<commit_message>
update experiment results on slides
</commit_message>
<xml_diff>
--- a/Slides/11761-slides.pptx
+++ b/Slides/11761-slides.pptx
@@ -17,7 +17,7 @@
     <p:sldId id="261" r:id="rId8"/>
     <p:sldId id="263" r:id="rId9"/>
     <p:sldId id="267" r:id="rId10"/>
-    <p:sldId id="270" r:id="rId11"/>
+    <p:sldId id="273" r:id="rId11"/>
     <p:sldId id="268" r:id="rId12"/>
     <p:sldId id="265" r:id="rId13"/>
     <p:sldId id="269" r:id="rId14"/>
@@ -124,6 +124,275 @@
 </p:presentation>
 </file>
 
+<file path=ppt/charts/chart1.xml><?xml version="1.0" encoding="utf-8"?>
+<c:chartSpace xmlns:c="http://schemas.openxmlformats.org/drawingml/2006/chart" xmlns:a="http://schemas.openxmlformats.org/drawingml/2006/main" xmlns:r="http://schemas.openxmlformats.org/officeDocument/2006/relationships">
+  <c:date1904 val="0"/>
+  <c:lang val="en-US"/>
+  <c:roundedCorners val="0"/>
+  <mc:AlternateContent xmlns:mc="http://schemas.openxmlformats.org/markup-compatibility/2006">
+    <mc:Choice xmlns:c14="http://schemas.microsoft.com/office/drawing/2007/8/2/chart" Requires="c14">
+      <c14:style val="102"/>
+    </mc:Choice>
+    <mc:Fallback>
+      <c:style val="2"/>
+    </mc:Fallback>
+  </mc:AlternateContent>
+  <c:chart>
+    <c:autoTitleDeleted val="0"/>
+    <c:plotArea>
+      <c:layout/>
+      <c:lineChart>
+        <c:grouping val="standard"/>
+        <c:varyColors val="0"/>
+        <c:ser>
+          <c:idx val="0"/>
+          <c:order val="0"/>
+          <c:tx>
+            <c:strRef>
+              <c:f>Sheet1!$B$1</c:f>
+              <c:strCache>
+                <c:ptCount val="1"/>
+                <c:pt idx="0">
+                  <c:v>Original DEV</c:v>
+                </c:pt>
+              </c:strCache>
+            </c:strRef>
+          </c:tx>
+          <c:cat>
+            <c:numRef>
+              <c:f>Sheet1!$A$2:$A$10</c:f>
+              <c:numCache>
+                <c:formatCode>General</c:formatCode>
+                <c:ptCount val="9"/>
+                <c:pt idx="0">
+                  <c:v>1</c:v>
+                </c:pt>
+                <c:pt idx="1">
+                  <c:v>2</c:v>
+                </c:pt>
+                <c:pt idx="2">
+                  <c:v>3</c:v>
+                </c:pt>
+                <c:pt idx="3">
+                  <c:v>4</c:v>
+                </c:pt>
+                <c:pt idx="4">
+                  <c:v>5</c:v>
+                </c:pt>
+                <c:pt idx="5">
+                  <c:v>7</c:v>
+                </c:pt>
+                <c:pt idx="6">
+                  <c:v>10</c:v>
+                </c:pt>
+                <c:pt idx="7">
+                  <c:v>15</c:v>
+                </c:pt>
+                <c:pt idx="8">
+                  <c:v>20</c:v>
+                </c:pt>
+              </c:numCache>
+            </c:numRef>
+          </c:cat>
+          <c:val>
+            <c:numRef>
+              <c:f>Sheet1!$B$2:$B$10</c:f>
+              <c:numCache>
+                <c:formatCode>General</c:formatCode>
+                <c:ptCount val="9"/>
+                <c:pt idx="0">
+                  <c:v>0.75</c:v>
+                </c:pt>
+                <c:pt idx="1">
+                  <c:v>0.9</c:v>
+                </c:pt>
+                <c:pt idx="2">
+                  <c:v>0.9</c:v>
+                </c:pt>
+                <c:pt idx="3">
+                  <c:v>0.95</c:v>
+                </c:pt>
+                <c:pt idx="4">
+                  <c:v>0.95</c:v>
+                </c:pt>
+                <c:pt idx="5">
+                  <c:v>1</c:v>
+                </c:pt>
+                <c:pt idx="6">
+                  <c:v>1</c:v>
+                </c:pt>
+                <c:pt idx="7">
+                  <c:v>1</c:v>
+                </c:pt>
+                <c:pt idx="8">
+                  <c:v>1</c:v>
+                </c:pt>
+              </c:numCache>
+            </c:numRef>
+          </c:val>
+          <c:smooth val="0"/>
+        </c:ser>
+        <c:ser>
+          <c:idx val="1"/>
+          <c:order val="1"/>
+          <c:tx>
+            <c:strRef>
+              <c:f>Sheet1!$C$1</c:f>
+              <c:strCache>
+                <c:ptCount val="1"/>
+                <c:pt idx="0">
+                  <c:v>Generated DEV</c:v>
+                </c:pt>
+              </c:strCache>
+            </c:strRef>
+          </c:tx>
+          <c:cat>
+            <c:numRef>
+              <c:f>Sheet1!$A$2:$A$10</c:f>
+              <c:numCache>
+                <c:formatCode>General</c:formatCode>
+                <c:ptCount val="9"/>
+                <c:pt idx="0">
+                  <c:v>1</c:v>
+                </c:pt>
+                <c:pt idx="1">
+                  <c:v>2</c:v>
+                </c:pt>
+                <c:pt idx="2">
+                  <c:v>3</c:v>
+                </c:pt>
+                <c:pt idx="3">
+                  <c:v>4</c:v>
+                </c:pt>
+                <c:pt idx="4">
+                  <c:v>5</c:v>
+                </c:pt>
+                <c:pt idx="5">
+                  <c:v>7</c:v>
+                </c:pt>
+                <c:pt idx="6">
+                  <c:v>10</c:v>
+                </c:pt>
+                <c:pt idx="7">
+                  <c:v>15</c:v>
+                </c:pt>
+                <c:pt idx="8">
+                  <c:v>20</c:v>
+                </c:pt>
+              </c:numCache>
+            </c:numRef>
+          </c:cat>
+          <c:val>
+            <c:numRef>
+              <c:f>Sheet1!$C$2:$C$10</c:f>
+              <c:numCache>
+                <c:formatCode>General</c:formatCode>
+                <c:ptCount val="9"/>
+                <c:pt idx="0">
+                  <c:v>0.73</c:v>
+                </c:pt>
+                <c:pt idx="1">
+                  <c:v>0.86</c:v>
+                </c:pt>
+                <c:pt idx="2">
+                  <c:v>0.86</c:v>
+                </c:pt>
+                <c:pt idx="3">
+                  <c:v>0.91</c:v>
+                </c:pt>
+                <c:pt idx="4">
+                  <c:v>0.95</c:v>
+                </c:pt>
+                <c:pt idx="5">
+                  <c:v>0.96</c:v>
+                </c:pt>
+                <c:pt idx="6">
+                  <c:v>0.99</c:v>
+                </c:pt>
+                <c:pt idx="7">
+                  <c:v>1</c:v>
+                </c:pt>
+                <c:pt idx="8">
+                  <c:v>1</c:v>
+                </c:pt>
+              </c:numCache>
+            </c:numRef>
+          </c:val>
+          <c:smooth val="0"/>
+        </c:ser>
+        <c:dLbls>
+          <c:showLegendKey val="0"/>
+          <c:showVal val="0"/>
+          <c:showCatName val="0"/>
+          <c:showSerName val="0"/>
+          <c:showPercent val="0"/>
+          <c:showBubbleSize val="0"/>
+        </c:dLbls>
+        <c:marker val="1"/>
+        <c:smooth val="0"/>
+        <c:axId val="63850752"/>
+        <c:axId val="63881216"/>
+      </c:lineChart>
+      <c:catAx>
+        <c:axId val="63850752"/>
+        <c:scaling>
+          <c:orientation val="minMax"/>
+        </c:scaling>
+        <c:delete val="0"/>
+        <c:axPos val="b"/>
+        <c:numFmt formatCode="General" sourceLinked="1"/>
+        <c:majorTickMark val="out"/>
+        <c:minorTickMark val="none"/>
+        <c:tickLblPos val="nextTo"/>
+        <c:crossAx val="63881216"/>
+        <c:crosses val="autoZero"/>
+        <c:auto val="1"/>
+        <c:lblAlgn val="ctr"/>
+        <c:lblOffset val="100"/>
+        <c:noMultiLvlLbl val="0"/>
+      </c:catAx>
+      <c:valAx>
+        <c:axId val="63881216"/>
+        <c:scaling>
+          <c:orientation val="minMax"/>
+        </c:scaling>
+        <c:delete val="0"/>
+        <c:axPos val="l"/>
+        <c:majorGridlines/>
+        <c:numFmt formatCode="General" sourceLinked="1"/>
+        <c:majorTickMark val="out"/>
+        <c:minorTickMark val="none"/>
+        <c:tickLblPos val="nextTo"/>
+        <c:crossAx val="63850752"/>
+        <c:crosses val="autoZero"/>
+        <c:crossBetween val="between"/>
+      </c:valAx>
+    </c:plotArea>
+    <c:legend>
+      <c:legendPos val="r"/>
+      <c:layout/>
+      <c:overlay val="0"/>
+    </c:legend>
+    <c:plotVisOnly val="1"/>
+    <c:dispBlanksAs val="gap"/>
+    <c:showDLblsOverMax val="0"/>
+  </c:chart>
+  <c:txPr>
+    <a:bodyPr/>
+    <a:lstStyle/>
+    <a:p>
+      <a:pPr>
+        <a:defRPr sz="1800"/>
+      </a:pPr>
+      <a:endParaRPr lang="en-US"/>
+    </a:p>
+  </c:txPr>
+  <c:externalData r:id="rId1">
+    <c:autoUpdate val="0"/>
+  </c:externalData>
+</c:chartSpace>
+</file>
+
 <file path=ppt/notesMasters/notesMaster1.xml><?xml version="1.0" encoding="utf-8"?>
 <p:notesMaster xmlns:a="http://schemas.openxmlformats.org/drawingml/2006/main" xmlns:r="http://schemas.openxmlformats.org/officeDocument/2006/relationships" xmlns:p="http://schemas.openxmlformats.org/presentationml/2006/main">
   <p:cSld>
@@ -475,6 +744,90 @@
 </file>
 
 <file path=ppt/notesSlides/notesSlide1.xml><?xml version="1.0" encoding="utf-8"?>
+<p:notes xmlns:a="http://schemas.openxmlformats.org/drawingml/2006/main" xmlns:r="http://schemas.openxmlformats.org/officeDocument/2006/relationships" xmlns:p="http://schemas.openxmlformats.org/presentationml/2006/main">
+  <p:cSld>
+    <p:spTree>
+      <p:nvGrpSpPr>
+        <p:cNvPr id="1" name=""/>
+        <p:cNvGrpSpPr/>
+        <p:nvPr/>
+      </p:nvGrpSpPr>
+      <p:grpSpPr>
+        <a:xfrm>
+          <a:off x="0" y="0"/>
+          <a:ext cx="0" cy="0"/>
+          <a:chOff x="0" y="0"/>
+          <a:chExt cx="0" cy="0"/>
+        </a:xfrm>
+      </p:grpSpPr>
+      <p:sp>
+        <p:nvSpPr>
+          <p:cNvPr id="2" name="Slide Image Placeholder 1"/>
+          <p:cNvSpPr>
+            <a:spLocks noGrp="1" noRot="1" noChangeAspect="1"/>
+          </p:cNvSpPr>
+          <p:nvPr>
+            <p:ph type="sldImg"/>
+          </p:nvPr>
+        </p:nvSpPr>
+        <p:spPr/>
+      </p:sp>
+      <p:sp>
+        <p:nvSpPr>
+          <p:cNvPr id="3" name="Notes Placeholder 2"/>
+          <p:cNvSpPr>
+            <a:spLocks noGrp="1"/>
+          </p:cNvSpPr>
+          <p:nvPr>
+            <p:ph type="body" idx="1"/>
+          </p:nvPr>
+        </p:nvSpPr>
+        <p:spPr/>
+        <p:txBody>
+          <a:bodyPr/>
+          <a:lstStyle/>
+          <a:p>
+            <a:endParaRPr lang="en-US" dirty="0"/>
+          </a:p>
+        </p:txBody>
+      </p:sp>
+      <p:sp>
+        <p:nvSpPr>
+          <p:cNvPr id="4" name="Slide Number Placeholder 3"/>
+          <p:cNvSpPr>
+            <a:spLocks noGrp="1"/>
+          </p:cNvSpPr>
+          <p:nvPr>
+            <p:ph type="sldNum" sz="quarter" idx="10"/>
+          </p:nvPr>
+        </p:nvSpPr>
+        <p:spPr/>
+        <p:txBody>
+          <a:bodyPr/>
+          <a:lstStyle/>
+          <a:p>
+            <a:fld id="{5AD49A89-4F47-40EF-A32F-B1E1EBB2236E}" type="slidenum">
+              <a:rPr lang="en-US" smtClean="0"/>
+              <a:t>9</a:t>
+            </a:fld>
+            <a:endParaRPr lang="en-US"/>
+          </a:p>
+        </p:txBody>
+      </p:sp>
+    </p:spTree>
+    <p:extLst>
+      <p:ext uri="{BB962C8B-B14F-4D97-AF65-F5344CB8AC3E}">
+        <p14:creationId xmlns:p14="http://schemas.microsoft.com/office/powerpoint/2010/main" val="3089979720"/>
+      </p:ext>
+    </p:extLst>
+  </p:cSld>
+  <p:clrMapOvr>
+    <a:masterClrMapping/>
+  </p:clrMapOvr>
+</p:notes>
+</file>
+
+<file path=ppt/notesSlides/notesSlide2.xml><?xml version="1.0" encoding="utf-8"?>
 <p:notes xmlns:a="http://schemas.openxmlformats.org/drawingml/2006/main" xmlns:r="http://schemas.openxmlformats.org/officeDocument/2006/relationships" xmlns:p="http://schemas.openxmlformats.org/presentationml/2006/main">
   <p:cSld>
     <p:spTree>
@@ -4097,113 +4450,108 @@
           <a:lstStyle/>
           <a:p>
             <a:r>
-              <a:rPr lang="en-US" dirty="0"/>
-              <a:t>Experimental results </a:t>
-            </a:r>
-            <a:r>
               <a:rPr lang="en-US" dirty="0" smtClean="0"/>
-              <a:t>(soft metric</a:t>
-            </a:r>
-            <a:r>
-              <a:rPr lang="en-US" dirty="0"/>
-              <a:t>)</a:t>
-            </a:r>
-          </a:p>
-        </p:txBody>
-      </p:sp>
-      <p:sp>
-        <p:nvSpPr>
-          <p:cNvPr id="3" name="Text Placeholder 2"/>
-          <p:cNvSpPr>
-            <a:spLocks noGrp="1"/>
-          </p:cNvSpPr>
-          <p:nvPr>
-            <p:ph type="body" idx="1"/>
-          </p:nvPr>
-        </p:nvSpPr>
-        <p:spPr/>
-        <p:txBody>
-          <a:bodyPr/>
+              <a:t>Experiment results</a:t>
+            </a:r>
+            <a:endParaRPr lang="en-US" dirty="0"/>
+          </a:p>
+        </p:txBody>
+      </p:sp>
+      <p:graphicFrame>
+        <p:nvGraphicFramePr>
+          <p:cNvPr id="7" name="Content Placeholder 6" title="Correctness vs. sentence number"/>
+          <p:cNvGraphicFramePr>
+            <a:graphicFrameLocks noGrp="1"/>
+          </p:cNvGraphicFramePr>
+          <p:nvPr>
+            <p:ph idx="1"/>
+            <p:extLst>
+              <p:ext uri="{D42A27DB-BD31-4B8C-83A1-F6EECF244321}">
+                <p14:modId xmlns:p14="http://schemas.microsoft.com/office/powerpoint/2010/main" val="3349619774"/>
+              </p:ext>
+            </p:extLst>
+          </p:nvPr>
+        </p:nvGraphicFramePr>
+        <p:xfrm>
+          <a:off x="457200" y="1600200"/>
+          <a:ext cx="8229600" cy="4876800"/>
+        </p:xfrm>
+        <a:graphic>
+          <a:graphicData uri="http://schemas.openxmlformats.org/drawingml/2006/chart">
+            <c:chart xmlns:c="http://schemas.openxmlformats.org/drawingml/2006/chart" xmlns:r="http://schemas.openxmlformats.org/officeDocument/2006/relationships" r:id="rId2"/>
+          </a:graphicData>
+        </a:graphic>
+      </p:graphicFrame>
+      <p:sp>
+        <p:nvSpPr>
+          <p:cNvPr id="8" name="TextBox 7"/>
+          <p:cNvSpPr txBox="1"/>
+          <p:nvPr/>
+        </p:nvSpPr>
+        <p:spPr>
+          <a:xfrm>
+            <a:off x="6553200" y="6172200"/>
+            <a:ext cx="1600200" cy="369332"/>
+          </a:xfrm>
+          <a:prstGeom prst="rect">
+            <a:avLst/>
+          </a:prstGeom>
+          <a:noFill/>
+        </p:spPr>
+        <p:txBody>
+          <a:bodyPr wrap="square" rtlCol="0">
+            <a:spAutoFit/>
+          </a:bodyPr>
           <a:lstStyle/>
           <a:p>
-            <a:endParaRPr lang="en-US"/>
-          </a:p>
-        </p:txBody>
-      </p:sp>
-      <p:sp>
-        <p:nvSpPr>
-          <p:cNvPr id="4" name="Content Placeholder 3"/>
-          <p:cNvSpPr>
-            <a:spLocks noGrp="1"/>
-          </p:cNvSpPr>
-          <p:nvPr>
-            <p:ph sz="half" idx="2"/>
-          </p:nvPr>
-        </p:nvSpPr>
-        <p:spPr/>
-        <p:txBody>
-          <a:bodyPr/>
+            <a:r>
+              <a:rPr lang="en-US" dirty="0" smtClean="0"/>
+              <a:t># sentences</a:t>
+            </a:r>
+            <a:endParaRPr lang="en-US" dirty="0"/>
+          </a:p>
+        </p:txBody>
+      </p:sp>
+      <p:sp>
+        <p:nvSpPr>
+          <p:cNvPr id="9" name="TextBox 8"/>
+          <p:cNvSpPr txBox="1"/>
+          <p:nvPr/>
+        </p:nvSpPr>
+        <p:spPr>
+          <a:xfrm>
+            <a:off x="152400" y="1295400"/>
+            <a:ext cx="1219200" cy="369332"/>
+          </a:xfrm>
+          <a:prstGeom prst="rect">
+            <a:avLst/>
+          </a:prstGeom>
+          <a:noFill/>
+        </p:spPr>
+        <p:txBody>
+          <a:bodyPr wrap="square" rtlCol="0">
+            <a:spAutoFit/>
+          </a:bodyPr>
           <a:lstStyle/>
           <a:p>
-            <a:endParaRPr lang="en-US"/>
-          </a:p>
-        </p:txBody>
-      </p:sp>
-      <p:sp>
-        <p:nvSpPr>
-          <p:cNvPr id="5" name="Text Placeholder 4"/>
-          <p:cNvSpPr>
-            <a:spLocks noGrp="1"/>
-          </p:cNvSpPr>
-          <p:nvPr>
-            <p:ph type="body" sz="quarter" idx="3"/>
-          </p:nvPr>
-        </p:nvSpPr>
-        <p:spPr/>
-        <p:txBody>
-          <a:bodyPr/>
-          <a:lstStyle/>
-          <a:p>
-            <a:endParaRPr lang="en-US"/>
-          </a:p>
-        </p:txBody>
-      </p:sp>
-      <p:sp>
-        <p:nvSpPr>
-          <p:cNvPr id="6" name="Content Placeholder 5"/>
-          <p:cNvSpPr>
-            <a:spLocks noGrp="1"/>
-          </p:cNvSpPr>
-          <p:nvPr>
-            <p:ph sz="quarter" idx="4"/>
-          </p:nvPr>
-        </p:nvSpPr>
-        <p:spPr/>
-        <p:txBody>
-          <a:bodyPr/>
-          <a:lstStyle/>
-          <a:p>
-            <a:endParaRPr lang="en-US"/>
+            <a:r>
+              <a:rPr lang="en-US" dirty="0" smtClean="0"/>
+              <a:t>Accuracy</a:t>
+            </a:r>
+            <a:endParaRPr lang="en-US" dirty="0"/>
           </a:p>
         </p:txBody>
       </p:sp>
     </p:spTree>
     <p:extLst>
       <p:ext uri="{BB962C8B-B14F-4D97-AF65-F5344CB8AC3E}">
-        <p14:creationId xmlns:p14="http://schemas.microsoft.com/office/powerpoint/2010/main" val="2627072666"/>
+        <p14:creationId xmlns:p14="http://schemas.microsoft.com/office/powerpoint/2010/main" val="3003807993"/>
       </p:ext>
     </p:extLst>
   </p:cSld>
   <p:clrMapOvr>
     <a:masterClrMapping/>
   </p:clrMapOvr>
-  <p:timing>
-    <p:tnLst>
-      <p:par>
-        <p:cTn id="1" dur="indefinite" restart="never" nodeType="tmRoot"/>
-      </p:par>
-    </p:tnLst>
-  </p:timing>
 </p:sld>
 </file>
 
@@ -5580,7 +5928,11 @@
           <a:p>
             <a:r>
               <a:rPr lang="en-US" dirty="0" smtClean="0"/>
-              <a:t>Experimental results (hard metric)</a:t>
+              <a:t>Experimental </a:t>
+            </a:r>
+            <a:r>
+              <a:rPr lang="en-US" dirty="0" smtClean="0"/>
+              <a:t>results</a:t>
             </a:r>
             <a:endParaRPr lang="en-US" dirty="0"/>
           </a:p>
@@ -5602,18 +5954,18 @@
           <a:lstStyle/>
           <a:p>
             <a:r>
-              <a:rPr lang="en-US" dirty="0" smtClean="0"/>
+              <a:rPr lang="en-US" b="1" dirty="0" smtClean="0"/>
               <a:t>Original </a:t>
             </a:r>
             <a:r>
-              <a:rPr lang="en-US" dirty="0" err="1" smtClean="0"/>
+              <a:rPr lang="en-US" b="1" dirty="0" err="1" smtClean="0"/>
               <a:t>Dev</a:t>
             </a:r>
             <a:r>
-              <a:rPr lang="en-US" dirty="0" smtClean="0"/>
+              <a:rPr lang="en-US" b="1" dirty="0" smtClean="0"/>
               <a:t> Set</a:t>
             </a:r>
-            <a:endParaRPr lang="en-US" dirty="0"/>
+            <a:endParaRPr lang="en-US" b="1" dirty="0"/>
           </a:p>
         </p:txBody>
       </p:sp>
@@ -5627,13 +5979,13 @@
             <p:ph sz="half" idx="2"/>
             <p:extLst>
               <p:ext uri="{D42A27DB-BD31-4B8C-83A1-F6EECF244321}">
-                <p14:modId xmlns:p14="http://schemas.microsoft.com/office/powerpoint/2010/main" val="4138287914"/>
+                <p14:modId xmlns:p14="http://schemas.microsoft.com/office/powerpoint/2010/main" val="2446293108"/>
               </p:ext>
             </p:extLst>
           </p:nvPr>
         </p:nvGraphicFramePr>
         <p:xfrm>
-          <a:off x="457200" y="2438400"/>
+          <a:off x="457200" y="3114040"/>
           <a:ext cx="3932235" cy="1381760"/>
         </p:xfrm>
         <a:graphic>
@@ -5883,18 +6235,18 @@
           <a:lstStyle/>
           <a:p>
             <a:r>
-              <a:rPr lang="en-US" dirty="0" smtClean="0"/>
+              <a:rPr lang="en-US" b="1" dirty="0" smtClean="0"/>
               <a:t>Generated </a:t>
             </a:r>
             <a:r>
-              <a:rPr lang="en-US" dirty="0" err="1" smtClean="0"/>
+              <a:rPr lang="en-US" b="1" dirty="0" err="1" smtClean="0"/>
               <a:t>Dev</a:t>
             </a:r>
             <a:r>
-              <a:rPr lang="en-US" dirty="0" smtClean="0"/>
+              <a:rPr lang="en-US" b="1" dirty="0" smtClean="0"/>
               <a:t> Set</a:t>
             </a:r>
-            <a:endParaRPr lang="en-US" dirty="0"/>
+            <a:endParaRPr lang="en-US" b="1" dirty="0"/>
           </a:p>
         </p:txBody>
       </p:sp>
@@ -5908,14 +6260,14 @@
             <p:ph sz="quarter" idx="4"/>
             <p:extLst>
               <p:ext uri="{D42A27DB-BD31-4B8C-83A1-F6EECF244321}">
-                <p14:modId xmlns:p14="http://schemas.microsoft.com/office/powerpoint/2010/main" val="538300338"/>
+                <p14:modId xmlns:p14="http://schemas.microsoft.com/office/powerpoint/2010/main" val="2421856549"/>
               </p:ext>
             </p:extLst>
           </p:nvPr>
         </p:nvGraphicFramePr>
         <p:xfrm>
-          <a:off x="4754563" y="2438400"/>
-          <a:ext cx="3932235" cy="1381760"/>
+          <a:off x="4754563" y="3114040"/>
+          <a:ext cx="4237035" cy="1381760"/>
         </p:xfrm>
         <a:graphic>
           <a:graphicData uri="http://schemas.openxmlformats.org/drawingml/2006/table">
@@ -5924,11 +6276,11 @@
                 <a:tableStyleId>{5C22544A-7EE6-4342-B048-85BDC9FD1C3A}</a:tableStyleId>
               </a:tblPr>
               <a:tblGrid>
-                <a:gridCol w="786447"/>
-                <a:gridCol w="786447"/>
-                <a:gridCol w="786447"/>
-                <a:gridCol w="786447"/>
-                <a:gridCol w="786447"/>
+                <a:gridCol w="847407"/>
+                <a:gridCol w="847407"/>
+                <a:gridCol w="847407"/>
+                <a:gridCol w="847407"/>
+                <a:gridCol w="847407"/>
               </a:tblGrid>
               <a:tr h="370840">
                 <a:tc>
@@ -6147,13 +6499,13 @@
           <p:nvPr>
             <p:extLst>
               <p:ext uri="{D42A27DB-BD31-4B8C-83A1-F6EECF244321}">
-                <p14:modId xmlns:p14="http://schemas.microsoft.com/office/powerpoint/2010/main" val="656003614"/>
+                <p14:modId xmlns:p14="http://schemas.microsoft.com/office/powerpoint/2010/main" val="638539270"/>
               </p:ext>
             </p:extLst>
           </p:nvPr>
         </p:nvGraphicFramePr>
         <p:xfrm>
-          <a:off x="457200" y="4343400"/>
+          <a:off x="457200" y="5029200"/>
           <a:ext cx="3932235" cy="1381760"/>
         </p:xfrm>
         <a:graphic>
@@ -6177,7 +6529,7 @@
                     <a:p>
                       <a:r>
                         <a:rPr lang="en-US" dirty="0" smtClean="0"/>
-                        <a:t>LR</a:t>
+                        <a:t>LR-L1</a:t>
                       </a:r>
                       <a:endParaRPr lang="en-US" dirty="0"/>
                     </a:p>
@@ -6279,7 +6631,7 @@
                     <a:p>
                       <a:r>
                         <a:rPr lang="en-US" dirty="0" smtClean="0"/>
-                        <a:t>all</a:t>
+                        <a:t>All</a:t>
                       </a:r>
                       <a:endParaRPr lang="en-US" dirty="0"/>
                     </a:p>
@@ -6293,7 +6645,7 @@
                     <a:p>
                       <a:r>
                         <a:rPr lang="en-US" dirty="0" smtClean="0"/>
-                        <a:t>short</a:t>
+                        <a:t>Short</a:t>
                       </a:r>
                       <a:endParaRPr lang="en-US" dirty="0"/>
                     </a:p>
@@ -6321,6 +6673,22 @@
                     <a:bodyPr/>
                     <a:lstStyle/>
                     <a:p>
+                      <a:r>
+                        <a:rPr lang="en-US" dirty="0" err="1" smtClean="0"/>
+                        <a:t>Exp</a:t>
+                      </a:r>
+                      <a:r>
+                        <a:rPr lang="en-US" dirty="0" smtClean="0"/>
+                        <a:t>(</a:t>
+                      </a:r>
+                      <a:r>
+                        <a:rPr lang="en-US" dirty="0" err="1" smtClean="0"/>
+                        <a:t>ll</a:t>
+                      </a:r>
+                      <a:r>
+                        <a:rPr lang="en-US" dirty="0" smtClean="0"/>
+                        <a:t>)</a:t>
+                      </a:r>
                       <a:endParaRPr lang="en-US" dirty="0"/>
                     </a:p>
                   </a:txBody>
@@ -6331,6 +6699,10 @@
                     <a:bodyPr/>
                     <a:lstStyle/>
                     <a:p>
+                      <a:r>
+                        <a:rPr lang="en-US" dirty="0" smtClean="0"/>
+                        <a:t>0.7</a:t>
+                      </a:r>
                       <a:endParaRPr lang="en-US" dirty="0"/>
                     </a:p>
                   </a:txBody>
@@ -6341,7 +6713,11 @@
                     <a:bodyPr/>
                     <a:lstStyle/>
                     <a:p>
-                      <a:endParaRPr lang="en-US"/>
+                      <a:r>
+                        <a:rPr lang="en-US" dirty="0" smtClean="0"/>
+                        <a:t>0.73</a:t>
+                      </a:r>
+                      <a:endParaRPr lang="en-US" dirty="0"/>
                     </a:p>
                   </a:txBody>
                   <a:tcPr marL="43692" marR="43692"/>
@@ -6351,7 +6727,11 @@
                     <a:bodyPr/>
                     <a:lstStyle/>
                     <a:p>
-                      <a:endParaRPr lang="en-US"/>
+                      <a:r>
+                        <a:rPr lang="en-US" dirty="0" smtClean="0"/>
+                        <a:t>0.75</a:t>
+                      </a:r>
+                      <a:endParaRPr lang="en-US" dirty="0"/>
                     </a:p>
                   </a:txBody>
                   <a:tcPr marL="43692" marR="43692"/>
@@ -6361,6 +6741,10 @@
                     <a:bodyPr/>
                     <a:lstStyle/>
                     <a:p>
+                      <a:r>
+                        <a:rPr lang="en-US" dirty="0" smtClean="0"/>
+                        <a:t>0.76</a:t>
+                      </a:r>
                       <a:endParaRPr lang="en-US" dirty="0"/>
                     </a:p>
                   </a:txBody>
@@ -6380,14 +6764,14 @@
           <p:nvPr>
             <p:extLst>
               <p:ext uri="{D42A27DB-BD31-4B8C-83A1-F6EECF244321}">
-                <p14:modId xmlns:p14="http://schemas.microsoft.com/office/powerpoint/2010/main" val="2528470001"/>
+                <p14:modId xmlns:p14="http://schemas.microsoft.com/office/powerpoint/2010/main" val="1995753916"/>
               </p:ext>
             </p:extLst>
           </p:nvPr>
         </p:nvGraphicFramePr>
         <p:xfrm>
-          <a:off x="4800600" y="4343400"/>
-          <a:ext cx="3932235" cy="1381760"/>
+          <a:off x="4800600" y="5029200"/>
+          <a:ext cx="4267200" cy="1381760"/>
         </p:xfrm>
         <a:graphic>
           <a:graphicData uri="http://schemas.openxmlformats.org/drawingml/2006/table">
@@ -6396,11 +6780,11 @@
                 <a:tableStyleId>{5C22544A-7EE6-4342-B048-85BDC9FD1C3A}</a:tableStyleId>
               </a:tblPr>
               <a:tblGrid>
-                <a:gridCol w="786447"/>
-                <a:gridCol w="786447"/>
-                <a:gridCol w="786447"/>
-                <a:gridCol w="786447"/>
-                <a:gridCol w="786447"/>
+                <a:gridCol w="853440"/>
+                <a:gridCol w="853440"/>
+                <a:gridCol w="853440"/>
+                <a:gridCol w="853440"/>
+                <a:gridCol w="853440"/>
               </a:tblGrid>
               <a:tr h="370840">
                 <a:tc>
@@ -6410,7 +6794,7 @@
                     <a:p>
                       <a:r>
                         <a:rPr lang="en-US" dirty="0" smtClean="0"/>
-                        <a:t>LR</a:t>
+                        <a:t>LR-L1</a:t>
                       </a:r>
                       <a:endParaRPr lang="en-US" dirty="0"/>
                     </a:p>
@@ -6544,6 +6928,22 @@
                     <a:bodyPr/>
                     <a:lstStyle/>
                     <a:p>
+                      <a:r>
+                        <a:rPr lang="en-US" dirty="0" err="1" smtClean="0"/>
+                        <a:t>Exp</a:t>
+                      </a:r>
+                      <a:r>
+                        <a:rPr lang="en-US" dirty="0" smtClean="0"/>
+                        <a:t>(</a:t>
+                      </a:r>
+                      <a:r>
+                        <a:rPr lang="en-US" dirty="0" err="1" smtClean="0"/>
+                        <a:t>ll</a:t>
+                      </a:r>
+                      <a:r>
+                        <a:rPr lang="en-US" dirty="0" smtClean="0"/>
+                        <a:t>)</a:t>
+                      </a:r>
                       <a:endParaRPr lang="en-US" dirty="0"/>
                     </a:p>
                   </a:txBody>
@@ -6554,6 +6954,10 @@
                     <a:bodyPr/>
                     <a:lstStyle/>
                     <a:p>
+                      <a:r>
+                        <a:rPr lang="en-US" dirty="0" smtClean="0"/>
+                        <a:t>0.8</a:t>
+                      </a:r>
                       <a:endParaRPr lang="en-US" dirty="0"/>
                     </a:p>
                   </a:txBody>
@@ -6564,7 +6968,11 @@
                     <a:bodyPr/>
                     <a:lstStyle/>
                     <a:p>
-                      <a:endParaRPr lang="en-US"/>
+                      <a:r>
+                        <a:rPr lang="en-US" dirty="0" smtClean="0"/>
+                        <a:t>0.78</a:t>
+                      </a:r>
+                      <a:endParaRPr lang="en-US" dirty="0"/>
                     </a:p>
                   </a:txBody>
                   <a:tcPr marL="43692" marR="43692"/>
@@ -6574,7 +6982,11 @@
                     <a:bodyPr/>
                     <a:lstStyle/>
                     <a:p>
-                      <a:endParaRPr lang="en-US"/>
+                      <a:r>
+                        <a:rPr lang="en-US" dirty="0" smtClean="0"/>
+                        <a:t>0.8</a:t>
+                      </a:r>
+                      <a:endParaRPr lang="en-US" dirty="0"/>
                     </a:p>
                   </a:txBody>
                   <a:tcPr marL="43692" marR="43692"/>
@@ -6584,6 +6996,10 @@
                     <a:bodyPr/>
                     <a:lstStyle/>
                     <a:p>
+                      <a:r>
+                        <a:rPr lang="en-US" dirty="0" smtClean="0"/>
+                        <a:t>0.73</a:t>
+                      </a:r>
                       <a:endParaRPr lang="en-US" dirty="0"/>
                     </a:p>
                   </a:txBody>
@@ -6594,6 +7010,822 @@
           </a:graphicData>
         </a:graphic>
       </p:graphicFrame>
+      <p:sp>
+        <p:nvSpPr>
+          <p:cNvPr id="13" name="Text Placeholder 5"/>
+          <p:cNvSpPr txBox="1">
+            <a:spLocks/>
+          </p:cNvSpPr>
+          <p:nvPr/>
+        </p:nvSpPr>
+        <p:spPr>
+          <a:xfrm>
+            <a:off x="457200" y="4465638"/>
+            <a:ext cx="3931920" cy="639762"/>
+          </a:xfrm>
+          <a:prstGeom prst="rect">
+            <a:avLst/>
+          </a:prstGeom>
+          <a:noFill/>
+          <a:ln w="44450" cap="flat" cmpd="sng" algn="ctr">
+            <a:noFill/>
+            <a:prstDash val="solid"/>
+          </a:ln>
+          <a:effectLst/>
+        </p:spPr>
+        <p:txBody>
+          <a:bodyPr vert="horz" lIns="91440" tIns="45720" rIns="91440" bIns="45720" rtlCol="0" anchor="ctr">
+            <a:normAutofit/>
+          </a:bodyPr>
+          <a:lstStyle>
+            <a:lvl1pPr marL="0" indent="0" algn="ctr" defTabSz="914400" rtl="0" eaLnBrk="1" latinLnBrk="0" hangingPunct="1">
+              <a:spcBef>
+                <a:spcPct val="20000"/>
+              </a:spcBef>
+              <a:buClr>
+                <a:schemeClr val="accent1"/>
+              </a:buClr>
+              <a:buSzPct val="85000"/>
+              <a:buFont typeface="Arial" pitchFamily="34" charset="0"/>
+              <a:buNone/>
+              <a:defRPr sz="2000" b="0" kern="1200">
+                <a:solidFill>
+                  <a:schemeClr val="tx2"/>
+                </a:solidFill>
+                <a:latin typeface="+mn-lt"/>
+                <a:ea typeface="+mn-ea"/>
+                <a:cs typeface="+mn-cs"/>
+              </a:defRPr>
+            </a:lvl1pPr>
+            <a:lvl2pPr marL="457200" indent="0" algn="l" defTabSz="914400" rtl="0" eaLnBrk="1" latinLnBrk="0" hangingPunct="1">
+              <a:spcBef>
+                <a:spcPct val="20000"/>
+              </a:spcBef>
+              <a:buClr>
+                <a:schemeClr val="accent1"/>
+              </a:buClr>
+              <a:buSzPct val="85000"/>
+              <a:buFont typeface="Arial" pitchFamily="34" charset="0"/>
+              <a:buNone/>
+              <a:defRPr sz="2000" b="1" kern="1200">
+                <a:solidFill>
+                  <a:schemeClr val="tx1"/>
+                </a:solidFill>
+                <a:latin typeface="+mn-lt"/>
+                <a:ea typeface="+mn-ea"/>
+                <a:cs typeface="+mn-cs"/>
+              </a:defRPr>
+            </a:lvl2pPr>
+            <a:lvl3pPr marL="914400" indent="0" algn="l" defTabSz="914400" rtl="0" eaLnBrk="1" latinLnBrk="0" hangingPunct="1">
+              <a:spcBef>
+                <a:spcPct val="20000"/>
+              </a:spcBef>
+              <a:buClr>
+                <a:schemeClr val="accent1"/>
+              </a:buClr>
+              <a:buSzPct val="90000"/>
+              <a:buFont typeface="Arial" pitchFamily="34" charset="0"/>
+              <a:buNone/>
+              <a:defRPr sz="1800" b="1" kern="1200">
+                <a:solidFill>
+                  <a:schemeClr val="tx1"/>
+                </a:solidFill>
+                <a:latin typeface="+mn-lt"/>
+                <a:ea typeface="+mn-ea"/>
+                <a:cs typeface="+mn-cs"/>
+              </a:defRPr>
+            </a:lvl3pPr>
+            <a:lvl4pPr marL="1371600" indent="0" algn="l" defTabSz="914400" rtl="0" eaLnBrk="1" latinLnBrk="0" hangingPunct="1">
+              <a:spcBef>
+                <a:spcPct val="20000"/>
+              </a:spcBef>
+              <a:buClr>
+                <a:schemeClr val="accent1"/>
+              </a:buClr>
+              <a:buFont typeface="Arial" pitchFamily="34" charset="0"/>
+              <a:buNone/>
+              <a:defRPr sz="1600" b="1" kern="1200">
+                <a:solidFill>
+                  <a:schemeClr val="tx1"/>
+                </a:solidFill>
+                <a:latin typeface="+mn-lt"/>
+                <a:ea typeface="+mn-ea"/>
+                <a:cs typeface="+mn-cs"/>
+              </a:defRPr>
+            </a:lvl4pPr>
+            <a:lvl5pPr marL="1828800" indent="0" algn="l" defTabSz="914400" rtl="0" eaLnBrk="1" latinLnBrk="0" hangingPunct="1">
+              <a:spcBef>
+                <a:spcPct val="20000"/>
+              </a:spcBef>
+              <a:buClr>
+                <a:schemeClr val="accent1"/>
+              </a:buClr>
+              <a:buSzPct val="100000"/>
+              <a:buFont typeface="Arial" pitchFamily="34" charset="0"/>
+              <a:buNone/>
+              <a:defRPr sz="1600" b="1" kern="1200" baseline="0">
+                <a:solidFill>
+                  <a:schemeClr val="tx1"/>
+                </a:solidFill>
+                <a:latin typeface="+mn-lt"/>
+                <a:ea typeface="+mn-ea"/>
+                <a:cs typeface="+mn-cs"/>
+              </a:defRPr>
+            </a:lvl5pPr>
+            <a:lvl6pPr marL="2286000" indent="0" algn="l" defTabSz="914400" rtl="0" eaLnBrk="1" latinLnBrk="0" hangingPunct="1">
+              <a:spcBef>
+                <a:spcPct val="20000"/>
+              </a:spcBef>
+              <a:buClr>
+                <a:schemeClr val="accent1"/>
+              </a:buClr>
+              <a:buFont typeface="Arial" pitchFamily="34" charset="0"/>
+              <a:buNone/>
+              <a:defRPr sz="1600" b="1" kern="1200">
+                <a:solidFill>
+                  <a:schemeClr val="tx1"/>
+                </a:solidFill>
+                <a:latin typeface="+mn-lt"/>
+                <a:ea typeface="+mn-ea"/>
+                <a:cs typeface="+mn-cs"/>
+              </a:defRPr>
+            </a:lvl6pPr>
+            <a:lvl7pPr marL="2743200" indent="0" algn="l" defTabSz="914400" rtl="0" eaLnBrk="1" latinLnBrk="0" hangingPunct="1">
+              <a:spcBef>
+                <a:spcPct val="20000"/>
+              </a:spcBef>
+              <a:buClr>
+                <a:schemeClr val="accent1"/>
+              </a:buClr>
+              <a:buFont typeface="Arial" pitchFamily="34" charset="0"/>
+              <a:buNone/>
+              <a:defRPr sz="1600" b="1" kern="1200">
+                <a:solidFill>
+                  <a:schemeClr val="tx1"/>
+                </a:solidFill>
+                <a:latin typeface="+mn-lt"/>
+                <a:ea typeface="+mn-ea"/>
+                <a:cs typeface="+mn-cs"/>
+              </a:defRPr>
+            </a:lvl7pPr>
+            <a:lvl8pPr marL="3200400" indent="0" algn="l" defTabSz="914400" rtl="0" eaLnBrk="1" latinLnBrk="0" hangingPunct="1">
+              <a:spcBef>
+                <a:spcPct val="20000"/>
+              </a:spcBef>
+              <a:buClr>
+                <a:schemeClr val="accent1"/>
+              </a:buClr>
+              <a:buFont typeface="Arial" pitchFamily="34" charset="0"/>
+              <a:buNone/>
+              <a:defRPr sz="1600" b="1" kern="1200">
+                <a:solidFill>
+                  <a:schemeClr val="tx1"/>
+                </a:solidFill>
+                <a:latin typeface="+mn-lt"/>
+                <a:ea typeface="+mn-ea"/>
+                <a:cs typeface="+mn-cs"/>
+              </a:defRPr>
+            </a:lvl8pPr>
+            <a:lvl9pPr marL="3657600" indent="0" algn="l" defTabSz="914400" rtl="0" eaLnBrk="1" latinLnBrk="0" hangingPunct="1">
+              <a:spcBef>
+                <a:spcPct val="20000"/>
+              </a:spcBef>
+              <a:buClr>
+                <a:schemeClr val="accent1"/>
+              </a:buClr>
+              <a:buFont typeface="Arial" pitchFamily="34" charset="0"/>
+              <a:buNone/>
+              <a:defRPr sz="1600" b="1" kern="1200">
+                <a:solidFill>
+                  <a:schemeClr val="tx1"/>
+                </a:solidFill>
+                <a:latin typeface="+mn-lt"/>
+                <a:ea typeface="+mn-ea"/>
+                <a:cs typeface="+mn-cs"/>
+              </a:defRPr>
+            </a:lvl9pPr>
+          </a:lstStyle>
+          <a:p>
+            <a:r>
+              <a:rPr lang="en-US" dirty="0" smtClean="0"/>
+              <a:t>Soft Metric</a:t>
+            </a:r>
+            <a:endParaRPr lang="en-US" dirty="0"/>
+          </a:p>
+        </p:txBody>
+      </p:sp>
+      <p:sp>
+        <p:nvSpPr>
+          <p:cNvPr id="14" name="Text Placeholder 6"/>
+          <p:cNvSpPr txBox="1">
+            <a:spLocks/>
+          </p:cNvSpPr>
+          <p:nvPr/>
+        </p:nvSpPr>
+        <p:spPr>
+          <a:xfrm>
+            <a:off x="4754880" y="4465638"/>
+            <a:ext cx="3931920" cy="639762"/>
+          </a:xfrm>
+          <a:prstGeom prst="rect">
+            <a:avLst/>
+          </a:prstGeom>
+          <a:noFill/>
+          <a:ln w="44450" cap="flat" cmpd="sng" algn="ctr">
+            <a:noFill/>
+            <a:prstDash val="solid"/>
+          </a:ln>
+          <a:effectLst/>
+        </p:spPr>
+        <p:txBody>
+          <a:bodyPr vert="horz" lIns="91440" tIns="45720" rIns="91440" bIns="45720" rtlCol="0" anchor="ctr">
+            <a:normAutofit/>
+          </a:bodyPr>
+          <a:lstStyle>
+            <a:lvl1pPr marL="0" indent="0" algn="ctr" defTabSz="914400" rtl="0" eaLnBrk="1" latinLnBrk="0" hangingPunct="1">
+              <a:spcBef>
+                <a:spcPct val="20000"/>
+              </a:spcBef>
+              <a:buClr>
+                <a:schemeClr val="accent1"/>
+              </a:buClr>
+              <a:buSzPct val="85000"/>
+              <a:buFont typeface="Arial" pitchFamily="34" charset="0"/>
+              <a:buNone/>
+              <a:defRPr lang="en-US" sz="2000" b="0" kern="1200" dirty="0" smtClean="0">
+                <a:solidFill>
+                  <a:schemeClr val="tx2"/>
+                </a:solidFill>
+                <a:latin typeface="+mn-lt"/>
+                <a:ea typeface="+mn-ea"/>
+                <a:cs typeface="+mn-cs"/>
+              </a:defRPr>
+            </a:lvl1pPr>
+            <a:lvl2pPr marL="457200" indent="0" algn="l" defTabSz="914400" rtl="0" eaLnBrk="1" latinLnBrk="0" hangingPunct="1">
+              <a:spcBef>
+                <a:spcPct val="20000"/>
+              </a:spcBef>
+              <a:buClr>
+                <a:schemeClr val="accent1"/>
+              </a:buClr>
+              <a:buSzPct val="85000"/>
+              <a:buFont typeface="Arial" pitchFamily="34" charset="0"/>
+              <a:buNone/>
+              <a:defRPr sz="2000" b="1" kern="1200">
+                <a:solidFill>
+                  <a:schemeClr val="tx1"/>
+                </a:solidFill>
+                <a:latin typeface="+mn-lt"/>
+                <a:ea typeface="+mn-ea"/>
+                <a:cs typeface="+mn-cs"/>
+              </a:defRPr>
+            </a:lvl2pPr>
+            <a:lvl3pPr marL="914400" indent="0" algn="l" defTabSz="914400" rtl="0" eaLnBrk="1" latinLnBrk="0" hangingPunct="1">
+              <a:spcBef>
+                <a:spcPct val="20000"/>
+              </a:spcBef>
+              <a:buClr>
+                <a:schemeClr val="accent1"/>
+              </a:buClr>
+              <a:buSzPct val="90000"/>
+              <a:buFont typeface="Arial" pitchFamily="34" charset="0"/>
+              <a:buNone/>
+              <a:defRPr sz="1800" b="1" kern="1200">
+                <a:solidFill>
+                  <a:schemeClr val="tx1"/>
+                </a:solidFill>
+                <a:latin typeface="+mn-lt"/>
+                <a:ea typeface="+mn-ea"/>
+                <a:cs typeface="+mn-cs"/>
+              </a:defRPr>
+            </a:lvl3pPr>
+            <a:lvl4pPr marL="1371600" indent="0" algn="l" defTabSz="914400" rtl="0" eaLnBrk="1" latinLnBrk="0" hangingPunct="1">
+              <a:spcBef>
+                <a:spcPct val="20000"/>
+              </a:spcBef>
+              <a:buClr>
+                <a:schemeClr val="accent1"/>
+              </a:buClr>
+              <a:buFont typeface="Arial" pitchFamily="34" charset="0"/>
+              <a:buNone/>
+              <a:defRPr sz="1600" b="1" kern="1200">
+                <a:solidFill>
+                  <a:schemeClr val="tx1"/>
+                </a:solidFill>
+                <a:latin typeface="+mn-lt"/>
+                <a:ea typeface="+mn-ea"/>
+                <a:cs typeface="+mn-cs"/>
+              </a:defRPr>
+            </a:lvl4pPr>
+            <a:lvl5pPr marL="1828800" indent="0" algn="l" defTabSz="914400" rtl="0" eaLnBrk="1" latinLnBrk="0" hangingPunct="1">
+              <a:spcBef>
+                <a:spcPct val="20000"/>
+              </a:spcBef>
+              <a:buClr>
+                <a:schemeClr val="accent1"/>
+              </a:buClr>
+              <a:buSzPct val="100000"/>
+              <a:buFont typeface="Arial" pitchFamily="34" charset="0"/>
+              <a:buNone/>
+              <a:defRPr sz="1600" b="1" kern="1200" baseline="0">
+                <a:solidFill>
+                  <a:schemeClr val="tx1"/>
+                </a:solidFill>
+                <a:latin typeface="+mn-lt"/>
+                <a:ea typeface="+mn-ea"/>
+                <a:cs typeface="+mn-cs"/>
+              </a:defRPr>
+            </a:lvl5pPr>
+            <a:lvl6pPr marL="2286000" indent="0" algn="l" defTabSz="914400" rtl="0" eaLnBrk="1" latinLnBrk="0" hangingPunct="1">
+              <a:spcBef>
+                <a:spcPct val="20000"/>
+              </a:spcBef>
+              <a:buClr>
+                <a:schemeClr val="accent1"/>
+              </a:buClr>
+              <a:buFont typeface="Arial" pitchFamily="34" charset="0"/>
+              <a:buNone/>
+              <a:defRPr sz="1600" b="1" kern="1200">
+                <a:solidFill>
+                  <a:schemeClr val="tx1"/>
+                </a:solidFill>
+                <a:latin typeface="+mn-lt"/>
+                <a:ea typeface="+mn-ea"/>
+                <a:cs typeface="+mn-cs"/>
+              </a:defRPr>
+            </a:lvl6pPr>
+            <a:lvl7pPr marL="2743200" indent="0" algn="l" defTabSz="914400" rtl="0" eaLnBrk="1" latinLnBrk="0" hangingPunct="1">
+              <a:spcBef>
+                <a:spcPct val="20000"/>
+              </a:spcBef>
+              <a:buClr>
+                <a:schemeClr val="accent1"/>
+              </a:buClr>
+              <a:buFont typeface="Arial" pitchFamily="34" charset="0"/>
+              <a:buNone/>
+              <a:defRPr sz="1600" b="1" kern="1200">
+                <a:solidFill>
+                  <a:schemeClr val="tx1"/>
+                </a:solidFill>
+                <a:latin typeface="+mn-lt"/>
+                <a:ea typeface="+mn-ea"/>
+                <a:cs typeface="+mn-cs"/>
+              </a:defRPr>
+            </a:lvl7pPr>
+            <a:lvl8pPr marL="3200400" indent="0" algn="l" defTabSz="914400" rtl="0" eaLnBrk="1" latinLnBrk="0" hangingPunct="1">
+              <a:spcBef>
+                <a:spcPct val="20000"/>
+              </a:spcBef>
+              <a:buClr>
+                <a:schemeClr val="accent1"/>
+              </a:buClr>
+              <a:buFont typeface="Arial" pitchFamily="34" charset="0"/>
+              <a:buNone/>
+              <a:defRPr sz="1600" b="1" kern="1200">
+                <a:solidFill>
+                  <a:schemeClr val="tx1"/>
+                </a:solidFill>
+                <a:latin typeface="+mn-lt"/>
+                <a:ea typeface="+mn-ea"/>
+                <a:cs typeface="+mn-cs"/>
+              </a:defRPr>
+            </a:lvl8pPr>
+            <a:lvl9pPr marL="3657600" indent="0" algn="l" defTabSz="914400" rtl="0" eaLnBrk="1" latinLnBrk="0" hangingPunct="1">
+              <a:spcBef>
+                <a:spcPct val="20000"/>
+              </a:spcBef>
+              <a:buClr>
+                <a:schemeClr val="accent1"/>
+              </a:buClr>
+              <a:buFont typeface="Arial" pitchFamily="34" charset="0"/>
+              <a:buNone/>
+              <a:defRPr sz="1600" b="1" kern="1200">
+                <a:solidFill>
+                  <a:schemeClr val="tx1"/>
+                </a:solidFill>
+                <a:latin typeface="+mn-lt"/>
+                <a:ea typeface="+mn-ea"/>
+                <a:cs typeface="+mn-cs"/>
+              </a:defRPr>
+            </a:lvl9pPr>
+          </a:lstStyle>
+          <a:p>
+            <a:r>
+              <a:rPr lang="en-US" dirty="0" smtClean="0"/>
+              <a:t>Soft Metric</a:t>
+            </a:r>
+            <a:endParaRPr lang="en-US" dirty="0"/>
+          </a:p>
+        </p:txBody>
+      </p:sp>
+      <p:sp>
+        <p:nvSpPr>
+          <p:cNvPr id="15" name="Text Placeholder 5"/>
+          <p:cNvSpPr txBox="1">
+            <a:spLocks/>
+          </p:cNvSpPr>
+          <p:nvPr/>
+        </p:nvSpPr>
+        <p:spPr>
+          <a:xfrm>
+            <a:off x="457200" y="2438400"/>
+            <a:ext cx="3931920" cy="639762"/>
+          </a:xfrm>
+          <a:prstGeom prst="rect">
+            <a:avLst/>
+          </a:prstGeom>
+          <a:noFill/>
+          <a:ln w="44450" cap="flat" cmpd="sng" algn="ctr">
+            <a:noFill/>
+            <a:prstDash val="solid"/>
+          </a:ln>
+          <a:effectLst/>
+        </p:spPr>
+        <p:txBody>
+          <a:bodyPr vert="horz" lIns="91440" tIns="45720" rIns="91440" bIns="45720" rtlCol="0" anchor="ctr">
+            <a:normAutofit/>
+          </a:bodyPr>
+          <a:lstStyle>
+            <a:lvl1pPr marL="0" indent="0" algn="ctr" defTabSz="914400" rtl="0" eaLnBrk="1" latinLnBrk="0" hangingPunct="1">
+              <a:spcBef>
+                <a:spcPct val="20000"/>
+              </a:spcBef>
+              <a:buClr>
+                <a:schemeClr val="accent1"/>
+              </a:buClr>
+              <a:buSzPct val="85000"/>
+              <a:buFont typeface="Arial" pitchFamily="34" charset="0"/>
+              <a:buNone/>
+              <a:defRPr sz="2000" b="0" kern="1200">
+                <a:solidFill>
+                  <a:schemeClr val="tx2"/>
+                </a:solidFill>
+                <a:latin typeface="+mn-lt"/>
+                <a:ea typeface="+mn-ea"/>
+                <a:cs typeface="+mn-cs"/>
+              </a:defRPr>
+            </a:lvl1pPr>
+            <a:lvl2pPr marL="457200" indent="0" algn="l" defTabSz="914400" rtl="0" eaLnBrk="1" latinLnBrk="0" hangingPunct="1">
+              <a:spcBef>
+                <a:spcPct val="20000"/>
+              </a:spcBef>
+              <a:buClr>
+                <a:schemeClr val="accent1"/>
+              </a:buClr>
+              <a:buSzPct val="85000"/>
+              <a:buFont typeface="Arial" pitchFamily="34" charset="0"/>
+              <a:buNone/>
+              <a:defRPr sz="2000" b="1" kern="1200">
+                <a:solidFill>
+                  <a:schemeClr val="tx1"/>
+                </a:solidFill>
+                <a:latin typeface="+mn-lt"/>
+                <a:ea typeface="+mn-ea"/>
+                <a:cs typeface="+mn-cs"/>
+              </a:defRPr>
+            </a:lvl2pPr>
+            <a:lvl3pPr marL="914400" indent="0" algn="l" defTabSz="914400" rtl="0" eaLnBrk="1" latinLnBrk="0" hangingPunct="1">
+              <a:spcBef>
+                <a:spcPct val="20000"/>
+              </a:spcBef>
+              <a:buClr>
+                <a:schemeClr val="accent1"/>
+              </a:buClr>
+              <a:buSzPct val="90000"/>
+              <a:buFont typeface="Arial" pitchFamily="34" charset="0"/>
+              <a:buNone/>
+              <a:defRPr sz="1800" b="1" kern="1200">
+                <a:solidFill>
+                  <a:schemeClr val="tx1"/>
+                </a:solidFill>
+                <a:latin typeface="+mn-lt"/>
+                <a:ea typeface="+mn-ea"/>
+                <a:cs typeface="+mn-cs"/>
+              </a:defRPr>
+            </a:lvl3pPr>
+            <a:lvl4pPr marL="1371600" indent="0" algn="l" defTabSz="914400" rtl="0" eaLnBrk="1" latinLnBrk="0" hangingPunct="1">
+              <a:spcBef>
+                <a:spcPct val="20000"/>
+              </a:spcBef>
+              <a:buClr>
+                <a:schemeClr val="accent1"/>
+              </a:buClr>
+              <a:buFont typeface="Arial" pitchFamily="34" charset="0"/>
+              <a:buNone/>
+              <a:defRPr sz="1600" b="1" kern="1200">
+                <a:solidFill>
+                  <a:schemeClr val="tx1"/>
+                </a:solidFill>
+                <a:latin typeface="+mn-lt"/>
+                <a:ea typeface="+mn-ea"/>
+                <a:cs typeface="+mn-cs"/>
+              </a:defRPr>
+            </a:lvl4pPr>
+            <a:lvl5pPr marL="1828800" indent="0" algn="l" defTabSz="914400" rtl="0" eaLnBrk="1" latinLnBrk="0" hangingPunct="1">
+              <a:spcBef>
+                <a:spcPct val="20000"/>
+              </a:spcBef>
+              <a:buClr>
+                <a:schemeClr val="accent1"/>
+              </a:buClr>
+              <a:buSzPct val="100000"/>
+              <a:buFont typeface="Arial" pitchFamily="34" charset="0"/>
+              <a:buNone/>
+              <a:defRPr sz="1600" b="1" kern="1200" baseline="0">
+                <a:solidFill>
+                  <a:schemeClr val="tx1"/>
+                </a:solidFill>
+                <a:latin typeface="+mn-lt"/>
+                <a:ea typeface="+mn-ea"/>
+                <a:cs typeface="+mn-cs"/>
+              </a:defRPr>
+            </a:lvl5pPr>
+            <a:lvl6pPr marL="2286000" indent="0" algn="l" defTabSz="914400" rtl="0" eaLnBrk="1" latinLnBrk="0" hangingPunct="1">
+              <a:spcBef>
+                <a:spcPct val="20000"/>
+              </a:spcBef>
+              <a:buClr>
+                <a:schemeClr val="accent1"/>
+              </a:buClr>
+              <a:buFont typeface="Arial" pitchFamily="34" charset="0"/>
+              <a:buNone/>
+              <a:defRPr sz="1600" b="1" kern="1200">
+                <a:solidFill>
+                  <a:schemeClr val="tx1"/>
+                </a:solidFill>
+                <a:latin typeface="+mn-lt"/>
+                <a:ea typeface="+mn-ea"/>
+                <a:cs typeface="+mn-cs"/>
+              </a:defRPr>
+            </a:lvl6pPr>
+            <a:lvl7pPr marL="2743200" indent="0" algn="l" defTabSz="914400" rtl="0" eaLnBrk="1" latinLnBrk="0" hangingPunct="1">
+              <a:spcBef>
+                <a:spcPct val="20000"/>
+              </a:spcBef>
+              <a:buClr>
+                <a:schemeClr val="accent1"/>
+              </a:buClr>
+              <a:buFont typeface="Arial" pitchFamily="34" charset="0"/>
+              <a:buNone/>
+              <a:defRPr sz="1600" b="1" kern="1200">
+                <a:solidFill>
+                  <a:schemeClr val="tx1"/>
+                </a:solidFill>
+                <a:latin typeface="+mn-lt"/>
+                <a:ea typeface="+mn-ea"/>
+                <a:cs typeface="+mn-cs"/>
+              </a:defRPr>
+            </a:lvl7pPr>
+            <a:lvl8pPr marL="3200400" indent="0" algn="l" defTabSz="914400" rtl="0" eaLnBrk="1" latinLnBrk="0" hangingPunct="1">
+              <a:spcBef>
+                <a:spcPct val="20000"/>
+              </a:spcBef>
+              <a:buClr>
+                <a:schemeClr val="accent1"/>
+              </a:buClr>
+              <a:buFont typeface="Arial" pitchFamily="34" charset="0"/>
+              <a:buNone/>
+              <a:defRPr sz="1600" b="1" kern="1200">
+                <a:solidFill>
+                  <a:schemeClr val="tx1"/>
+                </a:solidFill>
+                <a:latin typeface="+mn-lt"/>
+                <a:ea typeface="+mn-ea"/>
+                <a:cs typeface="+mn-cs"/>
+              </a:defRPr>
+            </a:lvl8pPr>
+            <a:lvl9pPr marL="3657600" indent="0" algn="l" defTabSz="914400" rtl="0" eaLnBrk="1" latinLnBrk="0" hangingPunct="1">
+              <a:spcBef>
+                <a:spcPct val="20000"/>
+              </a:spcBef>
+              <a:buClr>
+                <a:schemeClr val="accent1"/>
+              </a:buClr>
+              <a:buFont typeface="Arial" pitchFamily="34" charset="0"/>
+              <a:buNone/>
+              <a:defRPr sz="1600" b="1" kern="1200">
+                <a:solidFill>
+                  <a:schemeClr val="tx1"/>
+                </a:solidFill>
+                <a:latin typeface="+mn-lt"/>
+                <a:ea typeface="+mn-ea"/>
+                <a:cs typeface="+mn-cs"/>
+              </a:defRPr>
+            </a:lvl9pPr>
+          </a:lstStyle>
+          <a:p>
+            <a:r>
+              <a:rPr lang="en-US" dirty="0" smtClean="0"/>
+              <a:t>Hard Metric</a:t>
+            </a:r>
+            <a:endParaRPr lang="en-US" dirty="0"/>
+          </a:p>
+        </p:txBody>
+      </p:sp>
+      <p:sp>
+        <p:nvSpPr>
+          <p:cNvPr id="16" name="Text Placeholder 6"/>
+          <p:cNvSpPr txBox="1">
+            <a:spLocks/>
+          </p:cNvSpPr>
+          <p:nvPr/>
+        </p:nvSpPr>
+        <p:spPr>
+          <a:xfrm>
+            <a:off x="4754880" y="2438400"/>
+            <a:ext cx="3931920" cy="639762"/>
+          </a:xfrm>
+          <a:prstGeom prst="rect">
+            <a:avLst/>
+          </a:prstGeom>
+          <a:noFill/>
+          <a:ln w="44450" cap="flat" cmpd="sng" algn="ctr">
+            <a:noFill/>
+            <a:prstDash val="solid"/>
+          </a:ln>
+          <a:effectLst/>
+        </p:spPr>
+        <p:txBody>
+          <a:bodyPr vert="horz" lIns="91440" tIns="45720" rIns="91440" bIns="45720" rtlCol="0" anchor="ctr">
+            <a:normAutofit/>
+          </a:bodyPr>
+          <a:lstStyle>
+            <a:lvl1pPr marL="0" indent="0" algn="ctr" defTabSz="914400" rtl="0" eaLnBrk="1" latinLnBrk="0" hangingPunct="1">
+              <a:spcBef>
+                <a:spcPct val="20000"/>
+              </a:spcBef>
+              <a:buClr>
+                <a:schemeClr val="accent1"/>
+              </a:buClr>
+              <a:buSzPct val="85000"/>
+              <a:buFont typeface="Arial" pitchFamily="34" charset="0"/>
+              <a:buNone/>
+              <a:defRPr lang="en-US" sz="2000" b="0" kern="1200" dirty="0" smtClean="0">
+                <a:solidFill>
+                  <a:schemeClr val="tx2"/>
+                </a:solidFill>
+                <a:latin typeface="+mn-lt"/>
+                <a:ea typeface="+mn-ea"/>
+                <a:cs typeface="+mn-cs"/>
+              </a:defRPr>
+            </a:lvl1pPr>
+            <a:lvl2pPr marL="457200" indent="0" algn="l" defTabSz="914400" rtl="0" eaLnBrk="1" latinLnBrk="0" hangingPunct="1">
+              <a:spcBef>
+                <a:spcPct val="20000"/>
+              </a:spcBef>
+              <a:buClr>
+                <a:schemeClr val="accent1"/>
+              </a:buClr>
+              <a:buSzPct val="85000"/>
+              <a:buFont typeface="Arial" pitchFamily="34" charset="0"/>
+              <a:buNone/>
+              <a:defRPr sz="2000" b="1" kern="1200">
+                <a:solidFill>
+                  <a:schemeClr val="tx1"/>
+                </a:solidFill>
+                <a:latin typeface="+mn-lt"/>
+                <a:ea typeface="+mn-ea"/>
+                <a:cs typeface="+mn-cs"/>
+              </a:defRPr>
+            </a:lvl2pPr>
+            <a:lvl3pPr marL="914400" indent="0" algn="l" defTabSz="914400" rtl="0" eaLnBrk="1" latinLnBrk="0" hangingPunct="1">
+              <a:spcBef>
+                <a:spcPct val="20000"/>
+              </a:spcBef>
+              <a:buClr>
+                <a:schemeClr val="accent1"/>
+              </a:buClr>
+              <a:buSzPct val="90000"/>
+              <a:buFont typeface="Arial" pitchFamily="34" charset="0"/>
+              <a:buNone/>
+              <a:defRPr sz="1800" b="1" kern="1200">
+                <a:solidFill>
+                  <a:schemeClr val="tx1"/>
+                </a:solidFill>
+                <a:latin typeface="+mn-lt"/>
+                <a:ea typeface="+mn-ea"/>
+                <a:cs typeface="+mn-cs"/>
+              </a:defRPr>
+            </a:lvl3pPr>
+            <a:lvl4pPr marL="1371600" indent="0" algn="l" defTabSz="914400" rtl="0" eaLnBrk="1" latinLnBrk="0" hangingPunct="1">
+              <a:spcBef>
+                <a:spcPct val="20000"/>
+              </a:spcBef>
+              <a:buClr>
+                <a:schemeClr val="accent1"/>
+              </a:buClr>
+              <a:buFont typeface="Arial" pitchFamily="34" charset="0"/>
+              <a:buNone/>
+              <a:defRPr sz="1600" b="1" kern="1200">
+                <a:solidFill>
+                  <a:schemeClr val="tx1"/>
+                </a:solidFill>
+                <a:latin typeface="+mn-lt"/>
+                <a:ea typeface="+mn-ea"/>
+                <a:cs typeface="+mn-cs"/>
+              </a:defRPr>
+            </a:lvl4pPr>
+            <a:lvl5pPr marL="1828800" indent="0" algn="l" defTabSz="914400" rtl="0" eaLnBrk="1" latinLnBrk="0" hangingPunct="1">
+              <a:spcBef>
+                <a:spcPct val="20000"/>
+              </a:spcBef>
+              <a:buClr>
+                <a:schemeClr val="accent1"/>
+              </a:buClr>
+              <a:buSzPct val="100000"/>
+              <a:buFont typeface="Arial" pitchFamily="34" charset="0"/>
+              <a:buNone/>
+              <a:defRPr sz="1600" b="1" kern="1200" baseline="0">
+                <a:solidFill>
+                  <a:schemeClr val="tx1"/>
+                </a:solidFill>
+                <a:latin typeface="+mn-lt"/>
+                <a:ea typeface="+mn-ea"/>
+                <a:cs typeface="+mn-cs"/>
+              </a:defRPr>
+            </a:lvl5pPr>
+            <a:lvl6pPr marL="2286000" indent="0" algn="l" defTabSz="914400" rtl="0" eaLnBrk="1" latinLnBrk="0" hangingPunct="1">
+              <a:spcBef>
+                <a:spcPct val="20000"/>
+              </a:spcBef>
+              <a:buClr>
+                <a:schemeClr val="accent1"/>
+              </a:buClr>
+              <a:buFont typeface="Arial" pitchFamily="34" charset="0"/>
+              <a:buNone/>
+              <a:defRPr sz="1600" b="1" kern="1200">
+                <a:solidFill>
+                  <a:schemeClr val="tx1"/>
+                </a:solidFill>
+                <a:latin typeface="+mn-lt"/>
+                <a:ea typeface="+mn-ea"/>
+                <a:cs typeface="+mn-cs"/>
+              </a:defRPr>
+            </a:lvl6pPr>
+            <a:lvl7pPr marL="2743200" indent="0" algn="l" defTabSz="914400" rtl="0" eaLnBrk="1" latinLnBrk="0" hangingPunct="1">
+              <a:spcBef>
+                <a:spcPct val="20000"/>
+              </a:spcBef>
+              <a:buClr>
+                <a:schemeClr val="accent1"/>
+              </a:buClr>
+              <a:buFont typeface="Arial" pitchFamily="34" charset="0"/>
+              <a:buNone/>
+              <a:defRPr sz="1600" b="1" kern="1200">
+                <a:solidFill>
+                  <a:schemeClr val="tx1"/>
+                </a:solidFill>
+                <a:latin typeface="+mn-lt"/>
+                <a:ea typeface="+mn-ea"/>
+                <a:cs typeface="+mn-cs"/>
+              </a:defRPr>
+            </a:lvl7pPr>
+            <a:lvl8pPr marL="3200400" indent="0" algn="l" defTabSz="914400" rtl="0" eaLnBrk="1" latinLnBrk="0" hangingPunct="1">
+              <a:spcBef>
+                <a:spcPct val="20000"/>
+              </a:spcBef>
+              <a:buClr>
+                <a:schemeClr val="accent1"/>
+              </a:buClr>
+              <a:buFont typeface="Arial" pitchFamily="34" charset="0"/>
+              <a:buNone/>
+              <a:defRPr sz="1600" b="1" kern="1200">
+                <a:solidFill>
+                  <a:schemeClr val="tx1"/>
+                </a:solidFill>
+                <a:latin typeface="+mn-lt"/>
+                <a:ea typeface="+mn-ea"/>
+                <a:cs typeface="+mn-cs"/>
+              </a:defRPr>
+            </a:lvl8pPr>
+            <a:lvl9pPr marL="3657600" indent="0" algn="l" defTabSz="914400" rtl="0" eaLnBrk="1" latinLnBrk="0" hangingPunct="1">
+              <a:spcBef>
+                <a:spcPct val="20000"/>
+              </a:spcBef>
+              <a:buClr>
+                <a:schemeClr val="accent1"/>
+              </a:buClr>
+              <a:buFont typeface="Arial" pitchFamily="34" charset="0"/>
+              <a:buNone/>
+              <a:defRPr sz="1600" b="1" kern="1200">
+                <a:solidFill>
+                  <a:schemeClr val="tx1"/>
+                </a:solidFill>
+                <a:latin typeface="+mn-lt"/>
+                <a:ea typeface="+mn-ea"/>
+                <a:cs typeface="+mn-cs"/>
+              </a:defRPr>
+            </a:lvl9pPr>
+          </a:lstStyle>
+          <a:p>
+            <a:r>
+              <a:rPr lang="en-US" dirty="0" smtClean="0"/>
+              <a:t>Hard Metric</a:t>
+            </a:r>
+            <a:endParaRPr lang="en-US" dirty="0"/>
+          </a:p>
+        </p:txBody>
+      </p:sp>
     </p:spTree>
     <p:extLst>
       <p:ext uri="{BB962C8B-B14F-4D97-AF65-F5344CB8AC3E}">

</xml_diff>

<commit_message>
add one more pic where Di requested
</commit_message>
<xml_diff>
--- a/Slides/11761-slides.pptx
+++ b/Slides/11761-slides.pptx
@@ -5,23 +5,21 @@
     <p:sldMasterId id="2147483720" r:id="rId1"/>
   </p:sldMasterIdLst>
   <p:notesMasterIdLst>
-    <p:notesMasterId r:id="rId16"/>
+    <p:notesMasterId r:id="rId14"/>
   </p:notesMasterIdLst>
   <p:sldIdLst>
     <p:sldId id="256" r:id="rId2"/>
-    <p:sldId id="257" r:id="rId3"/>
-    <p:sldId id="258" r:id="rId4"/>
-    <p:sldId id="259" r:id="rId5"/>
-    <p:sldId id="260" r:id="rId6"/>
-    <p:sldId id="264" r:id="rId7"/>
-    <p:sldId id="261" r:id="rId8"/>
-    <p:sldId id="263" r:id="rId9"/>
-    <p:sldId id="267" r:id="rId10"/>
-    <p:sldId id="265" r:id="rId11"/>
-    <p:sldId id="274" r:id="rId12"/>
-    <p:sldId id="273" r:id="rId13"/>
-    <p:sldId id="269" r:id="rId14"/>
-    <p:sldId id="272" r:id="rId15"/>
+    <p:sldId id="258" r:id="rId3"/>
+    <p:sldId id="259" r:id="rId4"/>
+    <p:sldId id="260" r:id="rId5"/>
+    <p:sldId id="264" r:id="rId6"/>
+    <p:sldId id="263" r:id="rId7"/>
+    <p:sldId id="267" r:id="rId8"/>
+    <p:sldId id="265" r:id="rId9"/>
+    <p:sldId id="274" r:id="rId10"/>
+    <p:sldId id="273" r:id="rId11"/>
+    <p:sldId id="269" r:id="rId12"/>
+    <p:sldId id="279" r:id="rId13"/>
   </p:sldIdLst>
   <p:sldSz cx="9144000" cy="6858000" type="screen4x3"/>
   <p:notesSz cx="6858000" cy="9144000"/>
@@ -121,6 +119,13 @@
     </a:lvl9pPr>
   </p:defaultTextStyle>
 </p:presentation>
+</file>
+
+<file path=ppt/commentAuthors.xml><?xml version="1.0" encoding="utf-8"?>
+<p:cmAuthorLst xmlns:a="http://schemas.openxmlformats.org/drawingml/2006/main" xmlns:r="http://schemas.openxmlformats.org/officeDocument/2006/relationships" xmlns:p="http://schemas.openxmlformats.org/presentationml/2006/main">
+  <p:cmAuthor id="0" name="leo" initials="l" lastIdx="20" clrIdx="0"/>
+  <p:cmAuthor id="1" name="Hector Liu" initials="HL" lastIdx="1" clrIdx="1"/>
+</p:cmAuthorLst>
 </file>
 
 <file path=ppt/charts/chart1.xml><?xml version="1.0" encoding="utf-8"?>
@@ -329,11 +334,11 @@
         </c:dLbls>
         <c:marker val="1"/>
         <c:smooth val="0"/>
-        <c:axId val="63850752"/>
-        <c:axId val="63881216"/>
+        <c:axId val="49959680"/>
+        <c:axId val="49961216"/>
       </c:lineChart>
       <c:catAx>
-        <c:axId val="63850752"/>
+        <c:axId val="49959680"/>
         <c:scaling>
           <c:orientation val="minMax"/>
         </c:scaling>
@@ -343,7 +348,7 @@
         <c:majorTickMark val="out"/>
         <c:minorTickMark val="none"/>
         <c:tickLblPos val="nextTo"/>
-        <c:crossAx val="63881216"/>
+        <c:crossAx val="49961216"/>
         <c:crosses val="autoZero"/>
         <c:auto val="1"/>
         <c:lblAlgn val="ctr"/>
@@ -351,7 +356,7 @@
         <c:noMultiLvlLbl val="0"/>
       </c:catAx>
       <c:valAx>
-        <c:axId val="63881216"/>
+        <c:axId val="49961216"/>
         <c:scaling>
           <c:orientation val="minMax"/>
         </c:scaling>
@@ -362,7 +367,7 @@
         <c:majorTickMark val="out"/>
         <c:minorTickMark val="none"/>
         <c:tickLblPos val="nextTo"/>
-        <c:crossAx val="63850752"/>
+        <c:crossAx val="49959680"/>
         <c:crosses val="autoZero"/>
         <c:crossBetween val="between"/>
       </c:valAx>
@@ -390,6 +395,16 @@
     <c:autoUpdate val="0"/>
   </c:externalData>
 </c:chartSpace>
+</file>
+
+<file path=ppt/comments/comment1.xml><?xml version="1.0" encoding="utf-8"?>
+<p:cmLst xmlns:a="http://schemas.openxmlformats.org/drawingml/2006/main" xmlns:r="http://schemas.openxmlformats.org/officeDocument/2006/relationships" xmlns:p="http://schemas.openxmlformats.org/presentationml/2006/main">
+  <p:cm authorId="0" dt="2013-04-28T19:48:11.153" idx="15">
+    <p:pos x="826" y="1122"/>
+    <p:text>Changed the title and the box in this one
+</p:text>
+  </p:cm>
+</p:cmLst>
 </file>
 
 <file path=ppt/diagrams/colors1.xml><?xml version="1.0" encoding="utf-8"?>
@@ -1162,10 +1177,10 @@
         <a:p>
           <a:pPr rtl="0"/>
           <a:r>
-            <a:rPr lang="en-US" smtClean="0"/>
-            <a:t>About machine learning</a:t>
+            <a:rPr lang="en-US" dirty="0" smtClean="0"/>
+            <a:t>Best machine learning method</a:t>
           </a:r>
-          <a:endParaRPr lang="en-US"/>
+          <a:endParaRPr lang="en-US" dirty="0"/>
         </a:p>
       </dgm:t>
     </dgm:pt>
@@ -1238,10 +1253,10 @@
         <a:p>
           <a:pPr rtl="0"/>
           <a:r>
-            <a:rPr lang="en-US" smtClean="0"/>
+            <a:rPr lang="en-US" dirty="0" smtClean="0"/>
             <a:t>Logistic regression with LASSO</a:t>
           </a:r>
-          <a:endParaRPr lang="en-US"/>
+          <a:endParaRPr lang="en-US" dirty="0"/>
         </a:p>
       </dgm:t>
     </dgm:pt>
@@ -1276,10 +1291,10 @@
         <a:p>
           <a:pPr rtl="0"/>
           <a:r>
-            <a:rPr lang="en-US" smtClean="0"/>
-            <a:t>About features</a:t>
+            <a:rPr lang="en-US" dirty="0" smtClean="0"/>
+            <a:t>Best features</a:t>
           </a:r>
-          <a:endParaRPr lang="en-US"/>
+          <a:endParaRPr lang="en-US" dirty="0"/>
         </a:p>
       </dgm:t>
     </dgm:pt>
@@ -1314,10 +1329,10 @@
         <a:p>
           <a:pPr rtl="0"/>
           <a:r>
-            <a:rPr lang="en-US" smtClean="0"/>
-            <a:t>N-Gram model dominates</a:t>
+            <a:rPr lang="en-US" dirty="0" smtClean="0"/>
+            <a:t>Perplexities computed using n-gram models</a:t>
           </a:r>
-          <a:endParaRPr lang="en-US"/>
+          <a:endParaRPr lang="en-US" dirty="0"/>
         </a:p>
       </dgm:t>
     </dgm:pt>
@@ -1352,10 +1367,10 @@
         <a:p>
           <a:pPr rtl="0"/>
           <a:r>
-            <a:rPr lang="en-US" smtClean="0"/>
-            <a:t>Interaction between N-Gram is important</a:t>
+            <a:rPr lang="en-US" dirty="0" smtClean="0"/>
+            <a:t>No single n-gram model can detect fake sentences</a:t>
           </a:r>
-          <a:endParaRPr lang="en-US"/>
+          <a:endParaRPr lang="en-US" dirty="0"/>
         </a:p>
       </dgm:t>
     </dgm:pt>
@@ -1390,10 +1405,10 @@
         <a:p>
           <a:pPr rtl="0"/>
           <a:r>
-            <a:rPr lang="en-US" smtClean="0"/>
-            <a:t>Classification work well with two features</a:t>
+            <a:rPr lang="en-US" dirty="0" smtClean="0"/>
+            <a:t>Yet, two n-gram models are sufficient to classify accurately</a:t>
           </a:r>
-          <a:endParaRPr lang="en-US"/>
+          <a:endParaRPr lang="en-US" dirty="0"/>
         </a:p>
       </dgm:t>
     </dgm:pt>
@@ -1428,10 +1443,10 @@
         <a:p>
           <a:pPr rtl="0"/>
           <a:r>
-            <a:rPr lang="en-US" smtClean="0"/>
-            <a:t>Probability estimation work with all features</a:t>
+            <a:rPr lang="en-US" dirty="0" smtClean="0"/>
+            <a:t>Probability estimation may work better with all features</a:t>
           </a:r>
-          <a:endParaRPr lang="en-US"/>
+          <a:endParaRPr lang="en-US" dirty="0"/>
         </a:p>
       </dgm:t>
     </dgm:pt>
@@ -1505,7 +1520,7 @@
           <a:pPr rtl="0"/>
           <a:r>
             <a:rPr lang="en-US" dirty="0" smtClean="0"/>
-            <a:t>On development set</a:t>
+            <a:t>Was probably helpful on the development set</a:t>
           </a:r>
           <a:endParaRPr lang="en-US" dirty="0"/>
         </a:p>
@@ -1543,7 +1558,7 @@
           <a:pPr rtl="0"/>
           <a:r>
             <a:rPr lang="en-US" dirty="0" smtClean="0"/>
-            <a:t>Unsure on unseen data</a:t>
+            <a:t>Unsure about unseen data</a:t>
           </a:r>
           <a:endParaRPr lang="en-US" dirty="0"/>
         </a:p>
@@ -1580,6 +1595,13 @@
         </dgm:presLayoutVars>
       </dgm:prSet>
       <dgm:spPr/>
+      <dgm:t>
+        <a:bodyPr/>
+        <a:lstStyle/>
+        <a:p>
+          <a:endParaRPr lang="en-US"/>
+        </a:p>
+      </dgm:t>
     </dgm:pt>
     <dgm:pt modelId="{5E6E5065-D27F-4BE6-BC8B-F4D83F9DD436}" type="pres">
       <dgm:prSet presAssocID="{6A1381AF-A01C-445F-90A7-24879C7828EC}" presName="thickLine" presStyleLbl="alignNode1" presStyleIdx="0" presStyleCnt="3"/>
@@ -1592,6 +1614,13 @@
     <dgm:pt modelId="{AB075B35-1B73-4043-B1BA-4B25E356EAED}" type="pres">
       <dgm:prSet presAssocID="{6A1381AF-A01C-445F-90A7-24879C7828EC}" presName="tx1" presStyleLbl="revTx" presStyleIdx="0" presStyleCnt="11"/>
       <dgm:spPr/>
+      <dgm:t>
+        <a:bodyPr/>
+        <a:lstStyle/>
+        <a:p>
+          <a:endParaRPr lang="en-US"/>
+        </a:p>
+      </dgm:t>
     </dgm:pt>
     <dgm:pt modelId="{A7D99808-FCC3-4781-9F47-37CC1A7857BD}" type="pres">
       <dgm:prSet presAssocID="{6A1381AF-A01C-445F-90A7-24879C7828EC}" presName="vert1" presStyleCnt="0"/>
@@ -1612,13 +1641,20 @@
     <dgm:pt modelId="{419C8211-62DD-49A2-93EB-4A736EC5A07D}" type="pres">
       <dgm:prSet presAssocID="{CDE48057-40CE-4053-BED2-957CA0A003DD}" presName="tx2" presStyleLbl="revTx" presStyleIdx="1" presStyleCnt="11"/>
       <dgm:spPr/>
+      <dgm:t>
+        <a:bodyPr/>
+        <a:lstStyle/>
+        <a:p>
+          <a:endParaRPr lang="en-US"/>
+        </a:p>
+      </dgm:t>
     </dgm:pt>
     <dgm:pt modelId="{64F7D2C9-7D43-4A1C-8443-68F70A2BC45C}" type="pres">
       <dgm:prSet presAssocID="{CDE48057-40CE-4053-BED2-957CA0A003DD}" presName="vert2" presStyleCnt="0"/>
       <dgm:spPr/>
     </dgm:pt>
     <dgm:pt modelId="{2DEB8B99-959F-4D35-A9B3-5DEE2E479D35}" type="pres">
-      <dgm:prSet presAssocID="{CDE48057-40CE-4053-BED2-957CA0A003DD}" presName="thinLine2b" presStyleLbl="callout" presStyleIdx="0" presStyleCnt="8"/>
+      <dgm:prSet presAssocID="{CDE48057-40CE-4053-BED2-957CA0A003DD}" presName="thinLine2b" presStyleLbl="callout" presStyleIdx="0" presStyleCnt="8" custLinFactY="-307379" custLinFactNeighborY="-400000"/>
       <dgm:spPr/>
     </dgm:pt>
     <dgm:pt modelId="{B18B1069-EC54-49DC-964A-07CC04FC1E41}" type="pres">
@@ -1634,15 +1670,22 @@
       <dgm:spPr/>
     </dgm:pt>
     <dgm:pt modelId="{C2C22BDF-845C-4EBF-A8CE-834EFED01891}" type="pres">
-      <dgm:prSet presAssocID="{D848917D-1795-4268-BCA2-C06FED6A0235}" presName="tx2" presStyleLbl="revTx" presStyleIdx="2" presStyleCnt="11"/>
+      <dgm:prSet presAssocID="{D848917D-1795-4268-BCA2-C06FED6A0235}" presName="tx2" presStyleLbl="revTx" presStyleIdx="2" presStyleCnt="11" custLinFactNeighborY="-35353"/>
       <dgm:spPr/>
+      <dgm:t>
+        <a:bodyPr/>
+        <a:lstStyle/>
+        <a:p>
+          <a:endParaRPr lang="en-US"/>
+        </a:p>
+      </dgm:t>
     </dgm:pt>
     <dgm:pt modelId="{BC54AF69-06DB-4ADB-958F-125C5A60B53D}" type="pres">
       <dgm:prSet presAssocID="{D848917D-1795-4268-BCA2-C06FED6A0235}" presName="vert2" presStyleCnt="0"/>
       <dgm:spPr/>
     </dgm:pt>
     <dgm:pt modelId="{13FAB319-9FF9-467B-B0E8-6A3388FD9CD3}" type="pres">
-      <dgm:prSet presAssocID="{D848917D-1795-4268-BCA2-C06FED6A0235}" presName="thinLine2b" presStyleLbl="callout" presStyleIdx="1" presStyleCnt="8"/>
+      <dgm:prSet presAssocID="{D848917D-1795-4268-BCA2-C06FED6A0235}" presName="thinLine2b" presStyleLbl="callout" presStyleIdx="1" presStyleCnt="8" custLinFactY="-800000" custLinFactNeighborY="-818892"/>
       <dgm:spPr/>
     </dgm:pt>
     <dgm:pt modelId="{9D3DC200-BF66-43F7-B741-C5B3F1065909}" type="pres">
@@ -1650,8 +1693,22 @@
       <dgm:spPr/>
     </dgm:pt>
     <dgm:pt modelId="{0F627A40-9747-429A-9F74-98C4D1DFC96B}" type="pres">
-      <dgm:prSet presAssocID="{16CD1383-48D8-45C2-959C-55F06E915898}" presName="thickLine" presStyleLbl="alignNode1" presStyleIdx="1" presStyleCnt="3"/>
-      <dgm:spPr/>
+      <dgm:prSet presAssocID="{16CD1383-48D8-45C2-959C-55F06E915898}" presName="thickLine" presStyleLbl="alignNode1" presStyleIdx="1" presStyleCnt="3" custScaleY="121000" custLinFactNeighborY="-1613"/>
+      <dgm:spPr>
+        <a:blipFill rotWithShape="0">
+          <a:blip xmlns:r="http://schemas.openxmlformats.org/officeDocument/2006/relationships" r:embed="rId1"/>
+          <a:stretch>
+            <a:fillRect/>
+          </a:stretch>
+        </a:blipFill>
+      </dgm:spPr>
+      <dgm:t>
+        <a:bodyPr/>
+        <a:lstStyle/>
+        <a:p>
+          <a:endParaRPr lang="en-US"/>
+        </a:p>
+      </dgm:t>
     </dgm:pt>
     <dgm:pt modelId="{311D4938-07C4-41FA-808B-6EEA94F79FFF}" type="pres">
       <dgm:prSet presAssocID="{16CD1383-48D8-45C2-959C-55F06E915898}" presName="horz1" presStyleCnt="0"/>
@@ -1660,6 +1717,13 @@
     <dgm:pt modelId="{560C6FEE-501F-4600-97CF-74BDA866EF54}" type="pres">
       <dgm:prSet presAssocID="{16CD1383-48D8-45C2-959C-55F06E915898}" presName="tx1" presStyleLbl="revTx" presStyleIdx="3" presStyleCnt="11"/>
       <dgm:spPr/>
+      <dgm:t>
+        <a:bodyPr/>
+        <a:lstStyle/>
+        <a:p>
+          <a:endParaRPr lang="en-US"/>
+        </a:p>
+      </dgm:t>
     </dgm:pt>
     <dgm:pt modelId="{72A55848-2619-4D01-8635-81680A27D07B}" type="pres">
       <dgm:prSet presAssocID="{16CD1383-48D8-45C2-959C-55F06E915898}" presName="vert1" presStyleCnt="0"/>
@@ -1680,6 +1744,13 @@
     <dgm:pt modelId="{D5518AB7-F9E4-4B4E-A451-4A739A8F7E36}" type="pres">
       <dgm:prSet presAssocID="{FB98BC02-5F3A-475B-8F93-BD2F54D83AE3}" presName="tx2" presStyleLbl="revTx" presStyleIdx="4" presStyleCnt="11"/>
       <dgm:spPr/>
+      <dgm:t>
+        <a:bodyPr/>
+        <a:lstStyle/>
+        <a:p>
+          <a:endParaRPr lang="en-US"/>
+        </a:p>
+      </dgm:t>
     </dgm:pt>
     <dgm:pt modelId="{467D60B8-968F-4141-84C6-87068E9F0BB0}" type="pres">
       <dgm:prSet presAssocID="{FB98BC02-5F3A-475B-8F93-BD2F54D83AE3}" presName="vert2" presStyleCnt="0"/>
@@ -1704,6 +1775,13 @@
     <dgm:pt modelId="{45834C88-2E51-479B-A432-68F5A83EC9CF}" type="pres">
       <dgm:prSet presAssocID="{89EFD3E2-41A6-48CB-BAD0-E3B1D33B88EC}" presName="tx2" presStyleLbl="revTx" presStyleIdx="5" presStyleCnt="11"/>
       <dgm:spPr/>
+      <dgm:t>
+        <a:bodyPr/>
+        <a:lstStyle/>
+        <a:p>
+          <a:endParaRPr lang="en-US"/>
+        </a:p>
+      </dgm:t>
     </dgm:pt>
     <dgm:pt modelId="{6F3BEB6F-05C3-4158-8300-4775DD8AD434}" type="pres">
       <dgm:prSet presAssocID="{89EFD3E2-41A6-48CB-BAD0-E3B1D33B88EC}" presName="vert2" presStyleCnt="0"/>
@@ -1728,6 +1806,13 @@
     <dgm:pt modelId="{44F5A052-F93A-4674-8A7F-FFF84D191908}" type="pres">
       <dgm:prSet presAssocID="{270B6EAE-9F7E-4DED-88F3-08F7E241AB80}" presName="tx2" presStyleLbl="revTx" presStyleIdx="6" presStyleCnt="11"/>
       <dgm:spPr/>
+      <dgm:t>
+        <a:bodyPr/>
+        <a:lstStyle/>
+        <a:p>
+          <a:endParaRPr lang="en-US"/>
+        </a:p>
+      </dgm:t>
     </dgm:pt>
     <dgm:pt modelId="{32F1C9E3-A4B9-4CD0-8616-8C263FB6E525}" type="pres">
       <dgm:prSet presAssocID="{270B6EAE-9F7E-4DED-88F3-08F7E241AB80}" presName="vert2" presStyleCnt="0"/>
@@ -1752,6 +1837,13 @@
     <dgm:pt modelId="{C32D5754-64A0-4792-A0CF-A74C321D6ED0}" type="pres">
       <dgm:prSet presAssocID="{DD027C28-5537-4A58-A8AF-905AB40C41CB}" presName="tx2" presStyleLbl="revTx" presStyleIdx="7" presStyleCnt="11"/>
       <dgm:spPr/>
+      <dgm:t>
+        <a:bodyPr/>
+        <a:lstStyle/>
+        <a:p>
+          <a:endParaRPr lang="en-US"/>
+        </a:p>
+      </dgm:t>
     </dgm:pt>
     <dgm:pt modelId="{3C70B278-DA49-4488-B0F3-982B58BC9DEA}" type="pres">
       <dgm:prSet presAssocID="{DD027C28-5537-4A58-A8AF-905AB40C41CB}" presName="vert2" presStyleCnt="0"/>
@@ -1766,7 +1858,7 @@
       <dgm:spPr/>
     </dgm:pt>
     <dgm:pt modelId="{52D63BF3-F2BC-4E4D-88EA-BD030AD114D3}" type="pres">
-      <dgm:prSet presAssocID="{41596840-7F01-443B-A0D9-46C163BF2E25}" presName="thickLine" presStyleLbl="alignNode1" presStyleIdx="2" presStyleCnt="3"/>
+      <dgm:prSet presAssocID="{41596840-7F01-443B-A0D9-46C163BF2E25}" presName="thickLine" presStyleLbl="alignNode1" presStyleIdx="2" presStyleCnt="3" custLinFactNeighborY="-1515"/>
       <dgm:spPr/>
     </dgm:pt>
     <dgm:pt modelId="{055FD98E-D17E-4009-AC61-03B1D6919E44}" type="pres">
@@ -1776,6 +1868,13 @@
     <dgm:pt modelId="{AE6FE8FF-43CD-4176-8535-915338C5F596}" type="pres">
       <dgm:prSet presAssocID="{41596840-7F01-443B-A0D9-46C163BF2E25}" presName="tx1" presStyleLbl="revTx" presStyleIdx="8" presStyleCnt="11"/>
       <dgm:spPr/>
+      <dgm:t>
+        <a:bodyPr/>
+        <a:lstStyle/>
+        <a:p>
+          <a:endParaRPr lang="en-US"/>
+        </a:p>
+      </dgm:t>
     </dgm:pt>
     <dgm:pt modelId="{A409B240-9EDA-4C47-80B8-1CAA97C47DE2}" type="pres">
       <dgm:prSet presAssocID="{41596840-7F01-443B-A0D9-46C163BF2E25}" presName="vert1" presStyleCnt="0"/>
@@ -1809,7 +1908,7 @@
       <dgm:spPr/>
     </dgm:pt>
     <dgm:pt modelId="{4DE4C443-CFBB-44C0-8F4F-9DAEC67C78C9}" type="pres">
-      <dgm:prSet presAssocID="{DB975129-738B-4FEF-A56F-DED356E414CE}" presName="thinLine2b" presStyleLbl="callout" presStyleIdx="6" presStyleCnt="8"/>
+      <dgm:prSet presAssocID="{DB975129-738B-4FEF-A56F-DED356E414CE}" presName="thinLine2b" presStyleLbl="callout" presStyleIdx="6" presStyleCnt="8" custLinFactY="-400000" custLinFactNeighborY="-437835"/>
       <dgm:spPr/>
     </dgm:pt>
     <dgm:pt modelId="{0FADF7C2-EDE8-4F9F-85CD-6F4200A03E98}" type="pres">
@@ -1825,15 +1924,22 @@
       <dgm:spPr/>
     </dgm:pt>
     <dgm:pt modelId="{8FCFCF74-9697-472C-901A-02B542B6BDE7}" type="pres">
-      <dgm:prSet presAssocID="{BC45992A-838F-4597-A8AA-7E6496501A11}" presName="tx2" presStyleLbl="revTx" presStyleIdx="10" presStyleCnt="11"/>
+      <dgm:prSet presAssocID="{BC45992A-838F-4597-A8AA-7E6496501A11}" presName="tx2" presStyleLbl="revTx" presStyleIdx="10" presStyleCnt="11" custLinFactNeighborY="-45967"/>
       <dgm:spPr/>
+      <dgm:t>
+        <a:bodyPr/>
+        <a:lstStyle/>
+        <a:p>
+          <a:endParaRPr lang="en-US"/>
+        </a:p>
+      </dgm:t>
     </dgm:pt>
     <dgm:pt modelId="{2541D64E-1562-4E84-8F0D-871CB2849E19}" type="pres">
       <dgm:prSet presAssocID="{BC45992A-838F-4597-A8AA-7E6496501A11}" presName="vert2" presStyleCnt="0"/>
       <dgm:spPr/>
     </dgm:pt>
     <dgm:pt modelId="{CFBE7A41-3EDD-4238-91F2-C067D3200D74}" type="pres">
-      <dgm:prSet presAssocID="{BC45992A-838F-4597-A8AA-7E6496501A11}" presName="thinLine2b" presStyleLbl="callout" presStyleIdx="7" presStyleCnt="8"/>
+      <dgm:prSet presAssocID="{BC45992A-838F-4597-A8AA-7E6496501A11}" presName="thinLine2b" presStyleLbl="callout" presStyleIdx="7" presStyleCnt="8" custLinFactY="-847250" custLinFactNeighborY="-900000"/>
       <dgm:spPr/>
     </dgm:pt>
     <dgm:pt modelId="{D1D9C401-63E2-4114-BA5B-7D61B2B89A0C}" type="pres">
@@ -1842,29 +1948,29 @@
     </dgm:pt>
   </dgm:ptLst>
   <dgm:cxnLst>
+    <dgm:cxn modelId="{058B0B08-0F97-4894-A729-7841E74F8FFF}" srcId="{CD9D619F-EC56-49AA-B55F-3EE3E0735566}" destId="{16CD1383-48D8-45C2-959C-55F06E915898}" srcOrd="1" destOrd="0" parTransId="{7FD57C88-538A-46C9-A1B0-EABE0293F3C4}" sibTransId="{7DB5D6B9-8DEB-4775-B3C6-7D23FE28F932}"/>
+    <dgm:cxn modelId="{98481BE0-77FE-445D-97D8-50C923251D35}" type="presOf" srcId="{270B6EAE-9F7E-4DED-88F3-08F7E241AB80}" destId="{44F5A052-F93A-4674-8A7F-FFF84D191908}" srcOrd="0" destOrd="0" presId="urn:microsoft.com/office/officeart/2008/layout/LinedList"/>
+    <dgm:cxn modelId="{AFA0FAFC-EB15-4284-B5B7-913B27248AAC}" type="presOf" srcId="{41596840-7F01-443B-A0D9-46C163BF2E25}" destId="{AE6FE8FF-43CD-4176-8535-915338C5F596}" srcOrd="0" destOrd="0" presId="urn:microsoft.com/office/officeart/2008/layout/LinedList"/>
+    <dgm:cxn modelId="{8F76C265-80B7-4C54-9099-E6F10E2F3676}" type="presOf" srcId="{89EFD3E2-41A6-48CB-BAD0-E3B1D33B88EC}" destId="{45834C88-2E51-479B-A432-68F5A83EC9CF}" srcOrd="0" destOrd="0" presId="urn:microsoft.com/office/officeart/2008/layout/LinedList"/>
+    <dgm:cxn modelId="{AD65147E-13C2-475A-8278-C00B1B62B703}" type="presOf" srcId="{16CD1383-48D8-45C2-959C-55F06E915898}" destId="{560C6FEE-501F-4600-97CF-74BDA866EF54}" srcOrd="0" destOrd="0" presId="urn:microsoft.com/office/officeart/2008/layout/LinedList"/>
+    <dgm:cxn modelId="{4BE85DEE-9FA3-4D17-B801-9278E72FC6BA}" srcId="{6A1381AF-A01C-445F-90A7-24879C7828EC}" destId="{CDE48057-40CE-4053-BED2-957CA0A003DD}" srcOrd="0" destOrd="0" parTransId="{6FE5FC9F-3299-4A2F-8B71-B886A1A08B97}" sibTransId="{C8FB72BF-AFF0-4AC1-91C5-CBC471D7353B}"/>
+    <dgm:cxn modelId="{A97D518B-3659-4846-B4C1-72FF6E497709}" type="presOf" srcId="{CD9D619F-EC56-49AA-B55F-3EE3E0735566}" destId="{D56D0753-ADA1-4461-8D69-3DF7BE869F9E}" srcOrd="0" destOrd="0" presId="urn:microsoft.com/office/officeart/2008/layout/LinedList"/>
+    <dgm:cxn modelId="{AA2D4BEC-F258-44E5-8672-938F4DB3D918}" type="presOf" srcId="{DB975129-738B-4FEF-A56F-DED356E414CE}" destId="{AF1E62C2-D592-4F29-B31B-17F1F006747D}" srcOrd="0" destOrd="0" presId="urn:microsoft.com/office/officeart/2008/layout/LinedList"/>
+    <dgm:cxn modelId="{6CBC0E13-6964-413D-B414-2F589A3707EE}" type="presOf" srcId="{BC45992A-838F-4597-A8AA-7E6496501A11}" destId="{8FCFCF74-9697-472C-901A-02B542B6BDE7}" srcOrd="0" destOrd="0" presId="urn:microsoft.com/office/officeart/2008/layout/LinedList"/>
     <dgm:cxn modelId="{3E9D4D9C-0859-4456-ABE7-F56459934041}" srcId="{CD9D619F-EC56-49AA-B55F-3EE3E0735566}" destId="{41596840-7F01-443B-A0D9-46C163BF2E25}" srcOrd="2" destOrd="0" parTransId="{AA51ED06-316E-438A-B11E-667A8C52C91E}" sibTransId="{5C63B5A5-E2B9-4FCB-96B0-887B56875648}"/>
+    <dgm:cxn modelId="{1DB2C2CC-6F40-44EF-9370-D92B8A9E7033}" srcId="{CD9D619F-EC56-49AA-B55F-3EE3E0735566}" destId="{6A1381AF-A01C-445F-90A7-24879C7828EC}" srcOrd="0" destOrd="0" parTransId="{598460CD-B79B-4B05-8712-327003C861F1}" sibTransId="{D373FD65-98C1-4DED-AFEE-C06F46FC17AD}"/>
+    <dgm:cxn modelId="{9896E36C-0C3C-449A-8D79-4FCC1DC5978B}" type="presOf" srcId="{FB98BC02-5F3A-475B-8F93-BD2F54D83AE3}" destId="{D5518AB7-F9E4-4B4E-A451-4A739A8F7E36}" srcOrd="0" destOrd="0" presId="urn:microsoft.com/office/officeart/2008/layout/LinedList"/>
     <dgm:cxn modelId="{D02875AF-C372-452A-ACC3-F640A981B73E}" srcId="{16CD1383-48D8-45C2-959C-55F06E915898}" destId="{DD027C28-5537-4A58-A8AF-905AB40C41CB}" srcOrd="3" destOrd="0" parTransId="{87F64AE6-A834-4FA5-B128-DB13A0A150E4}" sibTransId="{E548D149-4073-4B03-895B-45E9560891A1}"/>
+    <dgm:cxn modelId="{AFF018A3-8CC6-450C-9EE6-21CD9E4CE6F1}" type="presOf" srcId="{CDE48057-40CE-4053-BED2-957CA0A003DD}" destId="{419C8211-62DD-49A2-93EB-4A736EC5A07D}" srcOrd="0" destOrd="0" presId="urn:microsoft.com/office/officeart/2008/layout/LinedList"/>
+    <dgm:cxn modelId="{DDC9CE0D-6006-4D11-80D7-E0D7F0AA7A5E}" srcId="{41596840-7F01-443B-A0D9-46C163BF2E25}" destId="{DB975129-738B-4FEF-A56F-DED356E414CE}" srcOrd="0" destOrd="0" parTransId="{7487AB0D-6F83-4DC9-8447-279AD54A95F7}" sibTransId="{2022F9FA-8224-480A-B2E8-9DCF7474DC9A}"/>
+    <dgm:cxn modelId="{76CE190E-6A2E-41C8-9566-0E48A7724E62}" srcId="{16CD1383-48D8-45C2-959C-55F06E915898}" destId="{270B6EAE-9F7E-4DED-88F3-08F7E241AB80}" srcOrd="2" destOrd="0" parTransId="{E4F85AAF-2E79-4A71-808B-A8682978CF95}" sibTransId="{8C35D3FF-1D2D-4DC5-97DF-FB1A1BCA2771}"/>
+    <dgm:cxn modelId="{3EB35914-D7B8-4915-A57E-AA0E8EEFF7E3}" srcId="{16CD1383-48D8-45C2-959C-55F06E915898}" destId="{89EFD3E2-41A6-48CB-BAD0-E3B1D33B88EC}" srcOrd="1" destOrd="0" parTransId="{AE024446-3FAD-4161-BD24-0036B48FC5A7}" sibTransId="{A0E74C0E-FE59-44E5-8B87-E2C955DFB117}"/>
+    <dgm:cxn modelId="{5ADA8672-0855-4E96-AC59-4295C7E7026E}" srcId="{16CD1383-48D8-45C2-959C-55F06E915898}" destId="{FB98BC02-5F3A-475B-8F93-BD2F54D83AE3}" srcOrd="0" destOrd="0" parTransId="{7F3444FF-FCB6-4D32-A0B0-B87B02AD1D32}" sibTransId="{639B6B47-0257-4AD7-8B12-1751BC9CCDD0}"/>
+    <dgm:cxn modelId="{02CB63F9-4F6E-4C7A-BB74-D60936D0EAAA}" type="presOf" srcId="{6A1381AF-A01C-445F-90A7-24879C7828EC}" destId="{AB075B35-1B73-4043-B1BA-4B25E356EAED}" srcOrd="0" destOrd="0" presId="urn:microsoft.com/office/officeart/2008/layout/LinedList"/>
     <dgm:cxn modelId="{5A5E0784-CCC7-46A6-A708-36DAAA59ACD8}" type="presOf" srcId="{DD027C28-5537-4A58-A8AF-905AB40C41CB}" destId="{C32D5754-64A0-4792-A0CF-A74C321D6ED0}" srcOrd="0" destOrd="0" presId="urn:microsoft.com/office/officeart/2008/layout/LinedList"/>
-    <dgm:cxn modelId="{9896E36C-0C3C-449A-8D79-4FCC1DC5978B}" type="presOf" srcId="{FB98BC02-5F3A-475B-8F93-BD2F54D83AE3}" destId="{D5518AB7-F9E4-4B4E-A451-4A739A8F7E36}" srcOrd="0" destOrd="0" presId="urn:microsoft.com/office/officeart/2008/layout/LinedList"/>
-    <dgm:cxn modelId="{6CBC0E13-6964-413D-B414-2F589A3707EE}" type="presOf" srcId="{BC45992A-838F-4597-A8AA-7E6496501A11}" destId="{8FCFCF74-9697-472C-901A-02B542B6BDE7}" srcOrd="0" destOrd="0" presId="urn:microsoft.com/office/officeart/2008/layout/LinedList"/>
-    <dgm:cxn modelId="{1DB2C2CC-6F40-44EF-9370-D92B8A9E7033}" srcId="{CD9D619F-EC56-49AA-B55F-3EE3E0735566}" destId="{6A1381AF-A01C-445F-90A7-24879C7828EC}" srcOrd="0" destOrd="0" parTransId="{598460CD-B79B-4B05-8712-327003C861F1}" sibTransId="{D373FD65-98C1-4DED-AFEE-C06F46FC17AD}"/>
-    <dgm:cxn modelId="{3EB35914-D7B8-4915-A57E-AA0E8EEFF7E3}" srcId="{16CD1383-48D8-45C2-959C-55F06E915898}" destId="{89EFD3E2-41A6-48CB-BAD0-E3B1D33B88EC}" srcOrd="1" destOrd="0" parTransId="{AE024446-3FAD-4161-BD24-0036B48FC5A7}" sibTransId="{A0E74C0E-FE59-44E5-8B87-E2C955DFB117}"/>
-    <dgm:cxn modelId="{4BE85DEE-9FA3-4D17-B801-9278E72FC6BA}" srcId="{6A1381AF-A01C-445F-90A7-24879C7828EC}" destId="{CDE48057-40CE-4053-BED2-957CA0A003DD}" srcOrd="0" destOrd="0" parTransId="{6FE5FC9F-3299-4A2F-8B71-B886A1A08B97}" sibTransId="{C8FB72BF-AFF0-4AC1-91C5-CBC471D7353B}"/>
+    <dgm:cxn modelId="{CF3FE78F-A205-41F5-8A57-E4CB408060E3}" type="presOf" srcId="{D848917D-1795-4268-BCA2-C06FED6A0235}" destId="{C2C22BDF-845C-4EBF-A8CE-834EFED01891}" srcOrd="0" destOrd="0" presId="urn:microsoft.com/office/officeart/2008/layout/LinedList"/>
     <dgm:cxn modelId="{CDBE8DBE-7BE2-41B7-A23D-1EC39F678550}" srcId="{6A1381AF-A01C-445F-90A7-24879C7828EC}" destId="{D848917D-1795-4268-BCA2-C06FED6A0235}" srcOrd="1" destOrd="0" parTransId="{7006242D-1D6E-4628-A62C-BF22DB2E10A8}" sibTransId="{C1D278D2-E65E-4ADF-ACAB-31467CDD5A4E}"/>
-    <dgm:cxn modelId="{058B0B08-0F97-4894-A729-7841E74F8FFF}" srcId="{CD9D619F-EC56-49AA-B55F-3EE3E0735566}" destId="{16CD1383-48D8-45C2-959C-55F06E915898}" srcOrd="1" destOrd="0" parTransId="{7FD57C88-538A-46C9-A1B0-EABE0293F3C4}" sibTransId="{7DB5D6B9-8DEB-4775-B3C6-7D23FE28F932}"/>
-    <dgm:cxn modelId="{AA2D4BEC-F258-44E5-8672-938F4DB3D918}" type="presOf" srcId="{DB975129-738B-4FEF-A56F-DED356E414CE}" destId="{AF1E62C2-D592-4F29-B31B-17F1F006747D}" srcOrd="0" destOrd="0" presId="urn:microsoft.com/office/officeart/2008/layout/LinedList"/>
-    <dgm:cxn modelId="{5ADA8672-0855-4E96-AC59-4295C7E7026E}" srcId="{16CD1383-48D8-45C2-959C-55F06E915898}" destId="{FB98BC02-5F3A-475B-8F93-BD2F54D83AE3}" srcOrd="0" destOrd="0" parTransId="{7F3444FF-FCB6-4D32-A0B0-B87B02AD1D32}" sibTransId="{639B6B47-0257-4AD7-8B12-1751BC9CCDD0}"/>
-    <dgm:cxn modelId="{DDC9CE0D-6006-4D11-80D7-E0D7F0AA7A5E}" srcId="{41596840-7F01-443B-A0D9-46C163BF2E25}" destId="{DB975129-738B-4FEF-A56F-DED356E414CE}" srcOrd="0" destOrd="0" parTransId="{7487AB0D-6F83-4DC9-8447-279AD54A95F7}" sibTransId="{2022F9FA-8224-480A-B2E8-9DCF7474DC9A}"/>
-    <dgm:cxn modelId="{AD65147E-13C2-475A-8278-C00B1B62B703}" type="presOf" srcId="{16CD1383-48D8-45C2-959C-55F06E915898}" destId="{560C6FEE-501F-4600-97CF-74BDA866EF54}" srcOrd="0" destOrd="0" presId="urn:microsoft.com/office/officeart/2008/layout/LinedList"/>
-    <dgm:cxn modelId="{AFA0FAFC-EB15-4284-B5B7-913B27248AAC}" type="presOf" srcId="{41596840-7F01-443B-A0D9-46C163BF2E25}" destId="{AE6FE8FF-43CD-4176-8535-915338C5F596}" srcOrd="0" destOrd="0" presId="urn:microsoft.com/office/officeart/2008/layout/LinedList"/>
-    <dgm:cxn modelId="{02CB63F9-4F6E-4C7A-BB74-D60936D0EAAA}" type="presOf" srcId="{6A1381AF-A01C-445F-90A7-24879C7828EC}" destId="{AB075B35-1B73-4043-B1BA-4B25E356EAED}" srcOrd="0" destOrd="0" presId="urn:microsoft.com/office/officeart/2008/layout/LinedList"/>
-    <dgm:cxn modelId="{A97D518B-3659-4846-B4C1-72FF6E497709}" type="presOf" srcId="{CD9D619F-EC56-49AA-B55F-3EE3E0735566}" destId="{D56D0753-ADA1-4461-8D69-3DF7BE869F9E}" srcOrd="0" destOrd="0" presId="urn:microsoft.com/office/officeart/2008/layout/LinedList"/>
     <dgm:cxn modelId="{4193B2D0-6D97-4263-A6DB-84254E26BAF9}" srcId="{41596840-7F01-443B-A0D9-46C163BF2E25}" destId="{BC45992A-838F-4597-A8AA-7E6496501A11}" srcOrd="1" destOrd="0" parTransId="{7CB38A45-428A-427A-BCF9-F0B9B6C088F8}" sibTransId="{BB3CD21E-4531-4D49-BC25-0C8D2B6F3229}"/>
-    <dgm:cxn modelId="{76CE190E-6A2E-41C8-9566-0E48A7724E62}" srcId="{16CD1383-48D8-45C2-959C-55F06E915898}" destId="{270B6EAE-9F7E-4DED-88F3-08F7E241AB80}" srcOrd="2" destOrd="0" parTransId="{E4F85AAF-2E79-4A71-808B-A8682978CF95}" sibTransId="{8C35D3FF-1D2D-4DC5-97DF-FB1A1BCA2771}"/>
-    <dgm:cxn modelId="{98481BE0-77FE-445D-97D8-50C923251D35}" type="presOf" srcId="{270B6EAE-9F7E-4DED-88F3-08F7E241AB80}" destId="{44F5A052-F93A-4674-8A7F-FFF84D191908}" srcOrd="0" destOrd="0" presId="urn:microsoft.com/office/officeart/2008/layout/LinedList"/>
-    <dgm:cxn modelId="{CF3FE78F-A205-41F5-8A57-E4CB408060E3}" type="presOf" srcId="{D848917D-1795-4268-BCA2-C06FED6A0235}" destId="{C2C22BDF-845C-4EBF-A8CE-834EFED01891}" srcOrd="0" destOrd="0" presId="urn:microsoft.com/office/officeart/2008/layout/LinedList"/>
-    <dgm:cxn modelId="{8F76C265-80B7-4C54-9099-E6F10E2F3676}" type="presOf" srcId="{89EFD3E2-41A6-48CB-BAD0-E3B1D33B88EC}" destId="{45834C88-2E51-479B-A432-68F5A83EC9CF}" srcOrd="0" destOrd="0" presId="urn:microsoft.com/office/officeart/2008/layout/LinedList"/>
-    <dgm:cxn modelId="{AFF018A3-8CC6-450C-9EE6-21CD9E4CE6F1}" type="presOf" srcId="{CDE48057-40CE-4053-BED2-957CA0A003DD}" destId="{419C8211-62DD-49A2-93EB-4A736EC5A07D}" srcOrd="0" destOrd="0" presId="urn:microsoft.com/office/officeart/2008/layout/LinedList"/>
     <dgm:cxn modelId="{AA57365E-F4F9-4D7B-B19D-8B8C714DEF7C}" type="presParOf" srcId="{D56D0753-ADA1-4461-8D69-3DF7BE869F9E}" destId="{5E6E5065-D27F-4BE6-BC8B-F4D83F9DD436}" srcOrd="0" destOrd="0" presId="urn:microsoft.com/office/officeart/2008/layout/LinedList"/>
     <dgm:cxn modelId="{745DFED5-E0D1-41BA-82E8-FE49E54191A0}" type="presParOf" srcId="{D56D0753-ADA1-4461-8D69-3DF7BE869F9E}" destId="{21D77F04-6628-4610-90A8-3AA4D95EC13C}" srcOrd="1" destOrd="0" presId="urn:microsoft.com/office/officeart/2008/layout/LinedList"/>
     <dgm:cxn modelId="{C0EE1B6D-2BCE-496E-B67A-5A62B335BEAD}" type="presParOf" srcId="{21D77F04-6628-4610-90A8-3AA4D95EC13C}" destId="{AB075B35-1B73-4043-B1BA-4B25E356EAED}" srcOrd="0" destOrd="0" presId="urn:microsoft.com/office/officeart/2008/layout/LinedList"/>
@@ -2045,10 +2151,10 @@
             </a:spcAft>
           </a:pPr>
           <a:r>
-            <a:rPr lang="en-US" sz="2500" kern="1200" smtClean="0"/>
-            <a:t>About machine learning</a:t>
+            <a:rPr lang="en-US" sz="2500" kern="1200" dirty="0" smtClean="0"/>
+            <a:t>Best machine learning method</a:t>
           </a:r>
-          <a:endParaRPr lang="en-US" sz="2500" kern="1200"/>
+          <a:endParaRPr lang="en-US" sz="2500" kern="1200" dirty="0"/>
         </a:p>
       </dsp:txBody>
       <dsp:txXfrm>
@@ -2123,7 +2229,7 @@
       </dsp:nvSpPr>
       <dsp:spPr>
         <a:xfrm>
-          <a:off x="1645919" y="795038"/>
+          <a:off x="1645919" y="533400"/>
           <a:ext cx="6583679" cy="0"/>
         </a:xfrm>
         <a:prstGeom prst="line">
@@ -2171,7 +2277,7 @@
       </dsp:nvSpPr>
       <dsp:spPr>
         <a:xfrm>
-          <a:off x="1769364" y="832784"/>
+          <a:off x="1769364" y="565900"/>
           <a:ext cx="6460235" cy="754912"/>
         </a:xfrm>
         <a:prstGeom prst="rect">
@@ -2213,14 +2319,14 @@
             </a:spcAft>
           </a:pPr>
           <a:r>
-            <a:rPr lang="en-US" sz="1800" kern="1200" smtClean="0"/>
+            <a:rPr lang="en-US" sz="1800" kern="1200" dirty="0" smtClean="0"/>
             <a:t>Logistic regression with LASSO</a:t>
           </a:r>
-          <a:endParaRPr lang="en-US" sz="1800" kern="1200"/>
+          <a:endParaRPr lang="en-US" sz="1800" kern="1200" dirty="0"/>
         </a:p>
       </dsp:txBody>
       <dsp:txXfrm>
-        <a:off x="1769364" y="832784"/>
+        <a:off x="1769364" y="565900"/>
         <a:ext cx="6460235" cy="754912"/>
       </dsp:txXfrm>
     </dsp:sp>
@@ -2231,7 +2337,7 @@
       </dsp:nvSpPr>
       <dsp:spPr>
         <a:xfrm>
-          <a:off x="1645919" y="1587696"/>
+          <a:off x="1645919" y="990600"/>
           <a:ext cx="6583679" cy="0"/>
         </a:xfrm>
         <a:prstGeom prst="line">
@@ -2279,20 +2385,18 @@
       </dsp:nvSpPr>
       <dsp:spPr>
         <a:xfrm>
-          <a:off x="0" y="1626393"/>
+          <a:off x="0" y="1600198"/>
           <a:ext cx="8229599" cy="0"/>
         </a:xfrm>
         <a:prstGeom prst="line">
           <a:avLst/>
         </a:prstGeom>
-        <a:solidFill>
-          <a:schemeClr val="accent1">
-            <a:hueOff val="0"/>
-            <a:satOff val="0"/>
-            <a:lumOff val="0"/>
-            <a:alphaOff val="0"/>
-          </a:schemeClr>
-        </a:solidFill>
+        <a:blipFill rotWithShape="0">
+          <a:blip xmlns:r="http://schemas.openxmlformats.org/officeDocument/2006/relationships" r:embed="rId1"/>
+          <a:stretch>
+            <a:fillRect/>
+          </a:stretch>
+        </a:blipFill>
         <a:ln w="26425" cap="flat" cmpd="sng" algn="ctr">
           <a:solidFill>
             <a:schemeClr val="accent1">
@@ -2370,10 +2474,10 @@
             </a:spcAft>
           </a:pPr>
           <a:r>
-            <a:rPr lang="en-US" sz="2500" kern="1200" smtClean="0"/>
-            <a:t>About features</a:t>
+            <a:rPr lang="en-US" sz="2500" kern="1200" dirty="0" smtClean="0"/>
+            <a:t>Best features</a:t>
           </a:r>
-          <a:endParaRPr lang="en-US" sz="2500" kern="1200"/>
+          <a:endParaRPr lang="en-US" sz="2500" kern="1200" dirty="0"/>
         </a:p>
       </dsp:txBody>
       <dsp:txXfrm>
@@ -2430,10 +2534,10 @@
             </a:spcAft>
           </a:pPr>
           <a:r>
-            <a:rPr lang="en-US" sz="1800" kern="1200" smtClean="0"/>
-            <a:t>N-Gram model dominates</a:t>
+            <a:rPr lang="en-US" sz="1800" kern="1200" dirty="0" smtClean="0"/>
+            <a:t>Perplexities computed using n-gram models</a:t>
           </a:r>
-          <a:endParaRPr lang="en-US" sz="1800" kern="1200"/>
+          <a:endParaRPr lang="en-US" sz="1800" kern="1200" dirty="0"/>
         </a:p>
       </dsp:txBody>
       <dsp:txXfrm>
@@ -2538,10 +2642,10 @@
             </a:spcAft>
           </a:pPr>
           <a:r>
-            <a:rPr lang="en-US" sz="1800" kern="1200" smtClean="0"/>
-            <a:t>Interaction between N-Gram is important</a:t>
+            <a:rPr lang="en-US" sz="1800" kern="1200" dirty="0" smtClean="0"/>
+            <a:t>No single n-gram model can detect fake sentences</a:t>
           </a:r>
-          <a:endParaRPr lang="en-US" sz="1800" kern="1200"/>
+          <a:endParaRPr lang="en-US" sz="1800" kern="1200" dirty="0"/>
         </a:p>
       </dsp:txBody>
       <dsp:txXfrm>
@@ -2646,10 +2750,10 @@
             </a:spcAft>
           </a:pPr>
           <a:r>
-            <a:rPr lang="en-US" sz="1800" kern="1200" smtClean="0"/>
-            <a:t>Classification work well with two features</a:t>
+            <a:rPr lang="en-US" sz="1800" kern="1200" dirty="0" smtClean="0"/>
+            <a:t>Yet, two n-gram models are sufficient to classify accurately</a:t>
           </a:r>
-          <a:endParaRPr lang="en-US" sz="1800" kern="1200"/>
+          <a:endParaRPr lang="en-US" sz="1800" kern="1200" dirty="0"/>
         </a:p>
       </dsp:txBody>
       <dsp:txXfrm>
@@ -2754,10 +2858,10 @@
             </a:spcAft>
           </a:pPr>
           <a:r>
-            <a:rPr lang="en-US" sz="1800" kern="1200" smtClean="0"/>
-            <a:t>Probability estimation work with all features</a:t>
+            <a:rPr lang="en-US" sz="1800" kern="1200" dirty="0" smtClean="0"/>
+            <a:t>Probability estimation may work better with all features</a:t>
           </a:r>
-          <a:endParaRPr lang="en-US" sz="1800" kern="1200"/>
+          <a:endParaRPr lang="en-US" sz="1800" kern="1200" dirty="0"/>
         </a:p>
       </dsp:txBody>
       <dsp:txXfrm>
@@ -2820,7 +2924,7 @@
       </dsp:nvSpPr>
       <dsp:spPr>
         <a:xfrm>
-          <a:off x="0" y="3250406"/>
+          <a:off x="0" y="3225802"/>
           <a:ext cx="8229599" cy="0"/>
         </a:xfrm>
         <a:prstGeom prst="line">
@@ -2972,7 +3076,7 @@
           </a:pPr>
           <a:r>
             <a:rPr lang="en-US" sz="1800" kern="1200" dirty="0" smtClean="0"/>
-            <a:t>On development set</a:t>
+            <a:t>Was probably helpful on the development set</a:t>
           </a:r>
           <a:endParaRPr lang="en-US" sz="1800" kern="1200" dirty="0"/>
         </a:p>
@@ -2989,7 +3093,7 @@
       </dsp:nvSpPr>
       <dsp:spPr>
         <a:xfrm>
-          <a:off x="1645919" y="4043063"/>
+          <a:off x="1645919" y="3733800"/>
           <a:ext cx="6583679" cy="0"/>
         </a:xfrm>
         <a:prstGeom prst="line">
@@ -3037,7 +3141,7 @@
       </dsp:nvSpPr>
       <dsp:spPr>
         <a:xfrm>
-          <a:off x="1769364" y="4080809"/>
+          <a:off x="1769364" y="3733799"/>
           <a:ext cx="6460235" cy="754912"/>
         </a:xfrm>
         <a:prstGeom prst="rect">
@@ -3080,13 +3184,13 @@
           </a:pPr>
           <a:r>
             <a:rPr lang="en-US" sz="1800" kern="1200" dirty="0" smtClean="0"/>
-            <a:t>Unsure on unseen data</a:t>
+            <a:t>Unsure about unseen data</a:t>
           </a:r>
           <a:endParaRPr lang="en-US" sz="1800" kern="1200" dirty="0"/>
         </a:p>
       </dsp:txBody>
       <dsp:txXfrm>
-        <a:off x="1769364" y="4080809"/>
+        <a:off x="1769364" y="3733799"/>
         <a:ext cx="6460235" cy="754912"/>
       </dsp:txXfrm>
     </dsp:sp>
@@ -3097,7 +3201,7 @@
       </dsp:nvSpPr>
       <dsp:spPr>
         <a:xfrm>
-          <a:off x="1645919" y="4835721"/>
+          <a:off x="1645919" y="4191001"/>
           <a:ext cx="6583679" cy="0"/>
         </a:xfrm>
         <a:prstGeom prst="line">
@@ -4724,6 +4828,7 @@
           <a:p>
             <a:fld id="{534CC314-B7AF-43BB-8BEB-65A7E5BFF83B}" type="datetimeFigureOut">
               <a:rPr lang="en-US" smtClean="0"/>
+              <a:pPr/>
               <a:t>4/28/2013</a:t>
             </a:fld>
             <a:endParaRPr lang="en-US"/>
@@ -4883,6 +4988,7 @@
           <a:p>
             <a:fld id="{5AD49A89-4F47-40EF-A32F-B1E1EBB2236E}" type="slidenum">
               <a:rPr lang="en-US" smtClean="0"/>
+              <a:pPr/>
               <a:t>‹#›</a:t>
             </a:fld>
             <a:endParaRPr lang="en-US"/>
@@ -5036,7 +5142,7 @@
           <a:bodyPr/>
           <a:lstStyle/>
           <a:p>
-            <a:endParaRPr lang="en-US"/>
+            <a:endParaRPr lang="en-US" dirty="0"/>
           </a:p>
         </p:txBody>
       </p:sp>
@@ -5057,7 +5163,8 @@
           <a:p>
             <a:fld id="{5AD49A89-4F47-40EF-A32F-B1E1EBB2236E}" type="slidenum">
               <a:rPr lang="en-US" smtClean="0"/>
-              <a:t>2</a:t>
+              <a:pPr/>
+              <a:t>7</a:t>
             </a:fld>
             <a:endParaRPr lang="en-US"/>
           </a:p>
@@ -5066,7 +5173,7 @@
     </p:spTree>
     <p:extLst>
       <p:ext uri="{BB962C8B-B14F-4D97-AF65-F5344CB8AC3E}">
-        <p14:creationId xmlns:p14="http://schemas.microsoft.com/office/powerpoint/2010/main" val="768403961"/>
+        <p14:creationId xmlns:p14="http://schemas.microsoft.com/office/powerpoint/2010/main" val="3089979720"/>
       </p:ext>
     </p:extLst>
   </p:cSld>
@@ -5120,6 +5227,14 @@
           <a:bodyPr/>
           <a:lstStyle/>
           <a:p>
+            <a:r>
+              <a:rPr lang="en-US" dirty="0" smtClean="0"/>
+              <a:t>It is the ratio</a:t>
+            </a:r>
+            <a:r>
+              <a:rPr lang="en-US" baseline="0" dirty="0" smtClean="0"/>
+              <a:t> between T</a:t>
+            </a:r>
             <a:endParaRPr lang="en-US" dirty="0"/>
           </a:p>
         </p:txBody>
@@ -5141,99 +5256,8 @@
           <a:p>
             <a:fld id="{5AD49A89-4F47-40EF-A32F-B1E1EBB2236E}" type="slidenum">
               <a:rPr lang="en-US" smtClean="0"/>
-              <a:t>9</a:t>
-            </a:fld>
-            <a:endParaRPr lang="en-US"/>
-          </a:p>
-        </p:txBody>
-      </p:sp>
-    </p:spTree>
-    <p:extLst>
-      <p:ext uri="{BB962C8B-B14F-4D97-AF65-F5344CB8AC3E}">
-        <p14:creationId xmlns:p14="http://schemas.microsoft.com/office/powerpoint/2010/main" val="3089979720"/>
-      </p:ext>
-    </p:extLst>
-  </p:cSld>
-  <p:clrMapOvr>
-    <a:masterClrMapping/>
-  </p:clrMapOvr>
-</p:notes>
-</file>
-
-<file path=ppt/notesSlides/notesSlide3.xml><?xml version="1.0" encoding="utf-8"?>
-<p:notes xmlns:a="http://schemas.openxmlformats.org/drawingml/2006/main" xmlns:r="http://schemas.openxmlformats.org/officeDocument/2006/relationships" xmlns:p="http://schemas.openxmlformats.org/presentationml/2006/main">
-  <p:cSld>
-    <p:spTree>
-      <p:nvGrpSpPr>
-        <p:cNvPr id="1" name=""/>
-        <p:cNvGrpSpPr/>
-        <p:nvPr/>
-      </p:nvGrpSpPr>
-      <p:grpSpPr>
-        <a:xfrm>
-          <a:off x="0" y="0"/>
-          <a:ext cx="0" cy="0"/>
-          <a:chOff x="0" y="0"/>
-          <a:chExt cx="0" cy="0"/>
-        </a:xfrm>
-      </p:grpSpPr>
-      <p:sp>
-        <p:nvSpPr>
-          <p:cNvPr id="2" name="Slide Image Placeholder 1"/>
-          <p:cNvSpPr>
-            <a:spLocks noGrp="1" noRot="1" noChangeAspect="1"/>
-          </p:cNvSpPr>
-          <p:nvPr>
-            <p:ph type="sldImg"/>
-          </p:nvPr>
-        </p:nvSpPr>
-        <p:spPr/>
-      </p:sp>
-      <p:sp>
-        <p:nvSpPr>
-          <p:cNvPr id="3" name="Notes Placeholder 2"/>
-          <p:cNvSpPr>
-            <a:spLocks noGrp="1"/>
-          </p:cNvSpPr>
-          <p:nvPr>
-            <p:ph type="body" idx="1"/>
-          </p:nvPr>
-        </p:nvSpPr>
-        <p:spPr/>
-        <p:txBody>
-          <a:bodyPr/>
-          <a:lstStyle/>
-          <a:p>
-            <a:r>
-              <a:rPr lang="en-US" dirty="0" smtClean="0"/>
-              <a:t>It is the ratio</a:t>
-            </a:r>
-            <a:r>
-              <a:rPr lang="en-US" baseline="0" dirty="0" smtClean="0"/>
-              <a:t> between T</a:t>
-            </a:r>
-            <a:endParaRPr lang="en-US" dirty="0"/>
-          </a:p>
-        </p:txBody>
-      </p:sp>
-      <p:sp>
-        <p:nvSpPr>
-          <p:cNvPr id="4" name="Slide Number Placeholder 3"/>
-          <p:cNvSpPr>
-            <a:spLocks noGrp="1"/>
-          </p:cNvSpPr>
-          <p:nvPr>
-            <p:ph type="sldNum" sz="quarter" idx="10"/>
-          </p:nvPr>
-        </p:nvSpPr>
-        <p:spPr/>
-        <p:txBody>
-          <a:bodyPr/>
-          <a:lstStyle/>
-          <a:p>
-            <a:fld id="{5AD49A89-4F47-40EF-A32F-B1E1EBB2236E}" type="slidenum">
-              <a:rPr lang="en-US" smtClean="0"/>
-              <a:t>10</a:t>
+              <a:pPr/>
+              <a:t>8</a:t>
             </a:fld>
             <a:endParaRPr lang="en-US"/>
           </a:p>
@@ -5440,6 +5464,7 @@
           <a:p>
             <a:fld id="{C314E52B-A153-4F33-892B-6A5FC50AD205}" type="datetime1">
               <a:rPr lang="en-US" smtClean="0"/>
+              <a:pPr/>
               <a:t>4/28/2013</a:t>
             </a:fld>
             <a:endParaRPr lang="en-US"/>
@@ -5482,6 +5507,7 @@
           <a:p>
             <a:fld id="{28E7742D-E9E6-4DF8-B9EB-599EE73D2CED}" type="slidenum">
               <a:rPr lang="en-US" smtClean="0"/>
+              <a:pPr/>
               <a:t>‹#›</a:t>
             </a:fld>
             <a:endParaRPr lang="en-US"/>
@@ -5640,6 +5666,7 @@
           <a:p>
             <a:fld id="{C24B32D2-0FEB-467E-9525-88634251D20A}" type="datetime1">
               <a:rPr lang="en-US" smtClean="0"/>
+              <a:pPr/>
               <a:t>4/28/2013</a:t>
             </a:fld>
             <a:endParaRPr lang="en-US"/>
@@ -5682,6 +5709,7 @@
           <a:p>
             <a:fld id="{28E7742D-E9E6-4DF8-B9EB-599EE73D2CED}" type="slidenum">
               <a:rPr lang="en-US" smtClean="0"/>
+              <a:pPr/>
               <a:t>‹#›</a:t>
             </a:fld>
             <a:endParaRPr lang="en-US"/>
@@ -5815,6 +5843,7 @@
           <a:p>
             <a:fld id="{075500A3-C128-4164-93F3-3527BB33814C}" type="datetime1">
               <a:rPr lang="en-US" smtClean="0"/>
+              <a:pPr/>
               <a:t>4/28/2013</a:t>
             </a:fld>
             <a:endParaRPr lang="en-US"/>
@@ -5857,6 +5886,7 @@
           <a:p>
             <a:fld id="{28E7742D-E9E6-4DF8-B9EB-599EE73D2CED}" type="slidenum">
               <a:rPr lang="en-US" smtClean="0"/>
+              <a:pPr/>
               <a:t>‹#›</a:t>
             </a:fld>
             <a:endParaRPr lang="en-US"/>
@@ -5980,6 +6010,7 @@
           <a:p>
             <a:fld id="{C24BF8B2-C5F3-492D-8C10-460CB5267700}" type="datetime1">
               <a:rPr lang="en-US" smtClean="0"/>
+              <a:pPr/>
               <a:t>4/28/2013</a:t>
             </a:fld>
             <a:endParaRPr lang="en-US"/>
@@ -6022,6 +6053,7 @@
           <a:p>
             <a:fld id="{28E7742D-E9E6-4DF8-B9EB-599EE73D2CED}" type="slidenum">
               <a:rPr lang="en-US" smtClean="0"/>
+              <a:pPr/>
               <a:t>‹#›</a:t>
             </a:fld>
             <a:endParaRPr lang="en-US"/>
@@ -6228,6 +6260,7 @@
           <a:p>
             <a:fld id="{D0D8ADFD-1827-4E7D-8E79-B63A92A6D596}" type="datetime1">
               <a:rPr lang="en-US" smtClean="0"/>
+              <a:pPr/>
               <a:t>4/28/2013</a:t>
             </a:fld>
             <a:endParaRPr lang="en-US"/>
@@ -6270,6 +6303,7 @@
           <a:p>
             <a:fld id="{28E7742D-E9E6-4DF8-B9EB-599EE73D2CED}" type="slidenum">
               <a:rPr lang="en-US" smtClean="0"/>
+              <a:pPr/>
               <a:t>‹#›</a:t>
             </a:fld>
             <a:endParaRPr lang="en-US"/>
@@ -6546,6 +6580,7 @@
           <a:p>
             <a:fld id="{D15FD25E-98EF-4FE3-B399-F47B08F17FB0}" type="datetime1">
               <a:rPr lang="en-US" smtClean="0"/>
+              <a:pPr/>
               <a:t>4/28/2013</a:t>
             </a:fld>
             <a:endParaRPr lang="en-US"/>
@@ -6588,6 +6623,7 @@
           <a:p>
             <a:fld id="{28E7742D-E9E6-4DF8-B9EB-599EE73D2CED}" type="slidenum">
               <a:rPr lang="en-US" smtClean="0"/>
+              <a:pPr/>
               <a:t>‹#›</a:t>
             </a:fld>
             <a:endParaRPr lang="en-US"/>
@@ -7012,6 +7048,7 @@
           <a:p>
             <a:fld id="{D679A803-CC5A-4064-8103-41C147DF6CCA}" type="datetime1">
               <a:rPr lang="en-US" smtClean="0"/>
+              <a:pPr/>
               <a:t>4/28/2013</a:t>
             </a:fld>
             <a:endParaRPr lang="en-US"/>
@@ -7054,6 +7091,7 @@
           <a:p>
             <a:fld id="{28E7742D-E9E6-4DF8-B9EB-599EE73D2CED}" type="slidenum">
               <a:rPr lang="en-US" smtClean="0"/>
+              <a:pPr/>
               <a:t>‹#›</a:t>
             </a:fld>
             <a:endParaRPr lang="en-US"/>
@@ -7160,6 +7198,7 @@
           <a:p>
             <a:fld id="{E81A4977-3C39-4974-B7E8-6B9DE6C11AFA}" type="datetime1">
               <a:rPr lang="en-US" smtClean="0"/>
+              <a:pPr/>
               <a:t>4/28/2013</a:t>
             </a:fld>
             <a:endParaRPr lang="en-US"/>
@@ -7202,6 +7241,7 @@
           <a:p>
             <a:fld id="{28E7742D-E9E6-4DF8-B9EB-599EE73D2CED}" type="slidenum">
               <a:rPr lang="en-US" smtClean="0"/>
+              <a:pPr/>
               <a:t>‹#›</a:t>
             </a:fld>
             <a:endParaRPr lang="en-US"/>
@@ -7250,6 +7290,7 @@
           <a:p>
             <a:fld id="{C5DB8ED2-EBA6-4C10-BD5D-1D1D28AE36E3}" type="datetime1">
               <a:rPr lang="en-US" smtClean="0"/>
+              <a:pPr/>
               <a:t>4/28/2013</a:t>
             </a:fld>
             <a:endParaRPr lang="en-US"/>
@@ -7292,6 +7333,7 @@
           <a:p>
             <a:fld id="{28E7742D-E9E6-4DF8-B9EB-599EE73D2CED}" type="slidenum">
               <a:rPr lang="en-US" smtClean="0"/>
+              <a:pPr/>
               <a:t>‹#›</a:t>
             </a:fld>
             <a:endParaRPr lang="en-US"/>
@@ -7524,6 +7566,7 @@
           <a:p>
             <a:fld id="{561ACD0C-BAFD-4876-9292-8CA4E0132886}" type="datetime1">
               <a:rPr lang="en-US" smtClean="0"/>
+              <a:pPr/>
               <a:t>4/28/2013</a:t>
             </a:fld>
             <a:endParaRPr lang="en-US"/>
@@ -7566,6 +7609,7 @@
           <a:p>
             <a:fld id="{28E7742D-E9E6-4DF8-B9EB-599EE73D2CED}" type="slidenum">
               <a:rPr lang="en-US" smtClean="0"/>
+              <a:pPr/>
               <a:t>‹#›</a:t>
             </a:fld>
             <a:endParaRPr lang="en-US"/>
@@ -7829,6 +7873,7 @@
           <a:p>
             <a:fld id="{33DE0785-A7A1-4DAE-B1A1-18A9488A1C66}" type="datetime1">
               <a:rPr lang="en-US" smtClean="0"/>
+              <a:pPr/>
               <a:t>4/28/2013</a:t>
             </a:fld>
             <a:endParaRPr lang="en-US"/>
@@ -7871,6 +7916,7 @@
           <a:p>
             <a:fld id="{28E7742D-E9E6-4DF8-B9EB-599EE73D2CED}" type="slidenum">
               <a:rPr lang="en-US" smtClean="0"/>
+              <a:pPr/>
               <a:t>‹#›</a:t>
             </a:fld>
             <a:endParaRPr lang="en-US"/>
@@ -8127,6 +8173,7 @@
           <a:p>
             <a:fld id="{068EFD61-008B-4BC7-8DD5-2AEF65201865}" type="datetime1">
               <a:rPr lang="en-US" smtClean="0"/>
+              <a:pPr/>
               <a:t>4/28/2013</a:t>
             </a:fld>
             <a:endParaRPr lang="en-US"/>
@@ -8201,6 +8248,7 @@
           <a:p>
             <a:fld id="{28E7742D-E9E6-4DF8-B9EB-599EE73D2CED}" type="slidenum">
               <a:rPr lang="en-US" smtClean="0"/>
+              <a:pPr/>
               <a:t>‹#›</a:t>
             </a:fld>
             <a:endParaRPr lang="en-US"/>
@@ -8535,16 +8583,22 @@
             <p:ph type="ctrTitle"/>
           </p:nvPr>
         </p:nvSpPr>
-        <p:spPr/>
+        <p:spPr>
+          <a:xfrm>
+            <a:off x="685800" y="2438399"/>
+            <a:ext cx="7848600" cy="685801"/>
+          </a:xfrm>
+        </p:spPr>
         <p:txBody>
           <a:bodyPr/>
           <a:lstStyle/>
           <a:p>
-            <a:r>
-              <a:rPr lang="en-US" dirty="0" smtClean="0"/>
-              <a:t>Can trigram trick us?</a:t>
-            </a:r>
-            <a:endParaRPr lang="en-US" dirty="0"/>
+            <a:pPr algn="ctr"/>
+            <a:r>
+              <a:rPr lang="en-US" sz="2800" dirty="0" smtClean="0"/>
+              <a:t>LEARNING TO DETECT FAKE DOCUMENTS</a:t>
+            </a:r>
+            <a:endParaRPr lang="en-US" sz="2800" dirty="0"/>
           </a:p>
         </p:txBody>
       </p:sp>
@@ -8558,14 +8612,20 @@
             <p:ph type="subTitle" idx="1"/>
           </p:nvPr>
         </p:nvSpPr>
-        <p:spPr/>
+        <p:spPr>
+          <a:xfrm>
+            <a:off x="685800" y="3505200"/>
+            <a:ext cx="7696200" cy="609600"/>
+          </a:xfrm>
+        </p:spPr>
         <p:txBody>
           <a:bodyPr/>
           <a:lstStyle/>
           <a:p>
+            <a:pPr algn="ctr"/>
             <a:r>
               <a:rPr lang="en-US" dirty="0" smtClean="0"/>
-              <a:t>- Learning to detect fake articles</a:t>
+              <a:t>Team #6</a:t>
             </a:r>
             <a:endParaRPr lang="en-US" dirty="0"/>
           </a:p>
@@ -8586,7 +8646,7 @@
           </p:nvPr>
         </p:nvGraphicFramePr>
         <p:xfrm>
-          <a:off x="3276600" y="4724400"/>
+          <a:off x="3200400" y="4343400"/>
           <a:ext cx="2819400" cy="1854200"/>
         </p:xfrm>
         <a:graphic>
@@ -8606,7 +8666,7 @@
                     <a:p>
                       <a:r>
                         <a:rPr lang="en-US" dirty="0" smtClean="0"/>
-                        <a:t>Group Members:</a:t>
+                        <a:t>Team Members:</a:t>
                       </a:r>
                       <a:endParaRPr lang="en-US" dirty="0"/>
                     </a:p>
@@ -8785,70 +8845,53 @@
           <a:p>
             <a:r>
               <a:rPr lang="en-US" dirty="0" smtClean="0"/>
-              <a:t>Trigram vs. 4-Gram</a:t>
+              <a:t>Accuracy vs. # Sentences</a:t>
             </a:r>
             <a:endParaRPr lang="en-US" dirty="0"/>
           </a:p>
         </p:txBody>
       </p:sp>
-      <p:pic>
-        <p:nvPicPr>
-          <p:cNvPr id="4" name="Content Placeholder 3"/>
-          <p:cNvPicPr>
-            <a:picLocks noGrp="1" noChangeAspect="1"/>
-          </p:cNvPicPr>
+      <p:graphicFrame>
+        <p:nvGraphicFramePr>
+          <p:cNvPr id="7" name="Content Placeholder 6"/>
+          <p:cNvGraphicFramePr>
+            <a:graphicFrameLocks noGrp="1"/>
+          </p:cNvGraphicFramePr>
           <p:nvPr>
             <p:ph idx="1"/>
+            <p:extLst>
+              <p:ext uri="{D42A27DB-BD31-4B8C-83A1-F6EECF244321}">
+                <p14:modId xmlns:p14="http://schemas.microsoft.com/office/powerpoint/2010/main" val="3349619774"/>
+              </p:ext>
+            </p:extLst>
           </p:nvPr>
-        </p:nvPicPr>
-        <p:blipFill>
-          <a:blip r:embed="rId3">
-            <a:extLst>
-              <a:ext uri="{28A0092B-C50C-407E-A947-70E740481C1C}">
-                <a14:useLocalDpi xmlns:a14="http://schemas.microsoft.com/office/drawing/2010/main" val="0"/>
-              </a:ext>
-            </a:extLst>
-          </a:blip>
-          <a:stretch>
-            <a:fillRect/>
-          </a:stretch>
-        </p:blipFill>
-        <p:spPr>
-          <a:xfrm>
-            <a:off x="1726953" y="1904815"/>
-            <a:ext cx="5690093" cy="4267570"/>
-          </a:xfrm>
-        </p:spPr>
-      </p:pic>
+        </p:nvGraphicFramePr>
+        <p:xfrm>
+          <a:off x="457200" y="1600200"/>
+          <a:ext cx="8229600" cy="4876800"/>
+        </p:xfrm>
+        <a:graphic>
+          <a:graphicData uri="http://schemas.openxmlformats.org/drawingml/2006/chart">
+            <c:chart xmlns:c="http://schemas.openxmlformats.org/drawingml/2006/chart" xmlns:r="http://schemas.openxmlformats.org/officeDocument/2006/relationships" r:id="rId2"/>
+          </a:graphicData>
+        </a:graphic>
+      </p:graphicFrame>
       <p:sp>
         <p:nvSpPr>
-          <p:cNvPr id="6" name="TextBox 5"/>
+          <p:cNvPr id="8" name="TextBox 7"/>
           <p:cNvSpPr txBox="1"/>
           <p:nvPr/>
         </p:nvSpPr>
         <p:spPr>
           <a:xfrm>
-            <a:off x="5867400" y="914400"/>
-            <a:ext cx="2895600" cy="1200329"/>
+            <a:off x="6553200" y="6172200"/>
+            <a:ext cx="1600200" cy="369332"/>
           </a:xfrm>
           <a:prstGeom prst="rect">
             <a:avLst/>
           </a:prstGeom>
+          <a:noFill/>
         </p:spPr>
-        <p:style>
-          <a:lnRef idx="2">
-            <a:schemeClr val="accent1"/>
-          </a:lnRef>
-          <a:fillRef idx="1">
-            <a:schemeClr val="lt1"/>
-          </a:fillRef>
-          <a:effectRef idx="0">
-            <a:schemeClr val="accent1"/>
-          </a:effectRef>
-          <a:fontRef idx="minor">
-            <a:schemeClr val="dk1"/>
-          </a:fontRef>
-        </p:style>
         <p:txBody>
           <a:bodyPr wrap="square" rtlCol="0">
             <a:spAutoFit/>
@@ -8857,7 +8900,7 @@
           <a:p>
             <a:r>
               <a:rPr lang="en-US" dirty="0" smtClean="0"/>
-              <a:t>It is the interaction ( say ratio) between tri-gram and 4-gram on the data that make the difference</a:t>
+              <a:t># sentences</a:t>
             </a:r>
             <a:endParaRPr lang="en-US" dirty="0"/>
           </a:p>
@@ -8865,7 +8908,37 @@
       </p:sp>
       <p:sp>
         <p:nvSpPr>
-          <p:cNvPr id="3" name="Slide Number Placeholder 2"/>
+          <p:cNvPr id="9" name="TextBox 8"/>
+          <p:cNvSpPr txBox="1"/>
+          <p:nvPr/>
+        </p:nvSpPr>
+        <p:spPr>
+          <a:xfrm>
+            <a:off x="152400" y="1295400"/>
+            <a:ext cx="1219200" cy="369332"/>
+          </a:xfrm>
+          <a:prstGeom prst="rect">
+            <a:avLst/>
+          </a:prstGeom>
+          <a:noFill/>
+        </p:spPr>
+        <p:txBody>
+          <a:bodyPr wrap="square" rtlCol="0">
+            <a:spAutoFit/>
+          </a:bodyPr>
+          <a:lstStyle/>
+          <a:p>
+            <a:r>
+              <a:rPr lang="en-US" dirty="0" smtClean="0"/>
+              <a:t>Accuracy</a:t>
+            </a:r>
+            <a:endParaRPr lang="en-US" dirty="0"/>
+          </a:p>
+        </p:txBody>
+      </p:sp>
+      <p:sp>
+        <p:nvSpPr>
+          <p:cNvPr id="10" name="Slide Number Placeholder 9"/>
           <p:cNvSpPr>
             <a:spLocks noGrp="1"/>
           </p:cNvSpPr>
@@ -8880,6 +8953,7 @@
           <a:p>
             <a:fld id="{28E7742D-E9E6-4DF8-B9EB-599EE73D2CED}" type="slidenum">
               <a:rPr lang="en-US" smtClean="0"/>
+              <a:pPr/>
               <a:t>10</a:t>
             </a:fld>
             <a:endParaRPr lang="en-US"/>
@@ -8889,7 +8963,7 @@
     </p:spTree>
     <p:extLst>
       <p:ext uri="{BB962C8B-B14F-4D97-AF65-F5344CB8AC3E}">
-        <p14:creationId xmlns:p14="http://schemas.microsoft.com/office/powerpoint/2010/main" val="1978906286"/>
+        <p14:creationId xmlns:p14="http://schemas.microsoft.com/office/powerpoint/2010/main" val="3003807993"/>
       </p:ext>
     </p:extLst>
   </p:cSld>
@@ -8940,287 +9014,7 @@
           <a:p>
             <a:r>
               <a:rPr lang="en-US" dirty="0" smtClean="0"/>
-              <a:t>Point-wise Mutual Information</a:t>
-            </a:r>
-            <a:endParaRPr lang="en-US" dirty="0"/>
-          </a:p>
-        </p:txBody>
-      </p:sp>
-      <p:pic>
-        <p:nvPicPr>
-          <p:cNvPr id="4" name="Content Placeholder 3"/>
-          <p:cNvPicPr>
-            <a:picLocks noGrp="1" noChangeAspect="1"/>
-          </p:cNvPicPr>
-          <p:nvPr>
-            <p:ph idx="1"/>
-          </p:nvPr>
-        </p:nvPicPr>
-        <p:blipFill>
-          <a:blip r:embed="rId2">
-            <a:extLst>
-              <a:ext uri="{28A0092B-C50C-407E-A947-70E740481C1C}">
-                <a14:useLocalDpi xmlns:a14="http://schemas.microsoft.com/office/drawing/2010/main" val="0"/>
-              </a:ext>
-            </a:extLst>
-          </a:blip>
-          <a:stretch>
-            <a:fillRect/>
-          </a:stretch>
-        </p:blipFill>
-        <p:spPr>
-          <a:xfrm>
-            <a:off x="1726953" y="1904815"/>
-            <a:ext cx="5690093" cy="4267570"/>
-          </a:xfrm>
-        </p:spPr>
-      </p:pic>
-      <p:sp>
-        <p:nvSpPr>
-          <p:cNvPr id="7" name="Slide Number Placeholder 6"/>
-          <p:cNvSpPr>
-            <a:spLocks noGrp="1"/>
-          </p:cNvSpPr>
-          <p:nvPr>
-            <p:ph type="sldNum" sz="quarter" idx="12"/>
-          </p:nvPr>
-        </p:nvSpPr>
-        <p:spPr/>
-        <p:txBody>
-          <a:bodyPr/>
-          <a:lstStyle/>
-          <a:p>
-            <a:fld id="{28E7742D-E9E6-4DF8-B9EB-599EE73D2CED}" type="slidenum">
-              <a:rPr lang="en-US" smtClean="0"/>
-              <a:t>11</a:t>
-            </a:fld>
-            <a:endParaRPr lang="en-US"/>
-          </a:p>
-        </p:txBody>
-      </p:sp>
-    </p:spTree>
-    <p:extLst>
-      <p:ext uri="{BB962C8B-B14F-4D97-AF65-F5344CB8AC3E}">
-        <p14:creationId xmlns:p14="http://schemas.microsoft.com/office/powerpoint/2010/main" val="115826910"/>
-      </p:ext>
-    </p:extLst>
-  </p:cSld>
-  <p:clrMapOvr>
-    <a:masterClrMapping/>
-  </p:clrMapOvr>
-  <p:timing>
-    <p:tnLst>
-      <p:par>
-        <p:cTn id="1" dur="indefinite" restart="never" nodeType="tmRoot"/>
-      </p:par>
-    </p:tnLst>
-  </p:timing>
-</p:sld>
-</file>
-
-<file path=ppt/slides/slide12.xml><?xml version="1.0" encoding="utf-8"?>
-<p:sld xmlns:a="http://schemas.openxmlformats.org/drawingml/2006/main" xmlns:r="http://schemas.openxmlformats.org/officeDocument/2006/relationships" xmlns:p="http://schemas.openxmlformats.org/presentationml/2006/main">
-  <p:cSld>
-    <p:spTree>
-      <p:nvGrpSpPr>
-        <p:cNvPr id="1" name=""/>
-        <p:cNvGrpSpPr/>
-        <p:nvPr/>
-      </p:nvGrpSpPr>
-      <p:grpSpPr>
-        <a:xfrm>
-          <a:off x="0" y="0"/>
-          <a:ext cx="0" cy="0"/>
-          <a:chOff x="0" y="0"/>
-          <a:chExt cx="0" cy="0"/>
-        </a:xfrm>
-      </p:grpSpPr>
-      <p:sp>
-        <p:nvSpPr>
-          <p:cNvPr id="2" name="Title 1"/>
-          <p:cNvSpPr>
-            <a:spLocks noGrp="1"/>
-          </p:cNvSpPr>
-          <p:nvPr>
-            <p:ph type="title"/>
-          </p:nvPr>
-        </p:nvSpPr>
-        <p:spPr/>
-        <p:txBody>
-          <a:bodyPr/>
-          <a:lstStyle/>
-          <a:p>
-            <a:r>
-              <a:rPr lang="en-US" dirty="0" smtClean="0"/>
-              <a:t>Accuracy vs. # Sentences</a:t>
-            </a:r>
-            <a:endParaRPr lang="en-US" dirty="0"/>
-          </a:p>
-        </p:txBody>
-      </p:sp>
-      <p:graphicFrame>
-        <p:nvGraphicFramePr>
-          <p:cNvPr id="7" name="Content Placeholder 6" title="Correctness vs. sentence number"/>
-          <p:cNvGraphicFramePr>
-            <a:graphicFrameLocks noGrp="1"/>
-          </p:cNvGraphicFramePr>
-          <p:nvPr>
-            <p:ph idx="1"/>
-            <p:extLst>
-              <p:ext uri="{D42A27DB-BD31-4B8C-83A1-F6EECF244321}">
-                <p14:modId xmlns:p14="http://schemas.microsoft.com/office/powerpoint/2010/main" val="3349619774"/>
-              </p:ext>
-            </p:extLst>
-          </p:nvPr>
-        </p:nvGraphicFramePr>
-        <p:xfrm>
-          <a:off x="457200" y="1600200"/>
-          <a:ext cx="8229600" cy="4876800"/>
-        </p:xfrm>
-        <a:graphic>
-          <a:graphicData uri="http://schemas.openxmlformats.org/drawingml/2006/chart">
-            <c:chart xmlns:c="http://schemas.openxmlformats.org/drawingml/2006/chart" xmlns:r="http://schemas.openxmlformats.org/officeDocument/2006/relationships" r:id="rId2"/>
-          </a:graphicData>
-        </a:graphic>
-      </p:graphicFrame>
-      <p:sp>
-        <p:nvSpPr>
-          <p:cNvPr id="8" name="TextBox 7"/>
-          <p:cNvSpPr txBox="1"/>
-          <p:nvPr/>
-        </p:nvSpPr>
-        <p:spPr>
-          <a:xfrm>
-            <a:off x="6553200" y="6172200"/>
-            <a:ext cx="1600200" cy="369332"/>
-          </a:xfrm>
-          <a:prstGeom prst="rect">
-            <a:avLst/>
-          </a:prstGeom>
-          <a:noFill/>
-        </p:spPr>
-        <p:txBody>
-          <a:bodyPr wrap="square" rtlCol="0">
-            <a:spAutoFit/>
-          </a:bodyPr>
-          <a:lstStyle/>
-          <a:p>
-            <a:r>
-              <a:rPr lang="en-US" dirty="0" smtClean="0"/>
-              <a:t># sentences</a:t>
-            </a:r>
-            <a:endParaRPr lang="en-US" dirty="0"/>
-          </a:p>
-        </p:txBody>
-      </p:sp>
-      <p:sp>
-        <p:nvSpPr>
-          <p:cNvPr id="9" name="TextBox 8"/>
-          <p:cNvSpPr txBox="1"/>
-          <p:nvPr/>
-        </p:nvSpPr>
-        <p:spPr>
-          <a:xfrm>
-            <a:off x="152400" y="1295400"/>
-            <a:ext cx="1219200" cy="369332"/>
-          </a:xfrm>
-          <a:prstGeom prst="rect">
-            <a:avLst/>
-          </a:prstGeom>
-          <a:noFill/>
-        </p:spPr>
-        <p:txBody>
-          <a:bodyPr wrap="square" rtlCol="0">
-            <a:spAutoFit/>
-          </a:bodyPr>
-          <a:lstStyle/>
-          <a:p>
-            <a:r>
-              <a:rPr lang="en-US" dirty="0" smtClean="0"/>
-              <a:t>Accuracy</a:t>
-            </a:r>
-            <a:endParaRPr lang="en-US" dirty="0"/>
-          </a:p>
-        </p:txBody>
-      </p:sp>
-      <p:sp>
-        <p:nvSpPr>
-          <p:cNvPr id="10" name="Slide Number Placeholder 9"/>
-          <p:cNvSpPr>
-            <a:spLocks noGrp="1"/>
-          </p:cNvSpPr>
-          <p:nvPr>
-            <p:ph type="sldNum" sz="quarter" idx="12"/>
-          </p:nvPr>
-        </p:nvSpPr>
-        <p:spPr/>
-        <p:txBody>
-          <a:bodyPr/>
-          <a:lstStyle/>
-          <a:p>
-            <a:fld id="{28E7742D-E9E6-4DF8-B9EB-599EE73D2CED}" type="slidenum">
-              <a:rPr lang="en-US" smtClean="0"/>
-              <a:t>12</a:t>
-            </a:fld>
-            <a:endParaRPr lang="en-US"/>
-          </a:p>
-        </p:txBody>
-      </p:sp>
-    </p:spTree>
-    <p:extLst>
-      <p:ext uri="{BB962C8B-B14F-4D97-AF65-F5344CB8AC3E}">
-        <p14:creationId xmlns:p14="http://schemas.microsoft.com/office/powerpoint/2010/main" val="3003807993"/>
-      </p:ext>
-    </p:extLst>
-  </p:cSld>
-  <p:clrMapOvr>
-    <a:masterClrMapping/>
-  </p:clrMapOvr>
-  <p:timing>
-    <p:tnLst>
-      <p:par>
-        <p:cTn id="1" dur="indefinite" restart="never" nodeType="tmRoot"/>
-      </p:par>
-    </p:tnLst>
-  </p:timing>
-</p:sld>
-</file>
-
-<file path=ppt/slides/slide13.xml><?xml version="1.0" encoding="utf-8"?>
-<p:sld xmlns:a="http://schemas.openxmlformats.org/drawingml/2006/main" xmlns:r="http://schemas.openxmlformats.org/officeDocument/2006/relationships" xmlns:p="http://schemas.openxmlformats.org/presentationml/2006/main">
-  <p:cSld>
-    <p:spTree>
-      <p:nvGrpSpPr>
-        <p:cNvPr id="1" name=""/>
-        <p:cNvGrpSpPr/>
-        <p:nvPr/>
-      </p:nvGrpSpPr>
-      <p:grpSpPr>
-        <a:xfrm>
-          <a:off x="0" y="0"/>
-          <a:ext cx="0" cy="0"/>
-          <a:chOff x="0" y="0"/>
-          <a:chExt cx="0" cy="0"/>
-        </a:xfrm>
-      </p:grpSpPr>
-      <p:sp>
-        <p:nvSpPr>
-          <p:cNvPr id="2" name="Title 1"/>
-          <p:cNvSpPr>
-            <a:spLocks noGrp="1"/>
-          </p:cNvSpPr>
-          <p:nvPr>
-            <p:ph type="title"/>
-          </p:nvPr>
-        </p:nvSpPr>
-        <p:spPr/>
-        <p:txBody>
-          <a:bodyPr/>
-          <a:lstStyle/>
-          <a:p>
-            <a:r>
-              <a:rPr lang="en-US" dirty="0" smtClean="0"/>
-              <a:t>Conclusion</a:t>
+              <a:t>Conclusions</a:t>
             </a:r>
             <a:endParaRPr lang="en-US" dirty="0"/>
           </a:p>
@@ -9268,7 +9062,8 @@
           <a:p>
             <a:fld id="{28E7742D-E9E6-4DF8-B9EB-599EE73D2CED}" type="slidenum">
               <a:rPr lang="en-US" smtClean="0"/>
-              <a:t>13</a:t>
+              <a:pPr/>
+              <a:t>11</a:t>
             </a:fld>
             <a:endParaRPr lang="en-US"/>
           </a:p>
@@ -9294,7 +9089,7 @@
 </p:sld>
 </file>
 
-<file path=ppt/slides/slide14.xml><?xml version="1.0" encoding="utf-8"?>
+<file path=ppt/slides/slide12.xml><?xml version="1.0" encoding="utf-8"?>
 <p:sld xmlns:a="http://schemas.openxmlformats.org/drawingml/2006/main" xmlns:r="http://schemas.openxmlformats.org/officeDocument/2006/relationships" xmlns:p="http://schemas.openxmlformats.org/presentationml/2006/main">
   <p:cSld>
     <p:spTree>
@@ -9313,12 +9108,12 @@
       </p:grpSpPr>
       <p:sp>
         <p:nvSpPr>
-          <p:cNvPr id="2" name="Title 1"/>
+          <p:cNvPr id="3" name="Content Placeholder 2"/>
           <p:cNvSpPr>
             <a:spLocks noGrp="1"/>
           </p:cNvSpPr>
           <p:nvPr>
-            <p:ph type="title"/>
+            <p:ph idx="1"/>
           </p:nvPr>
         </p:nvSpPr>
         <p:spPr/>
@@ -9326,36 +9121,13 @@
           <a:bodyPr/>
           <a:lstStyle/>
           <a:p>
-            <a:r>
-              <a:rPr lang="en-US" dirty="0" smtClean="0"/>
-              <a:t>Q&amp;A</a:t>
-            </a:r>
             <a:endParaRPr lang="en-US" dirty="0"/>
           </a:p>
         </p:txBody>
       </p:sp>
       <p:sp>
         <p:nvSpPr>
-          <p:cNvPr id="4" name="Text Placeholder 3"/>
-          <p:cNvSpPr>
-            <a:spLocks noGrp="1"/>
-          </p:cNvSpPr>
-          <p:nvPr>
-            <p:ph type="body" idx="1"/>
-          </p:nvPr>
-        </p:nvSpPr>
-        <p:spPr/>
-        <p:txBody>
-          <a:bodyPr/>
-          <a:lstStyle/>
-          <a:p>
-            <a:endParaRPr lang="en-US"/>
-          </a:p>
-        </p:txBody>
-      </p:sp>
-      <p:sp>
-        <p:nvSpPr>
-          <p:cNvPr id="3" name="Slide Number Placeholder 2"/>
+          <p:cNvPr id="4" name="Slide Number Placeholder 3"/>
           <p:cNvSpPr>
             <a:spLocks noGrp="1"/>
           </p:cNvSpPr>
@@ -9370,18 +9142,45 @@
           <a:p>
             <a:fld id="{28E7742D-E9E6-4DF8-B9EB-599EE73D2CED}" type="slidenum">
               <a:rPr lang="en-US" smtClean="0"/>
-              <a:t>14</a:t>
+              <a:pPr/>
+              <a:t>12</a:t>
             </a:fld>
             <a:endParaRPr lang="en-US"/>
+          </a:p>
+        </p:txBody>
+      </p:sp>
+      <p:sp>
+        <p:nvSpPr>
+          <p:cNvPr id="5" name="Title 1"/>
+          <p:cNvSpPr>
+            <a:spLocks noGrp="1"/>
+          </p:cNvSpPr>
+          <p:nvPr>
+            <p:ph type="title"/>
+          </p:nvPr>
+        </p:nvSpPr>
+        <p:spPr>
+          <a:xfrm>
+            <a:off x="457200" y="3124200"/>
+            <a:ext cx="8229600" cy="990600"/>
+          </a:xfrm>
+        </p:spPr>
+        <p:txBody>
+          <a:bodyPr>
+            <a:normAutofit/>
+          </a:bodyPr>
+          <a:lstStyle/>
+          <a:p>
+            <a:pPr algn="ctr"/>
+            <a:r>
+              <a:rPr lang="en-US" dirty="0" smtClean="0"/>
+              <a:t>Questions?</a:t>
+            </a:r>
+            <a:endParaRPr lang="en-US" dirty="0"/>
           </a:p>
         </p:txBody>
       </p:sp>
     </p:spTree>
-    <p:extLst>
-      <p:ext uri="{BB962C8B-B14F-4D97-AF65-F5344CB8AC3E}">
-        <p14:creationId xmlns:p14="http://schemas.microsoft.com/office/powerpoint/2010/main" val="439079682"/>
-      </p:ext>
-    </p:extLst>
   </p:cSld>
   <p:clrMapOvr>
     <a:masterClrMapping/>
@@ -9430,7 +9229,7 @@
           <a:p>
             <a:r>
               <a:rPr lang="en-US" dirty="0" smtClean="0"/>
-              <a:t>Outline</a:t>
+              <a:t>General Approach</a:t>
             </a:r>
             <a:endParaRPr lang="en-US" dirty="0"/>
           </a:p>
@@ -9451,34 +9250,30 @@
           <a:bodyPr/>
           <a:lstStyle/>
           <a:p>
+            <a:endParaRPr lang="en-US" dirty="0" smtClean="0"/>
+          </a:p>
+          <a:p>
             <a:r>
               <a:rPr lang="en-US" dirty="0" smtClean="0"/>
-              <a:t>Introduction</a:t>
+              <a:t>Design linguistically motivated features</a:t>
             </a:r>
           </a:p>
           <a:p>
             <a:r>
               <a:rPr lang="en-US" dirty="0" smtClean="0"/>
-              <a:t>Hypothesis</a:t>
+              <a:t>Train a discriminative classifier to produce document classes (fake or real)</a:t>
             </a:r>
           </a:p>
           <a:p>
             <a:r>
               <a:rPr lang="en-US" dirty="0" smtClean="0"/>
-              <a:t>Approach and feature design</a:t>
-            </a:r>
-          </a:p>
-          <a:p>
-            <a:r>
-              <a:rPr lang="en-US" dirty="0" smtClean="0"/>
-              <a:t>Experiments and discussion</a:t>
-            </a:r>
-          </a:p>
-          <a:p>
-            <a:r>
-              <a:rPr lang="en-US" dirty="0" smtClean="0"/>
-              <a:t>Problems encountered (might be too much to say in 10 min)</a:t>
-            </a:r>
+              <a:t>Train a logistic regression model to produce posterior probabilities</a:t>
+            </a:r>
+          </a:p>
+          <a:p>
+            <a:endParaRPr lang="en-US" dirty="0" smtClean="0"/>
+          </a:p>
+          <a:p>
             <a:endParaRPr lang="en-US" dirty="0"/>
           </a:p>
         </p:txBody>
@@ -9500,6 +9295,7 @@
           <a:p>
             <a:fld id="{28E7742D-E9E6-4DF8-B9EB-599EE73D2CED}" type="slidenum">
               <a:rPr lang="en-US" smtClean="0"/>
+              <a:pPr/>
               <a:t>2</a:t>
             </a:fld>
             <a:endParaRPr lang="en-US"/>
@@ -9509,7 +9305,7 @@
     </p:spTree>
     <p:extLst>
       <p:ext uri="{BB962C8B-B14F-4D97-AF65-F5344CB8AC3E}">
-        <p14:creationId xmlns:p14="http://schemas.microsoft.com/office/powerpoint/2010/main" val="3045286297"/>
+        <p14:creationId xmlns:p14="http://schemas.microsoft.com/office/powerpoint/2010/main" val="1574483208"/>
       </p:ext>
     </p:extLst>
   </p:cSld>
@@ -9560,7 +9356,7 @@
           <a:p>
             <a:r>
               <a:rPr lang="en-US" dirty="0" smtClean="0"/>
-              <a:t>Introduction</a:t>
+              <a:t>Initial Hypotheses</a:t>
             </a:r>
             <a:endParaRPr lang="en-US" dirty="0"/>
           </a:p>
@@ -9576,37 +9372,78 @@
             <p:ph idx="1"/>
           </p:nvPr>
         </p:nvSpPr>
-        <p:spPr/>
+        <p:spPr>
+          <a:ln>
+            <a:noFill/>
+          </a:ln>
+        </p:spPr>
+        <p:style>
+          <a:lnRef idx="2">
+            <a:schemeClr val="accent4"/>
+          </a:lnRef>
+          <a:fillRef idx="1">
+            <a:schemeClr val="lt1"/>
+          </a:fillRef>
+          <a:effectRef idx="0">
+            <a:schemeClr val="accent4"/>
+          </a:effectRef>
+          <a:fontRef idx="minor">
+            <a:schemeClr val="dk1"/>
+          </a:fontRef>
+        </p:style>
         <p:txBody>
           <a:bodyPr/>
           <a:lstStyle/>
           <a:p>
+            <a:pPr>
+              <a:buNone/>
+            </a:pPr>
             <a:r>
               <a:rPr lang="en-US" dirty="0" smtClean="0"/>
-              <a:t>As we all know, our problem is…</a:t>
-            </a:r>
+              <a:t>We can detect fake articles by taking into account features computed for histories longer than three words:</a:t>
+            </a:r>
+          </a:p>
+          <a:p>
+            <a:pPr>
+              <a:buNone/>
+            </a:pPr>
+            <a:endParaRPr lang="en-US" sz="2200" dirty="0" smtClean="0"/>
           </a:p>
           <a:p>
             <a:pPr lvl="1"/>
             <a:r>
-              <a:rPr lang="en-US" dirty="0" smtClean="0"/>
-              <a:t>Given some articles, can we distinguish fake ones generated by a trigram model from real ones?</a:t>
-            </a:r>
-          </a:p>
-          <a:p>
-            <a:r>
-              <a:rPr lang="en-US" dirty="0" smtClean="0"/>
-              <a:t>We believe the answer lies in the statistics</a:t>
-            </a:r>
-          </a:p>
-          <a:p>
-            <a:r>
-              <a:rPr lang="en-US" dirty="0" smtClean="0"/>
-              <a:t>And we use a machine learning approach to exploit it</a:t>
-            </a:r>
-          </a:p>
-          <a:p>
-            <a:endParaRPr lang="en-US" dirty="0"/>
+              <a:rPr lang="en-US" sz="2400" dirty="0" smtClean="0"/>
+              <a:t>Perplexity computed using a higher-order n-gram models (</a:t>
+            </a:r>
+            <a:r>
+              <a:rPr lang="en-US" sz="2400" i="1" dirty="0" smtClean="0"/>
+              <a:t>n</a:t>
+            </a:r>
+            <a:r>
+              <a:rPr lang="en-US" sz="2400" dirty="0" smtClean="0"/>
+              <a:t>&gt;3)</a:t>
+            </a:r>
+          </a:p>
+          <a:p>
+            <a:pPr lvl="1"/>
+            <a:r>
+              <a:rPr lang="en-US" sz="2400" dirty="0" smtClean="0"/>
+              <a:t>Perplexity computed using a higher order n-gram model built over sequences of POS-tags</a:t>
+            </a:r>
+          </a:p>
+          <a:p>
+            <a:pPr lvl="1"/>
+            <a:r>
+              <a:rPr lang="en-US" sz="2400" dirty="0" smtClean="0"/>
+              <a:t>Mutual information between distant words</a:t>
+            </a:r>
+          </a:p>
+          <a:p>
+            <a:pPr lvl="1"/>
+            <a:r>
+              <a:rPr lang="en-US" sz="2400" dirty="0" smtClean="0"/>
+              <a:t>Mutual information in between sentences</a:t>
+            </a:r>
           </a:p>
         </p:txBody>
       </p:sp>
@@ -9627,6 +9464,7 @@
           <a:p>
             <a:fld id="{28E7742D-E9E6-4DF8-B9EB-599EE73D2CED}" type="slidenum">
               <a:rPr lang="en-US" smtClean="0"/>
+              <a:pPr/>
               <a:t>3</a:t>
             </a:fld>
             <a:endParaRPr lang="en-US"/>
@@ -9636,7 +9474,7 @@
     </p:spTree>
     <p:extLst>
       <p:ext uri="{BB962C8B-B14F-4D97-AF65-F5344CB8AC3E}">
-        <p14:creationId xmlns:p14="http://schemas.microsoft.com/office/powerpoint/2010/main" val="1574483208"/>
+        <p14:creationId xmlns:p14="http://schemas.microsoft.com/office/powerpoint/2010/main" val="47094019"/>
       </p:ext>
     </p:extLst>
   </p:cSld>
@@ -9687,7 +9525,7 @@
           <a:p>
             <a:r>
               <a:rPr lang="en-US" dirty="0" smtClean="0"/>
-              <a:t>Some Initial Hypothesis</a:t>
+              <a:t>Designed Features</a:t>
             </a:r>
             <a:endParaRPr lang="en-US" dirty="0"/>
           </a:p>
@@ -9704,68 +9542,91 @@
           </p:nvPr>
         </p:nvSpPr>
         <p:spPr/>
-        <p:style>
-          <a:lnRef idx="2">
-            <a:schemeClr val="accent4"/>
-          </a:lnRef>
-          <a:fillRef idx="1">
-            <a:schemeClr val="lt1"/>
-          </a:fillRef>
-          <a:effectRef idx="0">
-            <a:schemeClr val="accent4"/>
-          </a:effectRef>
-          <a:fontRef idx="minor">
-            <a:schemeClr val="dk1"/>
-          </a:fontRef>
-        </p:style>
         <p:txBody>
           <a:bodyPr/>
           <a:lstStyle/>
           <a:p>
             <a:r>
               <a:rPr lang="en-US" dirty="0" smtClean="0"/>
-              <a:t>Higher-order n-gram models on articles will expose the weakness of tri-gram model</a:t>
+              <a:t>Original text n-gram model perplexity</a:t>
             </a:r>
           </a:p>
           <a:p>
             <a:pPr lvl="1"/>
             <a:r>
               <a:rPr lang="en-US" dirty="0" smtClean="0"/>
-              <a:t>Higher-order n-gram models perplexity</a:t>
+              <a:t>2 to 7 words (with </a:t>
+            </a:r>
+            <a:r>
+              <a:rPr lang="en-US" dirty="0" err="1" smtClean="0"/>
+              <a:t>backoff</a:t>
+            </a:r>
+            <a:r>
+              <a:rPr lang="en-US" dirty="0" smtClean="0"/>
+              <a:t>)</a:t>
             </a:r>
           </a:p>
           <a:p>
             <a:pPr lvl="1"/>
             <a:r>
               <a:rPr lang="en-US" dirty="0" smtClean="0"/>
-              <a:t>Mutual information between distant words</a:t>
+              <a:t>Good-Turing smoothing</a:t>
             </a:r>
           </a:p>
           <a:p>
             <a:r>
               <a:rPr lang="en-US" dirty="0" smtClean="0"/>
-              <a:t>Sentences generated by Tri-gram model may not be well formed</a:t>
+              <a:t>POS tag n-gram model perplexity</a:t>
             </a:r>
           </a:p>
           <a:p>
             <a:pPr lvl="1"/>
             <a:r>
               <a:rPr lang="en-US" dirty="0" smtClean="0"/>
-              <a:t>POS tags might be screwed up</a:t>
-            </a:r>
-          </a:p>
-          <a:p>
+              <a:t>2 to 7 tags (with </a:t>
+            </a:r>
+            <a:r>
+              <a:rPr lang="en-US" dirty="0" err="1" smtClean="0"/>
+              <a:t>backoff</a:t>
+            </a:r>
             <a:r>
               <a:rPr lang="en-US" dirty="0" smtClean="0"/>
-              <a:t>Coherence in between fake sentences are weak</a:t>
+              <a:t>)</a:t>
             </a:r>
           </a:p>
           <a:p>
             <a:pPr lvl="1"/>
             <a:r>
               <a:rPr lang="en-US" dirty="0" smtClean="0"/>
-              <a:t>Mutual information in between sentences</a:t>
-            </a:r>
+              <a:t>Good-Turing smoothing</a:t>
+            </a:r>
+          </a:p>
+          <a:p>
+            <a:r>
+              <a:rPr lang="en-US" dirty="0" smtClean="0"/>
+              <a:t>Number of &lt;UNK&gt; words and the total number of words</a:t>
+            </a:r>
+          </a:p>
+          <a:p>
+            <a:r>
+              <a:rPr lang="en-US" dirty="0" smtClean="0"/>
+              <a:t>Point-wise </a:t>
+            </a:r>
+            <a:r>
+              <a:rPr lang="en-US" dirty="0"/>
+              <a:t>mutual </a:t>
+            </a:r>
+            <a:r>
+              <a:rPr lang="en-US" dirty="0" smtClean="0"/>
+              <a:t>information between distant words (more than 2 words in-between)</a:t>
+            </a:r>
+          </a:p>
+          <a:p>
+            <a:r>
+              <a:rPr lang="en-US" dirty="0" smtClean="0"/>
+              <a:t>Point-wise mutual information between words in different sentences</a:t>
+            </a:r>
+            <a:endParaRPr lang="en-US" dirty="0"/>
           </a:p>
         </p:txBody>
       </p:sp>
@@ -9786,6 +9647,7 @@
           <a:p>
             <a:fld id="{28E7742D-E9E6-4DF8-B9EB-599EE73D2CED}" type="slidenum">
               <a:rPr lang="en-US" smtClean="0"/>
+              <a:pPr/>
               <a:t>4</a:t>
             </a:fld>
             <a:endParaRPr lang="en-US"/>
@@ -9795,7 +9657,7 @@
     </p:spTree>
     <p:extLst>
       <p:ext uri="{BB962C8B-B14F-4D97-AF65-F5344CB8AC3E}">
-        <p14:creationId xmlns:p14="http://schemas.microsoft.com/office/powerpoint/2010/main" val="47094019"/>
+        <p14:creationId xmlns:p14="http://schemas.microsoft.com/office/powerpoint/2010/main" val="2398862653"/>
       </p:ext>
     </p:extLst>
   </p:cSld>
@@ -9846,7 +9708,7 @@
           <a:p>
             <a:r>
               <a:rPr lang="en-US" dirty="0" smtClean="0"/>
-              <a:t>Designed Features</a:t>
+              <a:t>Additional training/testing data</a:t>
             </a:r>
             <a:endParaRPr lang="en-US" dirty="0"/>
           </a:p>
@@ -9867,85 +9729,36 @@
           <a:bodyPr/>
           <a:lstStyle/>
           <a:p>
+            <a:endParaRPr lang="en-US" dirty="0" smtClean="0"/>
+          </a:p>
+          <a:p>
             <a:r>
               <a:rPr lang="en-US" dirty="0" smtClean="0"/>
-              <a:t>Original text n-gram model perplexity</a:t>
-            </a:r>
-          </a:p>
-          <a:p>
-            <a:pPr lvl="1"/>
+              <a:t>First we tried NLTK, but produced documents were very different from the provided testing and training data </a:t>
+            </a:r>
+          </a:p>
+          <a:p>
             <a:r>
               <a:rPr lang="en-US" dirty="0" smtClean="0"/>
-              <a:t>2 to 7 gram (with </a:t>
-            </a:r>
-            <a:r>
-              <a:rPr lang="en-US" dirty="0" err="1" smtClean="0"/>
-              <a:t>backoff</a:t>
-            </a:r>
+              <a:t>Then we back-ported the generating function from the CMU Sphinx toolkit to the CMU Cambridge toolkit</a:t>
+            </a:r>
+          </a:p>
+          <a:p>
             <a:r>
               <a:rPr lang="en-US" dirty="0" smtClean="0"/>
-              <a:t>)</a:t>
-            </a:r>
-          </a:p>
-          <a:p>
-            <a:pPr lvl="1"/>
+              <a:t>Real data was generated by extracting a long piece that starts at a random sentence</a:t>
+            </a:r>
+          </a:p>
+          <a:p>
             <a:r>
               <a:rPr lang="en-US" dirty="0" smtClean="0"/>
-              <a:t>Good-Turing smoothing</a:t>
+              <a:t>We generated documents that were much longer than those in the training set</a:t>
             </a:r>
           </a:p>
           <a:p>
             <a:r>
               <a:rPr lang="en-US" dirty="0" smtClean="0"/>
-              <a:t>POS tag n-gram model perplexity</a:t>
-            </a:r>
-          </a:p>
-          <a:p>
-            <a:pPr lvl="1"/>
-            <a:r>
-              <a:rPr lang="en-US" dirty="0" smtClean="0"/>
-              <a:t>2 to 7 gram (with </a:t>
-            </a:r>
-            <a:r>
-              <a:rPr lang="en-US" dirty="0" err="1" smtClean="0"/>
-              <a:t>backoff</a:t>
-            </a:r>
-            <a:r>
-              <a:rPr lang="en-US" dirty="0" smtClean="0"/>
-              <a:t>)</a:t>
-            </a:r>
-          </a:p>
-          <a:p>
-            <a:pPr lvl="1"/>
-            <a:r>
-              <a:rPr lang="en-US" dirty="0" smtClean="0"/>
-              <a:t>Good-Turing smoothing</a:t>
-            </a:r>
-          </a:p>
-          <a:p>
-            <a:r>
-              <a:rPr lang="en-US" dirty="0" smtClean="0"/>
-              <a:t>Number of &lt;UNK&gt; and total number of words</a:t>
-            </a:r>
-          </a:p>
-          <a:p>
-            <a:r>
-              <a:rPr lang="en-US" dirty="0" smtClean="0"/>
-              <a:t>Point-wise </a:t>
-            </a:r>
-            <a:r>
-              <a:rPr lang="en-US" dirty="0"/>
-              <a:t>mutual </a:t>
-            </a:r>
-            <a:r>
-              <a:rPr lang="en-US" dirty="0" smtClean="0"/>
-              <a:t>information between distant words (word in between &gt; 2)</a:t>
-            </a:r>
-          </a:p>
-          <a:p>
-            <a:r>
-              <a:rPr lang="en-US" dirty="0" smtClean="0"/>
-              <a:t>Point-wise mutual information between words in different sentences</a:t>
+              <a:t>The generated training/testing sets were 10x the size of the sets provided by instructors</a:t>
             </a:r>
             <a:endParaRPr lang="en-US" dirty="0"/>
           </a:p>
@@ -9968,6 +9781,7 @@
           <a:p>
             <a:fld id="{28E7742D-E9E6-4DF8-B9EB-599EE73D2CED}" type="slidenum">
               <a:rPr lang="en-US" smtClean="0"/>
+              <a:pPr/>
               <a:t>5</a:t>
             </a:fld>
             <a:endParaRPr lang="en-US"/>
@@ -9977,7 +9791,7 @@
     </p:spTree>
     <p:extLst>
       <p:ext uri="{BB962C8B-B14F-4D97-AF65-F5344CB8AC3E}">
-        <p14:creationId xmlns:p14="http://schemas.microsoft.com/office/powerpoint/2010/main" val="2398862653"/>
+        <p14:creationId xmlns:p14="http://schemas.microsoft.com/office/powerpoint/2010/main" val="3229135573"/>
       </p:ext>
     </p:extLst>
   </p:cSld>
@@ -10028,7 +9842,7 @@
           <a:p>
             <a:r>
               <a:rPr lang="en-US" dirty="0" smtClean="0"/>
-              <a:t>Additional data*</a:t>
+              <a:t>Machine Learning Methods</a:t>
             </a:r>
             <a:endParaRPr lang="en-US" dirty="0"/>
           </a:p>
@@ -10046,87 +9860,100 @@
         </p:nvSpPr>
         <p:spPr/>
         <p:txBody>
-          <a:bodyPr/>
-          <a:lstStyle/>
-          <a:p>
-            <a:r>
-              <a:rPr lang="en-US" dirty="0" err="1" smtClean="0"/>
-              <a:t>Sparsity</a:t>
-            </a:r>
-            <a:r>
-              <a:rPr lang="en-US" dirty="0" smtClean="0"/>
-              <a:t> is always an issue for language processing</a:t>
-            </a:r>
-          </a:p>
-          <a:p>
-            <a:r>
-              <a:rPr lang="en-US" dirty="0" smtClean="0"/>
-              <a:t>Estimation of N-Gram requires large amount of data</a:t>
-            </a:r>
-          </a:p>
-          <a:p>
-            <a:r>
-              <a:rPr lang="en-US" dirty="0" smtClean="0"/>
-              <a:t>We need more….</a:t>
-            </a:r>
-          </a:p>
-          <a:p>
-            <a:pPr lvl="1"/>
-            <a:r>
-              <a:rPr lang="en-US" dirty="0" smtClean="0"/>
-              <a:t>We tried NLTK, the generated data is different</a:t>
-            </a:r>
-          </a:p>
-          <a:p>
-            <a:pPr lvl="1"/>
-            <a:r>
-              <a:rPr lang="en-US" dirty="0" smtClean="0"/>
-              <a:t>We tried CMU Sphinx toolkit</a:t>
-            </a:r>
-          </a:p>
-          <a:p>
-            <a:r>
-              <a:rPr lang="en-US" dirty="0" smtClean="0"/>
-              <a:t>We tend to generate long documents</a:t>
-            </a:r>
-          </a:p>
-          <a:p>
-            <a:pPr lvl="1"/>
-            <a:r>
-              <a:rPr lang="en-US" dirty="0" smtClean="0"/>
-              <a:t>2000 words longer than provided for training</a:t>
-            </a:r>
-            <a:endParaRPr lang="en-US" dirty="0"/>
-          </a:p>
-        </p:txBody>
-      </p:sp>
-      <p:sp>
-        <p:nvSpPr>
-          <p:cNvPr id="5" name="TextBox 4"/>
-          <p:cNvSpPr txBox="1"/>
-          <p:nvPr/>
-        </p:nvSpPr>
-        <p:spPr>
-          <a:xfrm>
-            <a:off x="4038600" y="6373892"/>
-            <a:ext cx="4953000" cy="369332"/>
-          </a:xfrm>
-          <a:prstGeom prst="rect">
-            <a:avLst/>
-          </a:prstGeom>
-          <a:noFill/>
-        </p:spPr>
-        <p:txBody>
-          <a:bodyPr wrap="square" rtlCol="0">
-            <a:spAutoFit/>
+          <a:bodyPr>
+            <a:normAutofit/>
           </a:bodyPr>
           <a:lstStyle/>
           <a:p>
             <a:r>
               <a:rPr lang="en-US" dirty="0" smtClean="0"/>
-              <a:t>* For more details, please refer to our report</a:t>
+              <a:t>Soft-margin SVM</a:t>
+            </a:r>
+          </a:p>
+          <a:p>
+            <a:pPr lvl="1"/>
+            <a:r>
+              <a:rPr lang="en-US" dirty="0" smtClean="0"/>
+              <a:t>Good classifier, but no posterior probabilities</a:t>
+            </a:r>
+          </a:p>
+          <a:p>
+            <a:pPr lvl="1"/>
+            <a:r>
+              <a:rPr lang="en-US" dirty="0" smtClean="0"/>
+              <a:t>Tried different kernels</a:t>
+            </a:r>
+          </a:p>
+          <a:p>
+            <a:r>
+              <a:rPr lang="en-US" dirty="0" smtClean="0"/>
+              <a:t>Regularized logistic regression</a:t>
+            </a:r>
+          </a:p>
+          <a:p>
+            <a:pPr lvl="1"/>
+            <a:r>
+              <a:rPr lang="en-US" dirty="0" smtClean="0"/>
+              <a:t>Probably not as good as SVM</a:t>
+            </a:r>
+          </a:p>
+          <a:p>
+            <a:pPr lvl="1"/>
+            <a:r>
+              <a:rPr lang="en-US" dirty="0" smtClean="0"/>
+              <a:t>But it can produce posterior probabilities</a:t>
+            </a:r>
+          </a:p>
+          <a:p>
+            <a:pPr lvl="1"/>
+            <a:r>
+              <a:rPr lang="en-US" dirty="0" smtClean="0"/>
+              <a:t>LASSO (L1) and </a:t>
+            </a:r>
+            <a:r>
+              <a:rPr lang="en-US" dirty="0" err="1" smtClean="0"/>
+              <a:t>Tikhonov</a:t>
+            </a:r>
+            <a:r>
+              <a:rPr lang="en-US" dirty="0" smtClean="0"/>
+              <a:t> (L2) regularization</a:t>
+            </a:r>
+          </a:p>
+          <a:p>
+            <a:r>
+              <a:rPr lang="en-US" dirty="0" smtClean="0"/>
+              <a:t>Naïve Bayes</a:t>
+            </a:r>
+          </a:p>
+          <a:p>
+            <a:r>
+              <a:rPr lang="en-US" dirty="0" smtClean="0"/>
+              <a:t>Parameters tuned by 10-fold cross-validation</a:t>
+            </a:r>
+          </a:p>
+          <a:p>
+            <a:r>
+              <a:rPr lang="en-US" dirty="0" smtClean="0"/>
+              <a:t>We use two sets of features </a:t>
+            </a:r>
+          </a:p>
+          <a:p>
+            <a:pPr marL="457200" lvl="2"/>
+            <a:r>
+              <a:rPr lang="en-US" dirty="0" smtClean="0"/>
+              <a:t>Complete includes all n-gram models</a:t>
+            </a:r>
+          </a:p>
+          <a:p>
+            <a:pPr marL="457200" lvl="2"/>
+            <a:r>
+              <a:rPr lang="en-US" dirty="0" smtClean="0"/>
+              <a:t>Short includes only for 3-gram and 4-gram models</a:t>
             </a:r>
             <a:endParaRPr lang="en-US" dirty="0"/>
+          </a:p>
+          <a:p>
+            <a:endParaRPr lang="en-US" dirty="0" smtClean="0"/>
           </a:p>
         </p:txBody>
       </p:sp>
@@ -10147,6 +9974,7 @@
           <a:p>
             <a:fld id="{28E7742D-E9E6-4DF8-B9EB-599EE73D2CED}" type="slidenum">
               <a:rPr lang="en-US" smtClean="0"/>
+              <a:pPr/>
               <a:t>6</a:t>
             </a:fld>
             <a:endParaRPr lang="en-US"/>
@@ -10156,7 +9984,7 @@
     </p:spTree>
     <p:extLst>
       <p:ext uri="{BB962C8B-B14F-4D97-AF65-F5344CB8AC3E}">
-        <p14:creationId xmlns:p14="http://schemas.microsoft.com/office/powerpoint/2010/main" val="3229135573"/>
+        <p14:creationId xmlns:p14="http://schemas.microsoft.com/office/powerpoint/2010/main" val="195055784"/>
       </p:ext>
     </p:extLst>
   </p:cSld>
@@ -10207,290 +10035,7 @@
           <a:p>
             <a:r>
               <a:rPr lang="en-US" dirty="0" smtClean="0"/>
-              <a:t>Experiments</a:t>
-            </a:r>
-            <a:endParaRPr lang="en-US" dirty="0"/>
-          </a:p>
-        </p:txBody>
-      </p:sp>
-      <p:sp>
-        <p:nvSpPr>
-          <p:cNvPr id="3" name="Text Placeholder 2"/>
-          <p:cNvSpPr>
-            <a:spLocks noGrp="1"/>
-          </p:cNvSpPr>
-          <p:nvPr>
-            <p:ph type="body" idx="1"/>
-          </p:nvPr>
-        </p:nvSpPr>
-        <p:spPr/>
-        <p:txBody>
-          <a:bodyPr/>
-          <a:lstStyle/>
-          <a:p>
-            <a:endParaRPr lang="en-US"/>
-          </a:p>
-        </p:txBody>
-      </p:sp>
-      <p:sp>
-        <p:nvSpPr>
-          <p:cNvPr id="4" name="Slide Number Placeholder 3"/>
-          <p:cNvSpPr>
-            <a:spLocks noGrp="1"/>
-          </p:cNvSpPr>
-          <p:nvPr>
-            <p:ph type="sldNum" sz="quarter" idx="12"/>
-          </p:nvPr>
-        </p:nvSpPr>
-        <p:spPr/>
-        <p:txBody>
-          <a:bodyPr/>
-          <a:lstStyle/>
-          <a:p>
-            <a:fld id="{28E7742D-E9E6-4DF8-B9EB-599EE73D2CED}" type="slidenum">
-              <a:rPr lang="en-US" smtClean="0"/>
-              <a:t>7</a:t>
-            </a:fld>
-            <a:endParaRPr lang="en-US"/>
-          </a:p>
-        </p:txBody>
-      </p:sp>
-    </p:spTree>
-    <p:extLst>
-      <p:ext uri="{BB962C8B-B14F-4D97-AF65-F5344CB8AC3E}">
-        <p14:creationId xmlns:p14="http://schemas.microsoft.com/office/powerpoint/2010/main" val="2774575651"/>
-      </p:ext>
-    </p:extLst>
-  </p:cSld>
-  <p:clrMapOvr>
-    <a:masterClrMapping/>
-  </p:clrMapOvr>
-  <p:timing>
-    <p:tnLst>
-      <p:par>
-        <p:cTn id="1" dur="indefinite" restart="never" nodeType="tmRoot"/>
-      </p:par>
-    </p:tnLst>
-  </p:timing>
-</p:sld>
-</file>
-
-<file path=ppt/slides/slide8.xml><?xml version="1.0" encoding="utf-8"?>
-<p:sld xmlns:a="http://schemas.openxmlformats.org/drawingml/2006/main" xmlns:r="http://schemas.openxmlformats.org/officeDocument/2006/relationships" xmlns:p="http://schemas.openxmlformats.org/presentationml/2006/main">
-  <p:cSld>
-    <p:spTree>
-      <p:nvGrpSpPr>
-        <p:cNvPr id="1" name=""/>
-        <p:cNvGrpSpPr/>
-        <p:nvPr/>
-      </p:nvGrpSpPr>
-      <p:grpSpPr>
-        <a:xfrm>
-          <a:off x="0" y="0"/>
-          <a:ext cx="0" cy="0"/>
-          <a:chOff x="0" y="0"/>
-          <a:chExt cx="0" cy="0"/>
-        </a:xfrm>
-      </p:grpSpPr>
-      <p:sp>
-        <p:nvSpPr>
-          <p:cNvPr id="2" name="Title 1"/>
-          <p:cNvSpPr>
-            <a:spLocks noGrp="1"/>
-          </p:cNvSpPr>
-          <p:nvPr>
-            <p:ph type="title"/>
-          </p:nvPr>
-        </p:nvSpPr>
-        <p:spPr/>
-        <p:txBody>
-          <a:bodyPr/>
-          <a:lstStyle/>
-          <a:p>
-            <a:r>
-              <a:rPr lang="en-US" dirty="0" smtClean="0"/>
-              <a:t>Approach</a:t>
-            </a:r>
-            <a:endParaRPr lang="en-US" dirty="0"/>
-          </a:p>
-        </p:txBody>
-      </p:sp>
-      <p:sp>
-        <p:nvSpPr>
-          <p:cNvPr id="3" name="Content Placeholder 2"/>
-          <p:cNvSpPr>
-            <a:spLocks noGrp="1"/>
-          </p:cNvSpPr>
-          <p:nvPr>
-            <p:ph idx="1"/>
-          </p:nvPr>
-        </p:nvSpPr>
-        <p:spPr/>
-        <p:txBody>
-          <a:bodyPr/>
-          <a:lstStyle/>
-          <a:p>
-            <a:r>
-              <a:rPr lang="en-US" dirty="0" smtClean="0"/>
-              <a:t>Soft-margin SVM</a:t>
-            </a:r>
-          </a:p>
-          <a:p>
-            <a:pPr lvl="1"/>
-            <a:r>
-              <a:rPr lang="en-US" dirty="0" smtClean="0"/>
-              <a:t>Good classifier, but no probability</a:t>
-            </a:r>
-          </a:p>
-          <a:p>
-            <a:pPr lvl="1"/>
-            <a:r>
-              <a:rPr lang="en-US" dirty="0" smtClean="0"/>
-              <a:t>Tried different kernels</a:t>
-            </a:r>
-          </a:p>
-          <a:p>
-            <a:r>
-              <a:rPr lang="en-US" dirty="0" smtClean="0"/>
-              <a:t>Regularized logistic regression</a:t>
-            </a:r>
-          </a:p>
-          <a:p>
-            <a:pPr lvl="1"/>
-            <a:r>
-              <a:rPr lang="en-US" dirty="0" smtClean="0"/>
-              <a:t>Probably not as good as SVM here</a:t>
-            </a:r>
-          </a:p>
-          <a:p>
-            <a:pPr lvl="1"/>
-            <a:r>
-              <a:rPr lang="en-US" dirty="0" smtClean="0"/>
-              <a:t>But we have probability results</a:t>
-            </a:r>
-          </a:p>
-          <a:p>
-            <a:pPr lvl="1"/>
-            <a:r>
-              <a:rPr lang="en-US" dirty="0" smtClean="0"/>
-              <a:t>LASSO and </a:t>
-            </a:r>
-            <a:r>
-              <a:rPr lang="en-US" dirty="0" err="1" smtClean="0"/>
-              <a:t>Tiknonov</a:t>
-            </a:r>
-            <a:r>
-              <a:rPr lang="en-US" dirty="0" smtClean="0"/>
-              <a:t> regularization</a:t>
-            </a:r>
-          </a:p>
-          <a:p>
-            <a:r>
-              <a:rPr lang="en-US" dirty="0" smtClean="0"/>
-              <a:t>Naïve Bayes</a:t>
-            </a:r>
-          </a:p>
-          <a:p>
-            <a:pPr lvl="1"/>
-            <a:r>
-              <a:rPr lang="en-US" dirty="0" smtClean="0"/>
-              <a:t>You know it didn’t work well</a:t>
-            </a:r>
-          </a:p>
-          <a:p>
-            <a:r>
-              <a:rPr lang="en-US" dirty="0" smtClean="0"/>
-              <a:t>Parameters tuned by 10-fold cross-validation</a:t>
-            </a:r>
-            <a:endParaRPr lang="en-US" dirty="0"/>
-          </a:p>
-          <a:p>
-            <a:endParaRPr lang="en-US" dirty="0" smtClean="0"/>
-          </a:p>
-        </p:txBody>
-      </p:sp>
-      <p:sp>
-        <p:nvSpPr>
-          <p:cNvPr id="4" name="Slide Number Placeholder 3"/>
-          <p:cNvSpPr>
-            <a:spLocks noGrp="1"/>
-          </p:cNvSpPr>
-          <p:nvPr>
-            <p:ph type="sldNum" sz="quarter" idx="12"/>
-          </p:nvPr>
-        </p:nvSpPr>
-        <p:spPr/>
-        <p:txBody>
-          <a:bodyPr/>
-          <a:lstStyle/>
-          <a:p>
-            <a:fld id="{28E7742D-E9E6-4DF8-B9EB-599EE73D2CED}" type="slidenum">
-              <a:rPr lang="en-US" smtClean="0"/>
-              <a:t>8</a:t>
-            </a:fld>
-            <a:endParaRPr lang="en-US"/>
-          </a:p>
-        </p:txBody>
-      </p:sp>
-    </p:spTree>
-    <p:extLst>
-      <p:ext uri="{BB962C8B-B14F-4D97-AF65-F5344CB8AC3E}">
-        <p14:creationId xmlns:p14="http://schemas.microsoft.com/office/powerpoint/2010/main" val="195055784"/>
-      </p:ext>
-    </p:extLst>
-  </p:cSld>
-  <p:clrMapOvr>
-    <a:masterClrMapping/>
-  </p:clrMapOvr>
-  <p:timing>
-    <p:tnLst>
-      <p:par>
-        <p:cTn id="1" dur="indefinite" restart="never" nodeType="tmRoot"/>
-      </p:par>
-    </p:tnLst>
-  </p:timing>
-</p:sld>
-</file>
-
-<file path=ppt/slides/slide9.xml><?xml version="1.0" encoding="utf-8"?>
-<p:sld xmlns:a="http://schemas.openxmlformats.org/drawingml/2006/main" xmlns:r="http://schemas.openxmlformats.org/officeDocument/2006/relationships" xmlns:p="http://schemas.openxmlformats.org/presentationml/2006/main">
-  <p:cSld>
-    <p:spTree>
-      <p:nvGrpSpPr>
-        <p:cNvPr id="1" name=""/>
-        <p:cNvGrpSpPr/>
-        <p:nvPr/>
-      </p:nvGrpSpPr>
-      <p:grpSpPr>
-        <a:xfrm>
-          <a:off x="0" y="0"/>
-          <a:ext cx="0" cy="0"/>
-          <a:chOff x="0" y="0"/>
-          <a:chExt cx="0" cy="0"/>
-        </a:xfrm>
-      </p:grpSpPr>
-      <p:sp>
-        <p:nvSpPr>
-          <p:cNvPr id="2" name="Title 1"/>
-          <p:cNvSpPr>
-            <a:spLocks noGrp="1"/>
-          </p:cNvSpPr>
-          <p:nvPr>
-            <p:ph type="title"/>
-          </p:nvPr>
-        </p:nvSpPr>
-        <p:spPr/>
-        <p:txBody>
-          <a:bodyPr/>
-          <a:lstStyle/>
-          <a:p>
-            <a:r>
-              <a:rPr lang="en-US" dirty="0" smtClean="0"/>
-              <a:t>Experimental </a:t>
-            </a:r>
-            <a:r>
-              <a:rPr lang="en-US" dirty="0" smtClean="0"/>
-              <a:t>results</a:t>
+              <a:t>Experimental results</a:t>
             </a:r>
             <a:endParaRPr lang="en-US" dirty="0"/>
           </a:p>
@@ -10543,8 +10088,8 @@
           </p:nvPr>
         </p:nvGraphicFramePr>
         <p:xfrm>
-          <a:off x="457200" y="3114040"/>
-          <a:ext cx="3932235" cy="1381760"/>
+          <a:off x="533400" y="3048000"/>
+          <a:ext cx="3733800" cy="1381760"/>
         </p:xfrm>
         <a:graphic>
           <a:graphicData uri="http://schemas.openxmlformats.org/drawingml/2006/table">
@@ -10553,27 +10098,12 @@
                 <a:tableStyleId>{5C22544A-7EE6-4342-B048-85BDC9FD1C3A}</a:tableStyleId>
               </a:tblPr>
               <a:tblGrid>
-                <a:gridCol w="786447"/>
-                <a:gridCol w="786447"/>
-                <a:gridCol w="786447"/>
-                <a:gridCol w="786447"/>
-                <a:gridCol w="786447"/>
+                <a:gridCol w="838200"/>
+                <a:gridCol w="1028700"/>
+                <a:gridCol w="800100"/>
+                <a:gridCol w="1066800"/>
               </a:tblGrid>
               <a:tr h="370840">
-                <a:tc>
-                  <a:txBody>
-                    <a:bodyPr/>
-                    <a:lstStyle/>
-                    <a:p>
-                      <a:r>
-                        <a:rPr lang="en-US" dirty="0" smtClean="0"/>
-                        <a:t>SVM</a:t>
-                      </a:r>
-                      <a:endParaRPr lang="en-US" dirty="0"/>
-                    </a:p>
-                  </a:txBody>
-                  <a:tcPr marL="43692" marR="43692"/>
-                </a:tc>
                 <a:tc gridSpan="2">
                   <a:txBody>
                     <a:bodyPr/>
@@ -10643,16 +10173,6 @@
                     <a:bodyPr/>
                     <a:lstStyle/>
                     <a:p>
-                      <a:endParaRPr lang="en-US" dirty="0"/>
-                    </a:p>
-                  </a:txBody>
-                  <a:tcPr marL="43692" marR="43692"/>
-                </a:tc>
-                <a:tc>
-                  <a:txBody>
-                    <a:bodyPr/>
-                    <a:lstStyle/>
-                    <a:p>
                       <a:r>
                         <a:rPr lang="en-US" dirty="0" smtClean="0"/>
                         <a:t>short</a:t>
@@ -10669,7 +10189,7 @@
                     <a:p>
                       <a:r>
                         <a:rPr lang="en-US" dirty="0" smtClean="0"/>
-                        <a:t>all</a:t>
+                        <a:t>complete</a:t>
                       </a:r>
                       <a:endParaRPr lang="en-US" dirty="0"/>
                     </a:p>
@@ -10697,7 +10217,7 @@
                     <a:p>
                       <a:r>
                         <a:rPr lang="en-US" dirty="0" smtClean="0"/>
-                        <a:t>all</a:t>
+                        <a:t>complete</a:t>
                       </a:r>
                       <a:endParaRPr lang="en-US" dirty="0"/>
                     </a:p>
@@ -10706,16 +10226,6 @@
                 </a:tc>
               </a:tr>
               <a:tr h="370840">
-                <a:tc>
-                  <a:txBody>
-                    <a:bodyPr/>
-                    <a:lstStyle/>
-                    <a:p>
-                      <a:endParaRPr lang="en-US" dirty="0"/>
-                    </a:p>
-                  </a:txBody>
-                  <a:tcPr marL="43692" marR="43692"/>
-                </a:tc>
                 <a:tc>
                   <a:txBody>
                     <a:bodyPr/>
@@ -10824,8 +10334,8 @@
           </p:nvPr>
         </p:nvGraphicFramePr>
         <p:xfrm>
-          <a:off x="4754563" y="3114040"/>
-          <a:ext cx="4237035" cy="1381760"/>
+          <a:off x="4800600" y="3114040"/>
+          <a:ext cx="3886200" cy="1381760"/>
         </p:xfrm>
         <a:graphic>
           <a:graphicData uri="http://schemas.openxmlformats.org/drawingml/2006/table">
@@ -10834,27 +10344,12 @@
                 <a:tableStyleId>{5C22544A-7EE6-4342-B048-85BDC9FD1C3A}</a:tableStyleId>
               </a:tblPr>
               <a:tblGrid>
-                <a:gridCol w="847407"/>
-                <a:gridCol w="847407"/>
-                <a:gridCol w="847407"/>
-                <a:gridCol w="847407"/>
-                <a:gridCol w="847407"/>
+                <a:gridCol w="838200"/>
+                <a:gridCol w="1104900"/>
+                <a:gridCol w="876300"/>
+                <a:gridCol w="1066800"/>
               </a:tblGrid>
               <a:tr h="370840">
-                <a:tc>
-                  <a:txBody>
-                    <a:bodyPr/>
-                    <a:lstStyle/>
-                    <a:p>
-                      <a:r>
-                        <a:rPr lang="en-US" dirty="0" smtClean="0"/>
-                        <a:t>SVM</a:t>
-                      </a:r>
-                      <a:endParaRPr lang="en-US" dirty="0"/>
-                    </a:p>
-                  </a:txBody>
-                  <a:tcPr/>
-                </a:tc>
                 <a:tc gridSpan="2">
                   <a:txBody>
                     <a:bodyPr/>
@@ -10914,16 +10409,6 @@
                     <a:bodyPr/>
                     <a:lstStyle/>
                     <a:p>
-                      <a:endParaRPr lang="en-US" dirty="0"/>
-                    </a:p>
-                  </a:txBody>
-                  <a:tcPr marL="43692" marR="43692"/>
-                </a:tc>
-                <a:tc>
-                  <a:txBody>
-                    <a:bodyPr/>
-                    <a:lstStyle/>
-                    <a:p>
                       <a:r>
                         <a:rPr lang="en-US" dirty="0" smtClean="0"/>
                         <a:t>short</a:t>
@@ -10940,7 +10425,7 @@
                     <a:p>
                       <a:r>
                         <a:rPr lang="en-US" dirty="0" smtClean="0"/>
-                        <a:t>all</a:t>
+                        <a:t>complete</a:t>
                       </a:r>
                       <a:endParaRPr lang="en-US" dirty="0"/>
                     </a:p>
@@ -10968,7 +10453,7 @@
                     <a:p>
                       <a:r>
                         <a:rPr lang="en-US" dirty="0" smtClean="0"/>
-                        <a:t>all</a:t>
+                        <a:t>complete</a:t>
                       </a:r>
                       <a:endParaRPr lang="en-US" dirty="0"/>
                     </a:p>
@@ -10977,16 +10462,6 @@
                 </a:tc>
               </a:tr>
               <a:tr h="370840">
-                <a:tc>
-                  <a:txBody>
-                    <a:bodyPr/>
-                    <a:lstStyle/>
-                    <a:p>
-                      <a:endParaRPr lang="en-US" dirty="0"/>
-                    </a:p>
-                  </a:txBody>
-                  <a:tcPr marL="43692" marR="43692"/>
-                </a:tc>
                 <a:tc>
                   <a:txBody>
                     <a:bodyPr/>
@@ -11063,8 +10538,8 @@
           </p:nvPr>
         </p:nvGraphicFramePr>
         <p:xfrm>
-          <a:off x="457200" y="5029200"/>
-          <a:ext cx="3932235" cy="1381760"/>
+          <a:off x="533400" y="5029200"/>
+          <a:ext cx="3733800" cy="1381760"/>
         </p:xfrm>
         <a:graphic>
           <a:graphicData uri="http://schemas.openxmlformats.org/drawingml/2006/table">
@@ -11073,27 +10548,12 @@
                 <a:tableStyleId>{5C22544A-7EE6-4342-B048-85BDC9FD1C3A}</a:tableStyleId>
               </a:tblPr>
               <a:tblGrid>
-                <a:gridCol w="786447"/>
-                <a:gridCol w="786447"/>
-                <a:gridCol w="786447"/>
-                <a:gridCol w="786447"/>
-                <a:gridCol w="786447"/>
+                <a:gridCol w="777875"/>
+                <a:gridCol w="1089025"/>
+                <a:gridCol w="777875"/>
+                <a:gridCol w="1089025"/>
               </a:tblGrid>
               <a:tr h="370840">
-                <a:tc>
-                  <a:txBody>
-                    <a:bodyPr/>
-                    <a:lstStyle/>
-                    <a:p>
-                      <a:r>
-                        <a:rPr lang="en-US" dirty="0" smtClean="0"/>
-                        <a:t>LR-L1</a:t>
-                      </a:r>
-                      <a:endParaRPr lang="en-US" dirty="0"/>
-                    </a:p>
-                  </a:txBody>
-                  <a:tcPr marL="43692" marR="43692"/>
-                </a:tc>
                 <a:tc gridSpan="2">
                   <a:txBody>
                     <a:bodyPr/>
@@ -11163,6 +10623,24 @@
                     <a:bodyPr/>
                     <a:lstStyle/>
                     <a:p>
+                      <a:r>
+                        <a:rPr lang="en-US" dirty="0" smtClean="0"/>
+                        <a:t>short</a:t>
+                      </a:r>
+                      <a:endParaRPr lang="en-US" dirty="0"/>
+                    </a:p>
+                  </a:txBody>
+                  <a:tcPr marL="43692" marR="43692"/>
+                </a:tc>
+                <a:tc>
+                  <a:txBody>
+                    <a:bodyPr/>
+                    <a:lstStyle/>
+                    <a:p>
+                      <a:r>
+                        <a:rPr lang="en-US" dirty="0" smtClean="0"/>
+                        <a:t>complete</a:t>
+                      </a:r>
                       <a:endParaRPr lang="en-US" dirty="0"/>
                     </a:p>
                   </a:txBody>
@@ -11189,35 +10667,7 @@
                     <a:p>
                       <a:r>
                         <a:rPr lang="en-US" dirty="0" smtClean="0"/>
-                        <a:t>All</a:t>
-                      </a:r>
-                      <a:endParaRPr lang="en-US" dirty="0"/>
-                    </a:p>
-                  </a:txBody>
-                  <a:tcPr marL="43692" marR="43692"/>
-                </a:tc>
-                <a:tc>
-                  <a:txBody>
-                    <a:bodyPr/>
-                    <a:lstStyle/>
-                    <a:p>
-                      <a:r>
-                        <a:rPr lang="en-US" dirty="0" smtClean="0"/>
-                        <a:t>Short</a:t>
-                      </a:r>
-                      <a:endParaRPr lang="en-US" dirty="0"/>
-                    </a:p>
-                  </a:txBody>
-                  <a:tcPr marL="43692" marR="43692"/>
-                </a:tc>
-                <a:tc>
-                  <a:txBody>
-                    <a:bodyPr/>
-                    <a:lstStyle/>
-                    <a:p>
-                      <a:r>
-                        <a:rPr lang="en-US" dirty="0" smtClean="0"/>
-                        <a:t>all</a:t>
+                        <a:t>complete</a:t>
                       </a:r>
                       <a:endParaRPr lang="en-US" dirty="0"/>
                     </a:p>
@@ -11226,32 +10676,6 @@
                 </a:tc>
               </a:tr>
               <a:tr h="370840">
-                <a:tc>
-                  <a:txBody>
-                    <a:bodyPr/>
-                    <a:lstStyle/>
-                    <a:p>
-                      <a:r>
-                        <a:rPr lang="en-US" dirty="0" err="1" smtClean="0"/>
-                        <a:t>Exp</a:t>
-                      </a:r>
-                      <a:r>
-                        <a:rPr lang="en-US" dirty="0" smtClean="0"/>
-                        <a:t>(</a:t>
-                      </a:r>
-                      <a:r>
-                        <a:rPr lang="en-US" dirty="0" err="1" smtClean="0"/>
-                        <a:t>ll</a:t>
-                      </a:r>
-                      <a:r>
-                        <a:rPr lang="en-US" dirty="0" smtClean="0"/>
-                        <a:t>)</a:t>
-                      </a:r>
-                      <a:endParaRPr lang="en-US" dirty="0"/>
-                    </a:p>
-                  </a:txBody>
-                  <a:tcPr marL="43692" marR="43692"/>
-                </a:tc>
                 <a:tc>
                   <a:txBody>
                     <a:bodyPr/>
@@ -11328,8 +10752,8 @@
           </p:nvPr>
         </p:nvGraphicFramePr>
         <p:xfrm>
-          <a:off x="4800600" y="5029200"/>
-          <a:ext cx="4267200" cy="1381760"/>
+          <a:off x="4876800" y="5029200"/>
+          <a:ext cx="3810000" cy="1381760"/>
         </p:xfrm>
         <a:graphic>
           <a:graphicData uri="http://schemas.openxmlformats.org/drawingml/2006/table">
@@ -11338,27 +10762,12 @@
                 <a:tableStyleId>{5C22544A-7EE6-4342-B048-85BDC9FD1C3A}</a:tableStyleId>
               </a:tblPr>
               <a:tblGrid>
-                <a:gridCol w="853440"/>
-                <a:gridCol w="853440"/>
-                <a:gridCol w="853440"/>
-                <a:gridCol w="853440"/>
-                <a:gridCol w="853440"/>
+                <a:gridCol w="762000"/>
+                <a:gridCol w="1143000"/>
+                <a:gridCol w="838200"/>
+                <a:gridCol w="1066800"/>
               </a:tblGrid>
               <a:tr h="370840">
-                <a:tc>
-                  <a:txBody>
-                    <a:bodyPr/>
-                    <a:lstStyle/>
-                    <a:p>
-                      <a:r>
-                        <a:rPr lang="en-US" dirty="0" smtClean="0"/>
-                        <a:t>LR-L1</a:t>
-                      </a:r>
-                      <a:endParaRPr lang="en-US" dirty="0"/>
-                    </a:p>
-                  </a:txBody>
-                  <a:tcPr/>
-                </a:tc>
                 <a:tc gridSpan="2">
                   <a:txBody>
                     <a:bodyPr/>
@@ -11418,16 +10827,6 @@
                     <a:bodyPr/>
                     <a:lstStyle/>
                     <a:p>
-                      <a:endParaRPr lang="en-US" dirty="0"/>
-                    </a:p>
-                  </a:txBody>
-                  <a:tcPr marL="43692" marR="43692"/>
-                </a:tc>
-                <a:tc>
-                  <a:txBody>
-                    <a:bodyPr/>
-                    <a:lstStyle/>
-                    <a:p>
                       <a:r>
                         <a:rPr lang="en-US" dirty="0" smtClean="0"/>
                         <a:t>short</a:t>
@@ -11444,7 +10843,7 @@
                     <a:p>
                       <a:r>
                         <a:rPr lang="en-US" dirty="0" smtClean="0"/>
-                        <a:t>all</a:t>
+                        <a:t>complete</a:t>
                       </a:r>
                       <a:endParaRPr lang="en-US" dirty="0"/>
                     </a:p>
@@ -11472,7 +10871,7 @@
                     <a:p>
                       <a:r>
                         <a:rPr lang="en-US" dirty="0" smtClean="0"/>
-                        <a:t>all</a:t>
+                        <a:t>complete</a:t>
                       </a:r>
                       <a:endParaRPr lang="en-US" dirty="0"/>
                     </a:p>
@@ -11481,32 +10880,6 @@
                 </a:tc>
               </a:tr>
               <a:tr h="370840">
-                <a:tc>
-                  <a:txBody>
-                    <a:bodyPr/>
-                    <a:lstStyle/>
-                    <a:p>
-                      <a:r>
-                        <a:rPr lang="en-US" dirty="0" err="1" smtClean="0"/>
-                        <a:t>Exp</a:t>
-                      </a:r>
-                      <a:r>
-                        <a:rPr lang="en-US" dirty="0" smtClean="0"/>
-                        <a:t>(</a:t>
-                      </a:r>
-                      <a:r>
-                        <a:rPr lang="en-US" dirty="0" err="1" smtClean="0"/>
-                        <a:t>ll</a:t>
-                      </a:r>
-                      <a:r>
-                        <a:rPr lang="en-US" dirty="0" smtClean="0"/>
-                        <a:t>)</a:t>
-                      </a:r>
-                      <a:endParaRPr lang="en-US" dirty="0"/>
-                    </a:p>
-                  </a:txBody>
-                  <a:tcPr marL="43692" marR="43692"/>
-                </a:tc>
                 <a:tc>
                   <a:txBody>
                     <a:bodyPr/>
@@ -11766,7 +11139,7 @@
           <a:p>
             <a:r>
               <a:rPr lang="en-US" dirty="0" smtClean="0"/>
-              <a:t>Soft Metric</a:t>
+              <a:t>Soft Metric (LR-L1)</a:t>
             </a:r>
             <a:endParaRPr lang="en-US" dirty="0"/>
           </a:p>
@@ -11970,7 +11343,7 @@
           <a:p>
             <a:r>
               <a:rPr lang="en-US" dirty="0" smtClean="0"/>
-              <a:t>Soft Metric</a:t>
+              <a:t>Soft Metric (LR-L1)</a:t>
             </a:r>
             <a:endParaRPr lang="en-US" dirty="0"/>
           </a:p>
@@ -12174,7 +11547,7 @@
           <a:p>
             <a:r>
               <a:rPr lang="en-US" dirty="0" smtClean="0"/>
-              <a:t>Hard Metric</a:t>
+              <a:t>Hard Metric (SVM)</a:t>
             </a:r>
             <a:endParaRPr lang="en-US" dirty="0"/>
           </a:p>
@@ -12378,7 +11751,7 @@
           <a:p>
             <a:r>
               <a:rPr lang="en-US" dirty="0" smtClean="0"/>
-              <a:t>Hard Metric</a:t>
+              <a:t>Hard Metric (SVM)</a:t>
             </a:r>
             <a:endParaRPr lang="en-US" dirty="0"/>
           </a:p>
@@ -12401,7 +11774,8 @@
           <a:p>
             <a:fld id="{28E7742D-E9E6-4DF8-B9EB-599EE73D2CED}" type="slidenum">
               <a:rPr lang="en-US" smtClean="0"/>
-              <a:t>9</a:t>
+              <a:pPr/>
+              <a:t>7</a:t>
             </a:fld>
             <a:endParaRPr lang="en-US"/>
           </a:p>
@@ -12411,6 +11785,366 @@
     <p:extLst>
       <p:ext uri="{BB962C8B-B14F-4D97-AF65-F5344CB8AC3E}">
         <p14:creationId xmlns:p14="http://schemas.microsoft.com/office/powerpoint/2010/main" val="1468082760"/>
+      </p:ext>
+    </p:extLst>
+  </p:cSld>
+  <p:clrMapOvr>
+    <a:masterClrMapping/>
+  </p:clrMapOvr>
+  <p:timing>
+    <p:tnLst>
+      <p:par>
+        <p:cTn id="1" dur="indefinite" restart="never" nodeType="tmRoot"/>
+      </p:par>
+    </p:tnLst>
+  </p:timing>
+</p:sld>
+</file>
+
+<file path=ppt/slides/slide8.xml><?xml version="1.0" encoding="utf-8"?>
+<p:sld xmlns:a="http://schemas.openxmlformats.org/drawingml/2006/main" xmlns:r="http://schemas.openxmlformats.org/officeDocument/2006/relationships" xmlns:p="http://schemas.openxmlformats.org/presentationml/2006/main">
+  <p:cSld>
+    <p:spTree>
+      <p:nvGrpSpPr>
+        <p:cNvPr id="1" name=""/>
+        <p:cNvGrpSpPr/>
+        <p:nvPr/>
+      </p:nvGrpSpPr>
+      <p:grpSpPr>
+        <a:xfrm>
+          <a:off x="0" y="0"/>
+          <a:ext cx="0" cy="0"/>
+          <a:chOff x="0" y="0"/>
+          <a:chExt cx="0" cy="0"/>
+        </a:xfrm>
+      </p:grpSpPr>
+      <p:sp>
+        <p:nvSpPr>
+          <p:cNvPr id="2" name="Title 1"/>
+          <p:cNvSpPr>
+            <a:spLocks noGrp="1"/>
+          </p:cNvSpPr>
+          <p:nvPr>
+            <p:ph type="title"/>
+          </p:nvPr>
+        </p:nvSpPr>
+        <p:spPr/>
+        <p:txBody>
+          <a:bodyPr>
+            <a:normAutofit fontScale="90000"/>
+          </a:bodyPr>
+          <a:lstStyle/>
+          <a:p>
+            <a:r>
+              <a:rPr lang="en-US" dirty="0" smtClean="0"/>
+              <a:t>Perplexity distributions of 3- and 4-gram models for fake and real documents</a:t>
+            </a:r>
+            <a:endParaRPr lang="en-US" dirty="0"/>
+          </a:p>
+        </p:txBody>
+      </p:sp>
+      <p:pic>
+        <p:nvPicPr>
+          <p:cNvPr id="4" name="Content Placeholder 3"/>
+          <p:cNvPicPr>
+            <a:picLocks noGrp="1" noChangeAspect="1"/>
+          </p:cNvPicPr>
+          <p:nvPr>
+            <p:ph idx="1"/>
+          </p:nvPr>
+        </p:nvPicPr>
+        <p:blipFill>
+          <a:blip r:embed="rId3" cstate="print">
+            <a:extLst>
+              <a:ext uri="{28A0092B-C50C-407E-A947-70E740481C1C}">
+                <a14:useLocalDpi xmlns:a14="http://schemas.microsoft.com/office/drawing/2010/main" val="0"/>
+              </a:ext>
+            </a:extLst>
+          </a:blip>
+          <a:stretch>
+            <a:fillRect/>
+          </a:stretch>
+        </p:blipFill>
+        <p:spPr>
+          <a:xfrm>
+            <a:off x="1726953" y="1904815"/>
+            <a:ext cx="5690093" cy="4267570"/>
+          </a:xfrm>
+        </p:spPr>
+      </p:pic>
+      <p:sp>
+        <p:nvSpPr>
+          <p:cNvPr id="6" name="TextBox 5"/>
+          <p:cNvSpPr txBox="1"/>
+          <p:nvPr/>
+        </p:nvSpPr>
+        <p:spPr>
+          <a:xfrm>
+            <a:off x="5867400" y="3581400"/>
+            <a:ext cx="2895600" cy="1200329"/>
+          </a:xfrm>
+          <a:prstGeom prst="rect">
+            <a:avLst/>
+          </a:prstGeom>
+        </p:spPr>
+        <p:style>
+          <a:lnRef idx="2">
+            <a:schemeClr val="accent1"/>
+          </a:lnRef>
+          <a:fillRef idx="1">
+            <a:schemeClr val="lt1"/>
+          </a:fillRef>
+          <a:effectRef idx="0">
+            <a:schemeClr val="accent1"/>
+          </a:effectRef>
+          <a:fontRef idx="minor">
+            <a:schemeClr val="dk1"/>
+          </a:fontRef>
+        </p:style>
+        <p:txBody>
+          <a:bodyPr wrap="square" rtlCol="0">
+            <a:spAutoFit/>
+          </a:bodyPr>
+          <a:lstStyle/>
+          <a:p>
+            <a:r>
+              <a:rPr lang="en-US" dirty="0" smtClean="0"/>
+              <a:t>No single model can separate fake and real documents, but two models can!</a:t>
+            </a:r>
+            <a:endParaRPr lang="en-US" dirty="0"/>
+          </a:p>
+        </p:txBody>
+      </p:sp>
+      <p:sp>
+        <p:nvSpPr>
+          <p:cNvPr id="3" name="Slide Number Placeholder 2"/>
+          <p:cNvSpPr>
+            <a:spLocks noGrp="1"/>
+          </p:cNvSpPr>
+          <p:nvPr>
+            <p:ph type="sldNum" sz="quarter" idx="12"/>
+          </p:nvPr>
+        </p:nvSpPr>
+        <p:spPr/>
+        <p:txBody>
+          <a:bodyPr/>
+          <a:lstStyle/>
+          <a:p>
+            <a:fld id="{28E7742D-E9E6-4DF8-B9EB-599EE73D2CED}" type="slidenum">
+              <a:rPr lang="en-US" smtClean="0"/>
+              <a:pPr/>
+              <a:t>8</a:t>
+            </a:fld>
+            <a:endParaRPr lang="en-US"/>
+          </a:p>
+        </p:txBody>
+      </p:sp>
+    </p:spTree>
+    <p:extLst>
+      <p:ext uri="{BB962C8B-B14F-4D97-AF65-F5344CB8AC3E}">
+        <p14:creationId xmlns:p14="http://schemas.microsoft.com/office/powerpoint/2010/main" val="1978906286"/>
+      </p:ext>
+    </p:extLst>
+  </p:cSld>
+  <p:clrMapOvr>
+    <a:masterClrMapping/>
+  </p:clrMapOvr>
+  <p:timing>
+    <p:tnLst>
+      <p:par>
+        <p:cTn id="1" dur="indefinite" restart="never" nodeType="tmRoot"/>
+      </p:par>
+    </p:tnLst>
+  </p:timing>
+</p:sld>
+</file>
+
+<file path=ppt/slides/slide9.xml><?xml version="1.0" encoding="utf-8"?>
+<p:sld xmlns:a="http://schemas.openxmlformats.org/drawingml/2006/main" xmlns:r="http://schemas.openxmlformats.org/officeDocument/2006/relationships" xmlns:p="http://schemas.openxmlformats.org/presentationml/2006/main">
+  <p:cSld>
+    <p:spTree>
+      <p:nvGrpSpPr>
+        <p:cNvPr id="1" name=""/>
+        <p:cNvGrpSpPr/>
+        <p:nvPr/>
+      </p:nvGrpSpPr>
+      <p:grpSpPr>
+        <a:xfrm>
+          <a:off x="0" y="0"/>
+          <a:ext cx="0" cy="0"/>
+          <a:chOff x="0" y="0"/>
+          <a:chExt cx="0" cy="0"/>
+        </a:xfrm>
+      </p:grpSpPr>
+      <p:sp>
+        <p:nvSpPr>
+          <p:cNvPr id="2" name="Title 1"/>
+          <p:cNvSpPr>
+            <a:spLocks noGrp="1"/>
+          </p:cNvSpPr>
+          <p:nvPr>
+            <p:ph type="title"/>
+          </p:nvPr>
+        </p:nvSpPr>
+        <p:spPr/>
+        <p:txBody>
+          <a:bodyPr/>
+          <a:lstStyle/>
+          <a:p>
+            <a:r>
+              <a:rPr lang="en-US" dirty="0" smtClean="0"/>
+              <a:t>Word occurrences features</a:t>
+            </a:r>
+            <a:endParaRPr lang="en-US" dirty="0"/>
+          </a:p>
+        </p:txBody>
+      </p:sp>
+      <p:pic>
+        <p:nvPicPr>
+          <p:cNvPr id="4" name="Content Placeholder 3"/>
+          <p:cNvPicPr>
+            <a:picLocks noGrp="1" noChangeAspect="1"/>
+          </p:cNvPicPr>
+          <p:nvPr>
+            <p:ph sz="half" idx="1"/>
+          </p:nvPr>
+        </p:nvPicPr>
+        <p:blipFill>
+          <a:blip r:embed="rId2" cstate="print">
+            <a:extLst>
+              <a:ext uri="{28A0092B-C50C-407E-A947-70E740481C1C}">
+                <a14:useLocalDpi xmlns:a14="http://schemas.microsoft.com/office/drawing/2010/main" val="0"/>
+              </a:ext>
+            </a:extLst>
+          </a:blip>
+          <a:stretch>
+            <a:fillRect/>
+          </a:stretch>
+        </p:blipFill>
+        <p:spPr>
+          <a:xfrm>
+            <a:off x="457200" y="2517775"/>
+            <a:ext cx="4038600" cy="3028950"/>
+          </a:xfrm>
+        </p:spPr>
+      </p:pic>
+      <p:pic>
+        <p:nvPicPr>
+          <p:cNvPr id="5" name="Content Placeholder 4"/>
+          <p:cNvPicPr>
+            <a:picLocks noGrp="1" noChangeAspect="1"/>
+          </p:cNvPicPr>
+          <p:nvPr>
+            <p:ph sz="half" idx="2"/>
+          </p:nvPr>
+        </p:nvPicPr>
+        <p:blipFill>
+          <a:blip r:embed="rId3">
+            <a:extLst>
+              <a:ext uri="{28A0092B-C50C-407E-A947-70E740481C1C}">
+                <a14:useLocalDpi xmlns:a14="http://schemas.microsoft.com/office/drawing/2010/main" val="0"/>
+              </a:ext>
+            </a:extLst>
+          </a:blip>
+          <a:stretch>
+            <a:fillRect/>
+          </a:stretch>
+        </p:blipFill>
+        <p:spPr>
+          <a:xfrm>
+            <a:off x="4648200" y="2517775"/>
+            <a:ext cx="4038600" cy="3028950"/>
+          </a:xfrm>
+        </p:spPr>
+      </p:pic>
+      <p:sp>
+        <p:nvSpPr>
+          <p:cNvPr id="7" name="Slide Number Placeholder 6"/>
+          <p:cNvSpPr>
+            <a:spLocks noGrp="1"/>
+          </p:cNvSpPr>
+          <p:nvPr>
+            <p:ph type="sldNum" sz="quarter" idx="12"/>
+          </p:nvPr>
+        </p:nvSpPr>
+        <p:spPr/>
+        <p:txBody>
+          <a:bodyPr/>
+          <a:lstStyle/>
+          <a:p>
+            <a:fld id="{28E7742D-E9E6-4DF8-B9EB-599EE73D2CED}" type="slidenum">
+              <a:rPr lang="en-US" smtClean="0"/>
+              <a:pPr/>
+              <a:t>9</a:t>
+            </a:fld>
+            <a:endParaRPr lang="en-US"/>
+          </a:p>
+        </p:txBody>
+      </p:sp>
+      <p:sp>
+        <p:nvSpPr>
+          <p:cNvPr id="6" name="TextBox 5"/>
+          <p:cNvSpPr txBox="1"/>
+          <p:nvPr/>
+        </p:nvSpPr>
+        <p:spPr>
+          <a:xfrm>
+            <a:off x="914400" y="1981200"/>
+            <a:ext cx="3276600" cy="369332"/>
+          </a:xfrm>
+          <a:prstGeom prst="rect">
+            <a:avLst/>
+          </a:prstGeom>
+          <a:noFill/>
+        </p:spPr>
+        <p:txBody>
+          <a:bodyPr wrap="square" rtlCol="0">
+            <a:spAutoFit/>
+          </a:bodyPr>
+          <a:lstStyle/>
+          <a:p>
+            <a:r>
+              <a:rPr lang="en-US" dirty="0" smtClean="0"/>
+              <a:t>Point-wise Mutual Information</a:t>
+            </a:r>
+            <a:endParaRPr lang="en-US" dirty="0"/>
+          </a:p>
+        </p:txBody>
+      </p:sp>
+      <p:sp>
+        <p:nvSpPr>
+          <p:cNvPr id="8" name="TextBox 7"/>
+          <p:cNvSpPr txBox="1"/>
+          <p:nvPr/>
+        </p:nvSpPr>
+        <p:spPr>
+          <a:xfrm>
+            <a:off x="5029200" y="1981200"/>
+            <a:ext cx="3733800" cy="369332"/>
+          </a:xfrm>
+          <a:prstGeom prst="rect">
+            <a:avLst/>
+          </a:prstGeom>
+          <a:noFill/>
+        </p:spPr>
+        <p:txBody>
+          <a:bodyPr wrap="square" rtlCol="0">
+            <a:spAutoFit/>
+          </a:bodyPr>
+          <a:lstStyle/>
+          <a:p>
+            <a:r>
+              <a:rPr lang="en-US" dirty="0" smtClean="0"/>
+              <a:t>Average portion of repeated words</a:t>
+            </a:r>
+            <a:endParaRPr lang="en-US" dirty="0"/>
+          </a:p>
+        </p:txBody>
+      </p:sp>
+    </p:spTree>
+    <p:extLst>
+      <p:ext uri="{BB962C8B-B14F-4D97-AF65-F5344CB8AC3E}">
+        <p14:creationId xmlns:p14="http://schemas.microsoft.com/office/powerpoint/2010/main" val="115826910"/>
       </p:ext>
     </p:extLst>
   </p:cSld>

</xml_diff>

<commit_message>
Final report & slides.
</commit_message>
<xml_diff>
--- a/Slides/11761-slides.pptx
+++ b/Slides/11761-slides.pptx
@@ -130,24 +130,12 @@
 
 <file path=ppt/charts/chart1.xml><?xml version="1.0" encoding="utf-8"?>
 <c:chartSpace xmlns:c="http://schemas.openxmlformats.org/drawingml/2006/chart" xmlns:a="http://schemas.openxmlformats.org/drawingml/2006/main" xmlns:r="http://schemas.openxmlformats.org/officeDocument/2006/relationships">
-  <c:date1904 val="0"/>
   <c:lang val="en-US"/>
-  <c:roundedCorners val="0"/>
-  <mc:AlternateContent xmlns:mc="http://schemas.openxmlformats.org/markup-compatibility/2006">
-    <mc:Choice xmlns:c14="http://schemas.microsoft.com/office/drawing/2007/8/2/chart" Requires="c14">
-      <c14:style val="102"/>
-    </mc:Choice>
-    <mc:Fallback>
-      <c:style val="2"/>
-    </mc:Fallback>
-  </mc:AlternateContent>
   <c:chart>
-    <c:autoTitleDeleted val="0"/>
     <c:plotArea>
       <c:layout/>
       <c:lineChart>
         <c:grouping val="standard"/>
-        <c:varyColors val="0"/>
         <c:ser>
           <c:idx val="0"/>
           <c:order val="0"/>
@@ -205,7 +193,7 @@
                 <c:formatCode>General</c:formatCode>
                 <c:ptCount val="9"/>
                 <c:pt idx="0">
-                  <c:v>0.75</c:v>
+                  <c:v>0.75000000000000022</c:v>
                 </c:pt>
                 <c:pt idx="1">
                   <c:v>0.9</c:v>
@@ -214,10 +202,10 @@
                   <c:v>0.9</c:v>
                 </c:pt>
                 <c:pt idx="3">
-                  <c:v>0.95</c:v>
+                  <c:v>0.95000000000000018</c:v>
                 </c:pt>
                 <c:pt idx="4">
-                  <c:v>0.95</c:v>
+                  <c:v>0.95000000000000018</c:v>
                 </c:pt>
                 <c:pt idx="5">
                   <c:v>1</c:v>
@@ -234,7 +222,6 @@
               </c:numCache>
             </c:numRef>
           </c:val>
-          <c:smooth val="0"/>
         </c:ser>
         <c:ser>
           <c:idx val="1"/>
@@ -293,22 +280,22 @@
                 <c:formatCode>General</c:formatCode>
                 <c:ptCount val="9"/>
                 <c:pt idx="0">
-                  <c:v>0.73</c:v>
+                  <c:v>0.7300000000000002</c:v>
                 </c:pt>
                 <c:pt idx="1">
-                  <c:v>0.86</c:v>
+                  <c:v>0.86000000000000021</c:v>
                 </c:pt>
                 <c:pt idx="2">
-                  <c:v>0.86</c:v>
+                  <c:v>0.86000000000000021</c:v>
                 </c:pt>
                 <c:pt idx="3">
                   <c:v>0.91</c:v>
                 </c:pt>
                 <c:pt idx="4">
-                  <c:v>0.95</c:v>
+                  <c:v>0.95000000000000018</c:v>
                 </c:pt>
                 <c:pt idx="5">
-                  <c:v>0.96</c:v>
+                  <c:v>0.96000000000000019</c:v>
                 </c:pt>
                 <c:pt idx="6">
                   <c:v>0.99</c:v>
@@ -322,52 +309,35 @@
               </c:numCache>
             </c:numRef>
           </c:val>
-          <c:smooth val="0"/>
         </c:ser>
-        <c:dLbls>
-          <c:showLegendKey val="0"/>
-          <c:showVal val="0"/>
-          <c:showCatName val="0"/>
-          <c:showSerName val="0"/>
-          <c:showPercent val="0"/>
-          <c:showBubbleSize val="0"/>
-        </c:dLbls>
         <c:marker val="1"/>
-        <c:smooth val="0"/>
-        <c:axId val="49959680"/>
-        <c:axId val="49961216"/>
+        <c:axId val="75531392"/>
+        <c:axId val="75532928"/>
       </c:lineChart>
       <c:catAx>
-        <c:axId val="49959680"/>
+        <c:axId val="75531392"/>
         <c:scaling>
           <c:orientation val="minMax"/>
         </c:scaling>
-        <c:delete val="0"/>
         <c:axPos val="b"/>
         <c:numFmt formatCode="General" sourceLinked="1"/>
-        <c:majorTickMark val="out"/>
-        <c:minorTickMark val="none"/>
         <c:tickLblPos val="nextTo"/>
-        <c:crossAx val="49961216"/>
+        <c:crossAx val="75532928"/>
         <c:crosses val="autoZero"/>
         <c:auto val="1"/>
         <c:lblAlgn val="ctr"/>
         <c:lblOffset val="100"/>
-        <c:noMultiLvlLbl val="0"/>
       </c:catAx>
       <c:valAx>
-        <c:axId val="49961216"/>
+        <c:axId val="75532928"/>
         <c:scaling>
           <c:orientation val="minMax"/>
         </c:scaling>
-        <c:delete val="0"/>
         <c:axPos val="l"/>
         <c:majorGridlines/>
         <c:numFmt formatCode="General" sourceLinked="1"/>
-        <c:majorTickMark val="out"/>
-        <c:minorTickMark val="none"/>
         <c:tickLblPos val="nextTo"/>
-        <c:crossAx val="49959680"/>
+        <c:crossAx val="75531392"/>
         <c:crosses val="autoZero"/>
         <c:crossBetween val="between"/>
       </c:valAx>
@@ -375,11 +345,9 @@
     <c:legend>
       <c:legendPos val="r"/>
       <c:layout/>
-      <c:overlay val="0"/>
     </c:legend>
     <c:plotVisOnly val="1"/>
     <c:dispBlanksAs val="gap"/>
-    <c:showDLblsOverMax val="0"/>
   </c:chart>
   <c:txPr>
     <a:bodyPr/>
@@ -391,20 +359,8 @@
       <a:endParaRPr lang="en-US"/>
     </a:p>
   </c:txPr>
-  <c:externalData r:id="rId1">
-    <c:autoUpdate val="0"/>
-  </c:externalData>
+  <c:externalData r:id="rId1"/>
 </c:chartSpace>
-</file>
-
-<file path=ppt/comments/comment1.xml><?xml version="1.0" encoding="utf-8"?>
-<p:cmLst xmlns:a="http://schemas.openxmlformats.org/drawingml/2006/main" xmlns:r="http://schemas.openxmlformats.org/officeDocument/2006/relationships" xmlns:p="http://schemas.openxmlformats.org/presentationml/2006/main">
-  <p:cm authorId="0" dt="2013-04-28T19:48:11.153" idx="15">
-    <p:pos x="826" y="1122"/>
-    <p:text>Changed the title and the box in this one
-</p:text>
-  </p:cm>
-</p:cmLst>
 </file>
 
 <file path=ppt/diagrams/colors1.xml><?xml version="1.0" encoding="utf-8"?>
@@ -1158,7 +1114,7 @@
 <dgm:dataModel xmlns:dgm="http://schemas.openxmlformats.org/drawingml/2006/diagram" xmlns:a="http://schemas.openxmlformats.org/drawingml/2006/main">
   <dgm:ptLst>
     <dgm:pt modelId="{CD9D619F-EC56-49AA-B55F-3EE3E0735566}" type="doc">
-      <dgm:prSet loTypeId="urn:microsoft.com/office/officeart/2008/layout/LinedList" loCatId="list" qsTypeId="urn:microsoft.com/office/officeart/2005/8/quickstyle/simple1" qsCatId="simple" csTypeId="urn:microsoft.com/office/officeart/2005/8/colors/accent1_2" csCatId="accent1" phldr="1"/>
+      <dgm:prSet loTypeId="urn:microsoft.com/office/officeart/2005/8/layout/vList2" loCatId="list" qsTypeId="urn:microsoft.com/office/officeart/2005/8/quickstyle/simple1" qsCatId="simple" csTypeId="urn:microsoft.com/office/officeart/2005/8/colors/accent1_2" csCatId="accent1" phldr="1"/>
       <dgm:spPr/>
       <dgm:t>
         <a:bodyPr/>
@@ -1178,7 +1134,7 @@
           <a:pPr rtl="0"/>
           <a:r>
             <a:rPr lang="en-US" dirty="0" smtClean="0"/>
-            <a:t>Best machine learning method</a:t>
+            <a:t>Best Machine Learning Methods</a:t>
           </a:r>
           <a:endParaRPr lang="en-US" dirty="0"/>
         </a:p>
@@ -1215,10 +1171,10 @@
         <a:p>
           <a:pPr rtl="0"/>
           <a:r>
-            <a:rPr lang="en-US" smtClean="0"/>
+            <a:rPr lang="en-US" dirty="0" smtClean="0"/>
             <a:t>Soft margin linear SVM</a:t>
           </a:r>
-          <a:endParaRPr lang="en-US"/>
+          <a:endParaRPr lang="en-US" dirty="0"/>
         </a:p>
       </dgm:t>
     </dgm:pt>
@@ -1254,7 +1210,7 @@
           <a:pPr rtl="0"/>
           <a:r>
             <a:rPr lang="en-US" dirty="0" smtClean="0"/>
-            <a:t>Logistic regression with LASSO</a:t>
+            <a:t>Logistic regression with the LASSO regularization</a:t>
           </a:r>
           <a:endParaRPr lang="en-US" dirty="0"/>
         </a:p>
@@ -1292,7 +1248,7 @@
           <a:pPr rtl="0"/>
           <a:r>
             <a:rPr lang="en-US" dirty="0" smtClean="0"/>
-            <a:t>Best features</a:t>
+            <a:t>Features</a:t>
           </a:r>
           <a:endParaRPr lang="en-US" dirty="0"/>
         </a:p>
@@ -1444,7 +1400,7 @@
           <a:pPr rtl="0"/>
           <a:r>
             <a:rPr lang="en-US" dirty="0" smtClean="0"/>
-            <a:t>Probability estimation may work better with all features</a:t>
+            <a:t>Probability estimation may work better with all n-gram models</a:t>
           </a:r>
           <a:endParaRPr lang="en-US" dirty="0"/>
         </a:p>
@@ -1586,12 +1542,87 @@
         </a:p>
       </dgm:t>
     </dgm:pt>
-    <dgm:pt modelId="{D56D0753-ADA1-4461-8D69-3DF7BE869F9E}" type="pres">
-      <dgm:prSet presAssocID="{CD9D619F-EC56-49AA-B55F-3EE3E0735566}" presName="vert0" presStyleCnt="0">
+    <dgm:pt modelId="{8BF70D9F-B740-46CB-86D4-12CD430B6305}">
+      <dgm:prSet/>
+      <dgm:spPr/>
+      <dgm:t>
+        <a:bodyPr/>
+        <a:lstStyle/>
+        <a:p>
+          <a:pPr rtl="0"/>
+          <a:r>
+            <a:rPr lang="en-US" dirty="0" smtClean="0"/>
+            <a:t>No feature works well for short sentences</a:t>
+          </a:r>
+          <a:endParaRPr lang="en-US" dirty="0"/>
+        </a:p>
+      </dgm:t>
+    </dgm:pt>
+    <dgm:pt modelId="{588D6BB8-0496-4B7C-9C1F-BD1AA1171DE7}" type="parTrans" cxnId="{7BDD5E19-B5CA-4290-9050-A641DB68CAC6}">
+      <dgm:prSet/>
+      <dgm:spPr/>
+      <dgm:t>
+        <a:bodyPr/>
+        <a:lstStyle/>
+        <a:p>
+          <a:endParaRPr lang="en-US"/>
+        </a:p>
+      </dgm:t>
+    </dgm:pt>
+    <dgm:pt modelId="{44E6EA68-D707-4AA0-BACB-A37B1C00CE3A}" type="sibTrans" cxnId="{7BDD5E19-B5CA-4290-9050-A641DB68CAC6}">
+      <dgm:prSet/>
+      <dgm:spPr/>
+      <dgm:t>
+        <a:bodyPr/>
+        <a:lstStyle/>
+        <a:p>
+          <a:endParaRPr lang="en-US"/>
+        </a:p>
+      </dgm:t>
+    </dgm:pt>
+    <dgm:pt modelId="{0DA2DDD7-1D86-4AC1-9DB1-5ED27367EAEA}">
+      <dgm:prSet/>
+      <dgm:spPr/>
+      <dgm:t>
+        <a:bodyPr/>
+        <a:lstStyle/>
+        <a:p>
+          <a:pPr rtl="0"/>
+          <a:r>
+            <a:rPr lang="en-US" dirty="0" smtClean="0"/>
+            <a:t>Syntactical parsing scores were not helpful</a:t>
+          </a:r>
+          <a:endParaRPr lang="en-US" dirty="0"/>
+        </a:p>
+      </dgm:t>
+    </dgm:pt>
+    <dgm:pt modelId="{BE095027-3BBC-45DF-AB53-27E1E6772EB7}" type="parTrans" cxnId="{F21CCA3E-EB24-4406-ADE3-AED811CF96A5}">
+      <dgm:prSet/>
+      <dgm:spPr/>
+      <dgm:t>
+        <a:bodyPr/>
+        <a:lstStyle/>
+        <a:p>
+          <a:endParaRPr lang="en-US"/>
+        </a:p>
+      </dgm:t>
+    </dgm:pt>
+    <dgm:pt modelId="{BC1DA6D8-AD65-491F-B76B-25FE9B83B25E}" type="sibTrans" cxnId="{F21CCA3E-EB24-4406-ADE3-AED811CF96A5}">
+      <dgm:prSet/>
+      <dgm:spPr/>
+      <dgm:t>
+        <a:bodyPr/>
+        <a:lstStyle/>
+        <a:p>
+          <a:endParaRPr lang="en-US"/>
+        </a:p>
+      </dgm:t>
+    </dgm:pt>
+    <dgm:pt modelId="{95DB4146-1247-4D79-B393-ED421419447D}" type="pres">
+      <dgm:prSet presAssocID="{CD9D619F-EC56-49AA-B55F-3EE3E0735566}" presName="linear" presStyleCnt="0">
         <dgm:presLayoutVars>
-          <dgm:dir/>
-          <dgm:animOne val="branch"/>
           <dgm:animLvl val="lvl"/>
+          <dgm:resizeHandles val="exact"/>
         </dgm:presLayoutVars>
       </dgm:prSet>
       <dgm:spPr/>
@@ -1603,16 +1634,13 @@
         </a:p>
       </dgm:t>
     </dgm:pt>
-    <dgm:pt modelId="{5E6E5065-D27F-4BE6-BC8B-F4D83F9DD436}" type="pres">
-      <dgm:prSet presAssocID="{6A1381AF-A01C-445F-90A7-24879C7828EC}" presName="thickLine" presStyleLbl="alignNode1" presStyleIdx="0" presStyleCnt="3"/>
-      <dgm:spPr/>
-    </dgm:pt>
-    <dgm:pt modelId="{21D77F04-6628-4610-90A8-3AA4D95EC13C}" type="pres">
-      <dgm:prSet presAssocID="{6A1381AF-A01C-445F-90A7-24879C7828EC}" presName="horz1" presStyleCnt="0"/>
-      <dgm:spPr/>
-    </dgm:pt>
-    <dgm:pt modelId="{AB075B35-1B73-4043-B1BA-4B25E356EAED}" type="pres">
-      <dgm:prSet presAssocID="{6A1381AF-A01C-445F-90A7-24879C7828EC}" presName="tx1" presStyleLbl="revTx" presStyleIdx="0" presStyleCnt="11"/>
+    <dgm:pt modelId="{330D1E6F-9E6C-44D8-92C6-5F6FD6CB9169}" type="pres">
+      <dgm:prSet presAssocID="{6A1381AF-A01C-445F-90A7-24879C7828EC}" presName="parentText" presStyleLbl="node1" presStyleIdx="0" presStyleCnt="3">
+        <dgm:presLayoutVars>
+          <dgm:chMax val="0"/>
+          <dgm:bulletEnabled val="1"/>
+        </dgm:presLayoutVars>
+      </dgm:prSet>
       <dgm:spPr/>
       <dgm:t>
         <a:bodyPr/>
@@ -1622,24 +1650,12 @@
         </a:p>
       </dgm:t>
     </dgm:pt>
-    <dgm:pt modelId="{A7D99808-FCC3-4781-9F47-37CC1A7857BD}" type="pres">
-      <dgm:prSet presAssocID="{6A1381AF-A01C-445F-90A7-24879C7828EC}" presName="vert1" presStyleCnt="0"/>
-      <dgm:spPr/>
-    </dgm:pt>
-    <dgm:pt modelId="{474044FE-1DD4-4EA9-A9C9-CC87D399D2BC}" type="pres">
-      <dgm:prSet presAssocID="{CDE48057-40CE-4053-BED2-957CA0A003DD}" presName="vertSpace2a" presStyleCnt="0"/>
-      <dgm:spPr/>
-    </dgm:pt>
-    <dgm:pt modelId="{C12173DE-9F82-445B-9D19-740380304B20}" type="pres">
-      <dgm:prSet presAssocID="{CDE48057-40CE-4053-BED2-957CA0A003DD}" presName="horz2" presStyleCnt="0"/>
-      <dgm:spPr/>
-    </dgm:pt>
-    <dgm:pt modelId="{16F0A3C0-C9D4-4570-8533-98AD18B383DC}" type="pres">
-      <dgm:prSet presAssocID="{CDE48057-40CE-4053-BED2-957CA0A003DD}" presName="horzSpace2" presStyleCnt="0"/>
-      <dgm:spPr/>
-    </dgm:pt>
-    <dgm:pt modelId="{419C8211-62DD-49A2-93EB-4A736EC5A07D}" type="pres">
-      <dgm:prSet presAssocID="{CDE48057-40CE-4053-BED2-957CA0A003DD}" presName="tx2" presStyleLbl="revTx" presStyleIdx="1" presStyleCnt="11"/>
+    <dgm:pt modelId="{A37C6F9B-3613-4423-9334-8932101912D2}" type="pres">
+      <dgm:prSet presAssocID="{6A1381AF-A01C-445F-90A7-24879C7828EC}" presName="childText" presStyleLbl="revTx" presStyleIdx="0" presStyleCnt="3">
+        <dgm:presLayoutVars>
+          <dgm:bulletEnabled val="1"/>
+        </dgm:presLayoutVars>
+      </dgm:prSet>
       <dgm:spPr/>
       <dgm:t>
         <a:bodyPr/>
@@ -1649,28 +1665,13 @@
         </a:p>
       </dgm:t>
     </dgm:pt>
-    <dgm:pt modelId="{64F7D2C9-7D43-4A1C-8443-68F70A2BC45C}" type="pres">
-      <dgm:prSet presAssocID="{CDE48057-40CE-4053-BED2-957CA0A003DD}" presName="vert2" presStyleCnt="0"/>
-      <dgm:spPr/>
-    </dgm:pt>
-    <dgm:pt modelId="{2DEB8B99-959F-4D35-A9B3-5DEE2E479D35}" type="pres">
-      <dgm:prSet presAssocID="{CDE48057-40CE-4053-BED2-957CA0A003DD}" presName="thinLine2b" presStyleLbl="callout" presStyleIdx="0" presStyleCnt="8" custLinFactY="-307379" custLinFactNeighborY="-400000"/>
-      <dgm:spPr/>
-    </dgm:pt>
-    <dgm:pt modelId="{B18B1069-EC54-49DC-964A-07CC04FC1E41}" type="pres">
-      <dgm:prSet presAssocID="{CDE48057-40CE-4053-BED2-957CA0A003DD}" presName="vertSpace2b" presStyleCnt="0"/>
-      <dgm:spPr/>
-    </dgm:pt>
-    <dgm:pt modelId="{C66DC2E7-0854-4EE1-A1B9-55253D9A4A96}" type="pres">
-      <dgm:prSet presAssocID="{D848917D-1795-4268-BCA2-C06FED6A0235}" presName="horz2" presStyleCnt="0"/>
-      <dgm:spPr/>
-    </dgm:pt>
-    <dgm:pt modelId="{B73479EE-806E-43D5-8E42-4A8402CAA43C}" type="pres">
-      <dgm:prSet presAssocID="{D848917D-1795-4268-BCA2-C06FED6A0235}" presName="horzSpace2" presStyleCnt="0"/>
-      <dgm:spPr/>
-    </dgm:pt>
-    <dgm:pt modelId="{C2C22BDF-845C-4EBF-A8CE-834EFED01891}" type="pres">
-      <dgm:prSet presAssocID="{D848917D-1795-4268-BCA2-C06FED6A0235}" presName="tx2" presStyleLbl="revTx" presStyleIdx="2" presStyleCnt="11" custLinFactNeighborY="-35353"/>
+    <dgm:pt modelId="{70015CF1-9BD5-42D9-BF9D-BEB104A742B8}" type="pres">
+      <dgm:prSet presAssocID="{16CD1383-48D8-45C2-959C-55F06E915898}" presName="parentText" presStyleLbl="node1" presStyleIdx="1" presStyleCnt="3">
+        <dgm:presLayoutVars>
+          <dgm:chMax val="0"/>
+          <dgm:bulletEnabled val="1"/>
+        </dgm:presLayoutVars>
+      </dgm:prSet>
       <dgm:spPr/>
       <dgm:t>
         <a:bodyPr/>
@@ -1680,42 +1681,12 @@
         </a:p>
       </dgm:t>
     </dgm:pt>
-    <dgm:pt modelId="{BC54AF69-06DB-4ADB-958F-125C5A60B53D}" type="pres">
-      <dgm:prSet presAssocID="{D848917D-1795-4268-BCA2-C06FED6A0235}" presName="vert2" presStyleCnt="0"/>
-      <dgm:spPr/>
-    </dgm:pt>
-    <dgm:pt modelId="{13FAB319-9FF9-467B-B0E8-6A3388FD9CD3}" type="pres">
-      <dgm:prSet presAssocID="{D848917D-1795-4268-BCA2-C06FED6A0235}" presName="thinLine2b" presStyleLbl="callout" presStyleIdx="1" presStyleCnt="8" custLinFactY="-800000" custLinFactNeighborY="-818892"/>
-      <dgm:spPr/>
-    </dgm:pt>
-    <dgm:pt modelId="{9D3DC200-BF66-43F7-B741-C5B3F1065909}" type="pres">
-      <dgm:prSet presAssocID="{D848917D-1795-4268-BCA2-C06FED6A0235}" presName="vertSpace2b" presStyleCnt="0"/>
-      <dgm:spPr/>
-    </dgm:pt>
-    <dgm:pt modelId="{0F627A40-9747-429A-9F74-98C4D1DFC96B}" type="pres">
-      <dgm:prSet presAssocID="{16CD1383-48D8-45C2-959C-55F06E915898}" presName="thickLine" presStyleLbl="alignNode1" presStyleIdx="1" presStyleCnt="3" custScaleY="121000" custLinFactNeighborY="-1613"/>
-      <dgm:spPr>
-        <a:blipFill rotWithShape="0">
-          <a:blip xmlns:r="http://schemas.openxmlformats.org/officeDocument/2006/relationships" r:embed="rId1"/>
-          <a:stretch>
-            <a:fillRect/>
-          </a:stretch>
-        </a:blipFill>
-      </dgm:spPr>
-      <dgm:t>
-        <a:bodyPr/>
-        <a:lstStyle/>
-        <a:p>
-          <a:endParaRPr lang="en-US"/>
-        </a:p>
-      </dgm:t>
-    </dgm:pt>
-    <dgm:pt modelId="{311D4938-07C4-41FA-808B-6EEA94F79FFF}" type="pres">
-      <dgm:prSet presAssocID="{16CD1383-48D8-45C2-959C-55F06E915898}" presName="horz1" presStyleCnt="0"/>
-      <dgm:spPr/>
-    </dgm:pt>
-    <dgm:pt modelId="{560C6FEE-501F-4600-97CF-74BDA866EF54}" type="pres">
-      <dgm:prSet presAssocID="{16CD1383-48D8-45C2-959C-55F06E915898}" presName="tx1" presStyleLbl="revTx" presStyleIdx="3" presStyleCnt="11"/>
+    <dgm:pt modelId="{CCF336C4-D94F-4A03-A256-4AC8954C4245}" type="pres">
+      <dgm:prSet presAssocID="{16CD1383-48D8-45C2-959C-55F06E915898}" presName="childText" presStyleLbl="revTx" presStyleIdx="1" presStyleCnt="3">
+        <dgm:presLayoutVars>
+          <dgm:bulletEnabled val="1"/>
+        </dgm:presLayoutVars>
+      </dgm:prSet>
       <dgm:spPr/>
       <dgm:t>
         <a:bodyPr/>
@@ -1725,24 +1696,13 @@
         </a:p>
       </dgm:t>
     </dgm:pt>
-    <dgm:pt modelId="{72A55848-2619-4D01-8635-81680A27D07B}" type="pres">
-      <dgm:prSet presAssocID="{16CD1383-48D8-45C2-959C-55F06E915898}" presName="vert1" presStyleCnt="0"/>
-      <dgm:spPr/>
-    </dgm:pt>
-    <dgm:pt modelId="{2BF40F4E-06F2-48D2-A0EE-C7784C949DD6}" type="pres">
-      <dgm:prSet presAssocID="{FB98BC02-5F3A-475B-8F93-BD2F54D83AE3}" presName="vertSpace2a" presStyleCnt="0"/>
-      <dgm:spPr/>
-    </dgm:pt>
-    <dgm:pt modelId="{3DCFB716-B0BD-40D7-95C5-73F40D3B5531}" type="pres">
-      <dgm:prSet presAssocID="{FB98BC02-5F3A-475B-8F93-BD2F54D83AE3}" presName="horz2" presStyleCnt="0"/>
-      <dgm:spPr/>
-    </dgm:pt>
-    <dgm:pt modelId="{0AC67099-4450-4BB1-B3BD-F58F629188B8}" type="pres">
-      <dgm:prSet presAssocID="{FB98BC02-5F3A-475B-8F93-BD2F54D83AE3}" presName="horzSpace2" presStyleCnt="0"/>
-      <dgm:spPr/>
-    </dgm:pt>
-    <dgm:pt modelId="{D5518AB7-F9E4-4B4E-A451-4A739A8F7E36}" type="pres">
-      <dgm:prSet presAssocID="{FB98BC02-5F3A-475B-8F93-BD2F54D83AE3}" presName="tx2" presStyleLbl="revTx" presStyleIdx="4" presStyleCnt="11"/>
+    <dgm:pt modelId="{E30E8D4F-7EB2-473A-97AE-4FE08EF2F9F9}" type="pres">
+      <dgm:prSet presAssocID="{41596840-7F01-443B-A0D9-46C163BF2E25}" presName="parentText" presStyleLbl="node1" presStyleIdx="2" presStyleCnt="3">
+        <dgm:presLayoutVars>
+          <dgm:chMax val="0"/>
+          <dgm:bulletEnabled val="1"/>
+        </dgm:presLayoutVars>
+      </dgm:prSet>
       <dgm:spPr/>
       <dgm:t>
         <a:bodyPr/>
@@ -1752,28 +1712,12 @@
         </a:p>
       </dgm:t>
     </dgm:pt>
-    <dgm:pt modelId="{467D60B8-968F-4141-84C6-87068E9F0BB0}" type="pres">
-      <dgm:prSet presAssocID="{FB98BC02-5F3A-475B-8F93-BD2F54D83AE3}" presName="vert2" presStyleCnt="0"/>
-      <dgm:spPr/>
-    </dgm:pt>
-    <dgm:pt modelId="{287C5287-7317-48A3-99DB-642326756138}" type="pres">
-      <dgm:prSet presAssocID="{FB98BC02-5F3A-475B-8F93-BD2F54D83AE3}" presName="thinLine2b" presStyleLbl="callout" presStyleIdx="2" presStyleCnt="8"/>
-      <dgm:spPr/>
-    </dgm:pt>
-    <dgm:pt modelId="{DECEA02B-82E8-4BCD-8A68-244147E4E0B4}" type="pres">
-      <dgm:prSet presAssocID="{FB98BC02-5F3A-475B-8F93-BD2F54D83AE3}" presName="vertSpace2b" presStyleCnt="0"/>
-      <dgm:spPr/>
-    </dgm:pt>
-    <dgm:pt modelId="{60185C81-F5A4-4756-A813-A032E2838662}" type="pres">
-      <dgm:prSet presAssocID="{89EFD3E2-41A6-48CB-BAD0-E3B1D33B88EC}" presName="horz2" presStyleCnt="0"/>
-      <dgm:spPr/>
-    </dgm:pt>
-    <dgm:pt modelId="{D5D0F6D1-56E7-4BA2-A95E-79361614832C}" type="pres">
-      <dgm:prSet presAssocID="{89EFD3E2-41A6-48CB-BAD0-E3B1D33B88EC}" presName="horzSpace2" presStyleCnt="0"/>
-      <dgm:spPr/>
-    </dgm:pt>
-    <dgm:pt modelId="{45834C88-2E51-479B-A432-68F5A83EC9CF}" type="pres">
-      <dgm:prSet presAssocID="{89EFD3E2-41A6-48CB-BAD0-E3B1D33B88EC}" presName="tx2" presStyleLbl="revTx" presStyleIdx="5" presStyleCnt="11"/>
+    <dgm:pt modelId="{301A3487-F354-409E-9FCD-230C4ED9E2CD}" type="pres">
+      <dgm:prSet presAssocID="{41596840-7F01-443B-A0D9-46C163BF2E25}" presName="childText" presStyleLbl="revTx" presStyleIdx="2" presStyleCnt="3">
+        <dgm:presLayoutVars>
+          <dgm:bulletEnabled val="1"/>
+        </dgm:presLayoutVars>
+      </dgm:prSet>
       <dgm:spPr/>
       <dgm:t>
         <a:bodyPr/>
@@ -1783,287 +1727,71 @@
         </a:p>
       </dgm:t>
     </dgm:pt>
-    <dgm:pt modelId="{6F3BEB6F-05C3-4158-8300-4775DD8AD434}" type="pres">
-      <dgm:prSet presAssocID="{89EFD3E2-41A6-48CB-BAD0-E3B1D33B88EC}" presName="vert2" presStyleCnt="0"/>
-      <dgm:spPr/>
-    </dgm:pt>
-    <dgm:pt modelId="{10408849-71A8-44CE-A4B9-7B407BEBF2AF}" type="pres">
-      <dgm:prSet presAssocID="{89EFD3E2-41A6-48CB-BAD0-E3B1D33B88EC}" presName="thinLine2b" presStyleLbl="callout" presStyleIdx="3" presStyleCnt="8"/>
-      <dgm:spPr/>
-    </dgm:pt>
-    <dgm:pt modelId="{BBD95A90-960E-47FA-89A5-5E1AC88D4DC3}" type="pres">
-      <dgm:prSet presAssocID="{89EFD3E2-41A6-48CB-BAD0-E3B1D33B88EC}" presName="vertSpace2b" presStyleCnt="0"/>
-      <dgm:spPr/>
-    </dgm:pt>
-    <dgm:pt modelId="{552CFB72-C673-402B-B9C0-353798B8A0E8}" type="pres">
-      <dgm:prSet presAssocID="{270B6EAE-9F7E-4DED-88F3-08F7E241AB80}" presName="horz2" presStyleCnt="0"/>
-      <dgm:spPr/>
-    </dgm:pt>
-    <dgm:pt modelId="{77256152-6DFE-492D-8019-335C1DC90256}" type="pres">
-      <dgm:prSet presAssocID="{270B6EAE-9F7E-4DED-88F3-08F7E241AB80}" presName="horzSpace2" presStyleCnt="0"/>
-      <dgm:spPr/>
-    </dgm:pt>
-    <dgm:pt modelId="{44F5A052-F93A-4674-8A7F-FFF84D191908}" type="pres">
-      <dgm:prSet presAssocID="{270B6EAE-9F7E-4DED-88F3-08F7E241AB80}" presName="tx2" presStyleLbl="revTx" presStyleIdx="6" presStyleCnt="11"/>
-      <dgm:spPr/>
-      <dgm:t>
-        <a:bodyPr/>
-        <a:lstStyle/>
-        <a:p>
-          <a:endParaRPr lang="en-US"/>
-        </a:p>
-      </dgm:t>
-    </dgm:pt>
-    <dgm:pt modelId="{32F1C9E3-A4B9-4CD0-8616-8C263FB6E525}" type="pres">
-      <dgm:prSet presAssocID="{270B6EAE-9F7E-4DED-88F3-08F7E241AB80}" presName="vert2" presStyleCnt="0"/>
-      <dgm:spPr/>
-    </dgm:pt>
-    <dgm:pt modelId="{8032C194-5C4E-4DDE-BBF6-39836D2ED5AD}" type="pres">
-      <dgm:prSet presAssocID="{270B6EAE-9F7E-4DED-88F3-08F7E241AB80}" presName="thinLine2b" presStyleLbl="callout" presStyleIdx="4" presStyleCnt="8"/>
-      <dgm:spPr/>
-    </dgm:pt>
-    <dgm:pt modelId="{0C1BFE24-7453-44DC-8F49-6DD57F4A013B}" type="pres">
-      <dgm:prSet presAssocID="{270B6EAE-9F7E-4DED-88F3-08F7E241AB80}" presName="vertSpace2b" presStyleCnt="0"/>
-      <dgm:spPr/>
-    </dgm:pt>
-    <dgm:pt modelId="{967557F9-602B-47E4-9C5E-CA8E57DED16C}" type="pres">
-      <dgm:prSet presAssocID="{DD027C28-5537-4A58-A8AF-905AB40C41CB}" presName="horz2" presStyleCnt="0"/>
-      <dgm:spPr/>
-    </dgm:pt>
-    <dgm:pt modelId="{A3747D0E-D9E4-4151-BC3F-145D4F59FB67}" type="pres">
-      <dgm:prSet presAssocID="{DD027C28-5537-4A58-A8AF-905AB40C41CB}" presName="horzSpace2" presStyleCnt="0"/>
-      <dgm:spPr/>
-    </dgm:pt>
-    <dgm:pt modelId="{C32D5754-64A0-4792-A0CF-A74C321D6ED0}" type="pres">
-      <dgm:prSet presAssocID="{DD027C28-5537-4A58-A8AF-905AB40C41CB}" presName="tx2" presStyleLbl="revTx" presStyleIdx="7" presStyleCnt="11"/>
-      <dgm:spPr/>
-      <dgm:t>
-        <a:bodyPr/>
-        <a:lstStyle/>
-        <a:p>
-          <a:endParaRPr lang="en-US"/>
-        </a:p>
-      </dgm:t>
-    </dgm:pt>
-    <dgm:pt modelId="{3C70B278-DA49-4488-B0F3-982B58BC9DEA}" type="pres">
-      <dgm:prSet presAssocID="{DD027C28-5537-4A58-A8AF-905AB40C41CB}" presName="vert2" presStyleCnt="0"/>
-      <dgm:spPr/>
-    </dgm:pt>
-    <dgm:pt modelId="{F85B9B47-5680-44DF-94CC-473B2B3FF22D}" type="pres">
-      <dgm:prSet presAssocID="{DD027C28-5537-4A58-A8AF-905AB40C41CB}" presName="thinLine2b" presStyleLbl="callout" presStyleIdx="5" presStyleCnt="8"/>
-      <dgm:spPr/>
-    </dgm:pt>
-    <dgm:pt modelId="{D6107667-4485-47B6-B40A-2345B6A2C2D8}" type="pres">
-      <dgm:prSet presAssocID="{DD027C28-5537-4A58-A8AF-905AB40C41CB}" presName="vertSpace2b" presStyleCnt="0"/>
-      <dgm:spPr/>
-    </dgm:pt>
-    <dgm:pt modelId="{52D63BF3-F2BC-4E4D-88EA-BD030AD114D3}" type="pres">
-      <dgm:prSet presAssocID="{41596840-7F01-443B-A0D9-46C163BF2E25}" presName="thickLine" presStyleLbl="alignNode1" presStyleIdx="2" presStyleCnt="3" custLinFactNeighborY="-1515"/>
-      <dgm:spPr/>
-    </dgm:pt>
-    <dgm:pt modelId="{055FD98E-D17E-4009-AC61-03B1D6919E44}" type="pres">
-      <dgm:prSet presAssocID="{41596840-7F01-443B-A0D9-46C163BF2E25}" presName="horz1" presStyleCnt="0"/>
-      <dgm:spPr/>
-    </dgm:pt>
-    <dgm:pt modelId="{AE6FE8FF-43CD-4176-8535-915338C5F596}" type="pres">
-      <dgm:prSet presAssocID="{41596840-7F01-443B-A0D9-46C163BF2E25}" presName="tx1" presStyleLbl="revTx" presStyleIdx="8" presStyleCnt="11"/>
-      <dgm:spPr/>
-      <dgm:t>
-        <a:bodyPr/>
-        <a:lstStyle/>
-        <a:p>
-          <a:endParaRPr lang="en-US"/>
-        </a:p>
-      </dgm:t>
-    </dgm:pt>
-    <dgm:pt modelId="{A409B240-9EDA-4C47-80B8-1CAA97C47DE2}" type="pres">
-      <dgm:prSet presAssocID="{41596840-7F01-443B-A0D9-46C163BF2E25}" presName="vert1" presStyleCnt="0"/>
-      <dgm:spPr/>
-    </dgm:pt>
-    <dgm:pt modelId="{B4578675-D809-40DD-871C-99AEB92DA07A}" type="pres">
-      <dgm:prSet presAssocID="{DB975129-738B-4FEF-A56F-DED356E414CE}" presName="vertSpace2a" presStyleCnt="0"/>
-      <dgm:spPr/>
-    </dgm:pt>
-    <dgm:pt modelId="{E6183CF9-3BD6-47EE-B49E-E423928322C5}" type="pres">
-      <dgm:prSet presAssocID="{DB975129-738B-4FEF-A56F-DED356E414CE}" presName="horz2" presStyleCnt="0"/>
-      <dgm:spPr/>
-    </dgm:pt>
-    <dgm:pt modelId="{C258E0DF-DD22-41B4-AE82-4818BBD98F09}" type="pres">
-      <dgm:prSet presAssocID="{DB975129-738B-4FEF-A56F-DED356E414CE}" presName="horzSpace2" presStyleCnt="0"/>
-      <dgm:spPr/>
-    </dgm:pt>
-    <dgm:pt modelId="{AF1E62C2-D592-4F29-B31B-17F1F006747D}" type="pres">
-      <dgm:prSet presAssocID="{DB975129-738B-4FEF-A56F-DED356E414CE}" presName="tx2" presStyleLbl="revTx" presStyleIdx="9" presStyleCnt="11"/>
-      <dgm:spPr/>
-      <dgm:t>
-        <a:bodyPr/>
-        <a:lstStyle/>
-        <a:p>
-          <a:endParaRPr lang="en-US"/>
-        </a:p>
-      </dgm:t>
-    </dgm:pt>
-    <dgm:pt modelId="{BC4E9CA3-6234-476C-8A2A-905255EA342B}" type="pres">
-      <dgm:prSet presAssocID="{DB975129-738B-4FEF-A56F-DED356E414CE}" presName="vert2" presStyleCnt="0"/>
-      <dgm:spPr/>
-    </dgm:pt>
-    <dgm:pt modelId="{4DE4C443-CFBB-44C0-8F4F-9DAEC67C78C9}" type="pres">
-      <dgm:prSet presAssocID="{DB975129-738B-4FEF-A56F-DED356E414CE}" presName="thinLine2b" presStyleLbl="callout" presStyleIdx="6" presStyleCnt="8" custLinFactY="-400000" custLinFactNeighborY="-437835"/>
-      <dgm:spPr/>
-    </dgm:pt>
-    <dgm:pt modelId="{0FADF7C2-EDE8-4F9F-85CD-6F4200A03E98}" type="pres">
-      <dgm:prSet presAssocID="{DB975129-738B-4FEF-A56F-DED356E414CE}" presName="vertSpace2b" presStyleCnt="0"/>
-      <dgm:spPr/>
-    </dgm:pt>
-    <dgm:pt modelId="{2C6F58B1-6424-4ACA-B72B-E47A9C3828B8}" type="pres">
-      <dgm:prSet presAssocID="{BC45992A-838F-4597-A8AA-7E6496501A11}" presName="horz2" presStyleCnt="0"/>
-      <dgm:spPr/>
-    </dgm:pt>
-    <dgm:pt modelId="{3A51E9E0-53E9-4C6C-B9F3-C1875D9A27C0}" type="pres">
-      <dgm:prSet presAssocID="{BC45992A-838F-4597-A8AA-7E6496501A11}" presName="horzSpace2" presStyleCnt="0"/>
-      <dgm:spPr/>
-    </dgm:pt>
-    <dgm:pt modelId="{8FCFCF74-9697-472C-901A-02B542B6BDE7}" type="pres">
-      <dgm:prSet presAssocID="{BC45992A-838F-4597-A8AA-7E6496501A11}" presName="tx2" presStyleLbl="revTx" presStyleIdx="10" presStyleCnt="11" custLinFactNeighborY="-45967"/>
-      <dgm:spPr/>
-      <dgm:t>
-        <a:bodyPr/>
-        <a:lstStyle/>
-        <a:p>
-          <a:endParaRPr lang="en-US"/>
-        </a:p>
-      </dgm:t>
-    </dgm:pt>
-    <dgm:pt modelId="{2541D64E-1562-4E84-8F0D-871CB2849E19}" type="pres">
-      <dgm:prSet presAssocID="{BC45992A-838F-4597-A8AA-7E6496501A11}" presName="vert2" presStyleCnt="0"/>
-      <dgm:spPr/>
-    </dgm:pt>
-    <dgm:pt modelId="{CFBE7A41-3EDD-4238-91F2-C067D3200D74}" type="pres">
-      <dgm:prSet presAssocID="{BC45992A-838F-4597-A8AA-7E6496501A11}" presName="thinLine2b" presStyleLbl="callout" presStyleIdx="7" presStyleCnt="8" custLinFactY="-847250" custLinFactNeighborY="-900000"/>
-      <dgm:spPr/>
-    </dgm:pt>
-    <dgm:pt modelId="{D1D9C401-63E2-4114-BA5B-7D61B2B89A0C}" type="pres">
-      <dgm:prSet presAssocID="{BC45992A-838F-4597-A8AA-7E6496501A11}" presName="vertSpace2b" presStyleCnt="0"/>
-      <dgm:spPr/>
-    </dgm:pt>
   </dgm:ptLst>
   <dgm:cxnLst>
+    <dgm:cxn modelId="{11847CAC-B3D8-4242-9928-E65A95EB878F}" type="presOf" srcId="{BC45992A-838F-4597-A8AA-7E6496501A11}" destId="{301A3487-F354-409E-9FCD-230C4ED9E2CD}" srcOrd="0" destOrd="1" presId="urn:microsoft.com/office/officeart/2005/8/layout/vList2"/>
+    <dgm:cxn modelId="{35027D29-2F93-4101-AD1D-273B848BD709}" type="presOf" srcId="{DD027C28-5537-4A58-A8AF-905AB40C41CB}" destId="{CCF336C4-D94F-4A03-A256-4AC8954C4245}" srcOrd="0" destOrd="3" presId="urn:microsoft.com/office/officeart/2005/8/layout/vList2"/>
+    <dgm:cxn modelId="{73742B71-ECAA-465C-9AC3-3A2B8904B3F4}" type="presOf" srcId="{CD9D619F-EC56-49AA-B55F-3EE3E0735566}" destId="{95DB4146-1247-4D79-B393-ED421419447D}" srcOrd="0" destOrd="0" presId="urn:microsoft.com/office/officeart/2005/8/layout/vList2"/>
+    <dgm:cxn modelId="{DDC9CE0D-6006-4D11-80D7-E0D7F0AA7A5E}" srcId="{41596840-7F01-443B-A0D9-46C163BF2E25}" destId="{DB975129-738B-4FEF-A56F-DED356E414CE}" srcOrd="0" destOrd="0" parTransId="{7487AB0D-6F83-4DC9-8447-279AD54A95F7}" sibTransId="{2022F9FA-8224-480A-B2E8-9DCF7474DC9A}"/>
+    <dgm:cxn modelId="{B9DE8127-52B3-4D47-A139-13350C60372D}" type="presOf" srcId="{8BF70D9F-B740-46CB-86D4-12CD430B6305}" destId="{CCF336C4-D94F-4A03-A256-4AC8954C4245}" srcOrd="0" destOrd="4" presId="urn:microsoft.com/office/officeart/2005/8/layout/vList2"/>
+    <dgm:cxn modelId="{767F14E4-E36D-466D-B6D4-2440176E0BAB}" type="presOf" srcId="{16CD1383-48D8-45C2-959C-55F06E915898}" destId="{70015CF1-9BD5-42D9-BF9D-BEB104A742B8}" srcOrd="0" destOrd="0" presId="urn:microsoft.com/office/officeart/2005/8/layout/vList2"/>
+    <dgm:cxn modelId="{CF111525-8BA5-42EE-9107-7F3FA4FB9714}" type="presOf" srcId="{41596840-7F01-443B-A0D9-46C163BF2E25}" destId="{E30E8D4F-7EB2-473A-97AE-4FE08EF2F9F9}" srcOrd="0" destOrd="0" presId="urn:microsoft.com/office/officeart/2005/8/layout/vList2"/>
+    <dgm:cxn modelId="{5ADA8672-0855-4E96-AC59-4295C7E7026E}" srcId="{16CD1383-48D8-45C2-959C-55F06E915898}" destId="{FB98BC02-5F3A-475B-8F93-BD2F54D83AE3}" srcOrd="0" destOrd="0" parTransId="{7F3444FF-FCB6-4D32-A0B0-B87B02AD1D32}" sibTransId="{639B6B47-0257-4AD7-8B12-1751BC9CCDD0}"/>
+    <dgm:cxn modelId="{E47B75C4-CD5C-4689-9C3D-E0BCAE78D334}" type="presOf" srcId="{D848917D-1795-4268-BCA2-C06FED6A0235}" destId="{A37C6F9B-3613-4423-9334-8932101912D2}" srcOrd="0" destOrd="1" presId="urn:microsoft.com/office/officeart/2005/8/layout/vList2"/>
+    <dgm:cxn modelId="{4193B2D0-6D97-4263-A6DB-84254E26BAF9}" srcId="{41596840-7F01-443B-A0D9-46C163BF2E25}" destId="{BC45992A-838F-4597-A8AA-7E6496501A11}" srcOrd="1" destOrd="0" parTransId="{7CB38A45-428A-427A-BCF9-F0B9B6C088F8}" sibTransId="{BB3CD21E-4531-4D49-BC25-0C8D2B6F3229}"/>
+    <dgm:cxn modelId="{CDBE8DBE-7BE2-41B7-A23D-1EC39F678550}" srcId="{6A1381AF-A01C-445F-90A7-24879C7828EC}" destId="{D848917D-1795-4268-BCA2-C06FED6A0235}" srcOrd="1" destOrd="0" parTransId="{7006242D-1D6E-4628-A62C-BF22DB2E10A8}" sibTransId="{C1D278D2-E65E-4ADF-ACAB-31467CDD5A4E}"/>
+    <dgm:cxn modelId="{F21CCA3E-EB24-4406-ADE3-AED811CF96A5}" srcId="{16CD1383-48D8-45C2-959C-55F06E915898}" destId="{0DA2DDD7-1D86-4AC1-9DB1-5ED27367EAEA}" srcOrd="5" destOrd="0" parTransId="{BE095027-3BBC-45DF-AB53-27E1E6772EB7}" sibTransId="{BC1DA6D8-AD65-491F-B76B-25FE9B83B25E}"/>
+    <dgm:cxn modelId="{D02875AF-C372-452A-ACC3-F640A981B73E}" srcId="{16CD1383-48D8-45C2-959C-55F06E915898}" destId="{DD027C28-5537-4A58-A8AF-905AB40C41CB}" srcOrd="3" destOrd="0" parTransId="{87F64AE6-A834-4FA5-B128-DB13A0A150E4}" sibTransId="{E548D149-4073-4B03-895B-45E9560891A1}"/>
+    <dgm:cxn modelId="{7BDD5E19-B5CA-4290-9050-A641DB68CAC6}" srcId="{16CD1383-48D8-45C2-959C-55F06E915898}" destId="{8BF70D9F-B740-46CB-86D4-12CD430B6305}" srcOrd="4" destOrd="0" parTransId="{588D6BB8-0496-4B7C-9C1F-BD1AA1171DE7}" sibTransId="{44E6EA68-D707-4AA0-BACB-A37B1C00CE3A}"/>
+    <dgm:cxn modelId="{12379792-A915-43B2-BE75-F24D93953ECB}" type="presOf" srcId="{DB975129-738B-4FEF-A56F-DED356E414CE}" destId="{301A3487-F354-409E-9FCD-230C4ED9E2CD}" srcOrd="0" destOrd="0" presId="urn:microsoft.com/office/officeart/2005/8/layout/vList2"/>
+    <dgm:cxn modelId="{01737AA2-E5E0-4F6E-895D-4B98342DB4FD}" type="presOf" srcId="{89EFD3E2-41A6-48CB-BAD0-E3B1D33B88EC}" destId="{CCF336C4-D94F-4A03-A256-4AC8954C4245}" srcOrd="0" destOrd="1" presId="urn:microsoft.com/office/officeart/2005/8/layout/vList2"/>
+    <dgm:cxn modelId="{4BE85DEE-9FA3-4D17-B801-9278E72FC6BA}" srcId="{6A1381AF-A01C-445F-90A7-24879C7828EC}" destId="{CDE48057-40CE-4053-BED2-957CA0A003DD}" srcOrd="0" destOrd="0" parTransId="{6FE5FC9F-3299-4A2F-8B71-B886A1A08B97}" sibTransId="{C8FB72BF-AFF0-4AC1-91C5-CBC471D7353B}"/>
+    <dgm:cxn modelId="{CB90FD66-B4C2-43BC-8F40-0E68134474A8}" type="presOf" srcId="{0DA2DDD7-1D86-4AC1-9DB1-5ED27367EAEA}" destId="{CCF336C4-D94F-4A03-A256-4AC8954C4245}" srcOrd="0" destOrd="5" presId="urn:microsoft.com/office/officeart/2005/8/layout/vList2"/>
+    <dgm:cxn modelId="{C624B2AC-60ED-43EE-A6DB-73D816E04321}" type="presOf" srcId="{FB98BC02-5F3A-475B-8F93-BD2F54D83AE3}" destId="{CCF336C4-D94F-4A03-A256-4AC8954C4245}" srcOrd="0" destOrd="0" presId="urn:microsoft.com/office/officeart/2005/8/layout/vList2"/>
+    <dgm:cxn modelId="{3E9D4D9C-0859-4456-ABE7-F56459934041}" srcId="{CD9D619F-EC56-49AA-B55F-3EE3E0735566}" destId="{41596840-7F01-443B-A0D9-46C163BF2E25}" srcOrd="2" destOrd="0" parTransId="{AA51ED06-316E-438A-B11E-667A8C52C91E}" sibTransId="{5C63B5A5-E2B9-4FCB-96B0-887B56875648}"/>
+    <dgm:cxn modelId="{1B360A7C-2625-4DB0-8F69-2FABA93EC4F7}" type="presOf" srcId="{270B6EAE-9F7E-4DED-88F3-08F7E241AB80}" destId="{CCF336C4-D94F-4A03-A256-4AC8954C4245}" srcOrd="0" destOrd="2" presId="urn:microsoft.com/office/officeart/2005/8/layout/vList2"/>
+    <dgm:cxn modelId="{1DB2C2CC-6F40-44EF-9370-D92B8A9E7033}" srcId="{CD9D619F-EC56-49AA-B55F-3EE3E0735566}" destId="{6A1381AF-A01C-445F-90A7-24879C7828EC}" srcOrd="0" destOrd="0" parTransId="{598460CD-B79B-4B05-8712-327003C861F1}" sibTransId="{D373FD65-98C1-4DED-AFEE-C06F46FC17AD}"/>
+    <dgm:cxn modelId="{F46E672E-CF0E-45BA-97AC-304655A4B27F}" type="presOf" srcId="{6A1381AF-A01C-445F-90A7-24879C7828EC}" destId="{330D1E6F-9E6C-44D8-92C6-5F6FD6CB9169}" srcOrd="0" destOrd="0" presId="urn:microsoft.com/office/officeart/2005/8/layout/vList2"/>
+    <dgm:cxn modelId="{42D0C0CA-E6A1-47CB-9DA2-F723453191C5}" type="presOf" srcId="{CDE48057-40CE-4053-BED2-957CA0A003DD}" destId="{A37C6F9B-3613-4423-9334-8932101912D2}" srcOrd="0" destOrd="0" presId="urn:microsoft.com/office/officeart/2005/8/layout/vList2"/>
     <dgm:cxn modelId="{058B0B08-0F97-4894-A729-7841E74F8FFF}" srcId="{CD9D619F-EC56-49AA-B55F-3EE3E0735566}" destId="{16CD1383-48D8-45C2-959C-55F06E915898}" srcOrd="1" destOrd="0" parTransId="{7FD57C88-538A-46C9-A1B0-EABE0293F3C4}" sibTransId="{7DB5D6B9-8DEB-4775-B3C6-7D23FE28F932}"/>
-    <dgm:cxn modelId="{98481BE0-77FE-445D-97D8-50C923251D35}" type="presOf" srcId="{270B6EAE-9F7E-4DED-88F3-08F7E241AB80}" destId="{44F5A052-F93A-4674-8A7F-FFF84D191908}" srcOrd="0" destOrd="0" presId="urn:microsoft.com/office/officeart/2008/layout/LinedList"/>
-    <dgm:cxn modelId="{AFA0FAFC-EB15-4284-B5B7-913B27248AAC}" type="presOf" srcId="{41596840-7F01-443B-A0D9-46C163BF2E25}" destId="{AE6FE8FF-43CD-4176-8535-915338C5F596}" srcOrd="0" destOrd="0" presId="urn:microsoft.com/office/officeart/2008/layout/LinedList"/>
-    <dgm:cxn modelId="{8F76C265-80B7-4C54-9099-E6F10E2F3676}" type="presOf" srcId="{89EFD3E2-41A6-48CB-BAD0-E3B1D33B88EC}" destId="{45834C88-2E51-479B-A432-68F5A83EC9CF}" srcOrd="0" destOrd="0" presId="urn:microsoft.com/office/officeart/2008/layout/LinedList"/>
-    <dgm:cxn modelId="{AD65147E-13C2-475A-8278-C00B1B62B703}" type="presOf" srcId="{16CD1383-48D8-45C2-959C-55F06E915898}" destId="{560C6FEE-501F-4600-97CF-74BDA866EF54}" srcOrd="0" destOrd="0" presId="urn:microsoft.com/office/officeart/2008/layout/LinedList"/>
-    <dgm:cxn modelId="{4BE85DEE-9FA3-4D17-B801-9278E72FC6BA}" srcId="{6A1381AF-A01C-445F-90A7-24879C7828EC}" destId="{CDE48057-40CE-4053-BED2-957CA0A003DD}" srcOrd="0" destOrd="0" parTransId="{6FE5FC9F-3299-4A2F-8B71-B886A1A08B97}" sibTransId="{C8FB72BF-AFF0-4AC1-91C5-CBC471D7353B}"/>
-    <dgm:cxn modelId="{A97D518B-3659-4846-B4C1-72FF6E497709}" type="presOf" srcId="{CD9D619F-EC56-49AA-B55F-3EE3E0735566}" destId="{D56D0753-ADA1-4461-8D69-3DF7BE869F9E}" srcOrd="0" destOrd="0" presId="urn:microsoft.com/office/officeart/2008/layout/LinedList"/>
-    <dgm:cxn modelId="{AA2D4BEC-F258-44E5-8672-938F4DB3D918}" type="presOf" srcId="{DB975129-738B-4FEF-A56F-DED356E414CE}" destId="{AF1E62C2-D592-4F29-B31B-17F1F006747D}" srcOrd="0" destOrd="0" presId="urn:microsoft.com/office/officeart/2008/layout/LinedList"/>
-    <dgm:cxn modelId="{6CBC0E13-6964-413D-B414-2F589A3707EE}" type="presOf" srcId="{BC45992A-838F-4597-A8AA-7E6496501A11}" destId="{8FCFCF74-9697-472C-901A-02B542B6BDE7}" srcOrd="0" destOrd="0" presId="urn:microsoft.com/office/officeart/2008/layout/LinedList"/>
-    <dgm:cxn modelId="{3E9D4D9C-0859-4456-ABE7-F56459934041}" srcId="{CD9D619F-EC56-49AA-B55F-3EE3E0735566}" destId="{41596840-7F01-443B-A0D9-46C163BF2E25}" srcOrd="2" destOrd="0" parTransId="{AA51ED06-316E-438A-B11E-667A8C52C91E}" sibTransId="{5C63B5A5-E2B9-4FCB-96B0-887B56875648}"/>
-    <dgm:cxn modelId="{1DB2C2CC-6F40-44EF-9370-D92B8A9E7033}" srcId="{CD9D619F-EC56-49AA-B55F-3EE3E0735566}" destId="{6A1381AF-A01C-445F-90A7-24879C7828EC}" srcOrd="0" destOrd="0" parTransId="{598460CD-B79B-4B05-8712-327003C861F1}" sibTransId="{D373FD65-98C1-4DED-AFEE-C06F46FC17AD}"/>
-    <dgm:cxn modelId="{9896E36C-0C3C-449A-8D79-4FCC1DC5978B}" type="presOf" srcId="{FB98BC02-5F3A-475B-8F93-BD2F54D83AE3}" destId="{D5518AB7-F9E4-4B4E-A451-4A739A8F7E36}" srcOrd="0" destOrd="0" presId="urn:microsoft.com/office/officeart/2008/layout/LinedList"/>
-    <dgm:cxn modelId="{D02875AF-C372-452A-ACC3-F640A981B73E}" srcId="{16CD1383-48D8-45C2-959C-55F06E915898}" destId="{DD027C28-5537-4A58-A8AF-905AB40C41CB}" srcOrd="3" destOrd="0" parTransId="{87F64AE6-A834-4FA5-B128-DB13A0A150E4}" sibTransId="{E548D149-4073-4B03-895B-45E9560891A1}"/>
-    <dgm:cxn modelId="{AFF018A3-8CC6-450C-9EE6-21CD9E4CE6F1}" type="presOf" srcId="{CDE48057-40CE-4053-BED2-957CA0A003DD}" destId="{419C8211-62DD-49A2-93EB-4A736EC5A07D}" srcOrd="0" destOrd="0" presId="urn:microsoft.com/office/officeart/2008/layout/LinedList"/>
-    <dgm:cxn modelId="{DDC9CE0D-6006-4D11-80D7-E0D7F0AA7A5E}" srcId="{41596840-7F01-443B-A0D9-46C163BF2E25}" destId="{DB975129-738B-4FEF-A56F-DED356E414CE}" srcOrd="0" destOrd="0" parTransId="{7487AB0D-6F83-4DC9-8447-279AD54A95F7}" sibTransId="{2022F9FA-8224-480A-B2E8-9DCF7474DC9A}"/>
     <dgm:cxn modelId="{76CE190E-6A2E-41C8-9566-0E48A7724E62}" srcId="{16CD1383-48D8-45C2-959C-55F06E915898}" destId="{270B6EAE-9F7E-4DED-88F3-08F7E241AB80}" srcOrd="2" destOrd="0" parTransId="{E4F85AAF-2E79-4A71-808B-A8682978CF95}" sibTransId="{8C35D3FF-1D2D-4DC5-97DF-FB1A1BCA2771}"/>
     <dgm:cxn modelId="{3EB35914-D7B8-4915-A57E-AA0E8EEFF7E3}" srcId="{16CD1383-48D8-45C2-959C-55F06E915898}" destId="{89EFD3E2-41A6-48CB-BAD0-E3B1D33B88EC}" srcOrd="1" destOrd="0" parTransId="{AE024446-3FAD-4161-BD24-0036B48FC5A7}" sibTransId="{A0E74C0E-FE59-44E5-8B87-E2C955DFB117}"/>
-    <dgm:cxn modelId="{5ADA8672-0855-4E96-AC59-4295C7E7026E}" srcId="{16CD1383-48D8-45C2-959C-55F06E915898}" destId="{FB98BC02-5F3A-475B-8F93-BD2F54D83AE3}" srcOrd="0" destOrd="0" parTransId="{7F3444FF-FCB6-4D32-A0B0-B87B02AD1D32}" sibTransId="{639B6B47-0257-4AD7-8B12-1751BC9CCDD0}"/>
-    <dgm:cxn modelId="{02CB63F9-4F6E-4C7A-BB74-D60936D0EAAA}" type="presOf" srcId="{6A1381AF-A01C-445F-90A7-24879C7828EC}" destId="{AB075B35-1B73-4043-B1BA-4B25E356EAED}" srcOrd="0" destOrd="0" presId="urn:microsoft.com/office/officeart/2008/layout/LinedList"/>
-    <dgm:cxn modelId="{5A5E0784-CCC7-46A6-A708-36DAAA59ACD8}" type="presOf" srcId="{DD027C28-5537-4A58-A8AF-905AB40C41CB}" destId="{C32D5754-64A0-4792-A0CF-A74C321D6ED0}" srcOrd="0" destOrd="0" presId="urn:microsoft.com/office/officeart/2008/layout/LinedList"/>
-    <dgm:cxn modelId="{CF3FE78F-A205-41F5-8A57-E4CB408060E3}" type="presOf" srcId="{D848917D-1795-4268-BCA2-C06FED6A0235}" destId="{C2C22BDF-845C-4EBF-A8CE-834EFED01891}" srcOrd="0" destOrd="0" presId="urn:microsoft.com/office/officeart/2008/layout/LinedList"/>
-    <dgm:cxn modelId="{CDBE8DBE-7BE2-41B7-A23D-1EC39F678550}" srcId="{6A1381AF-A01C-445F-90A7-24879C7828EC}" destId="{D848917D-1795-4268-BCA2-C06FED6A0235}" srcOrd="1" destOrd="0" parTransId="{7006242D-1D6E-4628-A62C-BF22DB2E10A8}" sibTransId="{C1D278D2-E65E-4ADF-ACAB-31467CDD5A4E}"/>
-    <dgm:cxn modelId="{4193B2D0-6D97-4263-A6DB-84254E26BAF9}" srcId="{41596840-7F01-443B-A0D9-46C163BF2E25}" destId="{BC45992A-838F-4597-A8AA-7E6496501A11}" srcOrd="1" destOrd="0" parTransId="{7CB38A45-428A-427A-BCF9-F0B9B6C088F8}" sibTransId="{BB3CD21E-4531-4D49-BC25-0C8D2B6F3229}"/>
-    <dgm:cxn modelId="{AA57365E-F4F9-4D7B-B19D-8B8C714DEF7C}" type="presParOf" srcId="{D56D0753-ADA1-4461-8D69-3DF7BE869F9E}" destId="{5E6E5065-D27F-4BE6-BC8B-F4D83F9DD436}" srcOrd="0" destOrd="0" presId="urn:microsoft.com/office/officeart/2008/layout/LinedList"/>
-    <dgm:cxn modelId="{745DFED5-E0D1-41BA-82E8-FE49E54191A0}" type="presParOf" srcId="{D56D0753-ADA1-4461-8D69-3DF7BE869F9E}" destId="{21D77F04-6628-4610-90A8-3AA4D95EC13C}" srcOrd="1" destOrd="0" presId="urn:microsoft.com/office/officeart/2008/layout/LinedList"/>
-    <dgm:cxn modelId="{C0EE1B6D-2BCE-496E-B67A-5A62B335BEAD}" type="presParOf" srcId="{21D77F04-6628-4610-90A8-3AA4D95EC13C}" destId="{AB075B35-1B73-4043-B1BA-4B25E356EAED}" srcOrd="0" destOrd="0" presId="urn:microsoft.com/office/officeart/2008/layout/LinedList"/>
-    <dgm:cxn modelId="{AA077F6C-185D-4D06-AC04-A39E3BD7A976}" type="presParOf" srcId="{21D77F04-6628-4610-90A8-3AA4D95EC13C}" destId="{A7D99808-FCC3-4781-9F47-37CC1A7857BD}" srcOrd="1" destOrd="0" presId="urn:microsoft.com/office/officeart/2008/layout/LinedList"/>
-    <dgm:cxn modelId="{41B80C64-649A-4968-A5EE-8EBA55137486}" type="presParOf" srcId="{A7D99808-FCC3-4781-9F47-37CC1A7857BD}" destId="{474044FE-1DD4-4EA9-A9C9-CC87D399D2BC}" srcOrd="0" destOrd="0" presId="urn:microsoft.com/office/officeart/2008/layout/LinedList"/>
-    <dgm:cxn modelId="{3B529236-093B-4B64-9E23-570C59F73567}" type="presParOf" srcId="{A7D99808-FCC3-4781-9F47-37CC1A7857BD}" destId="{C12173DE-9F82-445B-9D19-740380304B20}" srcOrd="1" destOrd="0" presId="urn:microsoft.com/office/officeart/2008/layout/LinedList"/>
-    <dgm:cxn modelId="{3211A05B-F4D3-4C96-A9FE-418077AFDFF2}" type="presParOf" srcId="{C12173DE-9F82-445B-9D19-740380304B20}" destId="{16F0A3C0-C9D4-4570-8533-98AD18B383DC}" srcOrd="0" destOrd="0" presId="urn:microsoft.com/office/officeart/2008/layout/LinedList"/>
-    <dgm:cxn modelId="{D23BA5DD-E4DD-48FE-8424-478DCCB2D371}" type="presParOf" srcId="{C12173DE-9F82-445B-9D19-740380304B20}" destId="{419C8211-62DD-49A2-93EB-4A736EC5A07D}" srcOrd="1" destOrd="0" presId="urn:microsoft.com/office/officeart/2008/layout/LinedList"/>
-    <dgm:cxn modelId="{ADADC2DE-E710-47F0-AE0E-523C8B593B7C}" type="presParOf" srcId="{C12173DE-9F82-445B-9D19-740380304B20}" destId="{64F7D2C9-7D43-4A1C-8443-68F70A2BC45C}" srcOrd="2" destOrd="0" presId="urn:microsoft.com/office/officeart/2008/layout/LinedList"/>
-    <dgm:cxn modelId="{A0189EE9-E20F-4858-A438-B9CEA29A8100}" type="presParOf" srcId="{A7D99808-FCC3-4781-9F47-37CC1A7857BD}" destId="{2DEB8B99-959F-4D35-A9B3-5DEE2E479D35}" srcOrd="2" destOrd="0" presId="urn:microsoft.com/office/officeart/2008/layout/LinedList"/>
-    <dgm:cxn modelId="{06063F61-8AC5-42BE-B891-6EC6FDC3791F}" type="presParOf" srcId="{A7D99808-FCC3-4781-9F47-37CC1A7857BD}" destId="{B18B1069-EC54-49DC-964A-07CC04FC1E41}" srcOrd="3" destOrd="0" presId="urn:microsoft.com/office/officeart/2008/layout/LinedList"/>
-    <dgm:cxn modelId="{4DD1EFBA-5BAB-4C09-8BAD-A7FD65F0BC23}" type="presParOf" srcId="{A7D99808-FCC3-4781-9F47-37CC1A7857BD}" destId="{C66DC2E7-0854-4EE1-A1B9-55253D9A4A96}" srcOrd="4" destOrd="0" presId="urn:microsoft.com/office/officeart/2008/layout/LinedList"/>
-    <dgm:cxn modelId="{736B7EEC-394D-4666-B16B-A79F59A4958A}" type="presParOf" srcId="{C66DC2E7-0854-4EE1-A1B9-55253D9A4A96}" destId="{B73479EE-806E-43D5-8E42-4A8402CAA43C}" srcOrd="0" destOrd="0" presId="urn:microsoft.com/office/officeart/2008/layout/LinedList"/>
-    <dgm:cxn modelId="{41E24712-263E-4F23-A4BF-E08EF3DF2F01}" type="presParOf" srcId="{C66DC2E7-0854-4EE1-A1B9-55253D9A4A96}" destId="{C2C22BDF-845C-4EBF-A8CE-834EFED01891}" srcOrd="1" destOrd="0" presId="urn:microsoft.com/office/officeart/2008/layout/LinedList"/>
-    <dgm:cxn modelId="{0AFC9375-317B-4DD1-8270-A526C0905E9A}" type="presParOf" srcId="{C66DC2E7-0854-4EE1-A1B9-55253D9A4A96}" destId="{BC54AF69-06DB-4ADB-958F-125C5A60B53D}" srcOrd="2" destOrd="0" presId="urn:microsoft.com/office/officeart/2008/layout/LinedList"/>
-    <dgm:cxn modelId="{382932DB-D50A-4D60-8ABD-EADB3A076879}" type="presParOf" srcId="{A7D99808-FCC3-4781-9F47-37CC1A7857BD}" destId="{13FAB319-9FF9-467B-B0E8-6A3388FD9CD3}" srcOrd="5" destOrd="0" presId="urn:microsoft.com/office/officeart/2008/layout/LinedList"/>
-    <dgm:cxn modelId="{1D81D691-DF0B-412B-A50B-67C45125BAE2}" type="presParOf" srcId="{A7D99808-FCC3-4781-9F47-37CC1A7857BD}" destId="{9D3DC200-BF66-43F7-B741-C5B3F1065909}" srcOrd="6" destOrd="0" presId="urn:microsoft.com/office/officeart/2008/layout/LinedList"/>
-    <dgm:cxn modelId="{7CA25B75-75BA-48FB-B236-B23B73CBF15B}" type="presParOf" srcId="{D56D0753-ADA1-4461-8D69-3DF7BE869F9E}" destId="{0F627A40-9747-429A-9F74-98C4D1DFC96B}" srcOrd="2" destOrd="0" presId="urn:microsoft.com/office/officeart/2008/layout/LinedList"/>
-    <dgm:cxn modelId="{464ECBD2-E4FC-4E30-B51E-A9347589F4B5}" type="presParOf" srcId="{D56D0753-ADA1-4461-8D69-3DF7BE869F9E}" destId="{311D4938-07C4-41FA-808B-6EEA94F79FFF}" srcOrd="3" destOrd="0" presId="urn:microsoft.com/office/officeart/2008/layout/LinedList"/>
-    <dgm:cxn modelId="{1F38F0EC-B4AC-461E-9AE3-4D5C29F57975}" type="presParOf" srcId="{311D4938-07C4-41FA-808B-6EEA94F79FFF}" destId="{560C6FEE-501F-4600-97CF-74BDA866EF54}" srcOrd="0" destOrd="0" presId="urn:microsoft.com/office/officeart/2008/layout/LinedList"/>
-    <dgm:cxn modelId="{2F90EAEE-69F3-49AF-A133-980E2EAE3C28}" type="presParOf" srcId="{311D4938-07C4-41FA-808B-6EEA94F79FFF}" destId="{72A55848-2619-4D01-8635-81680A27D07B}" srcOrd="1" destOrd="0" presId="urn:microsoft.com/office/officeart/2008/layout/LinedList"/>
-    <dgm:cxn modelId="{173BFBF6-DE79-4A3E-AD58-0FE209DF8965}" type="presParOf" srcId="{72A55848-2619-4D01-8635-81680A27D07B}" destId="{2BF40F4E-06F2-48D2-A0EE-C7784C949DD6}" srcOrd="0" destOrd="0" presId="urn:microsoft.com/office/officeart/2008/layout/LinedList"/>
-    <dgm:cxn modelId="{0B0117C0-24FD-428A-A40E-2A7EDF854EED}" type="presParOf" srcId="{72A55848-2619-4D01-8635-81680A27D07B}" destId="{3DCFB716-B0BD-40D7-95C5-73F40D3B5531}" srcOrd="1" destOrd="0" presId="urn:microsoft.com/office/officeart/2008/layout/LinedList"/>
-    <dgm:cxn modelId="{51C82CDF-516D-4595-BE23-2EF1D171CAE5}" type="presParOf" srcId="{3DCFB716-B0BD-40D7-95C5-73F40D3B5531}" destId="{0AC67099-4450-4BB1-B3BD-F58F629188B8}" srcOrd="0" destOrd="0" presId="urn:microsoft.com/office/officeart/2008/layout/LinedList"/>
-    <dgm:cxn modelId="{789FCD7F-EFF2-4E74-9F9E-D0FAB566D454}" type="presParOf" srcId="{3DCFB716-B0BD-40D7-95C5-73F40D3B5531}" destId="{D5518AB7-F9E4-4B4E-A451-4A739A8F7E36}" srcOrd="1" destOrd="0" presId="urn:microsoft.com/office/officeart/2008/layout/LinedList"/>
-    <dgm:cxn modelId="{1DBADAE1-52E9-4CB0-933D-42AD19162380}" type="presParOf" srcId="{3DCFB716-B0BD-40D7-95C5-73F40D3B5531}" destId="{467D60B8-968F-4141-84C6-87068E9F0BB0}" srcOrd="2" destOrd="0" presId="urn:microsoft.com/office/officeart/2008/layout/LinedList"/>
-    <dgm:cxn modelId="{460F223C-9462-4B55-851C-B768A27268E5}" type="presParOf" srcId="{72A55848-2619-4D01-8635-81680A27D07B}" destId="{287C5287-7317-48A3-99DB-642326756138}" srcOrd="2" destOrd="0" presId="urn:microsoft.com/office/officeart/2008/layout/LinedList"/>
-    <dgm:cxn modelId="{BAE38D38-EE25-4026-9AA4-E26AA6DAD223}" type="presParOf" srcId="{72A55848-2619-4D01-8635-81680A27D07B}" destId="{DECEA02B-82E8-4BCD-8A68-244147E4E0B4}" srcOrd="3" destOrd="0" presId="urn:microsoft.com/office/officeart/2008/layout/LinedList"/>
-    <dgm:cxn modelId="{1984FCEF-781E-43F8-B0A6-318837CEA48C}" type="presParOf" srcId="{72A55848-2619-4D01-8635-81680A27D07B}" destId="{60185C81-F5A4-4756-A813-A032E2838662}" srcOrd="4" destOrd="0" presId="urn:microsoft.com/office/officeart/2008/layout/LinedList"/>
-    <dgm:cxn modelId="{1EBB4BA5-17E8-49AE-BA5A-B53131337A8C}" type="presParOf" srcId="{60185C81-F5A4-4756-A813-A032E2838662}" destId="{D5D0F6D1-56E7-4BA2-A95E-79361614832C}" srcOrd="0" destOrd="0" presId="urn:microsoft.com/office/officeart/2008/layout/LinedList"/>
-    <dgm:cxn modelId="{22A2EEC4-29A2-454E-8114-0B656A18425B}" type="presParOf" srcId="{60185C81-F5A4-4756-A813-A032E2838662}" destId="{45834C88-2E51-479B-A432-68F5A83EC9CF}" srcOrd="1" destOrd="0" presId="urn:microsoft.com/office/officeart/2008/layout/LinedList"/>
-    <dgm:cxn modelId="{94C0E61A-2050-46EF-B917-318A2C74C948}" type="presParOf" srcId="{60185C81-F5A4-4756-A813-A032E2838662}" destId="{6F3BEB6F-05C3-4158-8300-4775DD8AD434}" srcOrd="2" destOrd="0" presId="urn:microsoft.com/office/officeart/2008/layout/LinedList"/>
-    <dgm:cxn modelId="{CA6B55FB-A5C4-41E1-BE32-5D2116BA8569}" type="presParOf" srcId="{72A55848-2619-4D01-8635-81680A27D07B}" destId="{10408849-71A8-44CE-A4B9-7B407BEBF2AF}" srcOrd="5" destOrd="0" presId="urn:microsoft.com/office/officeart/2008/layout/LinedList"/>
-    <dgm:cxn modelId="{0FDC8167-813E-4ADA-9B96-444E0A3CF71B}" type="presParOf" srcId="{72A55848-2619-4D01-8635-81680A27D07B}" destId="{BBD95A90-960E-47FA-89A5-5E1AC88D4DC3}" srcOrd="6" destOrd="0" presId="urn:microsoft.com/office/officeart/2008/layout/LinedList"/>
-    <dgm:cxn modelId="{97D88E5A-8302-4AE2-B082-61802205DC2B}" type="presParOf" srcId="{72A55848-2619-4D01-8635-81680A27D07B}" destId="{552CFB72-C673-402B-B9C0-353798B8A0E8}" srcOrd="7" destOrd="0" presId="urn:microsoft.com/office/officeart/2008/layout/LinedList"/>
-    <dgm:cxn modelId="{F19FA8B3-2649-4AAD-8C53-ECF143452413}" type="presParOf" srcId="{552CFB72-C673-402B-B9C0-353798B8A0E8}" destId="{77256152-6DFE-492D-8019-335C1DC90256}" srcOrd="0" destOrd="0" presId="urn:microsoft.com/office/officeart/2008/layout/LinedList"/>
-    <dgm:cxn modelId="{8AF63675-2F15-4DA0-8A53-3D4B18DBFDC1}" type="presParOf" srcId="{552CFB72-C673-402B-B9C0-353798B8A0E8}" destId="{44F5A052-F93A-4674-8A7F-FFF84D191908}" srcOrd="1" destOrd="0" presId="urn:microsoft.com/office/officeart/2008/layout/LinedList"/>
-    <dgm:cxn modelId="{ADD52BC3-225E-4FBF-BC67-B0A8E4934175}" type="presParOf" srcId="{552CFB72-C673-402B-B9C0-353798B8A0E8}" destId="{32F1C9E3-A4B9-4CD0-8616-8C263FB6E525}" srcOrd="2" destOrd="0" presId="urn:microsoft.com/office/officeart/2008/layout/LinedList"/>
-    <dgm:cxn modelId="{B95BC5AD-6E18-413D-962A-7CCB0F779D60}" type="presParOf" srcId="{72A55848-2619-4D01-8635-81680A27D07B}" destId="{8032C194-5C4E-4DDE-BBF6-39836D2ED5AD}" srcOrd="8" destOrd="0" presId="urn:microsoft.com/office/officeart/2008/layout/LinedList"/>
-    <dgm:cxn modelId="{9A143CD6-14C8-4F2F-968C-69C3B0D4C855}" type="presParOf" srcId="{72A55848-2619-4D01-8635-81680A27D07B}" destId="{0C1BFE24-7453-44DC-8F49-6DD57F4A013B}" srcOrd="9" destOrd="0" presId="urn:microsoft.com/office/officeart/2008/layout/LinedList"/>
-    <dgm:cxn modelId="{614EE008-156D-4E9D-8A00-26AC8BD3416B}" type="presParOf" srcId="{72A55848-2619-4D01-8635-81680A27D07B}" destId="{967557F9-602B-47E4-9C5E-CA8E57DED16C}" srcOrd="10" destOrd="0" presId="urn:microsoft.com/office/officeart/2008/layout/LinedList"/>
-    <dgm:cxn modelId="{6DD1AF8D-33C5-4019-82F1-45622BFC3E4D}" type="presParOf" srcId="{967557F9-602B-47E4-9C5E-CA8E57DED16C}" destId="{A3747D0E-D9E4-4151-BC3F-145D4F59FB67}" srcOrd="0" destOrd="0" presId="urn:microsoft.com/office/officeart/2008/layout/LinedList"/>
-    <dgm:cxn modelId="{3A756F7E-1BF6-43BE-AC23-ACF7A2089646}" type="presParOf" srcId="{967557F9-602B-47E4-9C5E-CA8E57DED16C}" destId="{C32D5754-64A0-4792-A0CF-A74C321D6ED0}" srcOrd="1" destOrd="0" presId="urn:microsoft.com/office/officeart/2008/layout/LinedList"/>
-    <dgm:cxn modelId="{CE737DDD-740E-41BB-A44C-D2EC3C4D6C5E}" type="presParOf" srcId="{967557F9-602B-47E4-9C5E-CA8E57DED16C}" destId="{3C70B278-DA49-4488-B0F3-982B58BC9DEA}" srcOrd="2" destOrd="0" presId="urn:microsoft.com/office/officeart/2008/layout/LinedList"/>
-    <dgm:cxn modelId="{3A1DE4F7-EF79-404E-92F4-DB2012663E1D}" type="presParOf" srcId="{72A55848-2619-4D01-8635-81680A27D07B}" destId="{F85B9B47-5680-44DF-94CC-473B2B3FF22D}" srcOrd="11" destOrd="0" presId="urn:microsoft.com/office/officeart/2008/layout/LinedList"/>
-    <dgm:cxn modelId="{02B4CC53-6903-41AC-A7D8-5DB798ABA8BC}" type="presParOf" srcId="{72A55848-2619-4D01-8635-81680A27D07B}" destId="{D6107667-4485-47B6-B40A-2345B6A2C2D8}" srcOrd="12" destOrd="0" presId="urn:microsoft.com/office/officeart/2008/layout/LinedList"/>
-    <dgm:cxn modelId="{8A0F0CA9-0D71-444E-9A11-74D008AFEB8D}" type="presParOf" srcId="{D56D0753-ADA1-4461-8D69-3DF7BE869F9E}" destId="{52D63BF3-F2BC-4E4D-88EA-BD030AD114D3}" srcOrd="4" destOrd="0" presId="urn:microsoft.com/office/officeart/2008/layout/LinedList"/>
-    <dgm:cxn modelId="{7CDC78CD-E634-4788-94D3-7733CE06E2E9}" type="presParOf" srcId="{D56D0753-ADA1-4461-8D69-3DF7BE869F9E}" destId="{055FD98E-D17E-4009-AC61-03B1D6919E44}" srcOrd="5" destOrd="0" presId="urn:microsoft.com/office/officeart/2008/layout/LinedList"/>
-    <dgm:cxn modelId="{28C0A150-19B9-4494-9867-C8CB979B1F99}" type="presParOf" srcId="{055FD98E-D17E-4009-AC61-03B1D6919E44}" destId="{AE6FE8FF-43CD-4176-8535-915338C5F596}" srcOrd="0" destOrd="0" presId="urn:microsoft.com/office/officeart/2008/layout/LinedList"/>
-    <dgm:cxn modelId="{F9951F98-7AFC-4203-B79B-EF62DED402A1}" type="presParOf" srcId="{055FD98E-D17E-4009-AC61-03B1D6919E44}" destId="{A409B240-9EDA-4C47-80B8-1CAA97C47DE2}" srcOrd="1" destOrd="0" presId="urn:microsoft.com/office/officeart/2008/layout/LinedList"/>
-    <dgm:cxn modelId="{87118943-A1CC-4D57-8AE5-88C676751CB0}" type="presParOf" srcId="{A409B240-9EDA-4C47-80B8-1CAA97C47DE2}" destId="{B4578675-D809-40DD-871C-99AEB92DA07A}" srcOrd="0" destOrd="0" presId="urn:microsoft.com/office/officeart/2008/layout/LinedList"/>
-    <dgm:cxn modelId="{5A27EB04-C306-48C9-BCF0-70457ABB52A1}" type="presParOf" srcId="{A409B240-9EDA-4C47-80B8-1CAA97C47DE2}" destId="{E6183CF9-3BD6-47EE-B49E-E423928322C5}" srcOrd="1" destOrd="0" presId="urn:microsoft.com/office/officeart/2008/layout/LinedList"/>
-    <dgm:cxn modelId="{7F7DA593-859C-477B-89E3-C0313B86E967}" type="presParOf" srcId="{E6183CF9-3BD6-47EE-B49E-E423928322C5}" destId="{C258E0DF-DD22-41B4-AE82-4818BBD98F09}" srcOrd="0" destOrd="0" presId="urn:microsoft.com/office/officeart/2008/layout/LinedList"/>
-    <dgm:cxn modelId="{8F27D8A2-4D58-4CE6-A633-47C901ED3A12}" type="presParOf" srcId="{E6183CF9-3BD6-47EE-B49E-E423928322C5}" destId="{AF1E62C2-D592-4F29-B31B-17F1F006747D}" srcOrd="1" destOrd="0" presId="urn:microsoft.com/office/officeart/2008/layout/LinedList"/>
-    <dgm:cxn modelId="{6F3E5C2F-2EF4-4357-B154-74234AD70600}" type="presParOf" srcId="{E6183CF9-3BD6-47EE-B49E-E423928322C5}" destId="{BC4E9CA3-6234-476C-8A2A-905255EA342B}" srcOrd="2" destOrd="0" presId="urn:microsoft.com/office/officeart/2008/layout/LinedList"/>
-    <dgm:cxn modelId="{F4611C7C-C060-4AB9-8864-434067783E09}" type="presParOf" srcId="{A409B240-9EDA-4C47-80B8-1CAA97C47DE2}" destId="{4DE4C443-CFBB-44C0-8F4F-9DAEC67C78C9}" srcOrd="2" destOrd="0" presId="urn:microsoft.com/office/officeart/2008/layout/LinedList"/>
-    <dgm:cxn modelId="{7A803DB3-4546-4424-A840-6ED09C655B77}" type="presParOf" srcId="{A409B240-9EDA-4C47-80B8-1CAA97C47DE2}" destId="{0FADF7C2-EDE8-4F9F-85CD-6F4200A03E98}" srcOrd="3" destOrd="0" presId="urn:microsoft.com/office/officeart/2008/layout/LinedList"/>
-    <dgm:cxn modelId="{1FAA3E1D-3652-4DC9-A06B-1D86B67CE21C}" type="presParOf" srcId="{A409B240-9EDA-4C47-80B8-1CAA97C47DE2}" destId="{2C6F58B1-6424-4ACA-B72B-E47A9C3828B8}" srcOrd="4" destOrd="0" presId="urn:microsoft.com/office/officeart/2008/layout/LinedList"/>
-    <dgm:cxn modelId="{1C3F8181-C5F4-482D-B676-8B5986B75B7B}" type="presParOf" srcId="{2C6F58B1-6424-4ACA-B72B-E47A9C3828B8}" destId="{3A51E9E0-53E9-4C6C-B9F3-C1875D9A27C0}" srcOrd="0" destOrd="0" presId="urn:microsoft.com/office/officeart/2008/layout/LinedList"/>
-    <dgm:cxn modelId="{D2311841-A395-4CFA-9587-3FD767F0B495}" type="presParOf" srcId="{2C6F58B1-6424-4ACA-B72B-E47A9C3828B8}" destId="{8FCFCF74-9697-472C-901A-02B542B6BDE7}" srcOrd="1" destOrd="0" presId="urn:microsoft.com/office/officeart/2008/layout/LinedList"/>
-    <dgm:cxn modelId="{ECF57C01-88CB-4C9D-89E7-7DF5154E3350}" type="presParOf" srcId="{2C6F58B1-6424-4ACA-B72B-E47A9C3828B8}" destId="{2541D64E-1562-4E84-8F0D-871CB2849E19}" srcOrd="2" destOrd="0" presId="urn:microsoft.com/office/officeart/2008/layout/LinedList"/>
-    <dgm:cxn modelId="{E2EC15EB-54DA-48B0-B02C-FFEB1A9B5E83}" type="presParOf" srcId="{A409B240-9EDA-4C47-80B8-1CAA97C47DE2}" destId="{CFBE7A41-3EDD-4238-91F2-C067D3200D74}" srcOrd="5" destOrd="0" presId="urn:microsoft.com/office/officeart/2008/layout/LinedList"/>
-    <dgm:cxn modelId="{30D2C9A0-9D9E-45B3-A91C-C7C4A526D4B6}" type="presParOf" srcId="{A409B240-9EDA-4C47-80B8-1CAA97C47DE2}" destId="{D1D9C401-63E2-4114-BA5B-7D61B2B89A0C}" srcOrd="6" destOrd="0" presId="urn:microsoft.com/office/officeart/2008/layout/LinedList"/>
+    <dgm:cxn modelId="{B184FAEB-0FC2-4BE8-85E9-A9E90A8AFE6C}" type="presParOf" srcId="{95DB4146-1247-4D79-B393-ED421419447D}" destId="{330D1E6F-9E6C-44D8-92C6-5F6FD6CB9169}" srcOrd="0" destOrd="0" presId="urn:microsoft.com/office/officeart/2005/8/layout/vList2"/>
+    <dgm:cxn modelId="{A773A014-65FC-4D44-9B59-063AC78DD8D4}" type="presParOf" srcId="{95DB4146-1247-4D79-B393-ED421419447D}" destId="{A37C6F9B-3613-4423-9334-8932101912D2}" srcOrd="1" destOrd="0" presId="urn:microsoft.com/office/officeart/2005/8/layout/vList2"/>
+    <dgm:cxn modelId="{CF8DD93C-99D9-4C05-AAFB-DBE64F3F1A75}" type="presParOf" srcId="{95DB4146-1247-4D79-B393-ED421419447D}" destId="{70015CF1-9BD5-42D9-BF9D-BEB104A742B8}" srcOrd="2" destOrd="0" presId="urn:microsoft.com/office/officeart/2005/8/layout/vList2"/>
+    <dgm:cxn modelId="{75658F67-4935-4292-A69F-27771553C45C}" type="presParOf" srcId="{95DB4146-1247-4D79-B393-ED421419447D}" destId="{CCF336C4-D94F-4A03-A256-4AC8954C4245}" srcOrd="3" destOrd="0" presId="urn:microsoft.com/office/officeart/2005/8/layout/vList2"/>
+    <dgm:cxn modelId="{14FC8037-D693-47AD-9F53-A510078BC56F}" type="presParOf" srcId="{95DB4146-1247-4D79-B393-ED421419447D}" destId="{E30E8D4F-7EB2-473A-97AE-4FE08EF2F9F9}" srcOrd="4" destOrd="0" presId="urn:microsoft.com/office/officeart/2005/8/layout/vList2"/>
+    <dgm:cxn modelId="{A1B139C9-8610-4DEB-AF12-DEB71E2A5EDC}" type="presParOf" srcId="{95DB4146-1247-4D79-B393-ED421419447D}" destId="{301A3487-F354-409E-9FCD-230C4ED9E2CD}" srcOrd="5" destOrd="0" presId="urn:microsoft.com/office/officeart/2005/8/layout/vList2"/>
   </dgm:cxnLst>
   <dgm:bg/>
   <dgm:whole/>
   <dgm:extLst>
     <a:ext uri="http://schemas.microsoft.com/office/drawing/2008/diagram">
-      <dsp:dataModelExt xmlns:dsp="http://schemas.microsoft.com/office/drawing/2008/diagram" relId="rId6" minVer="http://schemas.openxmlformats.org/drawingml/2006/diagram"/>
+      <dsp:dataModelExt xmlns:dsp="http://schemas.microsoft.com/office/drawing/2008/diagram" xmlns="" relId="rId6" minVer="http://schemas.openxmlformats.org/drawingml/2006/diagram"/>
     </a:ext>
   </dgm:extLst>
 </dgm:dataModel>
 </file>
 
 <file path=ppt/diagrams/drawing1.xml><?xml version="1.0" encoding="utf-8"?>
-<dsp:drawing xmlns:dgm="http://schemas.openxmlformats.org/drawingml/2006/diagram" xmlns:dsp="http://schemas.microsoft.com/office/drawing/2008/diagram" xmlns:a="http://schemas.openxmlformats.org/drawingml/2006/main">
+<dsp:drawing xmlns:dgm="http://schemas.openxmlformats.org/drawingml/2006/diagram" xmlns:a="http://schemas.openxmlformats.org/drawingml/2006/main" xmlns:dsp="http://schemas.microsoft.com/office/drawing/2008/diagram">
   <dsp:spTree>
     <dsp:nvGrpSpPr>
       <dsp:cNvPr id="0" name=""/>
       <dsp:cNvGrpSpPr/>
     </dsp:nvGrpSpPr>
     <dsp:grpSpPr/>
-    <dsp:sp modelId="{5E6E5065-D27F-4BE6-BC8B-F4D83F9DD436}">
+    <dsp:sp modelId="{330D1E6F-9E6C-44D8-92C6-5F6FD6CB9169}">
       <dsp:nvSpPr>
         <dsp:cNvPr id="0" name=""/>
         <dsp:cNvSpPr/>
       </dsp:nvSpPr>
       <dsp:spPr>
         <a:xfrm>
-          <a:off x="0" y="2381"/>
-          <a:ext cx="8229599" cy="0"/>
+          <a:off x="0" y="12044"/>
+          <a:ext cx="8229599" cy="608400"/>
         </a:xfrm>
-        <a:prstGeom prst="line">
+        <a:prstGeom prst="roundRect">
           <a:avLst/>
         </a:prstGeom>
         <a:solidFill>
@@ -2076,7 +1804,7 @@
         </a:solidFill>
         <a:ln w="26425" cap="flat" cmpd="sng" algn="ctr">
           <a:solidFill>
-            <a:schemeClr val="accent1">
+            <a:schemeClr val="lt1">
               <a:hueOff val="0"/>
               <a:satOff val="0"/>
               <a:lumOff val="0"/>
@@ -2101,16 +1829,44 @@
           <a:schemeClr val="lt1"/>
         </a:fontRef>
       </dsp:style>
+      <dsp:txBody>
+        <a:bodyPr spcFirstLastPara="0" vert="horz" wrap="square" lIns="99060" tIns="99060" rIns="99060" bIns="99060" numCol="1" spcCol="1270" anchor="ctr" anchorCtr="0">
+          <a:noAutofit/>
+        </a:bodyPr>
+        <a:lstStyle/>
+        <a:p>
+          <a:pPr lvl="0" algn="l" defTabSz="1155700" rtl="0">
+            <a:lnSpc>
+              <a:spcPct val="90000"/>
+            </a:lnSpc>
+            <a:spcBef>
+              <a:spcPct val="0"/>
+            </a:spcBef>
+            <a:spcAft>
+              <a:spcPct val="35000"/>
+            </a:spcAft>
+          </a:pPr>
+          <a:r>
+            <a:rPr lang="en-US" sz="2600" kern="1200" dirty="0" smtClean="0"/>
+            <a:t>Best Machine Learning Methods</a:t>
+          </a:r>
+          <a:endParaRPr lang="en-US" sz="2600" kern="1200" dirty="0"/>
+        </a:p>
+      </dsp:txBody>
+      <dsp:txXfrm>
+        <a:off x="0" y="12044"/>
+        <a:ext cx="8229599" cy="608400"/>
+      </dsp:txXfrm>
     </dsp:sp>
-    <dsp:sp modelId="{AB075B35-1B73-4043-B1BA-4B25E356EAED}">
+    <dsp:sp modelId="{A37C6F9B-3613-4423-9334-8932101912D2}">
       <dsp:nvSpPr>
         <dsp:cNvPr id="0" name=""/>
         <dsp:cNvSpPr/>
       </dsp:nvSpPr>
       <dsp:spPr>
         <a:xfrm>
-          <a:off x="0" y="2381"/>
-          <a:ext cx="1645919" cy="1624012"/>
+          <a:off x="0" y="620444"/>
+          <a:ext cx="8229599" cy="659294"/>
         </a:xfrm>
         <a:prstGeom prst="rect">
           <a:avLst/>
@@ -2134,12 +1890,12 @@
         <a:fontRef idx="minor"/>
       </dsp:style>
       <dsp:txBody>
-        <a:bodyPr spcFirstLastPara="0" vert="horz" wrap="square" lIns="95250" tIns="95250" rIns="95250" bIns="95250" numCol="1" spcCol="1270" anchor="t" anchorCtr="0">
+        <a:bodyPr spcFirstLastPara="0" vert="horz" wrap="square" lIns="261290" tIns="33020" rIns="184912" bIns="33020" numCol="1" spcCol="1270" anchor="t" anchorCtr="0">
           <a:noAutofit/>
         </a:bodyPr>
         <a:lstStyle/>
         <a:p>
-          <a:pPr lvl="0" algn="l" defTabSz="1111250" rtl="0">
+          <a:pPr marL="228600" lvl="1" indent="-228600" algn="l" defTabSz="889000" rtl="0">
             <a:lnSpc>
               <a:spcPct val="90000"/>
             </a:lnSpc>
@@ -2147,59 +1903,18 @@
               <a:spcPct val="0"/>
             </a:spcBef>
             <a:spcAft>
-              <a:spcPct val="35000"/>
+              <a:spcPct val="20000"/>
             </a:spcAft>
+            <a:buChar char="••"/>
           </a:pPr>
           <a:r>
-            <a:rPr lang="en-US" sz="2500" kern="1200" dirty="0" smtClean="0"/>
-            <a:t>Best machine learning method</a:t>
+            <a:rPr lang="en-US" sz="2000" kern="1200" dirty="0" smtClean="0"/>
+            <a:t>Soft margin linear SVM</a:t>
           </a:r>
-          <a:endParaRPr lang="en-US" sz="2500" kern="1200" dirty="0"/>
+          <a:endParaRPr lang="en-US" sz="2000" kern="1200" dirty="0"/>
         </a:p>
-      </dsp:txBody>
-      <dsp:txXfrm>
-        <a:off x="0" y="2381"/>
-        <a:ext cx="1645919" cy="1624012"/>
-      </dsp:txXfrm>
-    </dsp:sp>
-    <dsp:sp modelId="{419C8211-62DD-49A2-93EB-4A736EC5A07D}">
-      <dsp:nvSpPr>
-        <dsp:cNvPr id="0" name=""/>
-        <dsp:cNvSpPr/>
-      </dsp:nvSpPr>
-      <dsp:spPr>
-        <a:xfrm>
-          <a:off x="1769364" y="40126"/>
-          <a:ext cx="6460235" cy="754912"/>
-        </a:xfrm>
-        <a:prstGeom prst="rect">
-          <a:avLst/>
-        </a:prstGeom>
-        <a:noFill/>
-        <a:ln>
-          <a:noFill/>
-        </a:ln>
-        <a:effectLst/>
-      </dsp:spPr>
-      <dsp:style>
-        <a:lnRef idx="0">
-          <a:scrgbClr r="0" g="0" b="0"/>
-        </a:lnRef>
-        <a:fillRef idx="0">
-          <a:scrgbClr r="0" g="0" b="0"/>
-        </a:fillRef>
-        <a:effectRef idx="0">
-          <a:scrgbClr r="0" g="0" b="0"/>
-        </a:effectRef>
-        <a:fontRef idx="minor"/>
-      </dsp:style>
-      <dsp:txBody>
-        <a:bodyPr spcFirstLastPara="0" vert="horz" wrap="square" lIns="68580" tIns="68580" rIns="68580" bIns="68580" numCol="1" spcCol="1270" anchor="t" anchorCtr="0">
-          <a:noAutofit/>
-        </a:bodyPr>
-        <a:lstStyle/>
         <a:p>
-          <a:pPr lvl="0" algn="l" defTabSz="800100" rtl="0">
+          <a:pPr marL="228600" lvl="1" indent="-228600" algn="l" defTabSz="889000" rtl="0">
             <a:lnSpc>
               <a:spcPct val="90000"/>
             </a:lnSpc>
@@ -2207,32 +1922,33 @@
               <a:spcPct val="0"/>
             </a:spcBef>
             <a:spcAft>
-              <a:spcPct val="35000"/>
+              <a:spcPct val="20000"/>
             </a:spcAft>
+            <a:buChar char="••"/>
           </a:pPr>
           <a:r>
-            <a:rPr lang="en-US" sz="1800" kern="1200" smtClean="0"/>
-            <a:t>Soft margin linear SVM</a:t>
+            <a:rPr lang="en-US" sz="2000" kern="1200" dirty="0" smtClean="0"/>
+            <a:t>Logistic regression with the LASSO regularization</a:t>
           </a:r>
-          <a:endParaRPr lang="en-US" sz="1800" kern="1200"/>
+          <a:endParaRPr lang="en-US" sz="2000" kern="1200" dirty="0"/>
         </a:p>
       </dsp:txBody>
       <dsp:txXfrm>
-        <a:off x="1769364" y="40126"/>
-        <a:ext cx="6460235" cy="754912"/>
+        <a:off x="0" y="620444"/>
+        <a:ext cx="8229599" cy="659294"/>
       </dsp:txXfrm>
     </dsp:sp>
-    <dsp:sp modelId="{2DEB8B99-959F-4D35-A9B3-5DEE2E479D35}">
+    <dsp:sp modelId="{70015CF1-9BD5-42D9-BF9D-BEB104A742B8}">
       <dsp:nvSpPr>
         <dsp:cNvPr id="0" name=""/>
         <dsp:cNvSpPr/>
       </dsp:nvSpPr>
       <dsp:spPr>
         <a:xfrm>
-          <a:off x="1645919" y="533400"/>
-          <a:ext cx="6583679" cy="0"/>
+          <a:off x="0" y="1279739"/>
+          <a:ext cx="8229599" cy="608400"/>
         </a:xfrm>
-        <a:prstGeom prst="line">
+        <a:prstGeom prst="roundRect">
           <a:avLst/>
         </a:prstGeom>
         <a:solidFill>
@@ -2245,161 +1961,7 @@
         </a:solidFill>
         <a:ln w="26425" cap="flat" cmpd="sng" algn="ctr">
           <a:solidFill>
-            <a:schemeClr val="accent1">
-              <a:tint val="50000"/>
-              <a:hueOff val="0"/>
-              <a:satOff val="0"/>
-              <a:lumOff val="0"/>
-              <a:alphaOff val="0"/>
-            </a:schemeClr>
-          </a:solidFill>
-          <a:prstDash val="solid"/>
-        </a:ln>
-        <a:effectLst/>
-      </dsp:spPr>
-      <dsp:style>
-        <a:lnRef idx="2">
-          <a:scrgbClr r="0" g="0" b="0"/>
-        </a:lnRef>
-        <a:fillRef idx="1">
-          <a:scrgbClr r="0" g="0" b="0"/>
-        </a:fillRef>
-        <a:effectRef idx="0">
-          <a:scrgbClr r="0" g="0" b="0"/>
-        </a:effectRef>
-        <a:fontRef idx="minor"/>
-      </dsp:style>
-    </dsp:sp>
-    <dsp:sp modelId="{C2C22BDF-845C-4EBF-A8CE-834EFED01891}">
-      <dsp:nvSpPr>
-        <dsp:cNvPr id="0" name=""/>
-        <dsp:cNvSpPr/>
-      </dsp:nvSpPr>
-      <dsp:spPr>
-        <a:xfrm>
-          <a:off x="1769364" y="565900"/>
-          <a:ext cx="6460235" cy="754912"/>
-        </a:xfrm>
-        <a:prstGeom prst="rect">
-          <a:avLst/>
-        </a:prstGeom>
-        <a:noFill/>
-        <a:ln>
-          <a:noFill/>
-        </a:ln>
-        <a:effectLst/>
-      </dsp:spPr>
-      <dsp:style>
-        <a:lnRef idx="0">
-          <a:scrgbClr r="0" g="0" b="0"/>
-        </a:lnRef>
-        <a:fillRef idx="0">
-          <a:scrgbClr r="0" g="0" b="0"/>
-        </a:fillRef>
-        <a:effectRef idx="0">
-          <a:scrgbClr r="0" g="0" b="0"/>
-        </a:effectRef>
-        <a:fontRef idx="minor"/>
-      </dsp:style>
-      <dsp:txBody>
-        <a:bodyPr spcFirstLastPara="0" vert="horz" wrap="square" lIns="68580" tIns="68580" rIns="68580" bIns="68580" numCol="1" spcCol="1270" anchor="t" anchorCtr="0">
-          <a:noAutofit/>
-        </a:bodyPr>
-        <a:lstStyle/>
-        <a:p>
-          <a:pPr lvl="0" algn="l" defTabSz="800100" rtl="0">
-            <a:lnSpc>
-              <a:spcPct val="90000"/>
-            </a:lnSpc>
-            <a:spcBef>
-              <a:spcPct val="0"/>
-            </a:spcBef>
-            <a:spcAft>
-              <a:spcPct val="35000"/>
-            </a:spcAft>
-          </a:pPr>
-          <a:r>
-            <a:rPr lang="en-US" sz="1800" kern="1200" dirty="0" smtClean="0"/>
-            <a:t>Logistic regression with LASSO</a:t>
-          </a:r>
-          <a:endParaRPr lang="en-US" sz="1800" kern="1200" dirty="0"/>
-        </a:p>
-      </dsp:txBody>
-      <dsp:txXfrm>
-        <a:off x="1769364" y="565900"/>
-        <a:ext cx="6460235" cy="754912"/>
-      </dsp:txXfrm>
-    </dsp:sp>
-    <dsp:sp modelId="{13FAB319-9FF9-467B-B0E8-6A3388FD9CD3}">
-      <dsp:nvSpPr>
-        <dsp:cNvPr id="0" name=""/>
-        <dsp:cNvSpPr/>
-      </dsp:nvSpPr>
-      <dsp:spPr>
-        <a:xfrm>
-          <a:off x="1645919" y="990600"/>
-          <a:ext cx="6583679" cy="0"/>
-        </a:xfrm>
-        <a:prstGeom prst="line">
-          <a:avLst/>
-        </a:prstGeom>
-        <a:solidFill>
-          <a:schemeClr val="accent1">
-            <a:hueOff val="0"/>
-            <a:satOff val="0"/>
-            <a:lumOff val="0"/>
-            <a:alphaOff val="0"/>
-          </a:schemeClr>
-        </a:solidFill>
-        <a:ln w="26425" cap="flat" cmpd="sng" algn="ctr">
-          <a:solidFill>
-            <a:schemeClr val="accent1">
-              <a:tint val="50000"/>
-              <a:hueOff val="0"/>
-              <a:satOff val="0"/>
-              <a:lumOff val="0"/>
-              <a:alphaOff val="0"/>
-            </a:schemeClr>
-          </a:solidFill>
-          <a:prstDash val="solid"/>
-        </a:ln>
-        <a:effectLst/>
-      </dsp:spPr>
-      <dsp:style>
-        <a:lnRef idx="2">
-          <a:scrgbClr r="0" g="0" b="0"/>
-        </a:lnRef>
-        <a:fillRef idx="1">
-          <a:scrgbClr r="0" g="0" b="0"/>
-        </a:fillRef>
-        <a:effectRef idx="0">
-          <a:scrgbClr r="0" g="0" b="0"/>
-        </a:effectRef>
-        <a:fontRef idx="minor"/>
-      </dsp:style>
-    </dsp:sp>
-    <dsp:sp modelId="{0F627A40-9747-429A-9F74-98C4D1DFC96B}">
-      <dsp:nvSpPr>
-        <dsp:cNvPr id="0" name=""/>
-        <dsp:cNvSpPr/>
-      </dsp:nvSpPr>
-      <dsp:spPr>
-        <a:xfrm>
-          <a:off x="0" y="1600198"/>
-          <a:ext cx="8229599" cy="0"/>
-        </a:xfrm>
-        <a:prstGeom prst="line">
-          <a:avLst/>
-        </a:prstGeom>
-        <a:blipFill rotWithShape="0">
-          <a:blip xmlns:r="http://schemas.openxmlformats.org/officeDocument/2006/relationships" r:embed="rId1"/>
-          <a:stretch>
-            <a:fillRect/>
-          </a:stretch>
-        </a:blipFill>
-        <a:ln w="26425" cap="flat" cmpd="sng" algn="ctr">
-          <a:solidFill>
-            <a:schemeClr val="accent1">
+            <a:schemeClr val="lt1">
               <a:hueOff val="0"/>
               <a:satOff val="0"/>
               <a:lumOff val="0"/>
@@ -2424,16 +1986,44 @@
           <a:schemeClr val="lt1"/>
         </a:fontRef>
       </dsp:style>
+      <dsp:txBody>
+        <a:bodyPr spcFirstLastPara="0" vert="horz" wrap="square" lIns="99060" tIns="99060" rIns="99060" bIns="99060" numCol="1" spcCol="1270" anchor="ctr" anchorCtr="0">
+          <a:noAutofit/>
+        </a:bodyPr>
+        <a:lstStyle/>
+        <a:p>
+          <a:pPr lvl="0" algn="l" defTabSz="1155700" rtl="0">
+            <a:lnSpc>
+              <a:spcPct val="90000"/>
+            </a:lnSpc>
+            <a:spcBef>
+              <a:spcPct val="0"/>
+            </a:spcBef>
+            <a:spcAft>
+              <a:spcPct val="35000"/>
+            </a:spcAft>
+          </a:pPr>
+          <a:r>
+            <a:rPr lang="en-US" sz="2600" kern="1200" dirty="0" smtClean="0"/>
+            <a:t>Features</a:t>
+          </a:r>
+          <a:endParaRPr lang="en-US" sz="2600" kern="1200" dirty="0"/>
+        </a:p>
+      </dsp:txBody>
+      <dsp:txXfrm>
+        <a:off x="0" y="1279739"/>
+        <a:ext cx="8229599" cy="608400"/>
+      </dsp:txXfrm>
     </dsp:sp>
-    <dsp:sp modelId="{560C6FEE-501F-4600-97CF-74BDA866EF54}">
+    <dsp:sp modelId="{CCF336C4-D94F-4A03-A256-4AC8954C4245}">
       <dsp:nvSpPr>
         <dsp:cNvPr id="0" name=""/>
         <dsp:cNvSpPr/>
       </dsp:nvSpPr>
       <dsp:spPr>
         <a:xfrm>
-          <a:off x="0" y="1626393"/>
-          <a:ext cx="1645919" cy="1624012"/>
+          <a:off x="0" y="1888139"/>
+          <a:ext cx="8229599" cy="1937520"/>
         </a:xfrm>
         <a:prstGeom prst="rect">
           <a:avLst/>
@@ -2457,12 +2047,12 @@
         <a:fontRef idx="minor"/>
       </dsp:style>
       <dsp:txBody>
-        <a:bodyPr spcFirstLastPara="0" vert="horz" wrap="square" lIns="95250" tIns="95250" rIns="95250" bIns="95250" numCol="1" spcCol="1270" anchor="t" anchorCtr="0">
+        <a:bodyPr spcFirstLastPara="0" vert="horz" wrap="square" lIns="261290" tIns="33020" rIns="184912" bIns="33020" numCol="1" spcCol="1270" anchor="t" anchorCtr="0">
           <a:noAutofit/>
         </a:bodyPr>
         <a:lstStyle/>
         <a:p>
-          <a:pPr lvl="0" algn="l" defTabSz="1111250" rtl="0">
+          <a:pPr marL="228600" lvl="1" indent="-228600" algn="l" defTabSz="889000" rtl="0">
             <a:lnSpc>
               <a:spcPct val="90000"/>
             </a:lnSpc>
@@ -2470,59 +2060,18 @@
               <a:spcPct val="0"/>
             </a:spcBef>
             <a:spcAft>
-              <a:spcPct val="35000"/>
+              <a:spcPct val="20000"/>
             </a:spcAft>
+            <a:buChar char="••"/>
           </a:pPr>
           <a:r>
-            <a:rPr lang="en-US" sz="2500" kern="1200" dirty="0" smtClean="0"/>
-            <a:t>Best features</a:t>
+            <a:rPr lang="en-US" sz="2000" kern="1200" dirty="0" smtClean="0"/>
+            <a:t>Perplexities computed using n-gram models</a:t>
           </a:r>
-          <a:endParaRPr lang="en-US" sz="2500" kern="1200" dirty="0"/>
+          <a:endParaRPr lang="en-US" sz="2000" kern="1200" dirty="0"/>
         </a:p>
-      </dsp:txBody>
-      <dsp:txXfrm>
-        <a:off x="0" y="1626393"/>
-        <a:ext cx="1645919" cy="1624012"/>
-      </dsp:txXfrm>
-    </dsp:sp>
-    <dsp:sp modelId="{D5518AB7-F9E4-4B4E-A451-4A739A8F7E36}">
-      <dsp:nvSpPr>
-        <dsp:cNvPr id="0" name=""/>
-        <dsp:cNvSpPr/>
-      </dsp:nvSpPr>
-      <dsp:spPr>
-        <a:xfrm>
-          <a:off x="1769364" y="1645484"/>
-          <a:ext cx="6460235" cy="381817"/>
-        </a:xfrm>
-        <a:prstGeom prst="rect">
-          <a:avLst/>
-        </a:prstGeom>
-        <a:noFill/>
-        <a:ln>
-          <a:noFill/>
-        </a:ln>
-        <a:effectLst/>
-      </dsp:spPr>
-      <dsp:style>
-        <a:lnRef idx="0">
-          <a:scrgbClr r="0" g="0" b="0"/>
-        </a:lnRef>
-        <a:fillRef idx="0">
-          <a:scrgbClr r="0" g="0" b="0"/>
-        </a:fillRef>
-        <a:effectRef idx="0">
-          <a:scrgbClr r="0" g="0" b="0"/>
-        </a:effectRef>
-        <a:fontRef idx="minor"/>
-      </dsp:style>
-      <dsp:txBody>
-        <a:bodyPr spcFirstLastPara="0" vert="horz" wrap="square" lIns="68580" tIns="68580" rIns="68580" bIns="68580" numCol="1" spcCol="1270" anchor="t" anchorCtr="0">
-          <a:noAutofit/>
-        </a:bodyPr>
-        <a:lstStyle/>
         <a:p>
-          <a:pPr lvl="0" algn="l" defTabSz="800100" rtl="0">
+          <a:pPr marL="228600" lvl="1" indent="-228600" algn="l" defTabSz="889000" rtl="0">
             <a:lnSpc>
               <a:spcPct val="90000"/>
             </a:lnSpc>
@@ -2530,32 +2079,109 @@
               <a:spcPct val="0"/>
             </a:spcBef>
             <a:spcAft>
-              <a:spcPct val="35000"/>
+              <a:spcPct val="20000"/>
             </a:spcAft>
+            <a:buChar char="••"/>
           </a:pPr>
           <a:r>
-            <a:rPr lang="en-US" sz="1800" kern="1200" dirty="0" smtClean="0"/>
-            <a:t>Perplexities computed using n-gram models</a:t>
+            <a:rPr lang="en-US" sz="2000" kern="1200" dirty="0" smtClean="0"/>
+            <a:t>No single n-gram model can detect fake sentences</a:t>
           </a:r>
-          <a:endParaRPr lang="en-US" sz="1800" kern="1200" dirty="0"/>
+          <a:endParaRPr lang="en-US" sz="2000" kern="1200" dirty="0"/>
+        </a:p>
+        <a:p>
+          <a:pPr marL="228600" lvl="1" indent="-228600" algn="l" defTabSz="889000" rtl="0">
+            <a:lnSpc>
+              <a:spcPct val="90000"/>
+            </a:lnSpc>
+            <a:spcBef>
+              <a:spcPct val="0"/>
+            </a:spcBef>
+            <a:spcAft>
+              <a:spcPct val="20000"/>
+            </a:spcAft>
+            <a:buChar char="••"/>
+          </a:pPr>
+          <a:r>
+            <a:rPr lang="en-US" sz="2000" kern="1200" dirty="0" smtClean="0"/>
+            <a:t>Yet, two n-gram models are sufficient to classify accurately</a:t>
+          </a:r>
+          <a:endParaRPr lang="en-US" sz="2000" kern="1200" dirty="0"/>
+        </a:p>
+        <a:p>
+          <a:pPr marL="228600" lvl="1" indent="-228600" algn="l" defTabSz="889000" rtl="0">
+            <a:lnSpc>
+              <a:spcPct val="90000"/>
+            </a:lnSpc>
+            <a:spcBef>
+              <a:spcPct val="0"/>
+            </a:spcBef>
+            <a:spcAft>
+              <a:spcPct val="20000"/>
+            </a:spcAft>
+            <a:buChar char="••"/>
+          </a:pPr>
+          <a:r>
+            <a:rPr lang="en-US" sz="2000" kern="1200" dirty="0" smtClean="0"/>
+            <a:t>Probability estimation may work better with all n-gram models</a:t>
+          </a:r>
+          <a:endParaRPr lang="en-US" sz="2000" kern="1200" dirty="0"/>
+        </a:p>
+        <a:p>
+          <a:pPr marL="228600" lvl="1" indent="-228600" algn="l" defTabSz="889000" rtl="0">
+            <a:lnSpc>
+              <a:spcPct val="90000"/>
+            </a:lnSpc>
+            <a:spcBef>
+              <a:spcPct val="0"/>
+            </a:spcBef>
+            <a:spcAft>
+              <a:spcPct val="20000"/>
+            </a:spcAft>
+            <a:buChar char="••"/>
+          </a:pPr>
+          <a:r>
+            <a:rPr lang="en-US" sz="2000" kern="1200" dirty="0" smtClean="0"/>
+            <a:t>No feature works well for short sentences</a:t>
+          </a:r>
+          <a:endParaRPr lang="en-US" sz="2000" kern="1200" dirty="0"/>
+        </a:p>
+        <a:p>
+          <a:pPr marL="228600" lvl="1" indent="-228600" algn="l" defTabSz="889000" rtl="0">
+            <a:lnSpc>
+              <a:spcPct val="90000"/>
+            </a:lnSpc>
+            <a:spcBef>
+              <a:spcPct val="0"/>
+            </a:spcBef>
+            <a:spcAft>
+              <a:spcPct val="20000"/>
+            </a:spcAft>
+            <a:buChar char="••"/>
+          </a:pPr>
+          <a:r>
+            <a:rPr lang="en-US" sz="2000" kern="1200" dirty="0" smtClean="0"/>
+            <a:t>Syntactical parsing scores were not helpful</a:t>
+          </a:r>
+          <a:endParaRPr lang="en-US" sz="2000" kern="1200" dirty="0"/>
         </a:p>
       </dsp:txBody>
       <dsp:txXfrm>
-        <a:off x="1769364" y="1645484"/>
-        <a:ext cx="6460235" cy="381817"/>
+        <a:off x="0" y="1888139"/>
+        <a:ext cx="8229599" cy="1937520"/>
       </dsp:txXfrm>
     </dsp:sp>
-    <dsp:sp modelId="{287C5287-7317-48A3-99DB-642326756138}">
+    <dsp:sp modelId="{E30E8D4F-7EB2-473A-97AE-4FE08EF2F9F9}">
       <dsp:nvSpPr>
         <dsp:cNvPr id="0" name=""/>
         <dsp:cNvSpPr/>
       </dsp:nvSpPr>
       <dsp:spPr>
         <a:xfrm>
-          <a:off x="1645919" y="2027302"/>
-          <a:ext cx="6583679" cy="0"/>
+          <a:off x="0" y="3825659"/>
+          <a:ext cx="8229599" cy="608400"/>
         </a:xfrm>
-        <a:prstGeom prst="line">
+        <a:prstGeom prst="roundRect">
           <a:avLst/>
         </a:prstGeom>
         <a:solidFill>
@@ -2568,379 +2194,7 @@
         </a:solidFill>
         <a:ln w="26425" cap="flat" cmpd="sng" algn="ctr">
           <a:solidFill>
-            <a:schemeClr val="accent1">
-              <a:tint val="50000"/>
-              <a:hueOff val="0"/>
-              <a:satOff val="0"/>
-              <a:lumOff val="0"/>
-              <a:alphaOff val="0"/>
-            </a:schemeClr>
-          </a:solidFill>
-          <a:prstDash val="solid"/>
-        </a:ln>
-        <a:effectLst/>
-      </dsp:spPr>
-      <dsp:style>
-        <a:lnRef idx="2">
-          <a:scrgbClr r="0" g="0" b="0"/>
-        </a:lnRef>
-        <a:fillRef idx="1">
-          <a:scrgbClr r="0" g="0" b="0"/>
-        </a:fillRef>
-        <a:effectRef idx="0">
-          <a:scrgbClr r="0" g="0" b="0"/>
-        </a:effectRef>
-        <a:fontRef idx="minor"/>
-      </dsp:style>
-    </dsp:sp>
-    <dsp:sp modelId="{45834C88-2E51-479B-A432-68F5A83EC9CF}">
-      <dsp:nvSpPr>
-        <dsp:cNvPr id="0" name=""/>
-        <dsp:cNvSpPr/>
-      </dsp:nvSpPr>
-      <dsp:spPr>
-        <a:xfrm>
-          <a:off x="1769364" y="2046392"/>
-          <a:ext cx="6460235" cy="381817"/>
-        </a:xfrm>
-        <a:prstGeom prst="rect">
-          <a:avLst/>
-        </a:prstGeom>
-        <a:noFill/>
-        <a:ln>
-          <a:noFill/>
-        </a:ln>
-        <a:effectLst/>
-      </dsp:spPr>
-      <dsp:style>
-        <a:lnRef idx="0">
-          <a:scrgbClr r="0" g="0" b="0"/>
-        </a:lnRef>
-        <a:fillRef idx="0">
-          <a:scrgbClr r="0" g="0" b="0"/>
-        </a:fillRef>
-        <a:effectRef idx="0">
-          <a:scrgbClr r="0" g="0" b="0"/>
-        </a:effectRef>
-        <a:fontRef idx="minor"/>
-      </dsp:style>
-      <dsp:txBody>
-        <a:bodyPr spcFirstLastPara="0" vert="horz" wrap="square" lIns="68580" tIns="68580" rIns="68580" bIns="68580" numCol="1" spcCol="1270" anchor="t" anchorCtr="0">
-          <a:noAutofit/>
-        </a:bodyPr>
-        <a:lstStyle/>
-        <a:p>
-          <a:pPr lvl="0" algn="l" defTabSz="800100" rtl="0">
-            <a:lnSpc>
-              <a:spcPct val="90000"/>
-            </a:lnSpc>
-            <a:spcBef>
-              <a:spcPct val="0"/>
-            </a:spcBef>
-            <a:spcAft>
-              <a:spcPct val="35000"/>
-            </a:spcAft>
-          </a:pPr>
-          <a:r>
-            <a:rPr lang="en-US" sz="1800" kern="1200" dirty="0" smtClean="0"/>
-            <a:t>No single n-gram model can detect fake sentences</a:t>
-          </a:r>
-          <a:endParaRPr lang="en-US" sz="1800" kern="1200" dirty="0"/>
-        </a:p>
-      </dsp:txBody>
-      <dsp:txXfrm>
-        <a:off x="1769364" y="2046392"/>
-        <a:ext cx="6460235" cy="381817"/>
-      </dsp:txXfrm>
-    </dsp:sp>
-    <dsp:sp modelId="{10408849-71A8-44CE-A4B9-7B407BEBF2AF}">
-      <dsp:nvSpPr>
-        <dsp:cNvPr id="0" name=""/>
-        <dsp:cNvSpPr/>
-      </dsp:nvSpPr>
-      <dsp:spPr>
-        <a:xfrm>
-          <a:off x="1645919" y="2428210"/>
-          <a:ext cx="6583679" cy="0"/>
-        </a:xfrm>
-        <a:prstGeom prst="line">
-          <a:avLst/>
-        </a:prstGeom>
-        <a:solidFill>
-          <a:schemeClr val="accent1">
-            <a:hueOff val="0"/>
-            <a:satOff val="0"/>
-            <a:lumOff val="0"/>
-            <a:alphaOff val="0"/>
-          </a:schemeClr>
-        </a:solidFill>
-        <a:ln w="26425" cap="flat" cmpd="sng" algn="ctr">
-          <a:solidFill>
-            <a:schemeClr val="accent1">
-              <a:tint val="50000"/>
-              <a:hueOff val="0"/>
-              <a:satOff val="0"/>
-              <a:lumOff val="0"/>
-              <a:alphaOff val="0"/>
-            </a:schemeClr>
-          </a:solidFill>
-          <a:prstDash val="solid"/>
-        </a:ln>
-        <a:effectLst/>
-      </dsp:spPr>
-      <dsp:style>
-        <a:lnRef idx="2">
-          <a:scrgbClr r="0" g="0" b="0"/>
-        </a:lnRef>
-        <a:fillRef idx="1">
-          <a:scrgbClr r="0" g="0" b="0"/>
-        </a:fillRef>
-        <a:effectRef idx="0">
-          <a:scrgbClr r="0" g="0" b="0"/>
-        </a:effectRef>
-        <a:fontRef idx="minor"/>
-      </dsp:style>
-    </dsp:sp>
-    <dsp:sp modelId="{44F5A052-F93A-4674-8A7F-FFF84D191908}">
-      <dsp:nvSpPr>
-        <dsp:cNvPr id="0" name=""/>
-        <dsp:cNvSpPr/>
-      </dsp:nvSpPr>
-      <dsp:spPr>
-        <a:xfrm>
-          <a:off x="1769364" y="2447301"/>
-          <a:ext cx="6460235" cy="381817"/>
-        </a:xfrm>
-        <a:prstGeom prst="rect">
-          <a:avLst/>
-        </a:prstGeom>
-        <a:noFill/>
-        <a:ln>
-          <a:noFill/>
-        </a:ln>
-        <a:effectLst/>
-      </dsp:spPr>
-      <dsp:style>
-        <a:lnRef idx="0">
-          <a:scrgbClr r="0" g="0" b="0"/>
-        </a:lnRef>
-        <a:fillRef idx="0">
-          <a:scrgbClr r="0" g="0" b="0"/>
-        </a:fillRef>
-        <a:effectRef idx="0">
-          <a:scrgbClr r="0" g="0" b="0"/>
-        </a:effectRef>
-        <a:fontRef idx="minor"/>
-      </dsp:style>
-      <dsp:txBody>
-        <a:bodyPr spcFirstLastPara="0" vert="horz" wrap="square" lIns="68580" tIns="68580" rIns="68580" bIns="68580" numCol="1" spcCol="1270" anchor="t" anchorCtr="0">
-          <a:noAutofit/>
-        </a:bodyPr>
-        <a:lstStyle/>
-        <a:p>
-          <a:pPr lvl="0" algn="l" defTabSz="800100" rtl="0">
-            <a:lnSpc>
-              <a:spcPct val="90000"/>
-            </a:lnSpc>
-            <a:spcBef>
-              <a:spcPct val="0"/>
-            </a:spcBef>
-            <a:spcAft>
-              <a:spcPct val="35000"/>
-            </a:spcAft>
-          </a:pPr>
-          <a:r>
-            <a:rPr lang="en-US" sz="1800" kern="1200" dirty="0" smtClean="0"/>
-            <a:t>Yet, two n-gram models are sufficient to classify accurately</a:t>
-          </a:r>
-          <a:endParaRPr lang="en-US" sz="1800" kern="1200" dirty="0"/>
-        </a:p>
-      </dsp:txBody>
-      <dsp:txXfrm>
-        <a:off x="1769364" y="2447301"/>
-        <a:ext cx="6460235" cy="381817"/>
-      </dsp:txXfrm>
-    </dsp:sp>
-    <dsp:sp modelId="{8032C194-5C4E-4DDE-BBF6-39836D2ED5AD}">
-      <dsp:nvSpPr>
-        <dsp:cNvPr id="0" name=""/>
-        <dsp:cNvSpPr/>
-      </dsp:nvSpPr>
-      <dsp:spPr>
-        <a:xfrm>
-          <a:off x="1645919" y="2829118"/>
-          <a:ext cx="6583679" cy="0"/>
-        </a:xfrm>
-        <a:prstGeom prst="line">
-          <a:avLst/>
-        </a:prstGeom>
-        <a:solidFill>
-          <a:schemeClr val="accent1">
-            <a:hueOff val="0"/>
-            <a:satOff val="0"/>
-            <a:lumOff val="0"/>
-            <a:alphaOff val="0"/>
-          </a:schemeClr>
-        </a:solidFill>
-        <a:ln w="26425" cap="flat" cmpd="sng" algn="ctr">
-          <a:solidFill>
-            <a:schemeClr val="accent1">
-              <a:tint val="50000"/>
-              <a:hueOff val="0"/>
-              <a:satOff val="0"/>
-              <a:lumOff val="0"/>
-              <a:alphaOff val="0"/>
-            </a:schemeClr>
-          </a:solidFill>
-          <a:prstDash val="solid"/>
-        </a:ln>
-        <a:effectLst/>
-      </dsp:spPr>
-      <dsp:style>
-        <a:lnRef idx="2">
-          <a:scrgbClr r="0" g="0" b="0"/>
-        </a:lnRef>
-        <a:fillRef idx="1">
-          <a:scrgbClr r="0" g="0" b="0"/>
-        </a:fillRef>
-        <a:effectRef idx="0">
-          <a:scrgbClr r="0" g="0" b="0"/>
-        </a:effectRef>
-        <a:fontRef idx="minor"/>
-      </dsp:style>
-    </dsp:sp>
-    <dsp:sp modelId="{C32D5754-64A0-4792-A0CF-A74C321D6ED0}">
-      <dsp:nvSpPr>
-        <dsp:cNvPr id="0" name=""/>
-        <dsp:cNvSpPr/>
-      </dsp:nvSpPr>
-      <dsp:spPr>
-        <a:xfrm>
-          <a:off x="1769364" y="2848209"/>
-          <a:ext cx="6460235" cy="381817"/>
-        </a:xfrm>
-        <a:prstGeom prst="rect">
-          <a:avLst/>
-        </a:prstGeom>
-        <a:noFill/>
-        <a:ln>
-          <a:noFill/>
-        </a:ln>
-        <a:effectLst/>
-      </dsp:spPr>
-      <dsp:style>
-        <a:lnRef idx="0">
-          <a:scrgbClr r="0" g="0" b="0"/>
-        </a:lnRef>
-        <a:fillRef idx="0">
-          <a:scrgbClr r="0" g="0" b="0"/>
-        </a:fillRef>
-        <a:effectRef idx="0">
-          <a:scrgbClr r="0" g="0" b="0"/>
-        </a:effectRef>
-        <a:fontRef idx="minor"/>
-      </dsp:style>
-      <dsp:txBody>
-        <a:bodyPr spcFirstLastPara="0" vert="horz" wrap="square" lIns="68580" tIns="68580" rIns="68580" bIns="68580" numCol="1" spcCol="1270" anchor="t" anchorCtr="0">
-          <a:noAutofit/>
-        </a:bodyPr>
-        <a:lstStyle/>
-        <a:p>
-          <a:pPr lvl="0" algn="l" defTabSz="800100" rtl="0">
-            <a:lnSpc>
-              <a:spcPct val="90000"/>
-            </a:lnSpc>
-            <a:spcBef>
-              <a:spcPct val="0"/>
-            </a:spcBef>
-            <a:spcAft>
-              <a:spcPct val="35000"/>
-            </a:spcAft>
-          </a:pPr>
-          <a:r>
-            <a:rPr lang="en-US" sz="1800" kern="1200" dirty="0" smtClean="0"/>
-            <a:t>Probability estimation may work better with all features</a:t>
-          </a:r>
-          <a:endParaRPr lang="en-US" sz="1800" kern="1200" dirty="0"/>
-        </a:p>
-      </dsp:txBody>
-      <dsp:txXfrm>
-        <a:off x="1769364" y="2848209"/>
-        <a:ext cx="6460235" cy="381817"/>
-      </dsp:txXfrm>
-    </dsp:sp>
-    <dsp:sp modelId="{F85B9B47-5680-44DF-94CC-473B2B3FF22D}">
-      <dsp:nvSpPr>
-        <dsp:cNvPr id="0" name=""/>
-        <dsp:cNvSpPr/>
-      </dsp:nvSpPr>
-      <dsp:spPr>
-        <a:xfrm>
-          <a:off x="1645919" y="3230026"/>
-          <a:ext cx="6583679" cy="0"/>
-        </a:xfrm>
-        <a:prstGeom prst="line">
-          <a:avLst/>
-        </a:prstGeom>
-        <a:solidFill>
-          <a:schemeClr val="accent1">
-            <a:hueOff val="0"/>
-            <a:satOff val="0"/>
-            <a:lumOff val="0"/>
-            <a:alphaOff val="0"/>
-          </a:schemeClr>
-        </a:solidFill>
-        <a:ln w="26425" cap="flat" cmpd="sng" algn="ctr">
-          <a:solidFill>
-            <a:schemeClr val="accent1">
-              <a:tint val="50000"/>
-              <a:hueOff val="0"/>
-              <a:satOff val="0"/>
-              <a:lumOff val="0"/>
-              <a:alphaOff val="0"/>
-            </a:schemeClr>
-          </a:solidFill>
-          <a:prstDash val="solid"/>
-        </a:ln>
-        <a:effectLst/>
-      </dsp:spPr>
-      <dsp:style>
-        <a:lnRef idx="2">
-          <a:scrgbClr r="0" g="0" b="0"/>
-        </a:lnRef>
-        <a:fillRef idx="1">
-          <a:scrgbClr r="0" g="0" b="0"/>
-        </a:fillRef>
-        <a:effectRef idx="0">
-          <a:scrgbClr r="0" g="0" b="0"/>
-        </a:effectRef>
-        <a:fontRef idx="minor"/>
-      </dsp:style>
-    </dsp:sp>
-    <dsp:sp modelId="{52D63BF3-F2BC-4E4D-88EA-BD030AD114D3}">
-      <dsp:nvSpPr>
-        <dsp:cNvPr id="0" name=""/>
-        <dsp:cNvSpPr/>
-      </dsp:nvSpPr>
-      <dsp:spPr>
-        <a:xfrm>
-          <a:off x="0" y="3225802"/>
-          <a:ext cx="8229599" cy="0"/>
-        </a:xfrm>
-        <a:prstGeom prst="line">
-          <a:avLst/>
-        </a:prstGeom>
-        <a:solidFill>
-          <a:schemeClr val="accent1">
-            <a:hueOff val="0"/>
-            <a:satOff val="0"/>
-            <a:lumOff val="0"/>
-            <a:alphaOff val="0"/>
-          </a:schemeClr>
-        </a:solidFill>
-        <a:ln w="26425" cap="flat" cmpd="sng" algn="ctr">
-          <a:solidFill>
-            <a:schemeClr val="accent1">
+            <a:schemeClr val="lt1">
               <a:hueOff val="0"/>
               <a:satOff val="0"/>
               <a:lumOff val="0"/>
@@ -2965,16 +2219,44 @@
           <a:schemeClr val="lt1"/>
         </a:fontRef>
       </dsp:style>
+      <dsp:txBody>
+        <a:bodyPr spcFirstLastPara="0" vert="horz" wrap="square" lIns="99060" tIns="99060" rIns="99060" bIns="99060" numCol="1" spcCol="1270" anchor="ctr" anchorCtr="0">
+          <a:noAutofit/>
+        </a:bodyPr>
+        <a:lstStyle/>
+        <a:p>
+          <a:pPr lvl="0" algn="l" defTabSz="1155700" rtl="0">
+            <a:lnSpc>
+              <a:spcPct val="90000"/>
+            </a:lnSpc>
+            <a:spcBef>
+              <a:spcPct val="0"/>
+            </a:spcBef>
+            <a:spcAft>
+              <a:spcPct val="35000"/>
+            </a:spcAft>
+          </a:pPr>
+          <a:r>
+            <a:rPr lang="en-US" sz="2600" kern="1200" dirty="0" smtClean="0"/>
+            <a:t>Additional data</a:t>
+          </a:r>
+          <a:endParaRPr lang="en-US" sz="2600" kern="1200" dirty="0"/>
+        </a:p>
+      </dsp:txBody>
+      <dsp:txXfrm>
+        <a:off x="0" y="3825659"/>
+        <a:ext cx="8229599" cy="608400"/>
+      </dsp:txXfrm>
     </dsp:sp>
-    <dsp:sp modelId="{AE6FE8FF-43CD-4176-8535-915338C5F596}">
+    <dsp:sp modelId="{301A3487-F354-409E-9FCD-230C4ED9E2CD}">
       <dsp:nvSpPr>
         <dsp:cNvPr id="0" name=""/>
         <dsp:cNvSpPr/>
       </dsp:nvSpPr>
       <dsp:spPr>
         <a:xfrm>
-          <a:off x="0" y="3250406"/>
-          <a:ext cx="1645919" cy="1624012"/>
+          <a:off x="0" y="4434060"/>
+          <a:ext cx="8229599" cy="659294"/>
         </a:xfrm>
         <a:prstGeom prst="rect">
           <a:avLst/>
@@ -2998,12 +2280,12 @@
         <a:fontRef idx="minor"/>
       </dsp:style>
       <dsp:txBody>
-        <a:bodyPr spcFirstLastPara="0" vert="horz" wrap="square" lIns="95250" tIns="95250" rIns="95250" bIns="95250" numCol="1" spcCol="1270" anchor="t" anchorCtr="0">
+        <a:bodyPr spcFirstLastPara="0" vert="horz" wrap="square" lIns="261290" tIns="33020" rIns="184912" bIns="33020" numCol="1" spcCol="1270" anchor="t" anchorCtr="0">
           <a:noAutofit/>
         </a:bodyPr>
         <a:lstStyle/>
         <a:p>
-          <a:pPr lvl="0" algn="l" defTabSz="1111250" rtl="0">
+          <a:pPr marL="228600" lvl="1" indent="-228600" algn="l" defTabSz="889000" rtl="0">
             <a:lnSpc>
               <a:spcPct val="90000"/>
             </a:lnSpc>
@@ -3011,59 +2293,18 @@
               <a:spcPct val="0"/>
             </a:spcBef>
             <a:spcAft>
-              <a:spcPct val="35000"/>
+              <a:spcPct val="20000"/>
             </a:spcAft>
+            <a:buChar char="••"/>
           </a:pPr>
           <a:r>
-            <a:rPr lang="en-US" sz="2500" kern="1200" dirty="0" smtClean="0"/>
-            <a:t>Additional data</a:t>
+            <a:rPr lang="en-US" sz="2000" kern="1200" dirty="0" smtClean="0"/>
+            <a:t>Was probably helpful on the development set</a:t>
           </a:r>
-          <a:endParaRPr lang="en-US" sz="2500" kern="1200" dirty="0"/>
+          <a:endParaRPr lang="en-US" sz="2000" kern="1200" dirty="0"/>
         </a:p>
-      </dsp:txBody>
-      <dsp:txXfrm>
-        <a:off x="0" y="3250406"/>
-        <a:ext cx="1645919" cy="1624012"/>
-      </dsp:txXfrm>
-    </dsp:sp>
-    <dsp:sp modelId="{AF1E62C2-D592-4F29-B31B-17F1F006747D}">
-      <dsp:nvSpPr>
-        <dsp:cNvPr id="0" name=""/>
-        <dsp:cNvSpPr/>
-      </dsp:nvSpPr>
-      <dsp:spPr>
-        <a:xfrm>
-          <a:off x="1769364" y="3288151"/>
-          <a:ext cx="6460235" cy="754912"/>
-        </a:xfrm>
-        <a:prstGeom prst="rect">
-          <a:avLst/>
-        </a:prstGeom>
-        <a:noFill/>
-        <a:ln>
-          <a:noFill/>
-        </a:ln>
-        <a:effectLst/>
-      </dsp:spPr>
-      <dsp:style>
-        <a:lnRef idx="0">
-          <a:scrgbClr r="0" g="0" b="0"/>
-        </a:lnRef>
-        <a:fillRef idx="0">
-          <a:scrgbClr r="0" g="0" b="0"/>
-        </a:fillRef>
-        <a:effectRef idx="0">
-          <a:scrgbClr r="0" g="0" b="0"/>
-        </a:effectRef>
-        <a:fontRef idx="minor"/>
-      </dsp:style>
-      <dsp:txBody>
-        <a:bodyPr spcFirstLastPara="0" vert="horz" wrap="square" lIns="68580" tIns="68580" rIns="68580" bIns="68580" numCol="1" spcCol="1270" anchor="t" anchorCtr="0">
-          <a:noAutofit/>
-        </a:bodyPr>
-        <a:lstStyle/>
         <a:p>
-          <a:pPr lvl="0" algn="l" defTabSz="800100" rtl="0">
+          <a:pPr marL="228600" lvl="1" indent="-228600" algn="l" defTabSz="889000" rtl="0">
             <a:lnSpc>
               <a:spcPct val="90000"/>
             </a:lnSpc>
@@ -3071,188 +2312,33 @@
               <a:spcPct val="0"/>
             </a:spcBef>
             <a:spcAft>
-              <a:spcPct val="35000"/>
+              <a:spcPct val="20000"/>
             </a:spcAft>
+            <a:buChar char="••"/>
           </a:pPr>
           <a:r>
-            <a:rPr lang="en-US" sz="1800" kern="1200" dirty="0" smtClean="0"/>
-            <a:t>Was probably helpful on the development set</a:t>
+            <a:rPr lang="en-US" sz="2000" kern="1200" dirty="0" smtClean="0"/>
+            <a:t>Unsure about unseen data</a:t>
           </a:r>
-          <a:endParaRPr lang="en-US" sz="1800" kern="1200" dirty="0"/>
+          <a:endParaRPr lang="en-US" sz="2000" kern="1200" dirty="0"/>
         </a:p>
       </dsp:txBody>
       <dsp:txXfrm>
-        <a:off x="1769364" y="3288151"/>
-        <a:ext cx="6460235" cy="754912"/>
+        <a:off x="0" y="4434060"/>
+        <a:ext cx="8229599" cy="659294"/>
       </dsp:txXfrm>
-    </dsp:sp>
-    <dsp:sp modelId="{4DE4C443-CFBB-44C0-8F4F-9DAEC67C78C9}">
-      <dsp:nvSpPr>
-        <dsp:cNvPr id="0" name=""/>
-        <dsp:cNvSpPr/>
-      </dsp:nvSpPr>
-      <dsp:spPr>
-        <a:xfrm>
-          <a:off x="1645919" y="3733800"/>
-          <a:ext cx="6583679" cy="0"/>
-        </a:xfrm>
-        <a:prstGeom prst="line">
-          <a:avLst/>
-        </a:prstGeom>
-        <a:solidFill>
-          <a:schemeClr val="accent1">
-            <a:hueOff val="0"/>
-            <a:satOff val="0"/>
-            <a:lumOff val="0"/>
-            <a:alphaOff val="0"/>
-          </a:schemeClr>
-        </a:solidFill>
-        <a:ln w="26425" cap="flat" cmpd="sng" algn="ctr">
-          <a:solidFill>
-            <a:schemeClr val="accent1">
-              <a:tint val="50000"/>
-              <a:hueOff val="0"/>
-              <a:satOff val="0"/>
-              <a:lumOff val="0"/>
-              <a:alphaOff val="0"/>
-            </a:schemeClr>
-          </a:solidFill>
-          <a:prstDash val="solid"/>
-        </a:ln>
-        <a:effectLst/>
-      </dsp:spPr>
-      <dsp:style>
-        <a:lnRef idx="2">
-          <a:scrgbClr r="0" g="0" b="0"/>
-        </a:lnRef>
-        <a:fillRef idx="1">
-          <a:scrgbClr r="0" g="0" b="0"/>
-        </a:fillRef>
-        <a:effectRef idx="0">
-          <a:scrgbClr r="0" g="0" b="0"/>
-        </a:effectRef>
-        <a:fontRef idx="minor"/>
-      </dsp:style>
-    </dsp:sp>
-    <dsp:sp modelId="{8FCFCF74-9697-472C-901A-02B542B6BDE7}">
-      <dsp:nvSpPr>
-        <dsp:cNvPr id="0" name=""/>
-        <dsp:cNvSpPr/>
-      </dsp:nvSpPr>
-      <dsp:spPr>
-        <a:xfrm>
-          <a:off x="1769364" y="3733799"/>
-          <a:ext cx="6460235" cy="754912"/>
-        </a:xfrm>
-        <a:prstGeom prst="rect">
-          <a:avLst/>
-        </a:prstGeom>
-        <a:noFill/>
-        <a:ln>
-          <a:noFill/>
-        </a:ln>
-        <a:effectLst/>
-      </dsp:spPr>
-      <dsp:style>
-        <a:lnRef idx="0">
-          <a:scrgbClr r="0" g="0" b="0"/>
-        </a:lnRef>
-        <a:fillRef idx="0">
-          <a:scrgbClr r="0" g="0" b="0"/>
-        </a:fillRef>
-        <a:effectRef idx="0">
-          <a:scrgbClr r="0" g="0" b="0"/>
-        </a:effectRef>
-        <a:fontRef idx="minor"/>
-      </dsp:style>
-      <dsp:txBody>
-        <a:bodyPr spcFirstLastPara="0" vert="horz" wrap="square" lIns="68580" tIns="68580" rIns="68580" bIns="68580" numCol="1" spcCol="1270" anchor="t" anchorCtr="0">
-          <a:noAutofit/>
-        </a:bodyPr>
-        <a:lstStyle/>
-        <a:p>
-          <a:pPr lvl="0" algn="l" defTabSz="800100" rtl="0">
-            <a:lnSpc>
-              <a:spcPct val="90000"/>
-            </a:lnSpc>
-            <a:spcBef>
-              <a:spcPct val="0"/>
-            </a:spcBef>
-            <a:spcAft>
-              <a:spcPct val="35000"/>
-            </a:spcAft>
-          </a:pPr>
-          <a:r>
-            <a:rPr lang="en-US" sz="1800" kern="1200" dirty="0" smtClean="0"/>
-            <a:t>Unsure about unseen data</a:t>
-          </a:r>
-          <a:endParaRPr lang="en-US" sz="1800" kern="1200" dirty="0"/>
-        </a:p>
-      </dsp:txBody>
-      <dsp:txXfrm>
-        <a:off x="1769364" y="3733799"/>
-        <a:ext cx="6460235" cy="754912"/>
-      </dsp:txXfrm>
-    </dsp:sp>
-    <dsp:sp modelId="{CFBE7A41-3EDD-4238-91F2-C067D3200D74}">
-      <dsp:nvSpPr>
-        <dsp:cNvPr id="0" name=""/>
-        <dsp:cNvSpPr/>
-      </dsp:nvSpPr>
-      <dsp:spPr>
-        <a:xfrm>
-          <a:off x="1645919" y="4191001"/>
-          <a:ext cx="6583679" cy="0"/>
-        </a:xfrm>
-        <a:prstGeom prst="line">
-          <a:avLst/>
-        </a:prstGeom>
-        <a:solidFill>
-          <a:schemeClr val="accent1">
-            <a:hueOff val="0"/>
-            <a:satOff val="0"/>
-            <a:lumOff val="0"/>
-            <a:alphaOff val="0"/>
-          </a:schemeClr>
-        </a:solidFill>
-        <a:ln w="26425" cap="flat" cmpd="sng" algn="ctr">
-          <a:solidFill>
-            <a:schemeClr val="accent1">
-              <a:tint val="50000"/>
-              <a:hueOff val="0"/>
-              <a:satOff val="0"/>
-              <a:lumOff val="0"/>
-              <a:alphaOff val="0"/>
-            </a:schemeClr>
-          </a:solidFill>
-          <a:prstDash val="solid"/>
-        </a:ln>
-        <a:effectLst/>
-      </dsp:spPr>
-      <dsp:style>
-        <a:lnRef idx="2">
-          <a:scrgbClr r="0" g="0" b="0"/>
-        </a:lnRef>
-        <a:fillRef idx="1">
-          <a:scrgbClr r="0" g="0" b="0"/>
-        </a:fillRef>
-        <a:effectRef idx="0">
-          <a:scrgbClr r="0" g="0" b="0"/>
-        </a:effectRef>
-        <a:fontRef idx="minor"/>
-      </dsp:style>
     </dsp:sp>
   </dsp:spTree>
 </dsp:drawing>
 </file>
 
 <file path=ppt/diagrams/layout1.xml><?xml version="1.0" encoding="utf-8"?>
-<dgm:layoutDef xmlns:dgm="http://schemas.openxmlformats.org/drawingml/2006/diagram" xmlns:a="http://schemas.openxmlformats.org/drawingml/2006/main" uniqueId="urn:microsoft.com/office/officeart/2008/layout/LinedList">
+<dgm:layoutDef xmlns:dgm="http://schemas.openxmlformats.org/drawingml/2006/diagram" xmlns:a="http://schemas.openxmlformats.org/drawingml/2006/main" uniqueId="urn:microsoft.com/office/officeart/2005/8/layout/vList2">
   <dgm:title val=""/>
   <dgm:desc val=""/>
   <dgm:catLst>
-    <dgm:cat type="hierarchy" pri="8000"/>
-    <dgm:cat type="list" pri="2500"/>
+    <dgm:cat type="list" pri="3000"/>
+    <dgm:cat type="convert" pri="1000"/>
   </dgm:catLst>
   <dgm:sampData>
     <dgm:dataModel>
@@ -3264,18 +2350,18 @@
         <dgm:pt modelId="11">
           <dgm:prSet phldr="1"/>
         </dgm:pt>
-        <dgm:pt modelId="12">
+        <dgm:pt modelId="2">
           <dgm:prSet phldr="1"/>
         </dgm:pt>
-        <dgm:pt modelId="13">
+        <dgm:pt modelId="21">
           <dgm:prSet phldr="1"/>
         </dgm:pt>
       </dgm:ptLst>
       <dgm:cxnLst>
-        <dgm:cxn modelId="2" srcId="0" destId="1" srcOrd="0" destOrd="0"/>
-        <dgm:cxn modelId="3" srcId="1" destId="11" srcOrd="0" destOrd="0"/>
-        <dgm:cxn modelId="4" srcId="1" destId="12" srcOrd="1" destOrd="0"/>
-        <dgm:cxn modelId="5" srcId="1" destId="13" srcOrd="2" destOrd="0"/>
+        <dgm:cxn modelId="4" srcId="0" destId="1" srcOrd="0" destOrd="0"/>
+        <dgm:cxn modelId="5" srcId="0" destId="2" srcOrd="1" destOrd="0"/>
+        <dgm:cxn modelId="12" srcId="1" destId="11" srcOrd="0" destOrd="0"/>
+        <dgm:cxn modelId="23" srcId="2" destId="21" srcOrd="0" destOrd="0"/>
       </dgm:cxnLst>
       <dgm:bg/>
       <dgm:whole/>
@@ -3285,20 +2371,12 @@
     <dgm:dataModel>
       <dgm:ptLst>
         <dgm:pt modelId="0" type="doc"/>
-        <dgm:pt modelId="1">
-          <dgm:prSet phldr="1"/>
-        </dgm:pt>
-        <dgm:pt modelId="11">
-          <dgm:prSet phldr="1"/>
-        </dgm:pt>
-        <dgm:pt modelId="12">
-          <dgm:prSet phldr="1"/>
-        </dgm:pt>
+        <dgm:pt modelId="1"/>
+        <dgm:pt modelId="2"/>
       </dgm:ptLst>
       <dgm:cxnLst>
-        <dgm:cxn modelId="2" srcId="0" destId="1" srcOrd="0" destOrd="0"/>
-        <dgm:cxn modelId="3" srcId="1" destId="11" srcOrd="0" destOrd="0"/>
-        <dgm:cxn modelId="4" srcId="1" destId="12" srcOrd="1" destOrd="0"/>
+        <dgm:cxn modelId="3" srcId="0" destId="1" srcOrd="0" destOrd="0"/>
+        <dgm:cxn modelId="4" srcId="0" destId="2" srcOrd="1" destOrd="0"/>
       </dgm:cxnLst>
       <dgm:bg/>
       <dgm:whole/>
@@ -3308,405 +2386,114 @@
     <dgm:dataModel>
       <dgm:ptLst>
         <dgm:pt modelId="0" type="doc"/>
-        <dgm:pt modelId="1">
-          <dgm:prSet phldr="1"/>
-        </dgm:pt>
-        <dgm:pt modelId="11">
-          <dgm:prSet phldr="1"/>
-        </dgm:pt>
-        <dgm:pt modelId="12">
-          <dgm:prSet phldr="1"/>
-        </dgm:pt>
+        <dgm:pt modelId="1"/>
+        <dgm:pt modelId="2"/>
+        <dgm:pt modelId="3"/>
+        <dgm:pt modelId="4"/>
       </dgm:ptLst>
       <dgm:cxnLst>
-        <dgm:cxn modelId="2" srcId="0" destId="1" srcOrd="0" destOrd="0"/>
-        <dgm:cxn modelId="3" srcId="1" destId="11" srcOrd="0" destOrd="0"/>
-        <dgm:cxn modelId="4" srcId="1" destId="12" srcOrd="1" destOrd="0"/>
+        <dgm:cxn modelId="5" srcId="0" destId="1" srcOrd="0" destOrd="0"/>
+        <dgm:cxn modelId="6" srcId="0" destId="2" srcOrd="1" destOrd="0"/>
+        <dgm:cxn modelId="7" srcId="0" destId="3" srcOrd="2" destOrd="0"/>
+        <dgm:cxn modelId="8" srcId="0" destId="4" srcOrd="3" destOrd="0"/>
       </dgm:cxnLst>
       <dgm:bg/>
       <dgm:whole/>
     </dgm:dataModel>
   </dgm:clrData>
-  <dgm:layoutNode name="vert0">
+  <dgm:layoutNode name="linear">
     <dgm:varLst>
-      <dgm:dir/>
-      <dgm:animOne val="branch"/>
       <dgm:animLvl val="lvl"/>
+      <dgm:resizeHandles val="exact"/>
     </dgm:varLst>
-    <dgm:choose name="Name0">
-      <dgm:if name="Name1" func="var" arg="dir" op="equ" val="norm">
-        <dgm:alg type="lin">
-          <dgm:param type="linDir" val="fromT"/>
-          <dgm:param type="nodeHorzAlign" val="l"/>
-        </dgm:alg>
-      </dgm:if>
-      <dgm:else name="Name2">
-        <dgm:alg type="lin">
-          <dgm:param type="linDir" val="fromT"/>
-          <dgm:param type="nodeHorzAlign" val="r"/>
-        </dgm:alg>
-      </dgm:else>
-    </dgm:choose>
+    <dgm:alg type="lin">
+      <dgm:param type="linDir" val="fromT"/>
+      <dgm:param type="vertAlign" val="mid"/>
+    </dgm:alg>
     <dgm:shape xmlns:r="http://schemas.openxmlformats.org/officeDocument/2006/relationships" r:blip="">
       <dgm:adjLst/>
     </dgm:shape>
     <dgm:presOf/>
     <dgm:constrLst>
-      <dgm:constr type="w" for="ch" forName="horz1" refType="w"/>
-      <dgm:constr type="h" for="ch" forName="horz1" refType="h"/>
-      <dgm:constr type="h" for="des" forName="vert1" refType="h"/>
-      <dgm:constr type="h" for="des" forName="tx1" refType="h"/>
-      <dgm:constr type="h" for="des" forName="horz2" refType="h"/>
-      <dgm:constr type="h" for="des" forName="vert2" refType="h"/>
-      <dgm:constr type="h" for="des" forName="horz3" refType="h"/>
-      <dgm:constr type="h" for="des" forName="vert3" refType="h"/>
-      <dgm:constr type="h" for="des" forName="horz4" refType="h"/>
-      <dgm:constr type="h" for="des" ptType="node" refType="h"/>
-      <dgm:constr type="primFontSz" for="des" forName="tx1" op="equ" val="65"/>
-      <dgm:constr type="primFontSz" for="des" forName="tx2" op="equ" val="65"/>
-      <dgm:constr type="primFontSz" for="des" forName="tx3" op="equ" val="65"/>
-      <dgm:constr type="primFontSz" for="des" forName="tx4" op="equ" val="65"/>
-      <dgm:constr type="w" for="des" forName="thickLine" refType="w"/>
-      <dgm:constr type="h" for="des" forName="thickLine"/>
-      <dgm:constr type="h" for="des" forName="thinLine1"/>
-      <dgm:constr type="h" for="des" forName="thinLine2b"/>
-      <dgm:constr type="h" for="des" forName="thinLine3"/>
-      <dgm:constr type="h" for="des" forName="vertSpace2a" refType="h" fact="0.05"/>
-      <dgm:constr type="h" for="des" forName="vertSpace2b" refType="h" refFor="des" refForName="vertSpace2a"/>
+      <dgm:constr type="w" for="ch" forName="parentText" refType="w"/>
+      <dgm:constr type="h" for="ch" forName="parentText" refType="primFontSz" refFor="ch" refForName="parentText" fact="0.52"/>
+      <dgm:constr type="w" for="ch" forName="childText" refType="w"/>
+      <dgm:constr type="h" for="ch" forName="childText" refType="primFontSz" refFor="ch" refForName="parentText" fact="0.46"/>
+      <dgm:constr type="h" for="ch" forName="parentText" op="equ"/>
+      <dgm:constr type="primFontSz" for="ch" forName="parentText" op="equ" val="65"/>
+      <dgm:constr type="primFontSz" for="ch" forName="childText" refType="primFontSz" refFor="ch" refForName="parentText" op="equ"/>
+      <dgm:constr type="h" for="ch" forName="spacer" refType="primFontSz" refFor="ch" refForName="parentText" fact="0.08"/>
     </dgm:constrLst>
-    <dgm:forEach name="Name3" axis="ch" ptType="node">
-      <dgm:layoutNode name="thickLine" styleLbl="alignNode1">
-        <dgm:alg type="sp"/>
-        <dgm:shape xmlns:r="http://schemas.openxmlformats.org/officeDocument/2006/relationships" type="line" r:blip="">
+    <dgm:ruleLst>
+      <dgm:rule type="primFontSz" for="ch" forName="parentText" val="5" fact="NaN" max="NaN"/>
+    </dgm:ruleLst>
+    <dgm:forEach name="Name0" axis="ch" ptType="node">
+      <dgm:layoutNode name="parentText" styleLbl="node1">
+        <dgm:varLst>
+          <dgm:chMax val="0"/>
+          <dgm:bulletEnabled val="1"/>
+        </dgm:varLst>
+        <dgm:alg type="tx">
+          <dgm:param type="parTxLTRAlign" val="l"/>
+          <dgm:param type="parTxRTLAlign" val="r"/>
+        </dgm:alg>
+        <dgm:shape xmlns:r="http://schemas.openxmlformats.org/officeDocument/2006/relationships" type="roundRect" r:blip="">
           <dgm:adjLst/>
         </dgm:shape>
-        <dgm:presOf/>
+        <dgm:presOf axis="self"/>
+        <dgm:constrLst>
+          <dgm:constr type="tMarg" refType="primFontSz" fact="0.3"/>
+          <dgm:constr type="bMarg" refType="primFontSz" fact="0.3"/>
+          <dgm:constr type="lMarg" refType="primFontSz" fact="0.3"/>
+          <dgm:constr type="rMarg" refType="primFontSz" fact="0.3"/>
+        </dgm:constrLst>
+        <dgm:ruleLst>
+          <dgm:rule type="h" val="INF" fact="NaN" max="NaN"/>
+        </dgm:ruleLst>
       </dgm:layoutNode>
-      <dgm:layoutNode name="horz1">
-        <dgm:choose name="Name4">
-          <dgm:if name="Name5" func="var" arg="dir" op="equ" val="norm">
-            <dgm:alg type="lin">
-              <dgm:param type="linDir" val="fromL"/>
-              <dgm:param type="nodeVertAlign" val="t"/>
+      <dgm:choose name="Name1">
+        <dgm:if name="Name2" axis="ch" ptType="node" func="cnt" op="gte" val="1">
+          <dgm:layoutNode name="childText" styleLbl="revTx">
+            <dgm:varLst>
+              <dgm:bulletEnabled val="1"/>
+            </dgm:varLst>
+            <dgm:alg type="tx">
+              <dgm:param type="stBulletLvl" val="1"/>
+              <dgm:param type="lnSpAfChP" val="20"/>
             </dgm:alg>
-          </dgm:if>
-          <dgm:else name="Name6">
-            <dgm:alg type="lin">
-              <dgm:param type="linDir" val="fromR"/>
-              <dgm:param type="nodeVertAlign" val="t"/>
-            </dgm:alg>
-          </dgm:else>
-        </dgm:choose>
-        <dgm:shape xmlns:r="http://schemas.openxmlformats.org/officeDocument/2006/relationships" r:blip="">
-          <dgm:adjLst/>
-        </dgm:shape>
-        <dgm:presOf/>
-        <dgm:choose name="Name7">
-          <dgm:if name="Name8" axis="root des" func="maxDepth" op="equ" val="1">
+            <dgm:shape xmlns:r="http://schemas.openxmlformats.org/officeDocument/2006/relationships" type="rect" r:blip="">
+              <dgm:adjLst/>
+            </dgm:shape>
+            <dgm:presOf axis="des" ptType="node"/>
             <dgm:constrLst>
-              <dgm:constr type="w" for="ch" forName="tx1" refType="w"/>
+              <dgm:constr type="tMarg" refType="primFontSz" fact="0.1"/>
+              <dgm:constr type="bMarg" refType="primFontSz" fact="0.1"/>
+              <dgm:constr type="lMarg" refType="w" fact="0.09"/>
             </dgm:constrLst>
-          </dgm:if>
-          <dgm:if name="Name9" axis="root des" func="maxDepth" op="equ" val="2">
-            <dgm:constrLst>
-              <dgm:constr type="w" for="ch" forName="tx1" refType="w" fact="0.2"/>
-              <dgm:constr type="w" for="des" forName="tx2" refType="w" fact="0.785"/>
-              <dgm:constr type="w" for="des" forName="horzSpace2" refType="w" fact="0.015"/>
-              <dgm:constr type="w" for="des" forName="thinLine2b" refType="w" fact="0.8"/>
-            </dgm:constrLst>
-          </dgm:if>
-          <dgm:if name="Name10" axis="root des" func="maxDepth" op="equ" val="3">
-            <dgm:constrLst>
-              <dgm:constr type="w" for="ch" forName="tx1" refType="w" fact="0.2"/>
-              <dgm:constr type="w" for="des" forName="tx2" refType="w" fact="0.385"/>
-              <dgm:constr type="w" for="des" forName="tx3" refType="w" fact="0.385"/>
-              <dgm:constr type="w" for="des" forName="horzSpace2" refType="w" fact="0.015"/>
-              <dgm:constr type="w" for="des" forName="horzSpace3" refType="w" fact="0.015"/>
-              <dgm:constr type="w" for="des" forName="thinLine2b" refType="w" fact="0.8"/>
-              <dgm:constr type="w" for="des" forName="thinLine3" refType="w" fact="0.385"/>
-            </dgm:constrLst>
-          </dgm:if>
-          <dgm:if name="Name11" axis="root des" func="maxDepth" op="gte" val="4">
-            <dgm:constrLst>
-              <dgm:constr type="w" for="ch" forName="tx1" refType="w" fact="0.2"/>
-              <dgm:constr type="w" for="des" forName="tx2" refType="w" fact="0.2516"/>
-              <dgm:constr type="w" for="des" forName="tx3" refType="w" fact="0.2516"/>
-              <dgm:constr type="w" for="des" forName="tx4" refType="w" fact="0.2516"/>
-              <dgm:constr type="w" for="des" forName="horzSpace2" refType="w" fact="0.015"/>
-              <dgm:constr type="w" for="des" forName="horzSpace3" refType="w" fact="0.015"/>
-              <dgm:constr type="w" for="des" forName="horzSpace4" refType="w" fact="0.015"/>
-              <dgm:constr type="w" for="des" forName="thinLine2b" refType="w" fact="0.8"/>
-              <dgm:constr type="w" for="des" forName="thinLine3" refType="w" fact="0.5332"/>
-            </dgm:constrLst>
-          </dgm:if>
-          <dgm:else name="Name12"/>
-        </dgm:choose>
-        <dgm:layoutNode name="tx1" styleLbl="revTx">
-          <dgm:alg type="tx">
-            <dgm:param type="parTxLTRAlign" val="l"/>
-            <dgm:param type="parTxRTLAlign" val="r"/>
-            <dgm:param type="txAnchorVert" val="t"/>
-          </dgm:alg>
-          <dgm:shape xmlns:r="http://schemas.openxmlformats.org/officeDocument/2006/relationships" type="rect" r:blip="">
-            <dgm:adjLst/>
-          </dgm:shape>
-          <dgm:presOf axis="self"/>
-          <dgm:constrLst>
-            <dgm:constr type="tMarg" refType="primFontSz" fact="0.3"/>
-            <dgm:constr type="bMarg" refType="primFontSz" fact="0.3"/>
-            <dgm:constr type="lMarg" refType="primFontSz" fact="0.3"/>
-            <dgm:constr type="rMarg" refType="primFontSz" fact="0.3"/>
-          </dgm:constrLst>
-          <dgm:ruleLst>
-            <dgm:rule type="primFontSz" val="5" fact="NaN" max="NaN"/>
-          </dgm:ruleLst>
-        </dgm:layoutNode>
-        <dgm:layoutNode name="vert1">
-          <dgm:choose name="Name13">
-            <dgm:if name="Name14" func="var" arg="dir" op="equ" val="norm">
-              <dgm:alg type="lin">
-                <dgm:param type="linDir" val="fromT"/>
-                <dgm:param type="nodeHorzAlign" val="l"/>
-              </dgm:alg>
-            </dgm:if>
-            <dgm:else name="Name15">
-              <dgm:alg type="lin">
-                <dgm:param type="linDir" val="fromT"/>
-                <dgm:param type="nodeHorzAlign" val="r"/>
-              </dgm:alg>
-            </dgm:else>
-          </dgm:choose>
-          <dgm:shape xmlns:r="http://schemas.openxmlformats.org/officeDocument/2006/relationships" r:blip="">
-            <dgm:adjLst/>
-          </dgm:shape>
-          <dgm:presOf/>
-          <dgm:forEach name="Name16" axis="ch" ptType="node">
-            <dgm:choose name="Name17">
-              <dgm:if name="Name18" axis="self" ptType="node" func="pos" op="equ" val="1">
-                <dgm:layoutNode name="vertSpace2a">
+            <dgm:ruleLst>
+              <dgm:rule type="h" val="INF" fact="NaN" max="NaN"/>
+            </dgm:ruleLst>
+          </dgm:layoutNode>
+        </dgm:if>
+        <dgm:else name="Name3">
+          <dgm:choose name="Name4">
+            <dgm:if name="Name5" axis="par ch" ptType="doc node" func="cnt" op="gte" val="2">
+              <dgm:forEach name="Name6" axis="followSib" ptType="sibTrans" cnt="1">
+                <dgm:layoutNode name="spacer">
                   <dgm:alg type="sp"/>
                   <dgm:shape xmlns:r="http://schemas.openxmlformats.org/officeDocument/2006/relationships" r:blip="">
                     <dgm:adjLst/>
                   </dgm:shape>
                   <dgm:presOf/>
+                  <dgm:constrLst/>
+                  <dgm:ruleLst/>
                 </dgm:layoutNode>
-              </dgm:if>
-              <dgm:else name="Name19"/>
-            </dgm:choose>
-            <dgm:layoutNode name="horz2">
-              <dgm:choose name="Name20">
-                <dgm:if name="Name21" func="var" arg="dir" op="equ" val="norm">
-                  <dgm:alg type="lin">
-                    <dgm:param type="linDir" val="fromL"/>
-                    <dgm:param type="nodeVertAlign" val="t"/>
-                  </dgm:alg>
-                </dgm:if>
-                <dgm:else name="Name22">
-                  <dgm:alg type="lin">
-                    <dgm:param type="linDir" val="fromR"/>
-                    <dgm:param type="nodeVertAlign" val="t"/>
-                  </dgm:alg>
-                </dgm:else>
-              </dgm:choose>
-              <dgm:shape xmlns:r="http://schemas.openxmlformats.org/officeDocument/2006/relationships" r:blip="">
-                <dgm:adjLst/>
-              </dgm:shape>
-              <dgm:presOf/>
-              <dgm:layoutNode name="horzSpace2">
-                <dgm:alg type="sp"/>
-                <dgm:shape xmlns:r="http://schemas.openxmlformats.org/officeDocument/2006/relationships" r:blip="">
-                  <dgm:adjLst/>
-                </dgm:shape>
-                <dgm:presOf/>
-              </dgm:layoutNode>
-              <dgm:layoutNode name="tx2" styleLbl="revTx">
-                <dgm:alg type="tx">
-                  <dgm:param type="parTxLTRAlign" val="l"/>
-                  <dgm:param type="parTxRTLAlign" val="r"/>
-                  <dgm:param type="txAnchorVert" val="t"/>
-                </dgm:alg>
-                <dgm:shape xmlns:r="http://schemas.openxmlformats.org/officeDocument/2006/relationships" type="rect" r:blip="">
-                  <dgm:adjLst/>
-                </dgm:shape>
-                <dgm:presOf axis="self"/>
-                <dgm:constrLst>
-                  <dgm:constr type="tMarg" refType="primFontSz" fact="0.3"/>
-                  <dgm:constr type="bMarg" refType="primFontSz" fact="0.3"/>
-                  <dgm:constr type="lMarg" refType="primFontSz" fact="0.3"/>
-                  <dgm:constr type="rMarg" refType="primFontSz" fact="0.3"/>
-                </dgm:constrLst>
-                <dgm:ruleLst>
-                  <dgm:rule type="primFontSz" val="5" fact="NaN" max="NaN"/>
-                </dgm:ruleLst>
-              </dgm:layoutNode>
-              <dgm:layoutNode name="vert2">
-                <dgm:choose name="Name23">
-                  <dgm:if name="Name24" func="var" arg="dir" op="equ" val="norm">
-                    <dgm:alg type="lin">
-                      <dgm:param type="linDir" val="fromT"/>
-                      <dgm:param type="nodeHorzAlign" val="l"/>
-                    </dgm:alg>
-                  </dgm:if>
-                  <dgm:else name="Name25">
-                    <dgm:alg type="lin">
-                      <dgm:param type="linDir" val="fromT"/>
-                      <dgm:param type="nodeHorzAlign" val="r"/>
-                    </dgm:alg>
-                  </dgm:else>
-                </dgm:choose>
-                <dgm:shape xmlns:r="http://schemas.openxmlformats.org/officeDocument/2006/relationships" r:blip="">
-                  <dgm:adjLst/>
-                </dgm:shape>
-                <dgm:presOf/>
-                <dgm:forEach name="Name26" axis="ch" ptType="node">
-                  <dgm:layoutNode name="horz3">
-                    <dgm:choose name="Name27">
-                      <dgm:if name="Name28" func="var" arg="dir" op="equ" val="norm">
-                        <dgm:alg type="lin">
-                          <dgm:param type="linDir" val="fromL"/>
-                          <dgm:param type="nodeVertAlign" val="t"/>
-                        </dgm:alg>
-                      </dgm:if>
-                      <dgm:else name="Name29">
-                        <dgm:alg type="lin">
-                          <dgm:param type="linDir" val="fromR"/>
-                          <dgm:param type="nodeVertAlign" val="t"/>
-                        </dgm:alg>
-                      </dgm:else>
-                    </dgm:choose>
-                    <dgm:shape xmlns:r="http://schemas.openxmlformats.org/officeDocument/2006/relationships" r:blip="">
-                      <dgm:adjLst/>
-                    </dgm:shape>
-                    <dgm:presOf/>
-                    <dgm:layoutNode name="horzSpace3">
-                      <dgm:alg type="sp"/>
-                      <dgm:shape xmlns:r="http://schemas.openxmlformats.org/officeDocument/2006/relationships" r:blip="">
-                        <dgm:adjLst/>
-                      </dgm:shape>
-                      <dgm:presOf/>
-                    </dgm:layoutNode>
-                    <dgm:layoutNode name="tx3" styleLbl="revTx">
-                      <dgm:alg type="tx">
-                        <dgm:param type="parTxLTRAlign" val="l"/>
-                        <dgm:param type="parTxRTLAlign" val="r"/>
-                        <dgm:param type="txAnchorVert" val="t"/>
-                      </dgm:alg>
-                      <dgm:shape xmlns:r="http://schemas.openxmlformats.org/officeDocument/2006/relationships" type="rect" r:blip="">
-                        <dgm:adjLst/>
-                      </dgm:shape>
-                      <dgm:presOf axis="self"/>
-                      <dgm:constrLst>
-                        <dgm:constr type="tMarg" refType="primFontSz" fact="0.3"/>
-                        <dgm:constr type="bMarg" refType="primFontSz" fact="0.3"/>
-                        <dgm:constr type="lMarg" refType="primFontSz" fact="0.3"/>
-                        <dgm:constr type="rMarg" refType="primFontSz" fact="0.3"/>
-                      </dgm:constrLst>
-                      <dgm:ruleLst>
-                        <dgm:rule type="primFontSz" val="5" fact="NaN" max="NaN"/>
-                      </dgm:ruleLst>
-                    </dgm:layoutNode>
-                    <dgm:layoutNode name="vert3">
-                      <dgm:choose name="Name30">
-                        <dgm:if name="Name31" func="var" arg="dir" op="equ" val="norm">
-                          <dgm:alg type="lin">
-                            <dgm:param type="linDir" val="fromT"/>
-                            <dgm:param type="nodeHorzAlign" val="l"/>
-                          </dgm:alg>
-                        </dgm:if>
-                        <dgm:else name="Name32">
-                          <dgm:alg type="lin">
-                            <dgm:param type="linDir" val="fromT"/>
-                            <dgm:param type="nodeHorzAlign" val="r"/>
-                          </dgm:alg>
-                        </dgm:else>
-                      </dgm:choose>
-                      <dgm:shape xmlns:r="http://schemas.openxmlformats.org/officeDocument/2006/relationships" r:blip="">
-                        <dgm:adjLst/>
-                      </dgm:shape>
-                      <dgm:presOf/>
-                      <dgm:forEach name="Name33" axis="ch" ptType="node">
-                        <dgm:layoutNode name="horz4">
-                          <dgm:choose name="Name34">
-                            <dgm:if name="Name35" func="var" arg="dir" op="equ" val="norm">
-                              <dgm:alg type="lin">
-                                <dgm:param type="linDir" val="fromL"/>
-                                <dgm:param type="nodeVertAlign" val="t"/>
-                              </dgm:alg>
-                            </dgm:if>
-                            <dgm:else name="Name36">
-                              <dgm:alg type="lin">
-                                <dgm:param type="linDir" val="fromR"/>
-                                <dgm:param type="nodeVertAlign" val="t"/>
-                              </dgm:alg>
-                            </dgm:else>
-                          </dgm:choose>
-                          <dgm:shape xmlns:r="http://schemas.openxmlformats.org/officeDocument/2006/relationships" r:blip="">
-                            <dgm:adjLst/>
-                          </dgm:shape>
-                          <dgm:presOf/>
-                          <dgm:layoutNode name="horzSpace4">
-                            <dgm:alg type="sp"/>
-                            <dgm:shape xmlns:r="http://schemas.openxmlformats.org/officeDocument/2006/relationships" r:blip="">
-                              <dgm:adjLst/>
-                            </dgm:shape>
-                            <dgm:presOf/>
-                          </dgm:layoutNode>
-                          <dgm:layoutNode name="tx4" styleLbl="revTx">
-                            <dgm:varLst>
-                              <dgm:bulletEnabled val="1"/>
-                            </dgm:varLst>
-                            <dgm:alg type="tx">
-                              <dgm:param type="parTxLTRAlign" val="l"/>
-                              <dgm:param type="parTxRTLAlign" val="r"/>
-                              <dgm:param type="txAnchorVert" val="t"/>
-                            </dgm:alg>
-                            <dgm:shape xmlns:r="http://schemas.openxmlformats.org/officeDocument/2006/relationships" type="rect" r:blip="">
-                              <dgm:adjLst/>
-                            </dgm:shape>
-                            <dgm:presOf axis="desOrSelf" ptType="node"/>
-                            <dgm:constrLst>
-                              <dgm:constr type="tMarg" refType="primFontSz" fact="0.3"/>
-                              <dgm:constr type="bMarg" refType="primFontSz" fact="0.3"/>
-                              <dgm:constr type="lMarg" refType="primFontSz" fact="0.3"/>
-                              <dgm:constr type="rMarg" refType="primFontSz" fact="0.3"/>
-                            </dgm:constrLst>
-                            <dgm:ruleLst>
-                              <dgm:rule type="primFontSz" val="5" fact="NaN" max="NaN"/>
-                            </dgm:ruleLst>
-                          </dgm:layoutNode>
-                        </dgm:layoutNode>
-                      </dgm:forEach>
-                    </dgm:layoutNode>
-                  </dgm:layoutNode>
-                  <dgm:forEach name="Name37" axis="followSib" ptType="sibTrans" cnt="1">
-                    <dgm:layoutNode name="thinLine3" styleLbl="callout">
-                      <dgm:alg type="sp"/>
-                      <dgm:shape xmlns:r="http://schemas.openxmlformats.org/officeDocument/2006/relationships" type="line" r:blip="">
-                        <dgm:adjLst/>
-                      </dgm:shape>
-                      <dgm:presOf/>
-                    </dgm:layoutNode>
-                  </dgm:forEach>
-                </dgm:forEach>
-              </dgm:layoutNode>
-            </dgm:layoutNode>
-            <dgm:layoutNode name="thinLine2b" styleLbl="callout">
-              <dgm:alg type="sp"/>
-              <dgm:shape xmlns:r="http://schemas.openxmlformats.org/officeDocument/2006/relationships" type="line" r:blip="">
-                <dgm:adjLst/>
-              </dgm:shape>
-              <dgm:presOf/>
-            </dgm:layoutNode>
-            <dgm:layoutNode name="vertSpace2b">
-              <dgm:alg type="sp"/>
-              <dgm:shape xmlns:r="http://schemas.openxmlformats.org/officeDocument/2006/relationships" r:blip="">
-                <dgm:adjLst/>
-              </dgm:shape>
-              <dgm:presOf/>
-            </dgm:layoutNode>
-          </dgm:forEach>
-        </dgm:layoutNode>
-      </dgm:layoutNode>
+              </dgm:forEach>
+            </dgm:if>
+            <dgm:else name="Name7"/>
+          </dgm:choose>
+        </dgm:else>
+      </dgm:choose>
     </dgm:forEach>
   </dgm:layoutNode>
 </dgm:layoutDef>
@@ -4829,7 +3616,7 @@
             <a:fld id="{534CC314-B7AF-43BB-8BEB-65A7E5BFF83B}" type="datetimeFigureOut">
               <a:rPr lang="en-US" smtClean="0"/>
               <a:pPr/>
-              <a:t>4/28/2013</a:t>
+              <a:t>4/29/2013</a:t>
             </a:fld>
             <a:endParaRPr lang="en-US"/>
           </a:p>
@@ -4998,7 +3785,7 @@
     </p:spTree>
     <p:extLst>
       <p:ext uri="{BB962C8B-B14F-4D97-AF65-F5344CB8AC3E}">
-        <p14:creationId xmlns:p14="http://schemas.microsoft.com/office/powerpoint/2010/main" val="2685327206"/>
+        <p14:creationId xmlns="" xmlns:p14="http://schemas.microsoft.com/office/powerpoint/2010/main" val="2685327206"/>
       </p:ext>
     </p:extLst>
   </p:cSld>
@@ -5173,7 +3960,7 @@
     </p:spTree>
     <p:extLst>
       <p:ext uri="{BB962C8B-B14F-4D97-AF65-F5344CB8AC3E}">
-        <p14:creationId xmlns:p14="http://schemas.microsoft.com/office/powerpoint/2010/main" val="3089979720"/>
+        <p14:creationId xmlns="" xmlns:p14="http://schemas.microsoft.com/office/powerpoint/2010/main" val="3089979720"/>
       </p:ext>
     </p:extLst>
   </p:cSld>
@@ -5266,7 +4053,7 @@
     </p:spTree>
     <p:extLst>
       <p:ext uri="{BB962C8B-B14F-4D97-AF65-F5344CB8AC3E}">
-        <p14:creationId xmlns:p14="http://schemas.microsoft.com/office/powerpoint/2010/main" val="728078676"/>
+        <p14:creationId xmlns="" xmlns:p14="http://schemas.microsoft.com/office/powerpoint/2010/main" val="728078676"/>
       </p:ext>
     </p:extLst>
   </p:cSld>
@@ -5465,7 +4252,7 @@
             <a:fld id="{C314E52B-A153-4F33-892B-6A5FC50AD205}" type="datetime1">
               <a:rPr lang="en-US" smtClean="0"/>
               <a:pPr/>
-              <a:t>4/28/2013</a:t>
+              <a:t>4/29/2013</a:t>
             </a:fld>
             <a:endParaRPr lang="en-US"/>
           </a:p>
@@ -5667,7 +4454,7 @@
             <a:fld id="{C24B32D2-0FEB-467E-9525-88634251D20A}" type="datetime1">
               <a:rPr lang="en-US" smtClean="0"/>
               <a:pPr/>
-              <a:t>4/28/2013</a:t>
+              <a:t>4/29/2013</a:t>
             </a:fld>
             <a:endParaRPr lang="en-US"/>
           </a:p>
@@ -5844,7 +4631,7 @@
             <a:fld id="{075500A3-C128-4164-93F3-3527BB33814C}" type="datetime1">
               <a:rPr lang="en-US" smtClean="0"/>
               <a:pPr/>
-              <a:t>4/28/2013</a:t>
+              <a:t>4/29/2013</a:t>
             </a:fld>
             <a:endParaRPr lang="en-US"/>
           </a:p>
@@ -6011,7 +4798,7 @@
             <a:fld id="{C24BF8B2-C5F3-492D-8C10-460CB5267700}" type="datetime1">
               <a:rPr lang="en-US" smtClean="0"/>
               <a:pPr/>
-              <a:t>4/28/2013</a:t>
+              <a:t>4/29/2013</a:t>
             </a:fld>
             <a:endParaRPr lang="en-US"/>
           </a:p>
@@ -6261,7 +5048,7 @@
             <a:fld id="{D0D8ADFD-1827-4E7D-8E79-B63A92A6D596}" type="datetime1">
               <a:rPr lang="en-US" smtClean="0"/>
               <a:pPr/>
-              <a:t>4/28/2013</a:t>
+              <a:t>4/29/2013</a:t>
             </a:fld>
             <a:endParaRPr lang="en-US"/>
           </a:p>
@@ -6581,7 +5368,7 @@
             <a:fld id="{D15FD25E-98EF-4FE3-B399-F47B08F17FB0}" type="datetime1">
               <a:rPr lang="en-US" smtClean="0"/>
               <a:pPr/>
-              <a:t>4/28/2013</a:t>
+              <a:t>4/29/2013</a:t>
             </a:fld>
             <a:endParaRPr lang="en-US"/>
           </a:p>
@@ -7049,7 +5836,7 @@
             <a:fld id="{D679A803-CC5A-4064-8103-41C147DF6CCA}" type="datetime1">
               <a:rPr lang="en-US" smtClean="0"/>
               <a:pPr/>
-              <a:t>4/28/2013</a:t>
+              <a:t>4/29/2013</a:t>
             </a:fld>
             <a:endParaRPr lang="en-US"/>
           </a:p>
@@ -7199,7 +5986,7 @@
             <a:fld id="{E81A4977-3C39-4974-B7E8-6B9DE6C11AFA}" type="datetime1">
               <a:rPr lang="en-US" smtClean="0"/>
               <a:pPr/>
-              <a:t>4/28/2013</a:t>
+              <a:t>4/29/2013</a:t>
             </a:fld>
             <a:endParaRPr lang="en-US"/>
           </a:p>
@@ -7291,7 +6078,7 @@
             <a:fld id="{C5DB8ED2-EBA6-4C10-BD5D-1D1D28AE36E3}" type="datetime1">
               <a:rPr lang="en-US" smtClean="0"/>
               <a:pPr/>
-              <a:t>4/28/2013</a:t>
+              <a:t>4/29/2013</a:t>
             </a:fld>
             <a:endParaRPr lang="en-US"/>
           </a:p>
@@ -7567,7 +6354,7 @@
             <a:fld id="{561ACD0C-BAFD-4876-9292-8CA4E0132886}" type="datetime1">
               <a:rPr lang="en-US" smtClean="0"/>
               <a:pPr/>
-              <a:t>4/28/2013</a:t>
+              <a:t>4/29/2013</a:t>
             </a:fld>
             <a:endParaRPr lang="en-US"/>
           </a:p>
@@ -7874,7 +6661,7 @@
             <a:fld id="{33DE0785-A7A1-4DAE-B1A1-18A9488A1C66}" type="datetime1">
               <a:rPr lang="en-US" smtClean="0"/>
               <a:pPr/>
-              <a:t>4/28/2013</a:t>
+              <a:t>4/29/2013</a:t>
             </a:fld>
             <a:endParaRPr lang="en-US"/>
           </a:p>
@@ -8174,7 +6961,7 @@
             <a:fld id="{068EFD61-008B-4BC7-8DD5-2AEF65201865}" type="datetime1">
               <a:rPr lang="en-US" smtClean="0"/>
               <a:pPr/>
-              <a:t>4/28/2013</a:t>
+              <a:t>4/29/2013</a:t>
             </a:fld>
             <a:endParaRPr lang="en-US"/>
           </a:p>
@@ -8640,7 +7427,7 @@
           <p:nvPr>
             <p:extLst>
               <p:ext uri="{D42A27DB-BD31-4B8C-83A1-F6EECF244321}">
-                <p14:modId xmlns:p14="http://schemas.microsoft.com/office/powerpoint/2010/main" val="60105034"/>
+                <p14:modId xmlns="" xmlns:p14="http://schemas.microsoft.com/office/powerpoint/2010/main" val="60105034"/>
               </p:ext>
             </p:extLst>
           </p:nvPr>
@@ -8794,7 +7581,7 @@
     </p:spTree>
     <p:extLst>
       <p:ext uri="{BB962C8B-B14F-4D97-AF65-F5344CB8AC3E}">
-        <p14:creationId xmlns:p14="http://schemas.microsoft.com/office/powerpoint/2010/main" val="1598287932"/>
+        <p14:creationId xmlns="" xmlns:p14="http://schemas.microsoft.com/office/powerpoint/2010/main" val="1598287932"/>
       </p:ext>
     </p:extLst>
   </p:cSld>
@@ -8861,7 +7648,7 @@
             <p:ph idx="1"/>
             <p:extLst>
               <p:ext uri="{D42A27DB-BD31-4B8C-83A1-F6EECF244321}">
-                <p14:modId xmlns:p14="http://schemas.microsoft.com/office/powerpoint/2010/main" val="3349619774"/>
+                <p14:modId xmlns="" xmlns:p14="http://schemas.microsoft.com/office/powerpoint/2010/main" val="3349619774"/>
               </p:ext>
             </p:extLst>
           </p:nvPr>
@@ -8963,7 +7750,7 @@
     </p:spTree>
     <p:extLst>
       <p:ext uri="{BB962C8B-B14F-4D97-AF65-F5344CB8AC3E}">
-        <p14:creationId xmlns:p14="http://schemas.microsoft.com/office/powerpoint/2010/main" val="3003807993"/>
+        <p14:creationId xmlns="" xmlns:p14="http://schemas.microsoft.com/office/powerpoint/2010/main" val="3003807993"/>
       </p:ext>
     </p:extLst>
   </p:cSld>
@@ -9007,7 +7794,12 @@
             <p:ph type="title"/>
           </p:nvPr>
         </p:nvSpPr>
-        <p:spPr/>
+        <p:spPr>
+          <a:xfrm>
+            <a:off x="457200" y="457200"/>
+            <a:ext cx="8229600" cy="838200"/>
+          </a:xfrm>
+        </p:spPr>
         <p:txBody>
           <a:bodyPr/>
           <a:lstStyle/>
@@ -9030,14 +7822,14 @@
             <p:ph idx="1"/>
             <p:extLst>
               <p:ext uri="{D42A27DB-BD31-4B8C-83A1-F6EECF244321}">
-                <p14:modId xmlns:p14="http://schemas.microsoft.com/office/powerpoint/2010/main" val="2275833314"/>
+                <p14:modId xmlns="" xmlns:p14="http://schemas.microsoft.com/office/powerpoint/2010/main" val="2275833314"/>
               </p:ext>
             </p:extLst>
           </p:nvPr>
         </p:nvGraphicFramePr>
         <p:xfrm>
-          <a:off x="457200" y="1600200"/>
-          <a:ext cx="8229600" cy="4876800"/>
+          <a:off x="457200" y="1295400"/>
+          <a:ext cx="8229600" cy="5105400"/>
         </p:xfrm>
         <a:graphic>
           <a:graphicData uri="http://schemas.openxmlformats.org/drawingml/2006/diagram">
@@ -9072,7 +7864,7 @@
     </p:spTree>
     <p:extLst>
       <p:ext uri="{BB962C8B-B14F-4D97-AF65-F5344CB8AC3E}">
-        <p14:creationId xmlns:p14="http://schemas.microsoft.com/office/powerpoint/2010/main" val="3162621924"/>
+        <p14:creationId xmlns="" xmlns:p14="http://schemas.microsoft.com/office/powerpoint/2010/main" val="3162621924"/>
       </p:ext>
     </p:extLst>
   </p:cSld>
@@ -9305,7 +8097,7 @@
     </p:spTree>
     <p:extLst>
       <p:ext uri="{BB962C8B-B14F-4D97-AF65-F5344CB8AC3E}">
-        <p14:creationId xmlns:p14="http://schemas.microsoft.com/office/powerpoint/2010/main" val="1574483208"/>
+        <p14:creationId xmlns="" xmlns:p14="http://schemas.microsoft.com/office/powerpoint/2010/main" val="1574483208"/>
       </p:ext>
     </p:extLst>
   </p:cSld>
@@ -9435,14 +8227,25 @@
             <a:pPr lvl="1"/>
             <a:r>
               <a:rPr lang="en-US" sz="2400" dirty="0" smtClean="0"/>
-              <a:t>Mutual information between distant words</a:t>
+              <a:t>Mutual information between distant words in a single sentence</a:t>
             </a:r>
           </a:p>
           <a:p>
             <a:pPr lvl="1"/>
             <a:r>
               <a:rPr lang="en-US" sz="2400" dirty="0" smtClean="0"/>
-              <a:t>Mutual information in between sentences</a:t>
+              <a:t>Mutual information in words across sentences</a:t>
+            </a:r>
+          </a:p>
+          <a:p>
+            <a:pPr lvl="1"/>
+            <a:r>
+              <a:rPr lang="en-US" sz="2400" dirty="0" err="1" smtClean="0"/>
+              <a:t>Syntatctical</a:t>
+            </a:r>
+            <a:r>
+              <a:rPr lang="en-US" sz="2400" dirty="0" smtClean="0"/>
+              <a:t> parsing scores</a:t>
             </a:r>
           </a:p>
         </p:txBody>
@@ -9474,7 +8277,7 @@
     </p:spTree>
     <p:extLst>
       <p:ext uri="{BB962C8B-B14F-4D97-AF65-F5344CB8AC3E}">
-        <p14:creationId xmlns:p14="http://schemas.microsoft.com/office/powerpoint/2010/main" val="47094019"/>
+        <p14:creationId xmlns="" xmlns:p14="http://schemas.microsoft.com/office/powerpoint/2010/main" val="47094019"/>
       </p:ext>
     </p:extLst>
   </p:cSld>
@@ -9548,63 +8351,13 @@
           <a:p>
             <a:r>
               <a:rPr lang="en-US" dirty="0" smtClean="0"/>
-              <a:t>Original text n-gram model perplexity</a:t>
-            </a:r>
-          </a:p>
-          <a:p>
-            <a:pPr lvl="1"/>
+              <a:t>Original text n-gram model perplexity (2 to 7 words, Good-Turing smoothing)</a:t>
+            </a:r>
+          </a:p>
+          <a:p>
             <a:r>
               <a:rPr lang="en-US" dirty="0" smtClean="0"/>
-              <a:t>2 to 7 words (with </a:t>
-            </a:r>
-            <a:r>
-              <a:rPr lang="en-US" dirty="0" err="1" smtClean="0"/>
-              <a:t>backoff</a:t>
-            </a:r>
-            <a:r>
-              <a:rPr lang="en-US" dirty="0" smtClean="0"/>
-              <a:t>)</a:t>
-            </a:r>
-          </a:p>
-          <a:p>
-            <a:pPr lvl="1"/>
-            <a:r>
-              <a:rPr lang="en-US" dirty="0" smtClean="0"/>
-              <a:t>Good-Turing smoothing</a:t>
-            </a:r>
-          </a:p>
-          <a:p>
-            <a:r>
-              <a:rPr lang="en-US" dirty="0" smtClean="0"/>
-              <a:t>POS tag n-gram model perplexity</a:t>
-            </a:r>
-          </a:p>
-          <a:p>
-            <a:pPr lvl="1"/>
-            <a:r>
-              <a:rPr lang="en-US" dirty="0" smtClean="0"/>
-              <a:t>2 to 7 tags (with </a:t>
-            </a:r>
-            <a:r>
-              <a:rPr lang="en-US" dirty="0" err="1" smtClean="0"/>
-              <a:t>backoff</a:t>
-            </a:r>
-            <a:r>
-              <a:rPr lang="en-US" dirty="0" smtClean="0"/>
-              <a:t>)</a:t>
-            </a:r>
-          </a:p>
-          <a:p>
-            <a:pPr lvl="1"/>
-            <a:r>
-              <a:rPr lang="en-US" dirty="0" smtClean="0"/>
-              <a:t>Good-Turing smoothing</a:t>
-            </a:r>
-          </a:p>
-          <a:p>
-            <a:r>
-              <a:rPr lang="en-US" dirty="0" smtClean="0"/>
-              <a:t>Number of &lt;UNK&gt; words and the total number of words</a:t>
+              <a:t>POS tag n-gram model perplexity (2 to 7 tags, Good-Turing smoothing)</a:t>
             </a:r>
           </a:p>
           <a:p>
@@ -9625,6 +8378,18 @@
             <a:r>
               <a:rPr lang="en-US" dirty="0" smtClean="0"/>
               <a:t>Point-wise mutual information between words in different sentences</a:t>
+            </a:r>
+          </a:p>
+          <a:p>
+            <a:r>
+              <a:rPr lang="en-US" dirty="0" smtClean="0"/>
+              <a:t>Proportion of words that repeat in more than one sentence</a:t>
+            </a:r>
+          </a:p>
+          <a:p>
+            <a:r>
+              <a:rPr lang="en-US" dirty="0" smtClean="0"/>
+              <a:t>Syntactical parsing scores</a:t>
             </a:r>
             <a:endParaRPr lang="en-US" dirty="0"/>
           </a:p>
@@ -9657,7 +8422,7 @@
     </p:spTree>
     <p:extLst>
       <p:ext uri="{BB962C8B-B14F-4D97-AF65-F5344CB8AC3E}">
-        <p14:creationId xmlns:p14="http://schemas.microsoft.com/office/powerpoint/2010/main" val="2398862653"/>
+        <p14:creationId xmlns="" xmlns:p14="http://schemas.microsoft.com/office/powerpoint/2010/main" val="2398862653"/>
       </p:ext>
     </p:extLst>
   </p:cSld>
@@ -9746,7 +8511,7 @@
           <a:p>
             <a:r>
               <a:rPr lang="en-US" dirty="0" smtClean="0"/>
-              <a:t>Real data was generated by extracting a long piece that starts at a random sentence</a:t>
+              <a:t>Real data was generated by extracting a long piece that started at a random sentence</a:t>
             </a:r>
           </a:p>
           <a:p>
@@ -9791,7 +8556,7 @@
     </p:spTree>
     <p:extLst>
       <p:ext uri="{BB962C8B-B14F-4D97-AF65-F5344CB8AC3E}">
-        <p14:creationId xmlns:p14="http://schemas.microsoft.com/office/powerpoint/2010/main" val="3229135573"/>
+        <p14:creationId xmlns="" xmlns:p14="http://schemas.microsoft.com/office/powerpoint/2010/main" val="3229135573"/>
       </p:ext>
     </p:extLst>
   </p:cSld>
@@ -9948,7 +8713,7 @@
             <a:pPr marL="457200" lvl="2"/>
             <a:r>
               <a:rPr lang="en-US" dirty="0" smtClean="0"/>
-              <a:t>Short includes only for 3-gram and 4-gram models</a:t>
+              <a:t>Short includes only 3-gram and 4-gram models</a:t>
             </a:r>
             <a:endParaRPr lang="en-US" dirty="0"/>
           </a:p>
@@ -9984,7 +8749,7 @@
     </p:spTree>
     <p:extLst>
       <p:ext uri="{BB962C8B-B14F-4D97-AF65-F5344CB8AC3E}">
-        <p14:creationId xmlns:p14="http://schemas.microsoft.com/office/powerpoint/2010/main" val="195055784"/>
+        <p14:creationId xmlns="" xmlns:p14="http://schemas.microsoft.com/office/powerpoint/2010/main" val="195055784"/>
       </p:ext>
     </p:extLst>
   </p:cSld>
@@ -10082,7 +8847,7 @@
             <p:ph sz="half" idx="2"/>
             <p:extLst>
               <p:ext uri="{D42A27DB-BD31-4B8C-83A1-F6EECF244321}">
-                <p14:modId xmlns:p14="http://schemas.microsoft.com/office/powerpoint/2010/main" val="2446293108"/>
+                <p14:modId xmlns="" xmlns:p14="http://schemas.microsoft.com/office/powerpoint/2010/main" val="2446293108"/>
               </p:ext>
             </p:extLst>
           </p:nvPr>
@@ -10328,7 +9093,7 @@
             <p:ph sz="quarter" idx="4"/>
             <p:extLst>
               <p:ext uri="{D42A27DB-BD31-4B8C-83A1-F6EECF244321}">
-                <p14:modId xmlns:p14="http://schemas.microsoft.com/office/powerpoint/2010/main" val="2421856549"/>
+                <p14:modId xmlns="" xmlns:p14="http://schemas.microsoft.com/office/powerpoint/2010/main" val="2421856549"/>
               </p:ext>
             </p:extLst>
           </p:nvPr>
@@ -10532,7 +9297,7 @@
           <p:nvPr>
             <p:extLst>
               <p:ext uri="{D42A27DB-BD31-4B8C-83A1-F6EECF244321}">
-                <p14:modId xmlns:p14="http://schemas.microsoft.com/office/powerpoint/2010/main" val="638539270"/>
+                <p14:modId xmlns="" xmlns:p14="http://schemas.microsoft.com/office/powerpoint/2010/main" val="638539270"/>
               </p:ext>
             </p:extLst>
           </p:nvPr>
@@ -10746,7 +9511,7 @@
           <p:nvPr>
             <p:extLst>
               <p:ext uri="{D42A27DB-BD31-4B8C-83A1-F6EECF244321}">
-                <p14:modId xmlns:p14="http://schemas.microsoft.com/office/powerpoint/2010/main" val="1995753916"/>
+                <p14:modId xmlns="" xmlns:p14="http://schemas.microsoft.com/office/powerpoint/2010/main" val="1995753916"/>
               </p:ext>
             </p:extLst>
           </p:nvPr>
@@ -11139,7 +9904,15 @@
           <a:p>
             <a:r>
               <a:rPr lang="en-US" dirty="0" smtClean="0"/>
-              <a:t>Soft Metric (LR-L1)</a:t>
+              <a:t>2</a:t>
+            </a:r>
+            <a:r>
+              <a:rPr lang="en-US" baseline="30000" dirty="0" smtClean="0"/>
+              <a:t>Soft Metric</a:t>
+            </a:r>
+            <a:r>
+              <a:rPr lang="en-US" dirty="0" smtClean="0"/>
+              <a:t> (LR-L1)</a:t>
             </a:r>
             <a:endParaRPr lang="en-US" dirty="0"/>
           </a:p>
@@ -11343,7 +10116,15 @@
           <a:p>
             <a:r>
               <a:rPr lang="en-US" dirty="0" smtClean="0"/>
-              <a:t>Soft Metric (LR-L1)</a:t>
+              <a:t>2</a:t>
+            </a:r>
+            <a:r>
+              <a:rPr lang="en-US" baseline="30000" dirty="0" smtClean="0"/>
+              <a:t>Soft Metric</a:t>
+            </a:r>
+            <a:r>
+              <a:rPr lang="en-US" dirty="0" smtClean="0"/>
+              <a:t> (LR-L1)</a:t>
             </a:r>
             <a:endParaRPr lang="en-US" dirty="0"/>
           </a:p>
@@ -11784,7 +10565,7 @@
     </p:spTree>
     <p:extLst>
       <p:ext uri="{BB962C8B-B14F-4D97-AF65-F5344CB8AC3E}">
-        <p14:creationId xmlns:p14="http://schemas.microsoft.com/office/powerpoint/2010/main" val="1468082760"/>
+        <p14:creationId xmlns="" xmlns:p14="http://schemas.microsoft.com/office/powerpoint/2010/main" val="1468082760"/>
       </p:ext>
     </p:extLst>
   </p:cSld>
@@ -11857,7 +10638,7 @@
           <a:blip r:embed="rId3" cstate="print">
             <a:extLst>
               <a:ext uri="{28A0092B-C50C-407E-A947-70E740481C1C}">
-                <a14:useLocalDpi xmlns:a14="http://schemas.microsoft.com/office/drawing/2010/main" val="0"/>
+                <a14:useLocalDpi xmlns="" xmlns:a14="http://schemas.microsoft.com/office/drawing/2010/main" val="0"/>
               </a:ext>
             </a:extLst>
           </a:blip>
@@ -11881,7 +10662,7 @@
         <p:spPr>
           <a:xfrm>
             <a:off x="5867400" y="3581400"/>
-            <a:ext cx="2895600" cy="1200329"/>
+            <a:ext cx="2895600" cy="830997"/>
           </a:xfrm>
           <a:prstGeom prst="rect">
             <a:avLst/>
@@ -11907,11 +10688,12 @@
           </a:bodyPr>
           <a:lstStyle/>
           <a:p>
-            <a:r>
-              <a:rPr lang="en-US" dirty="0" smtClean="0"/>
+            <a:pPr algn="just"/>
+            <a:r>
+              <a:rPr lang="en-US" sz="1600" dirty="0" smtClean="0"/>
               <a:t>No single model can separate fake and real documents, but two models can!</a:t>
             </a:r>
-            <a:endParaRPr lang="en-US" dirty="0"/>
+            <a:endParaRPr lang="en-US" sz="1600" dirty="0"/>
           </a:p>
         </p:txBody>
       </p:sp>
@@ -11942,7 +10724,7 @@
     </p:spTree>
     <p:extLst>
       <p:ext uri="{BB962C8B-B14F-4D97-AF65-F5344CB8AC3E}">
-        <p14:creationId xmlns:p14="http://schemas.microsoft.com/office/powerpoint/2010/main" val="1978906286"/>
+        <p14:creationId xmlns="" xmlns:p14="http://schemas.microsoft.com/office/powerpoint/2010/main" val="1978906286"/>
       </p:ext>
     </p:extLst>
   </p:cSld>
@@ -11993,7 +10775,7 @@
           <a:p>
             <a:r>
               <a:rPr lang="en-US" dirty="0" smtClean="0"/>
-              <a:t>Word occurrences features</a:t>
+              <a:t>Word Occurrence Features</a:t>
             </a:r>
             <a:endParaRPr lang="en-US" dirty="0"/>
           </a:p>
@@ -12013,7 +10795,7 @@
           <a:blip r:embed="rId2" cstate="print">
             <a:extLst>
               <a:ext uri="{28A0092B-C50C-407E-A947-70E740481C1C}">
-                <a14:useLocalDpi xmlns:a14="http://schemas.microsoft.com/office/drawing/2010/main" val="0"/>
+                <a14:useLocalDpi xmlns="" xmlns:a14="http://schemas.microsoft.com/office/drawing/2010/main" val="0"/>
               </a:ext>
             </a:extLst>
           </a:blip>
@@ -12039,10 +10821,10 @@
           </p:nvPr>
         </p:nvPicPr>
         <p:blipFill>
-          <a:blip r:embed="rId3">
+          <a:blip r:embed="rId3" cstate="print">
             <a:extLst>
               <a:ext uri="{28A0092B-C50C-407E-A947-70E740481C1C}">
-                <a14:useLocalDpi xmlns:a14="http://schemas.microsoft.com/office/drawing/2010/main" val="0"/>
+                <a14:useLocalDpi xmlns="" xmlns:a14="http://schemas.microsoft.com/office/drawing/2010/main" val="0"/>
               </a:ext>
             </a:extLst>
           </a:blip>
@@ -12144,7 +10926,7 @@
     </p:spTree>
     <p:extLst>
       <p:ext uri="{BB962C8B-B14F-4D97-AF65-F5344CB8AC3E}">
-        <p14:creationId xmlns:p14="http://schemas.microsoft.com/office/powerpoint/2010/main" val="115826910"/>
+        <p14:creationId xmlns="" xmlns:p14="http://schemas.microsoft.com/office/powerpoint/2010/main" val="115826910"/>
       </p:ext>
     </p:extLst>
   </p:cSld>

</xml_diff>